<commit_message>
Add Chi square and Estimation
</commit_message>
<xml_diff>
--- a/Statistics/Lesson 7 Inferential Statistics.pptx
+++ b/Statistics/Lesson 7 Inferential Statistics.pptx
@@ -5,7 +5,7 @@
     <p:sldMasterId id="2147483648" r:id="rId1"/>
   </p:sldMasterIdLst>
   <p:notesMasterIdLst>
-    <p:notesMasterId r:id="rId34"/>
+    <p:notesMasterId r:id="rId44"/>
   </p:notesMasterIdLst>
   <p:sldIdLst>
     <p:sldId id="256" r:id="rId2"/>
@@ -39,7 +39,17 @@
     <p:sldId id="289" r:id="rId30"/>
     <p:sldId id="290" r:id="rId31"/>
     <p:sldId id="291" r:id="rId32"/>
-    <p:sldId id="259" r:id="rId33"/>
+    <p:sldId id="292" r:id="rId33"/>
+    <p:sldId id="293" r:id="rId34"/>
+    <p:sldId id="294" r:id="rId35"/>
+    <p:sldId id="295" r:id="rId36"/>
+    <p:sldId id="296" r:id="rId37"/>
+    <p:sldId id="297" r:id="rId38"/>
+    <p:sldId id="298" r:id="rId39"/>
+    <p:sldId id="299" r:id="rId40"/>
+    <p:sldId id="300" r:id="rId41"/>
+    <p:sldId id="301" r:id="rId42"/>
+    <p:sldId id="259" r:id="rId43"/>
   </p:sldIdLst>
   <p:sldSz cx="12192000" cy="6858000"/>
   <p:notesSz cx="6858000" cy="9144000"/>
@@ -17245,7 +17255,7 @@
         </p:nvSpPr>
         <p:spPr>
           <a:xfrm>
-            <a:off x="802784" y="1047241"/>
+            <a:off x="802784" y="1034362"/>
             <a:ext cx="10646534" cy="5611793"/>
           </a:xfrm>
           <a:prstGeom prst="rect">
@@ -17611,7 +17621,7 @@
         </p:nvSpPr>
         <p:spPr>
           <a:xfrm>
-            <a:off x="802784" y="1047241"/>
+            <a:off x="802783" y="1044804"/>
             <a:ext cx="10646534" cy="369332"/>
           </a:xfrm>
           <a:prstGeom prst="rect">
@@ -21425,7 +21435,7 @@
         <p:spPr>
           <a:xfrm>
             <a:off x="802784" y="1047241"/>
-            <a:ext cx="10646534" cy="369332"/>
+            <a:ext cx="10646534" cy="4057521"/>
           </a:xfrm>
           <a:prstGeom prst="rect">
             <a:avLst/>
@@ -21438,21 +21448,213 @@
           </a:bodyPr>
           <a:lstStyle/>
           <a:p>
+            <a:pPr>
+              <a:spcAft>
+                <a:spcPts val="1000"/>
+              </a:spcAft>
+            </a:pPr>
+            <a:r>
+              <a:rPr lang="en-IN" dirty="0"/>
+              <a:t>The distribution of the chi-square statistic is called the chi-square distribution</a:t>
+            </a:r>
             <a:r>
               <a:rPr lang="en-IN" dirty="0" smtClean="0"/>
-              <a:t>It is </a:t>
+              <a:t>.</a:t>
+            </a:r>
+          </a:p>
+          <a:p>
+            <a:pPr>
+              <a:spcAft>
+                <a:spcPts val="1000"/>
+              </a:spcAft>
+            </a:pPr>
+            <a:r>
+              <a:rPr lang="en-IN" dirty="0" smtClean="0"/>
+              <a:t>Suppose </a:t>
             </a:r>
             <a:r>
               <a:rPr lang="en-IN" dirty="0"/>
-              <a:t>a probability distribution that is used to estimate population parameters </a:t>
+              <a:t>we conduct the following statistical experiment. We select a random sample of size n from a normal population, having a standard deviation equal to σ. We find that the standard deviation in our sample is equal to s. Given these data, we can define a statistic, called chi-square, using the following equation</a:t>
             </a:r>
             <a:r>
               <a:rPr lang="en-IN" dirty="0" smtClean="0"/>
-              <a:t>when:</a:t>
-            </a:r>
+              <a:t>:</a:t>
+            </a:r>
+            <a:endParaRPr lang="en-IN" dirty="0"/>
+          </a:p>
+          <a:p>
+            <a:pPr algn="ctr">
+              <a:spcAft>
+                <a:spcPts val="1000"/>
+              </a:spcAft>
+            </a:pPr>
+            <a:r>
+              <a:rPr lang="en-IN" b="1" i="1" dirty="0"/>
+              <a:t>Χ2 = [ ( n - 1 ) * s2 ] / </a:t>
+            </a:r>
+            <a:r>
+              <a:rPr lang="en-IN" b="1" i="1" dirty="0" smtClean="0"/>
+              <a:t>σ2</a:t>
+            </a:r>
+          </a:p>
+          <a:p>
+            <a:pPr>
+              <a:spcAft>
+                <a:spcPts val="1000"/>
+              </a:spcAft>
+            </a:pPr>
+            <a:r>
+              <a:rPr lang="en-IN" dirty="0"/>
+              <a:t>The distribution of the chi-square statistic is called the chi-square distribution. The chi-square distribution is defined by the following probability density function:</a:t>
+            </a:r>
+          </a:p>
+          <a:p>
+            <a:pPr algn="ctr">
+              <a:spcAft>
+                <a:spcPts val="1000"/>
+              </a:spcAft>
+            </a:pPr>
+            <a:r>
+              <a:rPr lang="es-ES" b="1" i="1" dirty="0"/>
+              <a:t>Y = Y</a:t>
+            </a:r>
+            <a:r>
+              <a:rPr lang="es-ES" b="1" i="1" baseline="-25000" dirty="0"/>
+              <a:t>0</a:t>
+            </a:r>
+            <a:r>
+              <a:rPr lang="es-ES" b="1" i="1" dirty="0"/>
+              <a:t> * ( Χ</a:t>
+            </a:r>
+            <a:r>
+              <a:rPr lang="es-ES" b="1" i="1" baseline="30000" dirty="0"/>
+              <a:t>2</a:t>
+            </a:r>
+            <a:r>
+              <a:rPr lang="es-ES" b="1" i="1" dirty="0"/>
+              <a:t> ) </a:t>
+            </a:r>
+            <a:r>
+              <a:rPr lang="es-ES" b="1" i="1" baseline="30000" dirty="0"/>
+              <a:t>( v/2 - 1 )</a:t>
+            </a:r>
+            <a:r>
+              <a:rPr lang="es-ES" b="1" i="1" dirty="0"/>
+              <a:t> * e</a:t>
+            </a:r>
+            <a:r>
+              <a:rPr lang="es-ES" b="1" i="1" baseline="30000" dirty="0"/>
+              <a:t>-Χ2 / </a:t>
+            </a:r>
+            <a:r>
+              <a:rPr lang="es-ES" b="1" i="1" baseline="30000" dirty="0" smtClean="0"/>
+              <a:t>2</a:t>
+            </a:r>
+          </a:p>
+          <a:p>
+            <a:r>
+              <a:rPr lang="en-IN" dirty="0"/>
+              <a:t>where Y</a:t>
+            </a:r>
+            <a:r>
+              <a:rPr lang="en-IN" baseline="-25000" dirty="0"/>
+              <a:t>0</a:t>
+            </a:r>
+            <a:r>
+              <a:rPr lang="en-IN" dirty="0"/>
+              <a:t> is a constant that depends on the </a:t>
+            </a:r>
+            <a:endParaRPr lang="en-IN" dirty="0" smtClean="0"/>
+          </a:p>
+          <a:p>
+            <a:r>
+              <a:rPr lang="en-IN" dirty="0" smtClean="0"/>
+              <a:t>number </a:t>
+            </a:r>
+            <a:r>
+              <a:rPr lang="en-IN" dirty="0"/>
+              <a:t>of degrees of freedom, </a:t>
+            </a:r>
+            <a:endParaRPr lang="en-IN" dirty="0" smtClean="0"/>
+          </a:p>
+          <a:p>
+            <a:r>
+              <a:rPr lang="en-IN" dirty="0" smtClean="0"/>
+              <a:t>Χ</a:t>
+            </a:r>
+            <a:r>
+              <a:rPr lang="en-IN" baseline="30000" dirty="0" smtClean="0"/>
+              <a:t>2</a:t>
+            </a:r>
+            <a:r>
+              <a:rPr lang="en-IN" dirty="0" smtClean="0"/>
+              <a:t> </a:t>
+            </a:r>
+            <a:r>
+              <a:rPr lang="en-IN" dirty="0"/>
+              <a:t>is the chi-square statistic, </a:t>
+            </a:r>
+            <a:endParaRPr lang="en-IN" dirty="0" smtClean="0"/>
+          </a:p>
+          <a:p>
+            <a:r>
+              <a:rPr lang="en-IN" i="1" dirty="0" smtClean="0"/>
+              <a:t>v</a:t>
+            </a:r>
+            <a:r>
+              <a:rPr lang="en-IN" dirty="0" smtClean="0"/>
+              <a:t> </a:t>
+            </a:r>
+            <a:r>
+              <a:rPr lang="en-IN" dirty="0"/>
+              <a:t>= </a:t>
+            </a:r>
+            <a:r>
+              <a:rPr lang="en-IN" i="1" dirty="0"/>
+              <a:t>n</a:t>
+            </a:r>
+            <a:r>
+              <a:rPr lang="en-IN" dirty="0"/>
+              <a:t> - 1 is the number of degrees of </a:t>
+            </a:r>
+            <a:r>
+              <a:rPr lang="en-IN" dirty="0" smtClean="0"/>
+              <a:t>freedom.</a:t>
+            </a:r>
+            <a:endParaRPr lang="en-IN" dirty="0"/>
           </a:p>
         </p:txBody>
       </p:sp>
+      <p:pic>
+        <p:nvPicPr>
+          <p:cNvPr id="3" name="Picture 2"/>
+          <p:cNvPicPr>
+            <a:picLocks noChangeAspect="1"/>
+          </p:cNvPicPr>
+          <p:nvPr/>
+        </p:nvPicPr>
+        <p:blipFill>
+          <a:blip r:embed="rId2" cstate="print">
+            <a:extLst>
+              <a:ext uri="{28A0092B-C50C-407E-A947-70E740481C1C}">
+                <a14:useLocalDpi xmlns:a14="http://schemas.microsoft.com/office/drawing/2010/main" val="0"/>
+              </a:ext>
+            </a:extLst>
+          </a:blip>
+          <a:stretch>
+            <a:fillRect/>
+          </a:stretch>
+        </p:blipFill>
+        <p:spPr>
+          <a:xfrm>
+            <a:off x="7048499" y="3924121"/>
+            <a:ext cx="4400819" cy="2933879"/>
+          </a:xfrm>
+          <a:prstGeom prst="rect">
+            <a:avLst/>
+          </a:prstGeom>
+        </p:spPr>
+      </p:pic>
     </p:spTree>
     <p:extLst>
       <p:ext uri="{BB962C8B-B14F-4D97-AF65-F5344CB8AC3E}">
@@ -21503,7 +21705,7 @@
         <p:spPr>
           <a:xfrm>
             <a:off x="802783" y="270455"/>
-            <a:ext cx="9144000" cy="711548"/>
+            <a:ext cx="9796530" cy="711548"/>
           </a:xfrm>
         </p:spPr>
         <p:txBody>
@@ -21515,7 +21717,7 @@
             <a:pPr algn="l"/>
             <a:r>
               <a:rPr lang="en-US" sz="4000" dirty="0" smtClean="0"/>
-              <a:t>Inferential Statistics - Topics</a:t>
+              <a:t>Chi-Square Distribution</a:t>
             </a:r>
             <a:endParaRPr lang="en-IN" sz="4000" dirty="0"/>
           </a:p>
@@ -21566,8 +21768,8 @@
         </p:nvSpPr>
         <p:spPr>
           <a:xfrm>
-            <a:off x="914400" y="1339403"/>
-            <a:ext cx="9672034" cy="3693319"/>
+            <a:off x="802784" y="1047241"/>
+            <a:ext cx="10646534" cy="4632037"/>
           </a:xfrm>
           <a:prstGeom prst="rect">
             <a:avLst/>
@@ -21580,90 +21782,268 @@
           </a:bodyPr>
           <a:lstStyle/>
           <a:p>
+            <a:pPr>
+              <a:spcAft>
+                <a:spcPts val="1000"/>
+              </a:spcAft>
+            </a:pPr>
+            <a:r>
+              <a:rPr lang="en-US" b="1" dirty="0" smtClean="0"/>
+              <a:t>Things to remember:</a:t>
+            </a:r>
+          </a:p>
+          <a:p>
+            <a:pPr marL="285750" indent="-285750">
+              <a:buFont typeface="Arial" panose="020B0604020202020204" pitchFamily="34" charset="0"/>
+              <a:buChar char="•"/>
+            </a:pPr>
+            <a:r>
+              <a:rPr lang="en-IN" dirty="0"/>
+              <a:t>As the degrees of freedom increase, the chi-square curve approaches a normal distribution</a:t>
+            </a:r>
+            <a:r>
+              <a:rPr lang="en-IN" dirty="0" smtClean="0"/>
+              <a:t>.</a:t>
+            </a:r>
+          </a:p>
+          <a:p>
+            <a:pPr marL="285750" indent="-285750">
+              <a:buFont typeface="Arial" panose="020B0604020202020204" pitchFamily="34" charset="0"/>
+              <a:buChar char="•"/>
+            </a:pPr>
+            <a:r>
+              <a:rPr lang="en-IN" dirty="0"/>
+              <a:t>The chi-square distribution is constructed so that the total area under the curve is equal to 1</a:t>
+            </a:r>
+            <a:r>
+              <a:rPr lang="en-IN" dirty="0" smtClean="0"/>
+              <a:t>.</a:t>
+            </a:r>
+          </a:p>
+          <a:p>
+            <a:pPr marL="285750" indent="-285750">
+              <a:buFont typeface="Arial" panose="020B0604020202020204" pitchFamily="34" charset="0"/>
+              <a:buChar char="•"/>
+            </a:pPr>
+            <a:r>
+              <a:rPr lang="en-IN" dirty="0"/>
+              <a:t>The area under the curve between 0 and a particular chi-square value is a cumulative probability associated with that chi-square value</a:t>
+            </a:r>
+            <a:r>
+              <a:rPr lang="en-IN" dirty="0" smtClean="0"/>
+              <a:t>.</a:t>
+            </a:r>
+          </a:p>
+          <a:p>
+            <a:pPr marL="285750" indent="-285750">
+              <a:buFont typeface="Arial" panose="020B0604020202020204" pitchFamily="34" charset="0"/>
+              <a:buChar char="•"/>
+            </a:pPr>
+            <a:r>
+              <a:rPr lang="en-IN" dirty="0"/>
+              <a:t>Two of the more common tests using the Chi Square distribution are </a:t>
+            </a:r>
+            <a:r>
+              <a:rPr lang="en-IN" dirty="0" smtClean="0"/>
+              <a:t>:</a:t>
+            </a:r>
+          </a:p>
+          <a:p>
+            <a:pPr marL="742950" lvl="1" indent="-285750">
+              <a:buFont typeface="Arial" panose="020B0604020202020204" pitchFamily="34" charset="0"/>
+              <a:buChar char="•"/>
+            </a:pPr>
+            <a:r>
+              <a:rPr lang="en-IN" dirty="0" smtClean="0"/>
+              <a:t>Tests </a:t>
+            </a:r>
+            <a:r>
+              <a:rPr lang="en-IN" dirty="0"/>
+              <a:t>of deviations of differences between theoretically expected and observed frequencies (one-way tables</a:t>
+            </a:r>
+            <a:r>
+              <a:rPr lang="en-IN" dirty="0" smtClean="0"/>
+              <a:t>)</a:t>
+            </a:r>
+          </a:p>
+          <a:p>
+            <a:pPr marL="742950" lvl="1" indent="-285750">
+              <a:spcAft>
+                <a:spcPts val="1000"/>
+              </a:spcAft>
+              <a:buFont typeface="Arial" panose="020B0604020202020204" pitchFamily="34" charset="0"/>
+              <a:buChar char="•"/>
+            </a:pPr>
+            <a:r>
+              <a:rPr lang="en-IN" dirty="0" smtClean="0"/>
+              <a:t>The </a:t>
+            </a:r>
+            <a:r>
+              <a:rPr lang="en-IN" dirty="0"/>
+              <a:t>relationship between categorical variables (contingency tables</a:t>
+            </a:r>
+            <a:r>
+              <a:rPr lang="en-IN" dirty="0" smtClean="0"/>
+              <a:t>)</a:t>
+            </a:r>
+            <a:endParaRPr lang="en-US" dirty="0" smtClean="0"/>
+          </a:p>
+          <a:p>
+            <a:pPr>
+              <a:spcAft>
+                <a:spcPts val="1000"/>
+              </a:spcAft>
+            </a:pPr>
+            <a:r>
+              <a:rPr lang="en-US" b="1" dirty="0" smtClean="0"/>
+              <a:t>Things not to remember:</a:t>
+            </a:r>
+          </a:p>
+          <a:p>
+            <a:pPr marL="285750" indent="-285750">
+              <a:buFont typeface="Arial" panose="020B0604020202020204" pitchFamily="34" charset="0"/>
+              <a:buChar char="•"/>
+            </a:pPr>
             <a:r>
               <a:rPr lang="en-US" dirty="0" smtClean="0"/>
-              <a:t>Population and sample</a:t>
-            </a:r>
-          </a:p>
-          <a:p>
-            <a:r>
-              <a:rPr lang="en-US" dirty="0"/>
-              <a:t>Sampling </a:t>
-            </a:r>
-            <a:r>
-              <a:rPr lang="en-US" dirty="0" smtClean="0"/>
-              <a:t>distributions</a:t>
-            </a:r>
-          </a:p>
-          <a:p>
-            <a:r>
-              <a:rPr lang="en-US" dirty="0" smtClean="0"/>
-              <a:t>Central Limit theorem</a:t>
-            </a:r>
-          </a:p>
-          <a:p>
-            <a:r>
-              <a:rPr lang="en-US" dirty="0" smtClean="0"/>
-              <a:t>Sampling </a:t>
-            </a:r>
-            <a:r>
-              <a:rPr lang="en-US" dirty="0" err="1" smtClean="0"/>
-              <a:t>dist</a:t>
-            </a:r>
-            <a:r>
-              <a:rPr lang="en-US" dirty="0" smtClean="0"/>
-              <a:t> of difference between means</a:t>
-            </a:r>
-          </a:p>
-          <a:p>
-            <a:endParaRPr lang="en-US" dirty="0"/>
-          </a:p>
-          <a:p>
-            <a:r>
-              <a:rPr lang="en-US" dirty="0" smtClean="0"/>
-              <a:t>T distribution</a:t>
-            </a:r>
-          </a:p>
-          <a:p>
-            <a:r>
-              <a:rPr lang="en-US" dirty="0" smtClean="0"/>
-              <a:t>Chi square </a:t>
-            </a:r>
-            <a:r>
-              <a:rPr lang="en-US" dirty="0" err="1" smtClean="0"/>
-              <a:t>dist</a:t>
-            </a:r>
-            <a:endParaRPr lang="en-US" dirty="0" smtClean="0"/>
-          </a:p>
-          <a:p>
-            <a:r>
-              <a:rPr lang="en-US" dirty="0" smtClean="0"/>
-              <a:t>When to use normal and when to use t-distribution</a:t>
-            </a:r>
-            <a:endParaRPr lang="en-US" dirty="0"/>
-          </a:p>
-          <a:p>
-            <a:endParaRPr lang="en-US" dirty="0"/>
-          </a:p>
-          <a:p>
-            <a:r>
-              <a:rPr lang="en-US" dirty="0" smtClean="0"/>
-              <a:t>Estimation</a:t>
-            </a:r>
-          </a:p>
-          <a:p>
-            <a:r>
-              <a:rPr lang="en-US" dirty="0" smtClean="0"/>
-              <a:t>Confidence Interval</a:t>
-            </a:r>
-          </a:p>
-          <a:p>
-            <a:r>
-              <a:rPr lang="en-US" dirty="0" smtClean="0"/>
-              <a:t>Hypothesis Testing</a:t>
-            </a:r>
-          </a:p>
-          <a:p>
+              <a:t>Probability density function of chi-square distribution:</a:t>
+            </a:r>
+            <a:r>
+              <a:rPr lang="en-IN" dirty="0" smtClean="0"/>
+              <a:t> </a:t>
+            </a:r>
+            <a:r>
+              <a:rPr lang="es-ES" dirty="0"/>
+              <a:t>Y = Y</a:t>
+            </a:r>
+            <a:r>
+              <a:rPr lang="es-ES" baseline="-25000" dirty="0"/>
+              <a:t>0</a:t>
+            </a:r>
+            <a:r>
+              <a:rPr lang="es-ES" dirty="0"/>
+              <a:t> * ( Χ</a:t>
+            </a:r>
+            <a:r>
+              <a:rPr lang="es-ES" baseline="30000" dirty="0"/>
+              <a:t>2</a:t>
+            </a:r>
+            <a:r>
+              <a:rPr lang="es-ES" dirty="0"/>
+              <a:t> ) </a:t>
+            </a:r>
+            <a:r>
+              <a:rPr lang="es-ES" baseline="30000" dirty="0"/>
+              <a:t>( v/2 - 1 )</a:t>
+            </a:r>
+            <a:r>
+              <a:rPr lang="es-ES" dirty="0"/>
+              <a:t> * </a:t>
+            </a:r>
+            <a:r>
+              <a:rPr lang="es-ES" i="1" dirty="0"/>
+              <a:t>e</a:t>
+            </a:r>
+            <a:r>
+              <a:rPr lang="es-ES" baseline="30000" dirty="0"/>
+              <a:t>-Χ2 / </a:t>
+            </a:r>
+            <a:r>
+              <a:rPr lang="es-ES" baseline="30000" dirty="0" smtClean="0"/>
+              <a:t>2</a:t>
+            </a:r>
+          </a:p>
+          <a:p>
+            <a:pPr marL="285750" indent="-285750">
+              <a:buFont typeface="Arial" panose="020B0604020202020204" pitchFamily="34" charset="0"/>
+              <a:buChar char="•"/>
+            </a:pPr>
+            <a:r>
+              <a:rPr lang="en-IN" dirty="0"/>
+              <a:t>Y</a:t>
+            </a:r>
+            <a:r>
+              <a:rPr lang="en-IN" baseline="-25000" dirty="0"/>
+              <a:t>0</a:t>
+            </a:r>
+            <a:r>
+              <a:rPr lang="en-IN" dirty="0"/>
+              <a:t> is defined, so that the area under the chi-square curve is equal to </a:t>
+            </a:r>
+            <a:r>
+              <a:rPr lang="en-IN" dirty="0" smtClean="0"/>
+              <a:t>one.</a:t>
+            </a:r>
+          </a:p>
+          <a:p>
+            <a:pPr marL="285750" indent="-285750">
+              <a:buFont typeface="Arial" panose="020B0604020202020204" pitchFamily="34" charset="0"/>
+              <a:buChar char="•"/>
+            </a:pPr>
+            <a:r>
+              <a:rPr lang="en-IN" dirty="0" smtClean="0"/>
+              <a:t>The </a:t>
+            </a:r>
+            <a:r>
+              <a:rPr lang="en-IN" dirty="0"/>
+              <a:t>mean of the distribution is equal to the number of degrees of freedom: μ = </a:t>
+            </a:r>
+            <a:r>
+              <a:rPr lang="en-IN" i="1" dirty="0"/>
+              <a:t>v</a:t>
+            </a:r>
+            <a:r>
+              <a:rPr lang="en-IN" dirty="0" smtClean="0"/>
+              <a:t>.</a:t>
+            </a:r>
+          </a:p>
+          <a:p>
+            <a:pPr marL="285750" indent="-285750">
+              <a:buFont typeface="Arial" panose="020B0604020202020204" pitchFamily="34" charset="0"/>
+              <a:buChar char="•"/>
+            </a:pPr>
+            <a:r>
+              <a:rPr lang="en-IN" dirty="0"/>
+              <a:t>The variance is equal to two times the number of degrees of freedom: σ</a:t>
+            </a:r>
+            <a:r>
+              <a:rPr lang="en-IN" baseline="30000" dirty="0"/>
+              <a:t>2</a:t>
+            </a:r>
+            <a:r>
+              <a:rPr lang="en-IN" dirty="0"/>
+              <a:t> = 2 * </a:t>
+            </a:r>
+            <a:r>
+              <a:rPr lang="en-IN" i="1" dirty="0" smtClean="0"/>
+              <a:t>v</a:t>
+            </a:r>
+          </a:p>
+          <a:p>
+            <a:pPr marL="285750" indent="-285750">
+              <a:buFont typeface="Arial" panose="020B0604020202020204" pitchFamily="34" charset="0"/>
+              <a:buChar char="•"/>
+            </a:pPr>
+            <a:r>
+              <a:rPr lang="en-IN" dirty="0"/>
+              <a:t>When the degrees of freedom are greater than or equal to 2, the maximum value for Y occurs when Χ</a:t>
+            </a:r>
+            <a:r>
+              <a:rPr lang="en-IN" baseline="30000" dirty="0"/>
+              <a:t>2</a:t>
+            </a:r>
+            <a:r>
+              <a:rPr lang="en-IN" dirty="0"/>
+              <a:t> = </a:t>
+            </a:r>
+            <a:r>
+              <a:rPr lang="en-IN" i="1" dirty="0"/>
+              <a:t>v</a:t>
+            </a:r>
+            <a:r>
+              <a:rPr lang="en-IN" dirty="0"/>
+              <a:t> - 2</a:t>
+            </a:r>
             <a:endParaRPr lang="en-US" dirty="0" smtClean="0"/>
           </a:p>
         </p:txBody>
@@ -21671,7 +22051,2491 @@
     </p:spTree>
     <p:extLst>
       <p:ext uri="{BB962C8B-B14F-4D97-AF65-F5344CB8AC3E}">
-        <p14:creationId xmlns:p14="http://schemas.microsoft.com/office/powerpoint/2010/main" val="119503499"/>
+        <p14:creationId xmlns:p14="http://schemas.microsoft.com/office/powerpoint/2010/main" val="129495963"/>
+      </p:ext>
+    </p:extLst>
+  </p:cSld>
+  <p:clrMapOvr>
+    <a:masterClrMapping/>
+  </p:clrMapOvr>
+  <p:timing>
+    <p:tnLst>
+      <p:par>
+        <p:cTn id="1" dur="indefinite" restart="never" nodeType="tmRoot"/>
+      </p:par>
+    </p:tnLst>
+  </p:timing>
+</p:sld>
+</file>
+
+<file path=ppt/slides/slide33.xml><?xml version="1.0" encoding="utf-8"?>
+<p:sld xmlns:a="http://schemas.openxmlformats.org/drawingml/2006/main" xmlns:r="http://schemas.openxmlformats.org/officeDocument/2006/relationships" xmlns:p="http://schemas.openxmlformats.org/presentationml/2006/main">
+  <p:cSld>
+    <p:spTree>
+      <p:nvGrpSpPr>
+        <p:cNvPr id="1" name=""/>
+        <p:cNvGrpSpPr/>
+        <p:nvPr/>
+      </p:nvGrpSpPr>
+      <p:grpSpPr>
+        <a:xfrm>
+          <a:off x="0" y="0"/>
+          <a:ext cx="0" cy="0"/>
+          <a:chOff x="0" y="0"/>
+          <a:chExt cx="0" cy="0"/>
+        </a:xfrm>
+      </p:grpSpPr>
+      <p:sp>
+        <p:nvSpPr>
+          <p:cNvPr id="5" name="Title 1"/>
+          <p:cNvSpPr>
+            <a:spLocks noGrp="1"/>
+          </p:cNvSpPr>
+          <p:nvPr>
+            <p:ph type="ctrTitle"/>
+          </p:nvPr>
+        </p:nvSpPr>
+        <p:spPr>
+          <a:xfrm>
+            <a:off x="802783" y="270455"/>
+            <a:ext cx="9796530" cy="711548"/>
+          </a:xfrm>
+        </p:spPr>
+        <p:txBody>
+          <a:bodyPr>
+            <a:normAutofit/>
+          </a:bodyPr>
+          <a:lstStyle/>
+          <a:p>
+            <a:pPr algn="l"/>
+            <a:r>
+              <a:rPr lang="en-US" sz="4000" dirty="0" smtClean="0"/>
+              <a:t>Chi-Square </a:t>
+            </a:r>
+            <a:r>
+              <a:rPr lang="en-US" sz="4000" dirty="0" smtClean="0"/>
+              <a:t>Distribution and t </a:t>
+            </a:r>
+            <a:r>
+              <a:rPr lang="en-US" sz="4000" dirty="0" err="1" smtClean="0"/>
+              <a:t>dist</a:t>
+            </a:r>
+            <a:r>
+              <a:rPr lang="en-US" sz="4000" dirty="0" smtClean="0"/>
+              <a:t> questions</a:t>
+            </a:r>
+            <a:endParaRPr lang="en-IN" sz="4000" dirty="0"/>
+          </a:p>
+        </p:txBody>
+      </p:sp>
+      <p:cxnSp>
+        <p:nvCxnSpPr>
+          <p:cNvPr id="7" name="Straight Connector 6"/>
+          <p:cNvCxnSpPr/>
+          <p:nvPr/>
+        </p:nvCxnSpPr>
+        <p:spPr>
+          <a:xfrm>
+            <a:off x="914400" y="956255"/>
+            <a:ext cx="10045521" cy="0"/>
+          </a:xfrm>
+          <a:prstGeom prst="line">
+            <a:avLst/>
+          </a:prstGeom>
+          <a:ln>
+            <a:solidFill>
+              <a:schemeClr val="bg1">
+                <a:lumMod val="75000"/>
+              </a:schemeClr>
+            </a:solidFill>
+          </a:ln>
+        </p:spPr>
+        <p:style>
+          <a:lnRef idx="1">
+            <a:schemeClr val="dk1"/>
+          </a:lnRef>
+          <a:fillRef idx="0">
+            <a:schemeClr val="dk1"/>
+          </a:fillRef>
+          <a:effectRef idx="0">
+            <a:schemeClr val="dk1"/>
+          </a:effectRef>
+          <a:fontRef idx="minor">
+            <a:schemeClr val="tx1"/>
+          </a:fontRef>
+        </p:style>
+      </p:cxnSp>
+      <p:sp>
+        <p:nvSpPr>
+          <p:cNvPr id="2" name="TextBox 1"/>
+          <p:cNvSpPr txBox="1"/>
+          <p:nvPr/>
+        </p:nvSpPr>
+        <p:spPr>
+          <a:xfrm>
+            <a:off x="802784" y="1047241"/>
+            <a:ext cx="10646534" cy="369332"/>
+          </a:xfrm>
+          <a:prstGeom prst="rect">
+            <a:avLst/>
+          </a:prstGeom>
+          <a:noFill/>
+        </p:spPr>
+        <p:txBody>
+          <a:bodyPr wrap="square" rtlCol="0">
+            <a:spAutoFit/>
+          </a:bodyPr>
+          <a:lstStyle/>
+          <a:p>
+            <a:pPr>
+              <a:spcAft>
+                <a:spcPts val="1000"/>
+              </a:spcAft>
+            </a:pPr>
+            <a:r>
+              <a:rPr lang="en-US" b="1" dirty="0" smtClean="0"/>
+              <a:t>Things to remember:</a:t>
+            </a:r>
+          </a:p>
+        </p:txBody>
+      </p:sp>
+    </p:spTree>
+    <p:extLst>
+      <p:ext uri="{BB962C8B-B14F-4D97-AF65-F5344CB8AC3E}">
+        <p14:creationId xmlns:p14="http://schemas.microsoft.com/office/powerpoint/2010/main" val="266424311"/>
+      </p:ext>
+    </p:extLst>
+  </p:cSld>
+  <p:clrMapOvr>
+    <a:masterClrMapping/>
+  </p:clrMapOvr>
+  <p:timing>
+    <p:tnLst>
+      <p:par>
+        <p:cTn id="1" dur="indefinite" restart="never" nodeType="tmRoot"/>
+      </p:par>
+    </p:tnLst>
+  </p:timing>
+</p:sld>
+</file>
+
+<file path=ppt/slides/slide34.xml><?xml version="1.0" encoding="utf-8"?>
+<p:sld xmlns:a="http://schemas.openxmlformats.org/drawingml/2006/main" xmlns:r="http://schemas.openxmlformats.org/officeDocument/2006/relationships" xmlns:p="http://schemas.openxmlformats.org/presentationml/2006/main">
+  <p:cSld>
+    <p:spTree>
+      <p:nvGrpSpPr>
+        <p:cNvPr id="1" name=""/>
+        <p:cNvGrpSpPr/>
+        <p:nvPr/>
+      </p:nvGrpSpPr>
+      <p:grpSpPr>
+        <a:xfrm>
+          <a:off x="0" y="0"/>
+          <a:ext cx="0" cy="0"/>
+          <a:chOff x="0" y="0"/>
+          <a:chExt cx="0" cy="0"/>
+        </a:xfrm>
+      </p:grpSpPr>
+      <p:sp>
+        <p:nvSpPr>
+          <p:cNvPr id="5" name="Title 1"/>
+          <p:cNvSpPr>
+            <a:spLocks noGrp="1"/>
+          </p:cNvSpPr>
+          <p:nvPr>
+            <p:ph type="ctrTitle"/>
+          </p:nvPr>
+        </p:nvSpPr>
+        <p:spPr>
+          <a:xfrm>
+            <a:off x="802783" y="270455"/>
+            <a:ext cx="9796530" cy="711548"/>
+          </a:xfrm>
+        </p:spPr>
+        <p:txBody>
+          <a:bodyPr>
+            <a:normAutofit/>
+          </a:bodyPr>
+          <a:lstStyle/>
+          <a:p>
+            <a:pPr algn="l"/>
+            <a:r>
+              <a:rPr lang="en-US" sz="4000" dirty="0" smtClean="0"/>
+              <a:t>Estimation</a:t>
+            </a:r>
+            <a:endParaRPr lang="en-IN" sz="4000" dirty="0"/>
+          </a:p>
+        </p:txBody>
+      </p:sp>
+      <p:cxnSp>
+        <p:nvCxnSpPr>
+          <p:cNvPr id="7" name="Straight Connector 6"/>
+          <p:cNvCxnSpPr/>
+          <p:nvPr/>
+        </p:nvCxnSpPr>
+        <p:spPr>
+          <a:xfrm>
+            <a:off x="914400" y="956255"/>
+            <a:ext cx="10045521" cy="0"/>
+          </a:xfrm>
+          <a:prstGeom prst="line">
+            <a:avLst/>
+          </a:prstGeom>
+          <a:ln>
+            <a:solidFill>
+              <a:schemeClr val="bg1">
+                <a:lumMod val="75000"/>
+              </a:schemeClr>
+            </a:solidFill>
+          </a:ln>
+        </p:spPr>
+        <p:style>
+          <a:lnRef idx="1">
+            <a:schemeClr val="dk1"/>
+          </a:lnRef>
+          <a:fillRef idx="0">
+            <a:schemeClr val="dk1"/>
+          </a:fillRef>
+          <a:effectRef idx="0">
+            <a:schemeClr val="dk1"/>
+          </a:effectRef>
+          <a:fontRef idx="minor">
+            <a:schemeClr val="tx1"/>
+          </a:fontRef>
+        </p:style>
+      </p:cxnSp>
+      <p:sp>
+        <p:nvSpPr>
+          <p:cNvPr id="2" name="TextBox 1"/>
+          <p:cNvSpPr txBox="1"/>
+          <p:nvPr/>
+        </p:nvSpPr>
+        <p:spPr>
+          <a:xfrm>
+            <a:off x="802784" y="1047241"/>
+            <a:ext cx="10646534" cy="923330"/>
+          </a:xfrm>
+          <a:prstGeom prst="rect">
+            <a:avLst/>
+          </a:prstGeom>
+          <a:noFill/>
+        </p:spPr>
+        <p:txBody>
+          <a:bodyPr wrap="square" rtlCol="0">
+            <a:spAutoFit/>
+          </a:bodyPr>
+          <a:lstStyle/>
+          <a:p>
+            <a:r>
+              <a:rPr lang="en-IN" dirty="0"/>
+              <a:t>In statistics, </a:t>
+            </a:r>
+            <a:r>
+              <a:rPr lang="en-IN" b="1" dirty="0"/>
+              <a:t>estimation</a:t>
+            </a:r>
+            <a:r>
+              <a:rPr lang="en-IN" dirty="0"/>
+              <a:t> refers to the process by which one makes inferences about a population, based on information obtained from a </a:t>
+            </a:r>
+            <a:r>
+              <a:rPr lang="en-IN" dirty="0" smtClean="0"/>
+              <a:t>sample.</a:t>
+            </a:r>
+            <a:endParaRPr lang="en-US" dirty="0"/>
+          </a:p>
+          <a:p>
+            <a:pPr>
+              <a:spcAft>
+                <a:spcPts val="1000"/>
+              </a:spcAft>
+            </a:pPr>
+            <a:r>
+              <a:rPr lang="en-IN" dirty="0" smtClean="0"/>
+              <a:t>An </a:t>
+            </a:r>
+            <a:r>
+              <a:rPr lang="en-IN" dirty="0"/>
+              <a:t>estimate of a population parameter may be expressed in two ways</a:t>
+            </a:r>
+            <a:r>
+              <a:rPr lang="en-IN" dirty="0" smtClean="0"/>
+              <a:t>:</a:t>
+            </a:r>
+          </a:p>
+        </p:txBody>
+      </p:sp>
+      <p:sp>
+        <p:nvSpPr>
+          <p:cNvPr id="6" name="TextBox 5"/>
+          <p:cNvSpPr txBox="1"/>
+          <p:nvPr/>
+        </p:nvSpPr>
+        <p:spPr>
+          <a:xfrm>
+            <a:off x="802783" y="2021979"/>
+            <a:ext cx="5134377" cy="3854777"/>
+          </a:xfrm>
+          <a:prstGeom prst="rect">
+            <a:avLst/>
+          </a:prstGeom>
+          <a:noFill/>
+        </p:spPr>
+        <p:txBody>
+          <a:bodyPr wrap="square" rtlCol="0">
+            <a:spAutoFit/>
+          </a:bodyPr>
+          <a:lstStyle/>
+          <a:p>
+            <a:pPr algn="just"/>
+            <a:r>
+              <a:rPr lang="en-US" b="1" dirty="0"/>
+              <a:t>Point Estimate:</a:t>
+            </a:r>
+            <a:endParaRPr lang="en-US" dirty="0"/>
+          </a:p>
+          <a:p>
+            <a:pPr algn="just">
+              <a:spcAft>
+                <a:spcPts val="1000"/>
+              </a:spcAft>
+            </a:pPr>
+            <a:r>
+              <a:rPr lang="en-IN" dirty="0"/>
+              <a:t>A point estimate of a population parameter is a single value of a statistic. For example, the sample mean x is a point estimate of the population mean μ. Similarly, the sample proportion </a:t>
+            </a:r>
+            <a:r>
+              <a:rPr lang="en-IN" i="1" dirty="0"/>
+              <a:t>p</a:t>
+            </a:r>
+            <a:r>
+              <a:rPr lang="en-IN" dirty="0"/>
+              <a:t> is a point estimate of the population proportion </a:t>
+            </a:r>
+            <a:r>
+              <a:rPr lang="en-IN" i="1" dirty="0"/>
+              <a:t>P</a:t>
+            </a:r>
+            <a:r>
+              <a:rPr lang="en-IN" dirty="0"/>
+              <a:t>.</a:t>
+            </a:r>
+            <a:endParaRPr lang="en-US" b="1" dirty="0"/>
+          </a:p>
+          <a:p>
+            <a:pPr algn="just"/>
+            <a:r>
+              <a:rPr lang="en-US" b="1" dirty="0"/>
+              <a:t>Interval Estimate:</a:t>
+            </a:r>
+          </a:p>
+          <a:p>
+            <a:pPr algn="just"/>
+            <a:r>
+              <a:rPr lang="en-IN" dirty="0"/>
+              <a:t>An interval estimate is defined by two numbers, between which a population parameter is said to lie. For example, </a:t>
+            </a:r>
+            <a:r>
+              <a:rPr lang="en-IN" i="1" dirty="0"/>
+              <a:t>a</a:t>
+            </a:r>
+            <a:r>
+              <a:rPr lang="en-IN" dirty="0"/>
+              <a:t> &lt; x &lt; </a:t>
+            </a:r>
+            <a:r>
+              <a:rPr lang="en-IN" i="1" dirty="0"/>
+              <a:t>b</a:t>
+            </a:r>
+            <a:r>
+              <a:rPr lang="en-IN" dirty="0"/>
+              <a:t> is an interval estimate of the population mean μ. It indicates that the population mean is greater than </a:t>
+            </a:r>
+            <a:r>
+              <a:rPr lang="en-IN" i="1" dirty="0"/>
+              <a:t>a</a:t>
+            </a:r>
+            <a:r>
+              <a:rPr lang="en-IN" dirty="0"/>
+              <a:t> but less than </a:t>
+            </a:r>
+            <a:r>
+              <a:rPr lang="en-IN" i="1" dirty="0"/>
+              <a:t>b</a:t>
+            </a:r>
+            <a:r>
+              <a:rPr lang="en-IN" dirty="0"/>
+              <a:t>.</a:t>
+            </a:r>
+          </a:p>
+          <a:p>
+            <a:pPr algn="just"/>
+            <a:endParaRPr lang="en-IN" dirty="0"/>
+          </a:p>
+        </p:txBody>
+      </p:sp>
+      <p:pic>
+        <p:nvPicPr>
+          <p:cNvPr id="8" name="Picture 7"/>
+          <p:cNvPicPr>
+            <a:picLocks noChangeAspect="1"/>
+          </p:cNvPicPr>
+          <p:nvPr/>
+        </p:nvPicPr>
+        <p:blipFill>
+          <a:blip r:embed="rId2"/>
+          <a:stretch>
+            <a:fillRect/>
+          </a:stretch>
+        </p:blipFill>
+        <p:spPr>
+          <a:xfrm>
+            <a:off x="6126051" y="2061556"/>
+            <a:ext cx="5979386" cy="4307983"/>
+          </a:xfrm>
+          <a:prstGeom prst="rect">
+            <a:avLst/>
+          </a:prstGeom>
+        </p:spPr>
+      </p:pic>
+    </p:spTree>
+    <p:extLst>
+      <p:ext uri="{BB962C8B-B14F-4D97-AF65-F5344CB8AC3E}">
+        <p14:creationId xmlns:p14="http://schemas.microsoft.com/office/powerpoint/2010/main" val="2576038791"/>
+      </p:ext>
+    </p:extLst>
+  </p:cSld>
+  <p:clrMapOvr>
+    <a:masterClrMapping/>
+  </p:clrMapOvr>
+  <p:timing>
+    <p:tnLst>
+      <p:par>
+        <p:cTn id="1" dur="indefinite" restart="never" nodeType="tmRoot"/>
+      </p:par>
+    </p:tnLst>
+  </p:timing>
+</p:sld>
+</file>
+
+<file path=ppt/slides/slide35.xml><?xml version="1.0" encoding="utf-8"?>
+<p:sld xmlns:a="http://schemas.openxmlformats.org/drawingml/2006/main" xmlns:r="http://schemas.openxmlformats.org/officeDocument/2006/relationships" xmlns:p="http://schemas.openxmlformats.org/presentationml/2006/main">
+  <p:cSld>
+    <p:spTree>
+      <p:nvGrpSpPr>
+        <p:cNvPr id="1" name=""/>
+        <p:cNvGrpSpPr/>
+        <p:nvPr/>
+      </p:nvGrpSpPr>
+      <p:grpSpPr>
+        <a:xfrm>
+          <a:off x="0" y="0"/>
+          <a:ext cx="0" cy="0"/>
+          <a:chOff x="0" y="0"/>
+          <a:chExt cx="0" cy="0"/>
+        </a:xfrm>
+      </p:grpSpPr>
+      <p:sp>
+        <p:nvSpPr>
+          <p:cNvPr id="5" name="Title 1"/>
+          <p:cNvSpPr>
+            <a:spLocks noGrp="1"/>
+          </p:cNvSpPr>
+          <p:nvPr>
+            <p:ph type="ctrTitle"/>
+          </p:nvPr>
+        </p:nvSpPr>
+        <p:spPr>
+          <a:xfrm>
+            <a:off x="802783" y="270455"/>
+            <a:ext cx="9796530" cy="711548"/>
+          </a:xfrm>
+        </p:spPr>
+        <p:txBody>
+          <a:bodyPr>
+            <a:normAutofit/>
+          </a:bodyPr>
+          <a:lstStyle/>
+          <a:p>
+            <a:pPr algn="l"/>
+            <a:r>
+              <a:rPr lang="en-US" sz="4000" dirty="0" smtClean="0"/>
+              <a:t>Estimation</a:t>
+            </a:r>
+            <a:endParaRPr lang="en-IN" sz="4000" dirty="0"/>
+          </a:p>
+        </p:txBody>
+      </p:sp>
+      <p:cxnSp>
+        <p:nvCxnSpPr>
+          <p:cNvPr id="7" name="Straight Connector 6"/>
+          <p:cNvCxnSpPr/>
+          <p:nvPr/>
+        </p:nvCxnSpPr>
+        <p:spPr>
+          <a:xfrm>
+            <a:off x="914400" y="956255"/>
+            <a:ext cx="10045521" cy="0"/>
+          </a:xfrm>
+          <a:prstGeom prst="line">
+            <a:avLst/>
+          </a:prstGeom>
+          <a:ln>
+            <a:solidFill>
+              <a:schemeClr val="bg1">
+                <a:lumMod val="75000"/>
+              </a:schemeClr>
+            </a:solidFill>
+          </a:ln>
+        </p:spPr>
+        <p:style>
+          <a:lnRef idx="1">
+            <a:schemeClr val="dk1"/>
+          </a:lnRef>
+          <a:fillRef idx="0">
+            <a:schemeClr val="dk1"/>
+          </a:fillRef>
+          <a:effectRef idx="0">
+            <a:schemeClr val="dk1"/>
+          </a:effectRef>
+          <a:fontRef idx="minor">
+            <a:schemeClr val="tx1"/>
+          </a:fontRef>
+        </p:style>
+      </p:cxnSp>
+      <p:sp>
+        <p:nvSpPr>
+          <p:cNvPr id="2" name="TextBox 1"/>
+          <p:cNvSpPr txBox="1"/>
+          <p:nvPr/>
+        </p:nvSpPr>
+        <p:spPr>
+          <a:xfrm>
+            <a:off x="802784" y="1047241"/>
+            <a:ext cx="10646534" cy="4760278"/>
+          </a:xfrm>
+          <a:prstGeom prst="rect">
+            <a:avLst/>
+          </a:prstGeom>
+          <a:noFill/>
+        </p:spPr>
+        <p:txBody>
+          <a:bodyPr wrap="square" rtlCol="0">
+            <a:spAutoFit/>
+          </a:bodyPr>
+          <a:lstStyle/>
+          <a:p>
+            <a:pPr>
+              <a:spcAft>
+                <a:spcPts val="1000"/>
+              </a:spcAft>
+            </a:pPr>
+            <a:r>
+              <a:rPr lang="en-US" b="1" dirty="0" smtClean="0"/>
+              <a:t>What is a Confidence Interval?</a:t>
+            </a:r>
+            <a:endParaRPr lang="en-US" dirty="0" smtClean="0"/>
+          </a:p>
+          <a:p>
+            <a:r>
+              <a:rPr lang="en-IN" dirty="0"/>
+              <a:t>Statisticians use a confidence interval to express the precision and uncertainty associated with a particular sampling method. A confidence interval consists of three parts</a:t>
+            </a:r>
+            <a:r>
+              <a:rPr lang="en-IN" dirty="0" smtClean="0"/>
+              <a:t>.</a:t>
+            </a:r>
+            <a:endParaRPr lang="en-IN" dirty="0"/>
+          </a:p>
+          <a:p>
+            <a:pPr marL="342900" indent="-342900">
+              <a:buAutoNum type="arabicPeriod"/>
+            </a:pPr>
+            <a:r>
+              <a:rPr lang="en-IN" dirty="0" smtClean="0"/>
+              <a:t>A </a:t>
+            </a:r>
+            <a:r>
+              <a:rPr lang="en-IN" dirty="0"/>
+              <a:t>confidence </a:t>
+            </a:r>
+            <a:r>
+              <a:rPr lang="en-IN" dirty="0" smtClean="0"/>
+              <a:t>level</a:t>
+            </a:r>
+          </a:p>
+          <a:p>
+            <a:pPr marL="342900" indent="-342900">
+              <a:buAutoNum type="arabicPeriod"/>
+            </a:pPr>
+            <a:r>
+              <a:rPr lang="en-IN" dirty="0" smtClean="0"/>
+              <a:t>2. A statistic</a:t>
+            </a:r>
+          </a:p>
+          <a:p>
+            <a:pPr marL="342900" indent="-342900">
+              <a:spcAft>
+                <a:spcPts val="1000"/>
+              </a:spcAft>
+              <a:buAutoNum type="arabicPeriod"/>
+            </a:pPr>
+            <a:r>
+              <a:rPr lang="en-IN" dirty="0" smtClean="0"/>
+              <a:t>3. A </a:t>
+            </a:r>
+            <a:r>
+              <a:rPr lang="en-IN" dirty="0"/>
+              <a:t>margin of error</a:t>
+            </a:r>
+            <a:r>
+              <a:rPr lang="en-IN" dirty="0" smtClean="0"/>
+              <a:t>.</a:t>
+            </a:r>
+          </a:p>
+          <a:p>
+            <a:pPr>
+              <a:spcAft>
+                <a:spcPts val="1000"/>
+              </a:spcAft>
+            </a:pPr>
+            <a:r>
+              <a:rPr lang="en-IN" dirty="0" smtClean="0"/>
+              <a:t>The </a:t>
+            </a:r>
+            <a:r>
+              <a:rPr lang="en-IN" dirty="0"/>
+              <a:t>confidence level describes the uncertainty of a sampling method. The statistic and the margin of error define an interval estimate that describes the precision of the method. The interval estimate of a confidence interval is defined by the </a:t>
+            </a:r>
+            <a:r>
+              <a:rPr lang="en-IN" i="1" dirty="0"/>
+              <a:t>sample statistic</a:t>
+            </a:r>
+            <a:r>
+              <a:rPr lang="en-IN" dirty="0"/>
+              <a:t> </a:t>
+            </a:r>
+            <a:r>
+              <a:rPr lang="en-IN" u="sng" dirty="0"/>
+              <a:t>+</a:t>
+            </a:r>
+            <a:r>
+              <a:rPr lang="en-IN" dirty="0"/>
+              <a:t> </a:t>
+            </a:r>
+            <a:r>
+              <a:rPr lang="en-IN" i="1" dirty="0"/>
+              <a:t>margin of error</a:t>
+            </a:r>
+            <a:r>
+              <a:rPr lang="en-IN" dirty="0" smtClean="0"/>
+              <a:t>.</a:t>
+            </a:r>
+            <a:endParaRPr lang="en-US" dirty="0"/>
+          </a:p>
+          <a:p>
+            <a:pPr>
+              <a:spcAft>
+                <a:spcPts val="1000"/>
+              </a:spcAft>
+            </a:pPr>
+            <a:r>
+              <a:rPr lang="en-IN" dirty="0"/>
+              <a:t>For example, suppose we compute an interval estimate of a population parameter. We might describe this interval estimate as a 95% confidence interval. This means that if we used the same sampling method to select different samples and compute different interval estimates, the true population parameter would fall within a range defined by the </a:t>
+            </a:r>
+            <a:r>
+              <a:rPr lang="en-IN" i="1" dirty="0"/>
+              <a:t>sample statistic</a:t>
+            </a:r>
+            <a:r>
+              <a:rPr lang="en-IN" dirty="0"/>
+              <a:t> </a:t>
+            </a:r>
+            <a:r>
+              <a:rPr lang="en-IN" u="sng" dirty="0"/>
+              <a:t>+</a:t>
+            </a:r>
+            <a:r>
+              <a:rPr lang="en-IN" dirty="0"/>
+              <a:t> </a:t>
+            </a:r>
+            <a:r>
+              <a:rPr lang="en-IN" i="1" dirty="0"/>
+              <a:t>margin of error</a:t>
+            </a:r>
+            <a:r>
+              <a:rPr lang="en-IN" dirty="0"/>
+              <a:t> 95% of the time</a:t>
+            </a:r>
+            <a:r>
+              <a:rPr lang="en-IN" dirty="0" smtClean="0"/>
+              <a:t>.</a:t>
+            </a:r>
+            <a:endParaRPr lang="en-US" dirty="0"/>
+          </a:p>
+          <a:p>
+            <a:r>
+              <a:rPr lang="en-IN" b="1" dirty="0"/>
+              <a:t>Confidence intervals are preferred to point estimates</a:t>
+            </a:r>
+            <a:r>
+              <a:rPr lang="en-IN" dirty="0"/>
+              <a:t>, because confidence intervals indicate (a) the precision of the estimate and (b) the uncertainty of the estimate.</a:t>
+            </a:r>
+            <a:endParaRPr lang="en-IN" dirty="0" smtClean="0"/>
+          </a:p>
+        </p:txBody>
+      </p:sp>
+    </p:spTree>
+    <p:extLst>
+      <p:ext uri="{BB962C8B-B14F-4D97-AF65-F5344CB8AC3E}">
+        <p14:creationId xmlns:p14="http://schemas.microsoft.com/office/powerpoint/2010/main" val="2530306566"/>
+      </p:ext>
+    </p:extLst>
+  </p:cSld>
+  <p:clrMapOvr>
+    <a:masterClrMapping/>
+  </p:clrMapOvr>
+  <p:timing>
+    <p:tnLst>
+      <p:par>
+        <p:cTn id="1" dur="indefinite" restart="never" nodeType="tmRoot"/>
+      </p:par>
+    </p:tnLst>
+  </p:timing>
+</p:sld>
+</file>
+
+<file path=ppt/slides/slide36.xml><?xml version="1.0" encoding="utf-8"?>
+<p:sld xmlns:a="http://schemas.openxmlformats.org/drawingml/2006/main" xmlns:r="http://schemas.openxmlformats.org/officeDocument/2006/relationships" xmlns:p="http://schemas.openxmlformats.org/presentationml/2006/main">
+  <p:cSld>
+    <p:spTree>
+      <p:nvGrpSpPr>
+        <p:cNvPr id="1" name=""/>
+        <p:cNvGrpSpPr/>
+        <p:nvPr/>
+      </p:nvGrpSpPr>
+      <p:grpSpPr>
+        <a:xfrm>
+          <a:off x="0" y="0"/>
+          <a:ext cx="0" cy="0"/>
+          <a:chOff x="0" y="0"/>
+          <a:chExt cx="0" cy="0"/>
+        </a:xfrm>
+      </p:grpSpPr>
+      <p:sp>
+        <p:nvSpPr>
+          <p:cNvPr id="5" name="Title 1"/>
+          <p:cNvSpPr>
+            <a:spLocks noGrp="1"/>
+          </p:cNvSpPr>
+          <p:nvPr>
+            <p:ph type="ctrTitle"/>
+          </p:nvPr>
+        </p:nvSpPr>
+        <p:spPr>
+          <a:xfrm>
+            <a:off x="802783" y="270455"/>
+            <a:ext cx="9796530" cy="711548"/>
+          </a:xfrm>
+        </p:spPr>
+        <p:txBody>
+          <a:bodyPr>
+            <a:normAutofit/>
+          </a:bodyPr>
+          <a:lstStyle/>
+          <a:p>
+            <a:pPr algn="l"/>
+            <a:r>
+              <a:rPr lang="en-US" sz="4000" dirty="0" smtClean="0"/>
+              <a:t>Estimation</a:t>
+            </a:r>
+            <a:endParaRPr lang="en-IN" sz="4000" dirty="0"/>
+          </a:p>
+        </p:txBody>
+      </p:sp>
+      <p:cxnSp>
+        <p:nvCxnSpPr>
+          <p:cNvPr id="7" name="Straight Connector 6"/>
+          <p:cNvCxnSpPr/>
+          <p:nvPr/>
+        </p:nvCxnSpPr>
+        <p:spPr>
+          <a:xfrm>
+            <a:off x="914400" y="956255"/>
+            <a:ext cx="10045521" cy="0"/>
+          </a:xfrm>
+          <a:prstGeom prst="line">
+            <a:avLst/>
+          </a:prstGeom>
+          <a:ln>
+            <a:solidFill>
+              <a:schemeClr val="bg1">
+                <a:lumMod val="75000"/>
+              </a:schemeClr>
+            </a:solidFill>
+          </a:ln>
+        </p:spPr>
+        <p:style>
+          <a:lnRef idx="1">
+            <a:schemeClr val="dk1"/>
+          </a:lnRef>
+          <a:fillRef idx="0">
+            <a:schemeClr val="dk1"/>
+          </a:fillRef>
+          <a:effectRef idx="0">
+            <a:schemeClr val="dk1"/>
+          </a:effectRef>
+          <a:fontRef idx="minor">
+            <a:schemeClr val="tx1"/>
+          </a:fontRef>
+        </p:style>
+      </p:cxnSp>
+      <p:sp>
+        <p:nvSpPr>
+          <p:cNvPr id="2" name="TextBox 1"/>
+          <p:cNvSpPr txBox="1"/>
+          <p:nvPr/>
+        </p:nvSpPr>
+        <p:spPr>
+          <a:xfrm>
+            <a:off x="802784" y="1047241"/>
+            <a:ext cx="10646534" cy="1456809"/>
+          </a:xfrm>
+          <a:prstGeom prst="rect">
+            <a:avLst/>
+          </a:prstGeom>
+          <a:noFill/>
+        </p:spPr>
+        <p:txBody>
+          <a:bodyPr wrap="square" rtlCol="0">
+            <a:spAutoFit/>
+          </a:bodyPr>
+          <a:lstStyle/>
+          <a:p>
+            <a:pPr>
+              <a:spcAft>
+                <a:spcPts val="1000"/>
+              </a:spcAft>
+            </a:pPr>
+            <a:r>
+              <a:rPr lang="en-US" b="1" dirty="0" smtClean="0"/>
+              <a:t>Confidence Interval?</a:t>
+            </a:r>
+            <a:endParaRPr lang="en-US" dirty="0" smtClean="0"/>
+          </a:p>
+          <a:p>
+            <a:pPr>
+              <a:spcAft>
+                <a:spcPts val="1000"/>
+              </a:spcAft>
+            </a:pPr>
+            <a:r>
+              <a:rPr lang="en-IN" b="1" dirty="0" smtClean="0"/>
+              <a:t>A </a:t>
+            </a:r>
+            <a:r>
+              <a:rPr lang="en-IN" b="1" dirty="0"/>
+              <a:t>confidence </a:t>
+            </a:r>
+            <a:r>
+              <a:rPr lang="en-IN" b="1" dirty="0" smtClean="0"/>
+              <a:t>level</a:t>
+            </a:r>
+            <a:r>
+              <a:rPr lang="en-IN" dirty="0"/>
+              <a:t>: The probability part of a confidence interval is called a </a:t>
+            </a:r>
+            <a:r>
+              <a:rPr lang="en-IN" b="1" dirty="0"/>
+              <a:t>confidence level</a:t>
+            </a:r>
+            <a:r>
+              <a:rPr lang="en-IN" dirty="0" smtClean="0"/>
+              <a:t>.</a:t>
+            </a:r>
+          </a:p>
+          <a:p>
+            <a:pPr marL="285750" indent="-285750">
+              <a:buFontTx/>
+              <a:buChar char="-"/>
+            </a:pPr>
+            <a:r>
+              <a:rPr lang="en-IN" dirty="0" smtClean="0"/>
+              <a:t>The </a:t>
+            </a:r>
+            <a:r>
+              <a:rPr lang="en-IN" dirty="0"/>
+              <a:t>confidence level describes the likelihood that a particular sampling method will produce a confidence interval that includes the true population parameter</a:t>
+            </a:r>
+            <a:r>
+              <a:rPr lang="en-IN" dirty="0" smtClean="0"/>
+              <a:t>.</a:t>
+            </a:r>
+          </a:p>
+        </p:txBody>
+      </p:sp>
+      <p:pic>
+        <p:nvPicPr>
+          <p:cNvPr id="3" name="Picture 2"/>
+          <p:cNvPicPr>
+            <a:picLocks noChangeAspect="1"/>
+          </p:cNvPicPr>
+          <p:nvPr/>
+        </p:nvPicPr>
+        <p:blipFill>
+          <a:blip r:embed="rId2"/>
+          <a:stretch>
+            <a:fillRect/>
+          </a:stretch>
+        </p:blipFill>
+        <p:spPr>
+          <a:xfrm>
+            <a:off x="6772477" y="3263974"/>
+            <a:ext cx="5025800" cy="3226978"/>
+          </a:xfrm>
+          <a:prstGeom prst="rect">
+            <a:avLst/>
+          </a:prstGeom>
+        </p:spPr>
+      </p:pic>
+      <p:sp>
+        <p:nvSpPr>
+          <p:cNvPr id="4" name="TextBox 3"/>
+          <p:cNvSpPr txBox="1"/>
+          <p:nvPr/>
+        </p:nvSpPr>
+        <p:spPr>
+          <a:xfrm>
+            <a:off x="802783" y="2735940"/>
+            <a:ext cx="5636654" cy="2990562"/>
+          </a:xfrm>
+          <a:prstGeom prst="rect">
+            <a:avLst/>
+          </a:prstGeom>
+          <a:noFill/>
+        </p:spPr>
+        <p:txBody>
+          <a:bodyPr wrap="square" rtlCol="0">
+            <a:spAutoFit/>
+          </a:bodyPr>
+          <a:lstStyle/>
+          <a:p>
+            <a:pPr algn="just">
+              <a:spcAft>
+                <a:spcPts val="1000"/>
+              </a:spcAft>
+            </a:pPr>
+            <a:r>
+              <a:rPr lang="en-US" b="1" dirty="0"/>
+              <a:t>Interpretation of Confidence Level:</a:t>
+            </a:r>
+          </a:p>
+          <a:p>
+            <a:pPr algn="just"/>
+            <a:r>
+              <a:rPr lang="en-IN" dirty="0"/>
+              <a:t>Suppose we collected all possible samples from a given population, and computed confidence intervals for each sample. Some confidence intervals would include the true population parameter; others would not. A 95% confidence level means that 95% of the intervals contain the true population parameter; a 90% confidence level means that 90% of the intervals contain the population parameter; and so on.</a:t>
+            </a:r>
+          </a:p>
+          <a:p>
+            <a:pPr algn="just"/>
+            <a:endParaRPr lang="en-IN" dirty="0"/>
+          </a:p>
+        </p:txBody>
+      </p:sp>
+    </p:spTree>
+    <p:extLst>
+      <p:ext uri="{BB962C8B-B14F-4D97-AF65-F5344CB8AC3E}">
+        <p14:creationId xmlns:p14="http://schemas.microsoft.com/office/powerpoint/2010/main" val="3864502965"/>
+      </p:ext>
+    </p:extLst>
+  </p:cSld>
+  <p:clrMapOvr>
+    <a:masterClrMapping/>
+  </p:clrMapOvr>
+  <p:timing>
+    <p:tnLst>
+      <p:par>
+        <p:cTn id="1" dur="indefinite" restart="never" nodeType="tmRoot"/>
+      </p:par>
+    </p:tnLst>
+  </p:timing>
+</p:sld>
+</file>
+
+<file path=ppt/slides/slide37.xml><?xml version="1.0" encoding="utf-8"?>
+<p:sld xmlns:a="http://schemas.openxmlformats.org/drawingml/2006/main" xmlns:r="http://schemas.openxmlformats.org/officeDocument/2006/relationships" xmlns:p="http://schemas.openxmlformats.org/presentationml/2006/main">
+  <p:cSld>
+    <p:spTree>
+      <p:nvGrpSpPr>
+        <p:cNvPr id="1" name=""/>
+        <p:cNvGrpSpPr/>
+        <p:nvPr/>
+      </p:nvGrpSpPr>
+      <p:grpSpPr>
+        <a:xfrm>
+          <a:off x="0" y="0"/>
+          <a:ext cx="0" cy="0"/>
+          <a:chOff x="0" y="0"/>
+          <a:chExt cx="0" cy="0"/>
+        </a:xfrm>
+      </p:grpSpPr>
+      <p:sp>
+        <p:nvSpPr>
+          <p:cNvPr id="5" name="Title 1"/>
+          <p:cNvSpPr>
+            <a:spLocks noGrp="1"/>
+          </p:cNvSpPr>
+          <p:nvPr>
+            <p:ph type="ctrTitle"/>
+          </p:nvPr>
+        </p:nvSpPr>
+        <p:spPr>
+          <a:xfrm>
+            <a:off x="802783" y="270455"/>
+            <a:ext cx="9796530" cy="711548"/>
+          </a:xfrm>
+        </p:spPr>
+        <p:txBody>
+          <a:bodyPr>
+            <a:normAutofit/>
+          </a:bodyPr>
+          <a:lstStyle/>
+          <a:p>
+            <a:pPr algn="l"/>
+            <a:r>
+              <a:rPr lang="en-US" sz="4000" dirty="0" smtClean="0"/>
+              <a:t>Estimation</a:t>
+            </a:r>
+            <a:endParaRPr lang="en-IN" sz="4000" dirty="0"/>
+          </a:p>
+        </p:txBody>
+      </p:sp>
+      <p:cxnSp>
+        <p:nvCxnSpPr>
+          <p:cNvPr id="7" name="Straight Connector 6"/>
+          <p:cNvCxnSpPr/>
+          <p:nvPr/>
+        </p:nvCxnSpPr>
+        <p:spPr>
+          <a:xfrm>
+            <a:off x="914400" y="956255"/>
+            <a:ext cx="10045521" cy="0"/>
+          </a:xfrm>
+          <a:prstGeom prst="line">
+            <a:avLst/>
+          </a:prstGeom>
+          <a:ln>
+            <a:solidFill>
+              <a:schemeClr val="bg1">
+                <a:lumMod val="75000"/>
+              </a:schemeClr>
+            </a:solidFill>
+          </a:ln>
+        </p:spPr>
+        <p:style>
+          <a:lnRef idx="1">
+            <a:schemeClr val="dk1"/>
+          </a:lnRef>
+          <a:fillRef idx="0">
+            <a:schemeClr val="dk1"/>
+          </a:fillRef>
+          <a:effectRef idx="0">
+            <a:schemeClr val="dk1"/>
+          </a:effectRef>
+          <a:fontRef idx="minor">
+            <a:schemeClr val="tx1"/>
+          </a:fontRef>
+        </p:style>
+      </p:cxnSp>
+      <p:sp>
+        <p:nvSpPr>
+          <p:cNvPr id="2" name="TextBox 1"/>
+          <p:cNvSpPr txBox="1"/>
+          <p:nvPr/>
+        </p:nvSpPr>
+        <p:spPr>
+          <a:xfrm>
+            <a:off x="802784" y="1047241"/>
+            <a:ext cx="6602568" cy="1051570"/>
+          </a:xfrm>
+          <a:prstGeom prst="rect">
+            <a:avLst/>
+          </a:prstGeom>
+          <a:noFill/>
+        </p:spPr>
+        <p:txBody>
+          <a:bodyPr wrap="square" rtlCol="0">
+            <a:spAutoFit/>
+          </a:bodyPr>
+          <a:lstStyle/>
+          <a:p>
+            <a:pPr algn="just">
+              <a:spcAft>
+                <a:spcPts val="1000"/>
+              </a:spcAft>
+            </a:pPr>
+            <a:r>
+              <a:rPr lang="en-US" b="1" dirty="0" smtClean="0"/>
+              <a:t>Confidence Interval?</a:t>
+            </a:r>
+            <a:endParaRPr lang="en-US" dirty="0" smtClean="0"/>
+          </a:p>
+          <a:p>
+            <a:pPr algn="just">
+              <a:spcAft>
+                <a:spcPts val="1000"/>
+              </a:spcAft>
+            </a:pPr>
+            <a:r>
+              <a:rPr lang="en-IN" b="1" dirty="0" smtClean="0"/>
+              <a:t>Margin of Error</a:t>
+            </a:r>
+            <a:r>
+              <a:rPr lang="en-IN" dirty="0"/>
+              <a:t>: In a confidence interval, the range of values above and below the sample statistic is called the margin of error</a:t>
+            </a:r>
+            <a:r>
+              <a:rPr lang="en-IN" dirty="0" smtClean="0"/>
+              <a:t>.</a:t>
+            </a:r>
+          </a:p>
+        </p:txBody>
+      </p:sp>
+      <p:pic>
+        <p:nvPicPr>
+          <p:cNvPr id="6" name="Picture 5"/>
+          <p:cNvPicPr>
+            <a:picLocks noChangeAspect="1"/>
+          </p:cNvPicPr>
+          <p:nvPr/>
+        </p:nvPicPr>
+        <p:blipFill>
+          <a:blip r:embed="rId2">
+            <a:extLst>
+              <a:ext uri="{28A0092B-C50C-407E-A947-70E740481C1C}">
+                <a14:useLocalDpi xmlns:a14="http://schemas.microsoft.com/office/drawing/2010/main" val="0"/>
+              </a:ext>
+            </a:extLst>
+          </a:blip>
+          <a:stretch>
+            <a:fillRect/>
+          </a:stretch>
+        </p:blipFill>
+        <p:spPr>
+          <a:xfrm>
+            <a:off x="7765960" y="1506731"/>
+            <a:ext cx="3696237" cy="1644032"/>
+          </a:xfrm>
+          <a:prstGeom prst="rect">
+            <a:avLst/>
+          </a:prstGeom>
+        </p:spPr>
+      </p:pic>
+      <p:sp>
+        <p:nvSpPr>
+          <p:cNvPr id="8" name="TextBox 7"/>
+          <p:cNvSpPr txBox="1"/>
+          <p:nvPr/>
+        </p:nvSpPr>
+        <p:spPr>
+          <a:xfrm>
+            <a:off x="802783" y="2344765"/>
+            <a:ext cx="6602569" cy="923330"/>
+          </a:xfrm>
+          <a:prstGeom prst="rect">
+            <a:avLst/>
+          </a:prstGeom>
+          <a:noFill/>
+        </p:spPr>
+        <p:txBody>
+          <a:bodyPr wrap="square" rtlCol="0">
+            <a:spAutoFit/>
+          </a:bodyPr>
+          <a:lstStyle/>
+          <a:p>
+            <a:pPr algn="just"/>
+            <a:r>
+              <a:rPr lang="en-IN" dirty="0"/>
+              <a:t>For example, suppose the local newspaper conducts an </a:t>
+            </a:r>
+            <a:r>
+              <a:rPr lang="en-IN" dirty="0" smtClean="0"/>
+              <a:t>election </a:t>
+            </a:r>
+            <a:r>
+              <a:rPr lang="en-IN" dirty="0"/>
+              <a:t>survey </a:t>
+            </a:r>
+            <a:r>
+              <a:rPr lang="en-IN" dirty="0" smtClean="0"/>
+              <a:t>and </a:t>
+            </a:r>
+            <a:r>
+              <a:rPr lang="en-IN" dirty="0"/>
+              <a:t>reports that the independent candidate </a:t>
+            </a:r>
+            <a:r>
+              <a:rPr lang="en-IN" dirty="0" smtClean="0"/>
+              <a:t>will </a:t>
+            </a:r>
+            <a:r>
+              <a:rPr lang="en-IN" dirty="0"/>
+              <a:t>receive 30% of the vote. </a:t>
+            </a:r>
+            <a:endParaRPr lang="en-IN" dirty="0" smtClean="0"/>
+          </a:p>
+        </p:txBody>
+      </p:sp>
+      <p:sp>
+        <p:nvSpPr>
+          <p:cNvPr id="10" name="TextBox 9"/>
+          <p:cNvSpPr txBox="1"/>
+          <p:nvPr/>
+        </p:nvSpPr>
+        <p:spPr>
+          <a:xfrm>
+            <a:off x="802783" y="3445555"/>
+            <a:ext cx="10479110" cy="2862322"/>
+          </a:xfrm>
+          <a:prstGeom prst="rect">
+            <a:avLst/>
+          </a:prstGeom>
+          <a:noFill/>
+        </p:spPr>
+        <p:txBody>
+          <a:bodyPr wrap="square" rtlCol="0">
+            <a:spAutoFit/>
+          </a:bodyPr>
+          <a:lstStyle/>
+          <a:p>
+            <a:pPr algn="just"/>
+            <a:r>
+              <a:rPr lang="en-IN" dirty="0"/>
+              <a:t>The newspaper states that the survey had a 5% margin of error and a confidence level of 95%. </a:t>
+            </a:r>
+          </a:p>
+          <a:p>
+            <a:pPr algn="just"/>
+            <a:r>
+              <a:rPr lang="en-IN" dirty="0"/>
+              <a:t>These findings result in the following confidence interval: </a:t>
+            </a:r>
+            <a:r>
+              <a:rPr lang="en-IN" b="1" dirty="0"/>
+              <a:t>We are 95% confident that the independent candidate will receive between 25% and 35% of the vote</a:t>
+            </a:r>
+            <a:r>
+              <a:rPr lang="en-IN" b="1" dirty="0" smtClean="0"/>
+              <a:t>.</a:t>
+            </a:r>
+          </a:p>
+          <a:p>
+            <a:pPr algn="just"/>
+            <a:endParaRPr lang="en-IN" b="1" dirty="0"/>
+          </a:p>
+          <a:p>
+            <a:pPr marL="285750" indent="-285750" algn="just">
+              <a:buFontTx/>
+              <a:buChar char="-"/>
+            </a:pPr>
+            <a:r>
+              <a:rPr lang="en-IN" dirty="0" smtClean="0"/>
+              <a:t>Many </a:t>
+            </a:r>
+            <a:r>
+              <a:rPr lang="en-IN" dirty="0"/>
+              <a:t>public opinion surveys report interval estimates, but not confidence intervals. They provide the margin of error, but not the confidence level. </a:t>
+            </a:r>
+            <a:r>
+              <a:rPr lang="en-IN" b="1" dirty="0"/>
+              <a:t>To clearly interpret survey results you need to know both! </a:t>
+            </a:r>
+            <a:r>
+              <a:rPr lang="en-IN" dirty="0"/>
+              <a:t>We are much more likely to accept survey findings if the confidence level is high (say, 95%) than if it is low (say, 50</a:t>
+            </a:r>
+            <a:r>
+              <a:rPr lang="en-IN" dirty="0" smtClean="0"/>
+              <a:t>%).</a:t>
+            </a:r>
+          </a:p>
+          <a:p>
+            <a:pPr algn="just"/>
+            <a:endParaRPr lang="en-IN" dirty="0"/>
+          </a:p>
+          <a:p>
+            <a:pPr algn="just">
+              <a:spcAft>
+                <a:spcPts val="1000"/>
+              </a:spcAft>
+            </a:pPr>
+            <a:endParaRPr lang="en-IN" dirty="0"/>
+          </a:p>
+        </p:txBody>
+      </p:sp>
+    </p:spTree>
+    <p:extLst>
+      <p:ext uri="{BB962C8B-B14F-4D97-AF65-F5344CB8AC3E}">
+        <p14:creationId xmlns:p14="http://schemas.microsoft.com/office/powerpoint/2010/main" val="2749030388"/>
+      </p:ext>
+    </p:extLst>
+  </p:cSld>
+  <p:clrMapOvr>
+    <a:masterClrMapping/>
+  </p:clrMapOvr>
+  <p:timing>
+    <p:tnLst>
+      <p:par>
+        <p:cTn id="1" dur="indefinite" restart="never" nodeType="tmRoot"/>
+      </p:par>
+    </p:tnLst>
+  </p:timing>
+</p:sld>
+</file>
+
+<file path=ppt/slides/slide38.xml><?xml version="1.0" encoding="utf-8"?>
+<p:sld xmlns:a="http://schemas.openxmlformats.org/drawingml/2006/main" xmlns:r="http://schemas.openxmlformats.org/officeDocument/2006/relationships" xmlns:p="http://schemas.openxmlformats.org/presentationml/2006/main">
+  <p:cSld>
+    <p:spTree>
+      <p:nvGrpSpPr>
+        <p:cNvPr id="1" name=""/>
+        <p:cNvGrpSpPr/>
+        <p:nvPr/>
+      </p:nvGrpSpPr>
+      <p:grpSpPr>
+        <a:xfrm>
+          <a:off x="0" y="0"/>
+          <a:ext cx="0" cy="0"/>
+          <a:chOff x="0" y="0"/>
+          <a:chExt cx="0" cy="0"/>
+        </a:xfrm>
+      </p:grpSpPr>
+      <p:sp>
+        <p:nvSpPr>
+          <p:cNvPr id="5" name="Title 1"/>
+          <p:cNvSpPr>
+            <a:spLocks noGrp="1"/>
+          </p:cNvSpPr>
+          <p:nvPr>
+            <p:ph type="ctrTitle"/>
+          </p:nvPr>
+        </p:nvSpPr>
+        <p:spPr>
+          <a:xfrm>
+            <a:off x="802783" y="270455"/>
+            <a:ext cx="9796530" cy="711548"/>
+          </a:xfrm>
+        </p:spPr>
+        <p:txBody>
+          <a:bodyPr>
+            <a:normAutofit/>
+          </a:bodyPr>
+          <a:lstStyle/>
+          <a:p>
+            <a:pPr algn="l"/>
+            <a:r>
+              <a:rPr lang="en-US" sz="4000" dirty="0" smtClean="0"/>
+              <a:t>Estimation</a:t>
+            </a:r>
+            <a:endParaRPr lang="en-IN" sz="4000" dirty="0"/>
+          </a:p>
+        </p:txBody>
+      </p:sp>
+      <p:cxnSp>
+        <p:nvCxnSpPr>
+          <p:cNvPr id="7" name="Straight Connector 6"/>
+          <p:cNvCxnSpPr/>
+          <p:nvPr/>
+        </p:nvCxnSpPr>
+        <p:spPr>
+          <a:xfrm>
+            <a:off x="914400" y="956255"/>
+            <a:ext cx="10045521" cy="0"/>
+          </a:xfrm>
+          <a:prstGeom prst="line">
+            <a:avLst/>
+          </a:prstGeom>
+          <a:ln>
+            <a:solidFill>
+              <a:schemeClr val="bg1">
+                <a:lumMod val="75000"/>
+              </a:schemeClr>
+            </a:solidFill>
+          </a:ln>
+        </p:spPr>
+        <p:style>
+          <a:lnRef idx="1">
+            <a:schemeClr val="dk1"/>
+          </a:lnRef>
+          <a:fillRef idx="0">
+            <a:schemeClr val="dk1"/>
+          </a:fillRef>
+          <a:effectRef idx="0">
+            <a:schemeClr val="dk1"/>
+          </a:effectRef>
+          <a:fontRef idx="minor">
+            <a:schemeClr val="tx1"/>
+          </a:fontRef>
+        </p:style>
+      </p:cxnSp>
+      <p:sp>
+        <p:nvSpPr>
+          <p:cNvPr id="2" name="TextBox 1"/>
+          <p:cNvSpPr txBox="1"/>
+          <p:nvPr/>
+        </p:nvSpPr>
+        <p:spPr>
+          <a:xfrm>
+            <a:off x="802783" y="1047241"/>
+            <a:ext cx="10247289" cy="3395801"/>
+          </a:xfrm>
+          <a:prstGeom prst="rect">
+            <a:avLst/>
+          </a:prstGeom>
+          <a:noFill/>
+        </p:spPr>
+        <p:txBody>
+          <a:bodyPr wrap="square" rtlCol="0">
+            <a:spAutoFit/>
+          </a:bodyPr>
+          <a:lstStyle/>
+          <a:p>
+            <a:pPr algn="just">
+              <a:spcAft>
+                <a:spcPts val="1000"/>
+              </a:spcAft>
+            </a:pPr>
+            <a:r>
+              <a:rPr lang="en-US" b="1" dirty="0" smtClean="0"/>
+              <a:t>Understanding Confidence Interval:</a:t>
+            </a:r>
+          </a:p>
+          <a:p>
+            <a:r>
+              <a:rPr lang="en-IN" dirty="0"/>
+              <a:t>Which of the following statements is true</a:t>
+            </a:r>
+            <a:r>
+              <a:rPr lang="en-IN" dirty="0" smtClean="0"/>
+              <a:t>.</a:t>
+            </a:r>
+            <a:endParaRPr lang="en-IN" dirty="0"/>
+          </a:p>
+          <a:p>
+            <a:r>
+              <a:rPr lang="en-IN" dirty="0"/>
+              <a:t>I. When the margin of error is small, the confidence level is high. </a:t>
+            </a:r>
+            <a:br>
+              <a:rPr lang="en-IN" dirty="0"/>
+            </a:br>
+            <a:r>
+              <a:rPr lang="en-IN" dirty="0"/>
+              <a:t>II. When the margin of error is small, the confidence level is low. </a:t>
+            </a:r>
+            <a:br>
+              <a:rPr lang="en-IN" dirty="0"/>
+            </a:br>
+            <a:r>
+              <a:rPr lang="en-IN" dirty="0"/>
+              <a:t>III. A confidence interval is a type of point estimate. </a:t>
+            </a:r>
+            <a:br>
+              <a:rPr lang="en-IN" dirty="0"/>
+            </a:br>
+            <a:r>
+              <a:rPr lang="en-IN" dirty="0"/>
+              <a:t>IV. A population mean is an example of a point estimate. </a:t>
+            </a:r>
+          </a:p>
+          <a:p>
+            <a:pPr algn="just">
+              <a:spcAft>
+                <a:spcPts val="1000"/>
+              </a:spcAft>
+            </a:pPr>
+            <a:endParaRPr lang="en-IN" dirty="0" smtClean="0"/>
+          </a:p>
+          <a:p>
+            <a:pPr algn="just">
+              <a:spcAft>
+                <a:spcPts val="1000"/>
+              </a:spcAft>
+            </a:pPr>
+            <a:r>
+              <a:rPr lang="en-IN" dirty="0" smtClean="0"/>
+              <a:t>The </a:t>
+            </a:r>
+            <a:r>
+              <a:rPr lang="en-IN" dirty="0"/>
+              <a:t>confidence level is not affected by the margin of error. When the margin of error is small, the confidence level can low or high or anything in between. A confidence interval is a type of interval estimate, not a type of point estimate. A </a:t>
+            </a:r>
+            <a:r>
+              <a:rPr lang="en-IN" i="1" dirty="0"/>
+              <a:t>population</a:t>
+            </a:r>
+            <a:r>
+              <a:rPr lang="en-IN" dirty="0"/>
+              <a:t> mean is not an example of a point estimate; a </a:t>
+            </a:r>
+            <a:r>
+              <a:rPr lang="en-IN" i="1" dirty="0"/>
+              <a:t>sample</a:t>
+            </a:r>
+            <a:r>
+              <a:rPr lang="en-IN" dirty="0"/>
+              <a:t> mean is an example of a point estimate.</a:t>
+            </a:r>
+            <a:endParaRPr lang="en-US" dirty="0" smtClean="0"/>
+          </a:p>
+        </p:txBody>
+      </p:sp>
+    </p:spTree>
+    <p:extLst>
+      <p:ext uri="{BB962C8B-B14F-4D97-AF65-F5344CB8AC3E}">
+        <p14:creationId xmlns:p14="http://schemas.microsoft.com/office/powerpoint/2010/main" val="2530796977"/>
+      </p:ext>
+    </p:extLst>
+  </p:cSld>
+  <p:clrMapOvr>
+    <a:masterClrMapping/>
+  </p:clrMapOvr>
+  <p:timing>
+    <p:tnLst>
+      <p:par>
+        <p:cTn id="1" dur="indefinite" restart="never" nodeType="tmRoot"/>
+      </p:par>
+    </p:tnLst>
+  </p:timing>
+</p:sld>
+</file>
+
+<file path=ppt/slides/slide39.xml><?xml version="1.0" encoding="utf-8"?>
+<p:sld xmlns:a="http://schemas.openxmlformats.org/drawingml/2006/main" xmlns:r="http://schemas.openxmlformats.org/officeDocument/2006/relationships" xmlns:p="http://schemas.openxmlformats.org/presentationml/2006/main">
+  <p:cSld>
+    <p:spTree>
+      <p:nvGrpSpPr>
+        <p:cNvPr id="1" name=""/>
+        <p:cNvGrpSpPr/>
+        <p:nvPr/>
+      </p:nvGrpSpPr>
+      <p:grpSpPr>
+        <a:xfrm>
+          <a:off x="0" y="0"/>
+          <a:ext cx="0" cy="0"/>
+          <a:chOff x="0" y="0"/>
+          <a:chExt cx="0" cy="0"/>
+        </a:xfrm>
+      </p:grpSpPr>
+      <p:sp>
+        <p:nvSpPr>
+          <p:cNvPr id="5" name="Title 1"/>
+          <p:cNvSpPr>
+            <a:spLocks noGrp="1"/>
+          </p:cNvSpPr>
+          <p:nvPr>
+            <p:ph type="ctrTitle"/>
+          </p:nvPr>
+        </p:nvSpPr>
+        <p:spPr>
+          <a:xfrm>
+            <a:off x="802783" y="270455"/>
+            <a:ext cx="9796530" cy="711548"/>
+          </a:xfrm>
+        </p:spPr>
+        <p:txBody>
+          <a:bodyPr>
+            <a:normAutofit/>
+          </a:bodyPr>
+          <a:lstStyle/>
+          <a:p>
+            <a:pPr algn="l"/>
+            <a:r>
+              <a:rPr lang="en-US" sz="4000" dirty="0" smtClean="0"/>
+              <a:t>Estimation – Standard Error</a:t>
+            </a:r>
+            <a:endParaRPr lang="en-IN" sz="4000" dirty="0"/>
+          </a:p>
+        </p:txBody>
+      </p:sp>
+      <p:cxnSp>
+        <p:nvCxnSpPr>
+          <p:cNvPr id="7" name="Straight Connector 6"/>
+          <p:cNvCxnSpPr/>
+          <p:nvPr/>
+        </p:nvCxnSpPr>
+        <p:spPr>
+          <a:xfrm>
+            <a:off x="914400" y="956255"/>
+            <a:ext cx="10045521" cy="0"/>
+          </a:xfrm>
+          <a:prstGeom prst="line">
+            <a:avLst/>
+          </a:prstGeom>
+          <a:ln>
+            <a:solidFill>
+              <a:schemeClr val="bg1">
+                <a:lumMod val="75000"/>
+              </a:schemeClr>
+            </a:solidFill>
+          </a:ln>
+        </p:spPr>
+        <p:style>
+          <a:lnRef idx="1">
+            <a:schemeClr val="dk1"/>
+          </a:lnRef>
+          <a:fillRef idx="0">
+            <a:schemeClr val="dk1"/>
+          </a:fillRef>
+          <a:effectRef idx="0">
+            <a:schemeClr val="dk1"/>
+          </a:effectRef>
+          <a:fontRef idx="minor">
+            <a:schemeClr val="tx1"/>
+          </a:fontRef>
+        </p:style>
+      </p:cxnSp>
+      <p:sp>
+        <p:nvSpPr>
+          <p:cNvPr id="2" name="TextBox 1"/>
+          <p:cNvSpPr txBox="1"/>
+          <p:nvPr/>
+        </p:nvSpPr>
+        <p:spPr>
+          <a:xfrm>
+            <a:off x="802783" y="1047241"/>
+            <a:ext cx="10247289" cy="2010807"/>
+          </a:xfrm>
+          <a:prstGeom prst="rect">
+            <a:avLst/>
+          </a:prstGeom>
+          <a:noFill/>
+        </p:spPr>
+        <p:txBody>
+          <a:bodyPr wrap="square" rtlCol="0">
+            <a:spAutoFit/>
+          </a:bodyPr>
+          <a:lstStyle/>
+          <a:p>
+            <a:pPr>
+              <a:spcAft>
+                <a:spcPts val="1000"/>
+              </a:spcAft>
+            </a:pPr>
+            <a:r>
+              <a:rPr lang="en-IN" dirty="0"/>
+              <a:t>The standard error is an estimate of the standard deviation of a statistic</a:t>
+            </a:r>
+            <a:r>
+              <a:rPr lang="en-IN" dirty="0" smtClean="0"/>
+              <a:t>.</a:t>
+            </a:r>
+          </a:p>
+          <a:p>
+            <a:pPr>
+              <a:spcAft>
+                <a:spcPts val="1000"/>
+              </a:spcAft>
+            </a:pPr>
+            <a:r>
+              <a:rPr lang="en-IN" b="1" dirty="0" smtClean="0"/>
+              <a:t>Standard Deviation of Sample Estimates: </a:t>
+            </a:r>
+            <a:r>
+              <a:rPr lang="en-IN" dirty="0" smtClean="0"/>
+              <a:t>Statisticians </a:t>
+            </a:r>
+            <a:r>
+              <a:rPr lang="en-IN" dirty="0"/>
+              <a:t>use sample statistics to estimate population parameters. Naturally, the value of a statistic may vary from one sample to the next. </a:t>
+            </a:r>
+            <a:r>
+              <a:rPr lang="en-IN" dirty="0" smtClean="0"/>
+              <a:t>The </a:t>
+            </a:r>
+            <a:r>
+              <a:rPr lang="en-IN" dirty="0"/>
+              <a:t>variability of a statistic is measured by its standard deviation</a:t>
+            </a:r>
+            <a:r>
+              <a:rPr lang="en-IN" dirty="0" smtClean="0"/>
+              <a:t>.</a:t>
+            </a:r>
+          </a:p>
+          <a:p>
+            <a:pPr>
+              <a:spcAft>
+                <a:spcPts val="1000"/>
+              </a:spcAft>
+            </a:pPr>
+            <a:r>
+              <a:rPr lang="en-IN" dirty="0"/>
+              <a:t>The table below shows formulas for computing the standard deviation of statistics from simple random samples</a:t>
+            </a:r>
+            <a:r>
+              <a:rPr lang="en-IN" dirty="0" smtClean="0"/>
+              <a:t>.</a:t>
+            </a:r>
+          </a:p>
+        </p:txBody>
+      </p:sp>
+      <p:graphicFrame>
+        <p:nvGraphicFramePr>
+          <p:cNvPr id="4" name="Table 3"/>
+          <p:cNvGraphicFramePr>
+            <a:graphicFrameLocks noGrp="1"/>
+          </p:cNvGraphicFramePr>
+          <p:nvPr>
+            <p:extLst>
+              <p:ext uri="{D42A27DB-BD31-4B8C-83A1-F6EECF244321}">
+                <p14:modId xmlns:p14="http://schemas.microsoft.com/office/powerpoint/2010/main" val="1464317954"/>
+              </p:ext>
+            </p:extLst>
+          </p:nvPr>
+        </p:nvGraphicFramePr>
+        <p:xfrm>
+          <a:off x="802783" y="3244018"/>
+          <a:ext cx="10515600" cy="1097280"/>
+        </p:xfrm>
+        <a:graphic>
+          <a:graphicData uri="http://schemas.openxmlformats.org/drawingml/2006/table">
+            <a:tbl>
+              <a:tblPr>
+                <a:tableStyleId>{69C7853C-536D-4A76-A0AE-DD22124D55A5}</a:tableStyleId>
+              </a:tblPr>
+              <a:tblGrid>
+                <a:gridCol w="5257800">
+                  <a:extLst>
+                    <a:ext uri="{9D8B030D-6E8A-4147-A177-3AD203B41FA5}">
+                      <a16:colId xmlns:a16="http://schemas.microsoft.com/office/drawing/2014/main" val="1104619729"/>
+                    </a:ext>
+                  </a:extLst>
+                </a:gridCol>
+                <a:gridCol w="5257800">
+                  <a:extLst>
+                    <a:ext uri="{9D8B030D-6E8A-4147-A177-3AD203B41FA5}">
+                      <a16:colId xmlns:a16="http://schemas.microsoft.com/office/drawing/2014/main" val="3081646008"/>
+                    </a:ext>
+                  </a:extLst>
+                </a:gridCol>
+              </a:tblGrid>
+              <a:tr h="0">
+                <a:tc>
+                  <a:txBody>
+                    <a:bodyPr/>
+                    <a:lstStyle/>
+                    <a:p>
+                      <a:pPr algn="ctr"/>
+                      <a:r>
+                        <a:rPr lang="en-IN" dirty="0">
+                          <a:solidFill>
+                            <a:schemeClr val="bg1"/>
+                          </a:solidFill>
+                          <a:effectLst/>
+                        </a:rPr>
+                        <a:t>Sample mean, x </a:t>
+                      </a:r>
+                    </a:p>
+                  </a:txBody>
+                  <a:tcPr anchor="ctr">
+                    <a:lnL w="12700" cap="flat" cmpd="sng" algn="ctr">
+                      <a:solidFill>
+                        <a:schemeClr val="tx1"/>
+                      </a:solidFill>
+                      <a:prstDash val="solid"/>
+                      <a:round/>
+                      <a:headEnd type="none" w="med" len="med"/>
+                      <a:tailEnd type="none" w="med" len="med"/>
+                    </a:lnL>
+                    <a:lnR w="12700" cap="flat" cmpd="sng" algn="ctr">
+                      <a:solidFill>
+                        <a:schemeClr val="tx1"/>
+                      </a:solidFill>
+                      <a:prstDash val="solid"/>
+                      <a:round/>
+                      <a:headEnd type="none" w="med" len="med"/>
+                      <a:tailEnd type="none" w="med" len="med"/>
+                    </a:lnR>
+                    <a:lnT w="12700" cap="flat" cmpd="sng" algn="ctr">
+                      <a:solidFill>
+                        <a:schemeClr val="tx1"/>
+                      </a:solidFill>
+                      <a:prstDash val="solid"/>
+                      <a:round/>
+                      <a:headEnd type="none" w="med" len="med"/>
+                      <a:tailEnd type="none" w="med" len="med"/>
+                    </a:lnT>
+                    <a:lnB w="12700" cap="flat" cmpd="sng" algn="ctr">
+                      <a:solidFill>
+                        <a:schemeClr val="tx1"/>
+                      </a:solidFill>
+                      <a:prstDash val="solid"/>
+                      <a:round/>
+                      <a:headEnd type="none" w="med" len="med"/>
+                      <a:tailEnd type="none" w="med" len="med"/>
+                    </a:lnB>
+                    <a:solidFill>
+                      <a:schemeClr val="bg1">
+                        <a:lumMod val="50000"/>
+                      </a:schemeClr>
+                    </a:solidFill>
+                  </a:tcPr>
+                </a:tc>
+                <a:tc>
+                  <a:txBody>
+                    <a:bodyPr/>
+                    <a:lstStyle/>
+                    <a:p>
+                      <a:pPr algn="ctr"/>
+                      <a:r>
+                        <a:rPr lang="el-GR" dirty="0">
+                          <a:solidFill>
+                            <a:schemeClr val="bg1"/>
+                          </a:solidFill>
+                          <a:effectLst/>
+                        </a:rPr>
+                        <a:t>σ</a:t>
+                      </a:r>
+                      <a:r>
+                        <a:rPr lang="en-IN" baseline="-25000" dirty="0">
+                          <a:solidFill>
+                            <a:schemeClr val="bg1"/>
+                          </a:solidFill>
+                          <a:effectLst/>
+                        </a:rPr>
+                        <a:t>x</a:t>
+                      </a:r>
+                      <a:r>
+                        <a:rPr lang="en-IN" dirty="0">
+                          <a:solidFill>
+                            <a:schemeClr val="bg1"/>
+                          </a:solidFill>
+                          <a:effectLst/>
+                        </a:rPr>
+                        <a:t> = </a:t>
+                      </a:r>
+                      <a:r>
+                        <a:rPr lang="el-GR" dirty="0">
+                          <a:solidFill>
+                            <a:schemeClr val="bg1"/>
+                          </a:solidFill>
+                          <a:effectLst/>
+                        </a:rPr>
+                        <a:t>σ / </a:t>
+                      </a:r>
+                      <a:r>
+                        <a:rPr lang="en-IN" dirty="0" err="1">
+                          <a:solidFill>
+                            <a:schemeClr val="bg1"/>
+                          </a:solidFill>
+                          <a:effectLst/>
+                        </a:rPr>
+                        <a:t>sqrt</a:t>
+                      </a:r>
+                      <a:r>
+                        <a:rPr lang="en-IN" dirty="0">
+                          <a:solidFill>
+                            <a:schemeClr val="bg1"/>
+                          </a:solidFill>
+                          <a:effectLst/>
+                        </a:rPr>
+                        <a:t>( n ) </a:t>
+                      </a:r>
+                    </a:p>
+                  </a:txBody>
+                  <a:tcPr anchor="ctr">
+                    <a:lnL w="12700" cap="flat" cmpd="sng" algn="ctr">
+                      <a:solidFill>
+                        <a:schemeClr val="tx1"/>
+                      </a:solidFill>
+                      <a:prstDash val="solid"/>
+                      <a:round/>
+                      <a:headEnd type="none" w="med" len="med"/>
+                      <a:tailEnd type="none" w="med" len="med"/>
+                    </a:lnL>
+                    <a:lnR w="12700" cap="flat" cmpd="sng" algn="ctr">
+                      <a:solidFill>
+                        <a:schemeClr val="tx1"/>
+                      </a:solidFill>
+                      <a:prstDash val="solid"/>
+                      <a:round/>
+                      <a:headEnd type="none" w="med" len="med"/>
+                      <a:tailEnd type="none" w="med" len="med"/>
+                    </a:lnR>
+                    <a:lnT w="12700" cap="flat" cmpd="sng" algn="ctr">
+                      <a:solidFill>
+                        <a:schemeClr val="tx1"/>
+                      </a:solidFill>
+                      <a:prstDash val="solid"/>
+                      <a:round/>
+                      <a:headEnd type="none" w="med" len="med"/>
+                      <a:tailEnd type="none" w="med" len="med"/>
+                    </a:lnT>
+                    <a:lnB w="12700" cap="flat" cmpd="sng" algn="ctr">
+                      <a:solidFill>
+                        <a:schemeClr val="tx1"/>
+                      </a:solidFill>
+                      <a:prstDash val="solid"/>
+                      <a:round/>
+                      <a:headEnd type="none" w="med" len="med"/>
+                      <a:tailEnd type="none" w="med" len="med"/>
+                    </a:lnB>
+                    <a:solidFill>
+                      <a:schemeClr val="bg1">
+                        <a:lumMod val="50000"/>
+                      </a:schemeClr>
+                    </a:solidFill>
+                  </a:tcPr>
+                </a:tc>
+                <a:extLst>
+                  <a:ext uri="{0D108BD9-81ED-4DB2-BD59-A6C34878D82A}">
+                    <a16:rowId xmlns:a16="http://schemas.microsoft.com/office/drawing/2014/main" val="1663933826"/>
+                  </a:ext>
+                </a:extLst>
+              </a:tr>
+              <a:tr h="0">
+                <a:tc>
+                  <a:txBody>
+                    <a:bodyPr/>
+                    <a:lstStyle/>
+                    <a:p>
+                      <a:pPr algn="ctr"/>
+                      <a:r>
+                        <a:rPr lang="en-IN">
+                          <a:solidFill>
+                            <a:schemeClr val="bg1"/>
+                          </a:solidFill>
+                          <a:effectLst/>
+                        </a:rPr>
+                        <a:t>Sample proportion, p </a:t>
+                      </a:r>
+                    </a:p>
+                  </a:txBody>
+                  <a:tcPr anchor="ctr">
+                    <a:lnL w="12700" cap="flat" cmpd="sng" algn="ctr">
+                      <a:solidFill>
+                        <a:schemeClr val="tx1"/>
+                      </a:solidFill>
+                      <a:prstDash val="solid"/>
+                      <a:round/>
+                      <a:headEnd type="none" w="med" len="med"/>
+                      <a:tailEnd type="none" w="med" len="med"/>
+                    </a:lnL>
+                    <a:lnR w="12700" cap="flat" cmpd="sng" algn="ctr">
+                      <a:solidFill>
+                        <a:schemeClr val="tx1"/>
+                      </a:solidFill>
+                      <a:prstDash val="solid"/>
+                      <a:round/>
+                      <a:headEnd type="none" w="med" len="med"/>
+                      <a:tailEnd type="none" w="med" len="med"/>
+                    </a:lnR>
+                    <a:lnT w="12700" cap="flat" cmpd="sng" algn="ctr">
+                      <a:solidFill>
+                        <a:schemeClr val="tx1"/>
+                      </a:solidFill>
+                      <a:prstDash val="solid"/>
+                      <a:round/>
+                      <a:headEnd type="none" w="med" len="med"/>
+                      <a:tailEnd type="none" w="med" len="med"/>
+                    </a:lnT>
+                    <a:lnB w="12700" cap="flat" cmpd="sng" algn="ctr">
+                      <a:solidFill>
+                        <a:schemeClr val="tx1"/>
+                      </a:solidFill>
+                      <a:prstDash val="solid"/>
+                      <a:round/>
+                      <a:headEnd type="none" w="med" len="med"/>
+                      <a:tailEnd type="none" w="med" len="med"/>
+                    </a:lnB>
+                    <a:solidFill>
+                      <a:schemeClr val="bg1">
+                        <a:lumMod val="50000"/>
+                      </a:schemeClr>
+                    </a:solidFill>
+                  </a:tcPr>
+                </a:tc>
+                <a:tc>
+                  <a:txBody>
+                    <a:bodyPr/>
+                    <a:lstStyle/>
+                    <a:p>
+                      <a:pPr algn="ctr"/>
+                      <a:r>
+                        <a:rPr lang="pt-BR">
+                          <a:solidFill>
+                            <a:schemeClr val="bg1"/>
+                          </a:solidFill>
+                          <a:effectLst/>
+                        </a:rPr>
+                        <a:t>σ</a:t>
+                      </a:r>
+                      <a:r>
+                        <a:rPr lang="pt-BR" baseline="-25000">
+                          <a:solidFill>
+                            <a:schemeClr val="bg1"/>
+                          </a:solidFill>
+                          <a:effectLst/>
+                        </a:rPr>
+                        <a:t>p</a:t>
+                      </a:r>
+                      <a:r>
+                        <a:rPr lang="pt-BR">
+                          <a:solidFill>
+                            <a:schemeClr val="bg1"/>
+                          </a:solidFill>
+                          <a:effectLst/>
+                        </a:rPr>
+                        <a:t> = sqrt [ P(1 - P) / n ] </a:t>
+                      </a:r>
+                    </a:p>
+                  </a:txBody>
+                  <a:tcPr anchor="ctr">
+                    <a:lnL w="12700" cap="flat" cmpd="sng" algn="ctr">
+                      <a:solidFill>
+                        <a:schemeClr val="tx1"/>
+                      </a:solidFill>
+                      <a:prstDash val="solid"/>
+                      <a:round/>
+                      <a:headEnd type="none" w="med" len="med"/>
+                      <a:tailEnd type="none" w="med" len="med"/>
+                    </a:lnL>
+                    <a:lnR w="12700" cap="flat" cmpd="sng" algn="ctr">
+                      <a:solidFill>
+                        <a:schemeClr val="tx1"/>
+                      </a:solidFill>
+                      <a:prstDash val="solid"/>
+                      <a:round/>
+                      <a:headEnd type="none" w="med" len="med"/>
+                      <a:tailEnd type="none" w="med" len="med"/>
+                    </a:lnR>
+                    <a:lnT w="12700" cap="flat" cmpd="sng" algn="ctr">
+                      <a:solidFill>
+                        <a:schemeClr val="tx1"/>
+                      </a:solidFill>
+                      <a:prstDash val="solid"/>
+                      <a:round/>
+                      <a:headEnd type="none" w="med" len="med"/>
+                      <a:tailEnd type="none" w="med" len="med"/>
+                    </a:lnT>
+                    <a:lnB w="12700" cap="flat" cmpd="sng" algn="ctr">
+                      <a:solidFill>
+                        <a:schemeClr val="tx1"/>
+                      </a:solidFill>
+                      <a:prstDash val="solid"/>
+                      <a:round/>
+                      <a:headEnd type="none" w="med" len="med"/>
+                      <a:tailEnd type="none" w="med" len="med"/>
+                    </a:lnB>
+                    <a:solidFill>
+                      <a:schemeClr val="bg1">
+                        <a:lumMod val="50000"/>
+                      </a:schemeClr>
+                    </a:solidFill>
+                  </a:tcPr>
+                </a:tc>
+                <a:extLst>
+                  <a:ext uri="{0D108BD9-81ED-4DB2-BD59-A6C34878D82A}">
+                    <a16:rowId xmlns:a16="http://schemas.microsoft.com/office/drawing/2014/main" val="3527478761"/>
+                  </a:ext>
+                </a:extLst>
+              </a:tr>
+              <a:tr h="0">
+                <a:tc>
+                  <a:txBody>
+                    <a:bodyPr/>
+                    <a:lstStyle/>
+                    <a:p>
+                      <a:pPr algn="ctr"/>
+                      <a:r>
+                        <a:rPr lang="en-IN" dirty="0">
+                          <a:solidFill>
+                            <a:schemeClr val="bg1"/>
+                          </a:solidFill>
+                          <a:effectLst/>
+                        </a:rPr>
+                        <a:t>Difference between means, x</a:t>
+                      </a:r>
+                      <a:r>
+                        <a:rPr lang="en-IN" baseline="-25000" dirty="0">
+                          <a:solidFill>
+                            <a:schemeClr val="bg1"/>
+                          </a:solidFill>
+                          <a:effectLst/>
+                        </a:rPr>
+                        <a:t>1</a:t>
+                      </a:r>
+                      <a:r>
+                        <a:rPr lang="en-IN" dirty="0">
+                          <a:solidFill>
+                            <a:schemeClr val="bg1"/>
+                          </a:solidFill>
+                          <a:effectLst/>
+                        </a:rPr>
+                        <a:t> - x</a:t>
+                      </a:r>
+                      <a:r>
+                        <a:rPr lang="en-IN" baseline="-25000" dirty="0">
+                          <a:solidFill>
+                            <a:schemeClr val="bg1"/>
+                          </a:solidFill>
+                          <a:effectLst/>
+                        </a:rPr>
+                        <a:t>2</a:t>
+                      </a:r>
+                      <a:r>
+                        <a:rPr lang="en-IN" dirty="0">
+                          <a:solidFill>
+                            <a:schemeClr val="bg1"/>
+                          </a:solidFill>
+                          <a:effectLst/>
+                        </a:rPr>
+                        <a:t> </a:t>
+                      </a:r>
+                    </a:p>
+                  </a:txBody>
+                  <a:tcPr anchor="ctr">
+                    <a:lnL w="12700" cap="flat" cmpd="sng" algn="ctr">
+                      <a:solidFill>
+                        <a:schemeClr val="tx1"/>
+                      </a:solidFill>
+                      <a:prstDash val="solid"/>
+                      <a:round/>
+                      <a:headEnd type="none" w="med" len="med"/>
+                      <a:tailEnd type="none" w="med" len="med"/>
+                    </a:lnL>
+                    <a:lnR w="12700" cap="flat" cmpd="sng" algn="ctr">
+                      <a:solidFill>
+                        <a:schemeClr val="tx1"/>
+                      </a:solidFill>
+                      <a:prstDash val="solid"/>
+                      <a:round/>
+                      <a:headEnd type="none" w="med" len="med"/>
+                      <a:tailEnd type="none" w="med" len="med"/>
+                    </a:lnR>
+                    <a:lnT w="12700" cap="flat" cmpd="sng" algn="ctr">
+                      <a:solidFill>
+                        <a:schemeClr val="tx1"/>
+                      </a:solidFill>
+                      <a:prstDash val="solid"/>
+                      <a:round/>
+                      <a:headEnd type="none" w="med" len="med"/>
+                      <a:tailEnd type="none" w="med" len="med"/>
+                    </a:lnT>
+                    <a:lnB w="12700" cap="flat" cmpd="sng" algn="ctr">
+                      <a:solidFill>
+                        <a:schemeClr val="tx1"/>
+                      </a:solidFill>
+                      <a:prstDash val="solid"/>
+                      <a:round/>
+                      <a:headEnd type="none" w="med" len="med"/>
+                      <a:tailEnd type="none" w="med" len="med"/>
+                    </a:lnB>
+                    <a:solidFill>
+                      <a:schemeClr val="bg1">
+                        <a:lumMod val="50000"/>
+                      </a:schemeClr>
+                    </a:solidFill>
+                  </a:tcPr>
+                </a:tc>
+                <a:tc>
+                  <a:txBody>
+                    <a:bodyPr/>
+                    <a:lstStyle/>
+                    <a:p>
+                      <a:pPr algn="ctr"/>
+                      <a:r>
+                        <a:rPr lang="el-GR" dirty="0">
+                          <a:solidFill>
+                            <a:schemeClr val="bg1"/>
+                          </a:solidFill>
+                          <a:effectLst/>
+                        </a:rPr>
+                        <a:t>σ</a:t>
+                      </a:r>
+                      <a:r>
+                        <a:rPr lang="en-IN" baseline="-25000" dirty="0">
+                          <a:solidFill>
+                            <a:schemeClr val="bg1"/>
+                          </a:solidFill>
+                          <a:effectLst/>
+                        </a:rPr>
+                        <a:t>x1-x2</a:t>
+                      </a:r>
+                      <a:r>
+                        <a:rPr lang="en-IN" dirty="0">
+                          <a:solidFill>
+                            <a:schemeClr val="bg1"/>
+                          </a:solidFill>
+                          <a:effectLst/>
+                        </a:rPr>
+                        <a:t> = </a:t>
+                      </a:r>
+                      <a:r>
+                        <a:rPr lang="en-IN" dirty="0" err="1">
+                          <a:solidFill>
+                            <a:schemeClr val="bg1"/>
+                          </a:solidFill>
+                          <a:effectLst/>
+                        </a:rPr>
+                        <a:t>sqrt</a:t>
+                      </a:r>
+                      <a:r>
+                        <a:rPr lang="en-IN" dirty="0">
+                          <a:solidFill>
+                            <a:schemeClr val="bg1"/>
+                          </a:solidFill>
+                          <a:effectLst/>
+                        </a:rPr>
+                        <a:t> [ </a:t>
+                      </a:r>
+                      <a:r>
+                        <a:rPr lang="el-GR" dirty="0">
+                          <a:solidFill>
+                            <a:schemeClr val="bg1"/>
+                          </a:solidFill>
+                          <a:effectLst/>
+                        </a:rPr>
+                        <a:t>σ</a:t>
+                      </a:r>
+                      <a:r>
+                        <a:rPr lang="el-GR" baseline="30000" dirty="0">
+                          <a:solidFill>
+                            <a:schemeClr val="bg1"/>
+                          </a:solidFill>
+                          <a:effectLst/>
+                        </a:rPr>
+                        <a:t>2</a:t>
+                      </a:r>
+                      <a:r>
+                        <a:rPr lang="el-GR" baseline="-25000" dirty="0">
+                          <a:solidFill>
+                            <a:schemeClr val="bg1"/>
+                          </a:solidFill>
+                          <a:effectLst/>
+                        </a:rPr>
+                        <a:t>1</a:t>
+                      </a:r>
+                      <a:r>
+                        <a:rPr lang="el-GR" dirty="0">
+                          <a:solidFill>
+                            <a:schemeClr val="bg1"/>
+                          </a:solidFill>
+                          <a:effectLst/>
+                        </a:rPr>
+                        <a:t> / </a:t>
+                      </a:r>
+                      <a:r>
+                        <a:rPr lang="en-IN" dirty="0">
+                          <a:solidFill>
+                            <a:schemeClr val="bg1"/>
+                          </a:solidFill>
+                          <a:effectLst/>
+                        </a:rPr>
+                        <a:t>n</a:t>
+                      </a:r>
+                      <a:r>
+                        <a:rPr lang="en-IN" baseline="-25000" dirty="0">
+                          <a:solidFill>
+                            <a:schemeClr val="bg1"/>
+                          </a:solidFill>
+                          <a:effectLst/>
+                        </a:rPr>
+                        <a:t>1</a:t>
+                      </a:r>
+                      <a:r>
+                        <a:rPr lang="en-IN" dirty="0">
+                          <a:solidFill>
+                            <a:schemeClr val="bg1"/>
+                          </a:solidFill>
+                          <a:effectLst/>
+                        </a:rPr>
+                        <a:t> + </a:t>
+                      </a:r>
+                      <a:r>
+                        <a:rPr lang="el-GR" dirty="0">
+                          <a:solidFill>
+                            <a:schemeClr val="bg1"/>
+                          </a:solidFill>
+                          <a:effectLst/>
+                        </a:rPr>
+                        <a:t>σ</a:t>
+                      </a:r>
+                      <a:r>
+                        <a:rPr lang="el-GR" baseline="30000" dirty="0">
+                          <a:solidFill>
+                            <a:schemeClr val="bg1"/>
+                          </a:solidFill>
+                          <a:effectLst/>
+                        </a:rPr>
+                        <a:t>2</a:t>
+                      </a:r>
+                      <a:r>
+                        <a:rPr lang="el-GR" baseline="-25000" dirty="0">
+                          <a:solidFill>
+                            <a:schemeClr val="bg1"/>
+                          </a:solidFill>
+                          <a:effectLst/>
+                        </a:rPr>
+                        <a:t>2</a:t>
+                      </a:r>
+                      <a:r>
+                        <a:rPr lang="el-GR" dirty="0">
+                          <a:solidFill>
+                            <a:schemeClr val="bg1"/>
+                          </a:solidFill>
+                          <a:effectLst/>
+                        </a:rPr>
+                        <a:t> / </a:t>
+                      </a:r>
+                      <a:r>
+                        <a:rPr lang="en-IN" dirty="0">
+                          <a:solidFill>
+                            <a:schemeClr val="bg1"/>
+                          </a:solidFill>
+                          <a:effectLst/>
+                        </a:rPr>
+                        <a:t>n</a:t>
+                      </a:r>
+                      <a:r>
+                        <a:rPr lang="en-IN" baseline="-25000" dirty="0">
+                          <a:solidFill>
+                            <a:schemeClr val="bg1"/>
+                          </a:solidFill>
+                          <a:effectLst/>
+                        </a:rPr>
+                        <a:t>2</a:t>
+                      </a:r>
+                      <a:r>
+                        <a:rPr lang="en-IN" dirty="0">
+                          <a:solidFill>
+                            <a:schemeClr val="bg1"/>
+                          </a:solidFill>
+                          <a:effectLst/>
+                        </a:rPr>
+                        <a:t> ] </a:t>
+                      </a:r>
+                    </a:p>
+                  </a:txBody>
+                  <a:tcPr anchor="ctr">
+                    <a:lnL w="12700" cap="flat" cmpd="sng" algn="ctr">
+                      <a:solidFill>
+                        <a:schemeClr val="tx1"/>
+                      </a:solidFill>
+                      <a:prstDash val="solid"/>
+                      <a:round/>
+                      <a:headEnd type="none" w="med" len="med"/>
+                      <a:tailEnd type="none" w="med" len="med"/>
+                    </a:lnL>
+                    <a:lnR w="12700" cap="flat" cmpd="sng" algn="ctr">
+                      <a:solidFill>
+                        <a:schemeClr val="tx1"/>
+                      </a:solidFill>
+                      <a:prstDash val="solid"/>
+                      <a:round/>
+                      <a:headEnd type="none" w="med" len="med"/>
+                      <a:tailEnd type="none" w="med" len="med"/>
+                    </a:lnR>
+                    <a:lnT w="12700" cap="flat" cmpd="sng" algn="ctr">
+                      <a:solidFill>
+                        <a:schemeClr val="tx1"/>
+                      </a:solidFill>
+                      <a:prstDash val="solid"/>
+                      <a:round/>
+                      <a:headEnd type="none" w="med" len="med"/>
+                      <a:tailEnd type="none" w="med" len="med"/>
+                    </a:lnT>
+                    <a:lnB w="12700" cap="flat" cmpd="sng" algn="ctr">
+                      <a:solidFill>
+                        <a:schemeClr val="tx1"/>
+                      </a:solidFill>
+                      <a:prstDash val="solid"/>
+                      <a:round/>
+                      <a:headEnd type="none" w="med" len="med"/>
+                      <a:tailEnd type="none" w="med" len="med"/>
+                    </a:lnB>
+                    <a:solidFill>
+                      <a:schemeClr val="bg1">
+                        <a:lumMod val="50000"/>
+                      </a:schemeClr>
+                    </a:solidFill>
+                  </a:tcPr>
+                </a:tc>
+                <a:extLst>
+                  <a:ext uri="{0D108BD9-81ED-4DB2-BD59-A6C34878D82A}">
+                    <a16:rowId xmlns:a16="http://schemas.microsoft.com/office/drawing/2014/main" val="3944177451"/>
+                  </a:ext>
+                </a:extLst>
+              </a:tr>
+            </a:tbl>
+          </a:graphicData>
+        </a:graphic>
+      </p:graphicFrame>
+      <p:sp>
+        <p:nvSpPr>
+          <p:cNvPr id="6" name="TextBox 5"/>
+          <p:cNvSpPr txBox="1"/>
+          <p:nvPr/>
+        </p:nvSpPr>
+        <p:spPr>
+          <a:xfrm>
+            <a:off x="802783" y="4623515"/>
+            <a:ext cx="10135672" cy="1477328"/>
+          </a:xfrm>
+          <a:prstGeom prst="rect">
+            <a:avLst/>
+          </a:prstGeom>
+          <a:noFill/>
+        </p:spPr>
+        <p:txBody>
+          <a:bodyPr wrap="square" rtlCol="0">
+            <a:spAutoFit/>
+          </a:bodyPr>
+          <a:lstStyle/>
+          <a:p>
+            <a:r>
+              <a:rPr lang="en-IN" b="1" dirty="0"/>
+              <a:t>Note:</a:t>
+            </a:r>
+            <a:r>
+              <a:rPr lang="en-IN" dirty="0"/>
+              <a:t> In order to compute the standard deviation of a sample statistic, you must know the value of one or more population parameters. For example, to compute the standard deviation of the sample mean (</a:t>
+            </a:r>
+            <a:r>
+              <a:rPr lang="en-IN" dirty="0" err="1"/>
+              <a:t>σ</a:t>
+            </a:r>
+            <a:r>
+              <a:rPr lang="en-IN" baseline="-25000" dirty="0" err="1"/>
+              <a:t>x</a:t>
+            </a:r>
+            <a:r>
+              <a:rPr lang="en-IN" dirty="0"/>
+              <a:t>), you need to know the variance of the population (σ</a:t>
+            </a:r>
+            <a:r>
+              <a:rPr lang="en-IN" dirty="0" smtClean="0"/>
+              <a:t>).</a:t>
+            </a:r>
+          </a:p>
+          <a:p>
+            <a:endParaRPr lang="en-IN" dirty="0"/>
+          </a:p>
+          <a:p>
+            <a:r>
+              <a:rPr lang="en-IN" dirty="0" smtClean="0"/>
+              <a:t>What if we don’t know the population parameters? </a:t>
+            </a:r>
+            <a:endParaRPr lang="en-IN" dirty="0"/>
+          </a:p>
+        </p:txBody>
+      </p:sp>
+    </p:spTree>
+    <p:extLst>
+      <p:ext uri="{BB962C8B-B14F-4D97-AF65-F5344CB8AC3E}">
+        <p14:creationId xmlns:p14="http://schemas.microsoft.com/office/powerpoint/2010/main" val="3114911266"/>
       </p:ext>
     </p:extLst>
   </p:cSld>
@@ -22378,8 +25242,12 @@
               <a:t>A </a:t>
             </a:r>
             <a:r>
+              <a:rPr lang="en-IN" dirty="0" smtClean="0"/>
+              <a:t>pollster </a:t>
+            </a:r>
+            <a:r>
               <a:rPr lang="en-IN" dirty="0"/>
-              <a:t>public opinion pollster wants to know the percentage of voters that </a:t>
+              <a:t>wants to know the percentage of voters that </a:t>
             </a:r>
             <a:r>
               <a:rPr lang="en-IN" dirty="0" smtClean="0"/>
@@ -22434,6 +25302,1302 @@
     <p:extLst>
       <p:ext uri="{BB962C8B-B14F-4D97-AF65-F5344CB8AC3E}">
         <p14:creationId xmlns:p14="http://schemas.microsoft.com/office/powerpoint/2010/main" val="2635437395"/>
+      </p:ext>
+    </p:extLst>
+  </p:cSld>
+  <p:clrMapOvr>
+    <a:masterClrMapping/>
+  </p:clrMapOvr>
+  <p:timing>
+    <p:tnLst>
+      <p:par>
+        <p:cTn id="1" dur="indefinite" restart="never" nodeType="tmRoot"/>
+      </p:par>
+    </p:tnLst>
+  </p:timing>
+</p:sld>
+</file>
+
+<file path=ppt/slides/slide40.xml><?xml version="1.0" encoding="utf-8"?>
+<p:sld xmlns:a="http://schemas.openxmlformats.org/drawingml/2006/main" xmlns:r="http://schemas.openxmlformats.org/officeDocument/2006/relationships" xmlns:p="http://schemas.openxmlformats.org/presentationml/2006/main">
+  <p:cSld>
+    <p:spTree>
+      <p:nvGrpSpPr>
+        <p:cNvPr id="1" name=""/>
+        <p:cNvGrpSpPr/>
+        <p:nvPr/>
+      </p:nvGrpSpPr>
+      <p:grpSpPr>
+        <a:xfrm>
+          <a:off x="0" y="0"/>
+          <a:ext cx="0" cy="0"/>
+          <a:chOff x="0" y="0"/>
+          <a:chExt cx="0" cy="0"/>
+        </a:xfrm>
+      </p:grpSpPr>
+      <p:sp>
+        <p:nvSpPr>
+          <p:cNvPr id="5" name="Title 1"/>
+          <p:cNvSpPr>
+            <a:spLocks noGrp="1"/>
+          </p:cNvSpPr>
+          <p:nvPr>
+            <p:ph type="ctrTitle"/>
+          </p:nvPr>
+        </p:nvSpPr>
+        <p:spPr>
+          <a:xfrm>
+            <a:off x="802783" y="270455"/>
+            <a:ext cx="9796530" cy="711548"/>
+          </a:xfrm>
+        </p:spPr>
+        <p:txBody>
+          <a:bodyPr>
+            <a:normAutofit/>
+          </a:bodyPr>
+          <a:lstStyle/>
+          <a:p>
+            <a:pPr algn="l"/>
+            <a:r>
+              <a:rPr lang="en-US" sz="4000" dirty="0" smtClean="0"/>
+              <a:t>Estimation – Standard Error</a:t>
+            </a:r>
+            <a:endParaRPr lang="en-IN" sz="4000" dirty="0"/>
+          </a:p>
+        </p:txBody>
+      </p:sp>
+      <p:cxnSp>
+        <p:nvCxnSpPr>
+          <p:cNvPr id="7" name="Straight Connector 6"/>
+          <p:cNvCxnSpPr/>
+          <p:nvPr/>
+        </p:nvCxnSpPr>
+        <p:spPr>
+          <a:xfrm>
+            <a:off x="914400" y="956255"/>
+            <a:ext cx="10045521" cy="0"/>
+          </a:xfrm>
+          <a:prstGeom prst="line">
+            <a:avLst/>
+          </a:prstGeom>
+          <a:ln>
+            <a:solidFill>
+              <a:schemeClr val="bg1">
+                <a:lumMod val="75000"/>
+              </a:schemeClr>
+            </a:solidFill>
+          </a:ln>
+        </p:spPr>
+        <p:style>
+          <a:lnRef idx="1">
+            <a:schemeClr val="dk1"/>
+          </a:lnRef>
+          <a:fillRef idx="0">
+            <a:schemeClr val="dk1"/>
+          </a:fillRef>
+          <a:effectRef idx="0">
+            <a:schemeClr val="dk1"/>
+          </a:effectRef>
+          <a:fontRef idx="minor">
+            <a:schemeClr val="tx1"/>
+          </a:fontRef>
+        </p:style>
+      </p:cxnSp>
+      <p:sp>
+        <p:nvSpPr>
+          <p:cNvPr id="2" name="TextBox 1"/>
+          <p:cNvSpPr txBox="1"/>
+          <p:nvPr/>
+        </p:nvSpPr>
+        <p:spPr>
+          <a:xfrm>
+            <a:off x="802783" y="1047241"/>
+            <a:ext cx="10247289" cy="2010807"/>
+          </a:xfrm>
+          <a:prstGeom prst="rect">
+            <a:avLst/>
+          </a:prstGeom>
+          <a:noFill/>
+        </p:spPr>
+        <p:txBody>
+          <a:bodyPr wrap="square" rtlCol="0">
+            <a:spAutoFit/>
+          </a:bodyPr>
+          <a:lstStyle/>
+          <a:p>
+            <a:pPr>
+              <a:spcAft>
+                <a:spcPts val="1000"/>
+              </a:spcAft>
+            </a:pPr>
+            <a:r>
+              <a:rPr lang="en-IN" dirty="0"/>
+              <a:t>The standard error is an estimate of the standard deviation of a statistic</a:t>
+            </a:r>
+            <a:r>
+              <a:rPr lang="en-IN" dirty="0" smtClean="0"/>
+              <a:t>.</a:t>
+            </a:r>
+          </a:p>
+          <a:p>
+            <a:pPr>
+              <a:spcAft>
+                <a:spcPts val="1000"/>
+              </a:spcAft>
+            </a:pPr>
+            <a:r>
+              <a:rPr lang="en-IN" b="1" dirty="0" smtClean="0"/>
+              <a:t>Standard Error of Sample Estimates: </a:t>
+            </a:r>
+            <a:r>
+              <a:rPr lang="en-IN" dirty="0"/>
+              <a:t>Sadly, the values of population parameters are often unknown, making it impossible to compute the standard deviation of a statistic. When this occurs, use the standard error</a:t>
+            </a:r>
+            <a:r>
+              <a:rPr lang="en-IN" dirty="0" smtClean="0"/>
+              <a:t>.</a:t>
+            </a:r>
+          </a:p>
+          <a:p>
+            <a:pPr>
+              <a:spcAft>
+                <a:spcPts val="1000"/>
+              </a:spcAft>
+            </a:pPr>
+            <a:r>
+              <a:rPr lang="en-IN" dirty="0"/>
+              <a:t>The standard error is computed from known sample statistics. The table below shows how to compute the standard error for simple random samples, assuming the population size is at least 20 times larger than the sample size.</a:t>
+            </a:r>
+            <a:endParaRPr lang="en-IN" dirty="0" smtClean="0"/>
+          </a:p>
+        </p:txBody>
+      </p:sp>
+      <p:sp>
+        <p:nvSpPr>
+          <p:cNvPr id="6" name="TextBox 5"/>
+          <p:cNvSpPr txBox="1"/>
+          <p:nvPr/>
+        </p:nvSpPr>
+        <p:spPr>
+          <a:xfrm>
+            <a:off x="802783" y="4623515"/>
+            <a:ext cx="10135672" cy="923330"/>
+          </a:xfrm>
+          <a:prstGeom prst="rect">
+            <a:avLst/>
+          </a:prstGeom>
+          <a:noFill/>
+        </p:spPr>
+        <p:txBody>
+          <a:bodyPr wrap="square" rtlCol="0">
+            <a:spAutoFit/>
+          </a:bodyPr>
+          <a:lstStyle/>
+          <a:p>
+            <a:r>
+              <a:rPr lang="en-IN" dirty="0"/>
+              <a:t>The equations for the standard error are identical to the equations for the standard deviation, except for one thing - the standard error equations use statistics where the standard deviation equations use parameters. </a:t>
+            </a:r>
+          </a:p>
+        </p:txBody>
+      </p:sp>
+      <p:graphicFrame>
+        <p:nvGraphicFramePr>
+          <p:cNvPr id="3" name="Table 2"/>
+          <p:cNvGraphicFramePr>
+            <a:graphicFrameLocks noGrp="1"/>
+          </p:cNvGraphicFramePr>
+          <p:nvPr>
+            <p:extLst>
+              <p:ext uri="{D42A27DB-BD31-4B8C-83A1-F6EECF244321}">
+                <p14:modId xmlns:p14="http://schemas.microsoft.com/office/powerpoint/2010/main" val="1881442433"/>
+              </p:ext>
+            </p:extLst>
+          </p:nvPr>
+        </p:nvGraphicFramePr>
+        <p:xfrm>
+          <a:off x="802783" y="3239186"/>
+          <a:ext cx="10515600" cy="1097280"/>
+        </p:xfrm>
+        <a:graphic>
+          <a:graphicData uri="http://schemas.openxmlformats.org/drawingml/2006/table">
+            <a:tbl>
+              <a:tblPr/>
+              <a:tblGrid>
+                <a:gridCol w="5257800">
+                  <a:extLst>
+                    <a:ext uri="{9D8B030D-6E8A-4147-A177-3AD203B41FA5}">
+                      <a16:colId xmlns:a16="http://schemas.microsoft.com/office/drawing/2014/main" val="1252294892"/>
+                    </a:ext>
+                  </a:extLst>
+                </a:gridCol>
+                <a:gridCol w="5257800">
+                  <a:extLst>
+                    <a:ext uri="{9D8B030D-6E8A-4147-A177-3AD203B41FA5}">
+                      <a16:colId xmlns:a16="http://schemas.microsoft.com/office/drawing/2014/main" val="2375438175"/>
+                    </a:ext>
+                  </a:extLst>
+                </a:gridCol>
+              </a:tblGrid>
+              <a:tr h="0">
+                <a:tc>
+                  <a:txBody>
+                    <a:bodyPr/>
+                    <a:lstStyle/>
+                    <a:p>
+                      <a:pPr algn="ctr"/>
+                      <a:r>
+                        <a:rPr lang="en-IN" dirty="0">
+                          <a:solidFill>
+                            <a:schemeClr val="bg1"/>
+                          </a:solidFill>
+                          <a:effectLst/>
+                        </a:rPr>
+                        <a:t>Sample mean, x </a:t>
+                      </a:r>
+                    </a:p>
+                  </a:txBody>
+                  <a:tcPr anchor="ctr">
+                    <a:lnL w="12700" cap="flat" cmpd="sng" algn="ctr">
+                      <a:solidFill>
+                        <a:schemeClr val="tx1"/>
+                      </a:solidFill>
+                      <a:prstDash val="solid"/>
+                      <a:round/>
+                      <a:headEnd type="none" w="med" len="med"/>
+                      <a:tailEnd type="none" w="med" len="med"/>
+                    </a:lnL>
+                    <a:lnR w="12700" cap="flat" cmpd="sng" algn="ctr">
+                      <a:solidFill>
+                        <a:schemeClr val="tx1"/>
+                      </a:solidFill>
+                      <a:prstDash val="solid"/>
+                      <a:round/>
+                      <a:headEnd type="none" w="med" len="med"/>
+                      <a:tailEnd type="none" w="med" len="med"/>
+                    </a:lnR>
+                    <a:lnT w="12700" cap="flat" cmpd="sng" algn="ctr">
+                      <a:solidFill>
+                        <a:schemeClr val="tx1"/>
+                      </a:solidFill>
+                      <a:prstDash val="solid"/>
+                      <a:round/>
+                      <a:headEnd type="none" w="med" len="med"/>
+                      <a:tailEnd type="none" w="med" len="med"/>
+                    </a:lnT>
+                    <a:lnB w="12700" cap="flat" cmpd="sng" algn="ctr">
+                      <a:solidFill>
+                        <a:schemeClr val="tx1"/>
+                      </a:solidFill>
+                      <a:prstDash val="solid"/>
+                      <a:round/>
+                      <a:headEnd type="none" w="med" len="med"/>
+                      <a:tailEnd type="none" w="med" len="med"/>
+                    </a:lnB>
+                    <a:solidFill>
+                      <a:schemeClr val="bg1">
+                        <a:lumMod val="50000"/>
+                      </a:schemeClr>
+                    </a:solidFill>
+                  </a:tcPr>
+                </a:tc>
+                <a:tc>
+                  <a:txBody>
+                    <a:bodyPr/>
+                    <a:lstStyle/>
+                    <a:p>
+                      <a:pPr algn="ctr"/>
+                      <a:r>
+                        <a:rPr lang="en-IN" dirty="0" err="1">
+                          <a:solidFill>
+                            <a:schemeClr val="bg1"/>
+                          </a:solidFill>
+                          <a:effectLst/>
+                        </a:rPr>
+                        <a:t>SE</a:t>
+                      </a:r>
+                      <a:r>
+                        <a:rPr lang="en-IN" baseline="-25000" dirty="0" err="1">
+                          <a:solidFill>
+                            <a:schemeClr val="bg1"/>
+                          </a:solidFill>
+                          <a:effectLst/>
+                        </a:rPr>
+                        <a:t>x</a:t>
+                      </a:r>
+                      <a:r>
+                        <a:rPr lang="en-IN" dirty="0">
+                          <a:solidFill>
+                            <a:schemeClr val="bg1"/>
+                          </a:solidFill>
+                          <a:effectLst/>
+                        </a:rPr>
+                        <a:t> = s / </a:t>
+                      </a:r>
+                      <a:r>
+                        <a:rPr lang="en-IN" dirty="0" err="1">
+                          <a:solidFill>
+                            <a:schemeClr val="bg1"/>
+                          </a:solidFill>
+                          <a:effectLst/>
+                        </a:rPr>
+                        <a:t>sqrt</a:t>
+                      </a:r>
+                      <a:r>
+                        <a:rPr lang="en-IN" dirty="0">
+                          <a:solidFill>
+                            <a:schemeClr val="bg1"/>
+                          </a:solidFill>
+                          <a:effectLst/>
+                        </a:rPr>
+                        <a:t>( n ) </a:t>
+                      </a:r>
+                    </a:p>
+                  </a:txBody>
+                  <a:tcPr anchor="ctr">
+                    <a:lnL w="12700" cap="flat" cmpd="sng" algn="ctr">
+                      <a:solidFill>
+                        <a:schemeClr val="tx1"/>
+                      </a:solidFill>
+                      <a:prstDash val="solid"/>
+                      <a:round/>
+                      <a:headEnd type="none" w="med" len="med"/>
+                      <a:tailEnd type="none" w="med" len="med"/>
+                    </a:lnL>
+                    <a:lnR w="12700" cap="flat" cmpd="sng" algn="ctr">
+                      <a:solidFill>
+                        <a:schemeClr val="tx1"/>
+                      </a:solidFill>
+                      <a:prstDash val="solid"/>
+                      <a:round/>
+                      <a:headEnd type="none" w="med" len="med"/>
+                      <a:tailEnd type="none" w="med" len="med"/>
+                    </a:lnR>
+                    <a:lnT w="12700" cap="flat" cmpd="sng" algn="ctr">
+                      <a:solidFill>
+                        <a:schemeClr val="tx1"/>
+                      </a:solidFill>
+                      <a:prstDash val="solid"/>
+                      <a:round/>
+                      <a:headEnd type="none" w="med" len="med"/>
+                      <a:tailEnd type="none" w="med" len="med"/>
+                    </a:lnT>
+                    <a:lnB w="12700" cap="flat" cmpd="sng" algn="ctr">
+                      <a:solidFill>
+                        <a:schemeClr val="tx1"/>
+                      </a:solidFill>
+                      <a:prstDash val="solid"/>
+                      <a:round/>
+                      <a:headEnd type="none" w="med" len="med"/>
+                      <a:tailEnd type="none" w="med" len="med"/>
+                    </a:lnB>
+                    <a:solidFill>
+                      <a:schemeClr val="bg1">
+                        <a:lumMod val="50000"/>
+                      </a:schemeClr>
+                    </a:solidFill>
+                  </a:tcPr>
+                </a:tc>
+                <a:extLst>
+                  <a:ext uri="{0D108BD9-81ED-4DB2-BD59-A6C34878D82A}">
+                    <a16:rowId xmlns:a16="http://schemas.microsoft.com/office/drawing/2014/main" val="204988470"/>
+                  </a:ext>
+                </a:extLst>
+              </a:tr>
+              <a:tr h="0">
+                <a:tc>
+                  <a:txBody>
+                    <a:bodyPr/>
+                    <a:lstStyle/>
+                    <a:p>
+                      <a:pPr algn="ctr"/>
+                      <a:r>
+                        <a:rPr lang="en-IN" dirty="0">
+                          <a:solidFill>
+                            <a:schemeClr val="bg1"/>
+                          </a:solidFill>
+                          <a:effectLst/>
+                        </a:rPr>
+                        <a:t>Sample proportion, p </a:t>
+                      </a:r>
+                    </a:p>
+                  </a:txBody>
+                  <a:tcPr anchor="ctr">
+                    <a:lnL w="12700" cap="flat" cmpd="sng" algn="ctr">
+                      <a:solidFill>
+                        <a:schemeClr val="tx1"/>
+                      </a:solidFill>
+                      <a:prstDash val="solid"/>
+                      <a:round/>
+                      <a:headEnd type="none" w="med" len="med"/>
+                      <a:tailEnd type="none" w="med" len="med"/>
+                    </a:lnL>
+                    <a:lnR w="12700" cap="flat" cmpd="sng" algn="ctr">
+                      <a:solidFill>
+                        <a:schemeClr val="tx1"/>
+                      </a:solidFill>
+                      <a:prstDash val="solid"/>
+                      <a:round/>
+                      <a:headEnd type="none" w="med" len="med"/>
+                      <a:tailEnd type="none" w="med" len="med"/>
+                    </a:lnR>
+                    <a:lnT w="12700" cap="flat" cmpd="sng" algn="ctr">
+                      <a:solidFill>
+                        <a:schemeClr val="tx1"/>
+                      </a:solidFill>
+                      <a:prstDash val="solid"/>
+                      <a:round/>
+                      <a:headEnd type="none" w="med" len="med"/>
+                      <a:tailEnd type="none" w="med" len="med"/>
+                    </a:lnT>
+                    <a:lnB w="12700" cap="flat" cmpd="sng" algn="ctr">
+                      <a:solidFill>
+                        <a:schemeClr val="tx1"/>
+                      </a:solidFill>
+                      <a:prstDash val="solid"/>
+                      <a:round/>
+                      <a:headEnd type="none" w="med" len="med"/>
+                      <a:tailEnd type="none" w="med" len="med"/>
+                    </a:lnB>
+                    <a:solidFill>
+                      <a:schemeClr val="bg1">
+                        <a:lumMod val="50000"/>
+                      </a:schemeClr>
+                    </a:solidFill>
+                  </a:tcPr>
+                </a:tc>
+                <a:tc>
+                  <a:txBody>
+                    <a:bodyPr/>
+                    <a:lstStyle/>
+                    <a:p>
+                      <a:pPr algn="ctr"/>
+                      <a:r>
+                        <a:rPr lang="pt-BR" dirty="0">
+                          <a:solidFill>
+                            <a:schemeClr val="bg1"/>
+                          </a:solidFill>
+                          <a:effectLst/>
+                        </a:rPr>
+                        <a:t>SE</a:t>
+                      </a:r>
+                      <a:r>
+                        <a:rPr lang="pt-BR" baseline="-25000" dirty="0">
+                          <a:solidFill>
+                            <a:schemeClr val="bg1"/>
+                          </a:solidFill>
+                          <a:effectLst/>
+                        </a:rPr>
+                        <a:t>p</a:t>
+                      </a:r>
+                      <a:r>
+                        <a:rPr lang="pt-BR" dirty="0">
+                          <a:solidFill>
+                            <a:schemeClr val="bg1"/>
+                          </a:solidFill>
+                          <a:effectLst/>
+                        </a:rPr>
+                        <a:t> = sqrt [ p(1 - p) / n ] </a:t>
+                      </a:r>
+                    </a:p>
+                  </a:txBody>
+                  <a:tcPr anchor="ctr">
+                    <a:lnL w="12700" cap="flat" cmpd="sng" algn="ctr">
+                      <a:solidFill>
+                        <a:schemeClr val="tx1"/>
+                      </a:solidFill>
+                      <a:prstDash val="solid"/>
+                      <a:round/>
+                      <a:headEnd type="none" w="med" len="med"/>
+                      <a:tailEnd type="none" w="med" len="med"/>
+                    </a:lnL>
+                    <a:lnR w="12700" cap="flat" cmpd="sng" algn="ctr">
+                      <a:solidFill>
+                        <a:schemeClr val="tx1"/>
+                      </a:solidFill>
+                      <a:prstDash val="solid"/>
+                      <a:round/>
+                      <a:headEnd type="none" w="med" len="med"/>
+                      <a:tailEnd type="none" w="med" len="med"/>
+                    </a:lnR>
+                    <a:lnT w="12700" cap="flat" cmpd="sng" algn="ctr">
+                      <a:solidFill>
+                        <a:schemeClr val="tx1"/>
+                      </a:solidFill>
+                      <a:prstDash val="solid"/>
+                      <a:round/>
+                      <a:headEnd type="none" w="med" len="med"/>
+                      <a:tailEnd type="none" w="med" len="med"/>
+                    </a:lnT>
+                    <a:lnB w="12700" cap="flat" cmpd="sng" algn="ctr">
+                      <a:solidFill>
+                        <a:schemeClr val="tx1"/>
+                      </a:solidFill>
+                      <a:prstDash val="solid"/>
+                      <a:round/>
+                      <a:headEnd type="none" w="med" len="med"/>
+                      <a:tailEnd type="none" w="med" len="med"/>
+                    </a:lnB>
+                    <a:solidFill>
+                      <a:schemeClr val="bg1">
+                        <a:lumMod val="50000"/>
+                      </a:schemeClr>
+                    </a:solidFill>
+                  </a:tcPr>
+                </a:tc>
+                <a:extLst>
+                  <a:ext uri="{0D108BD9-81ED-4DB2-BD59-A6C34878D82A}">
+                    <a16:rowId xmlns:a16="http://schemas.microsoft.com/office/drawing/2014/main" val="1747815891"/>
+                  </a:ext>
+                </a:extLst>
+              </a:tr>
+              <a:tr h="0">
+                <a:tc>
+                  <a:txBody>
+                    <a:bodyPr/>
+                    <a:lstStyle/>
+                    <a:p>
+                      <a:pPr algn="ctr"/>
+                      <a:r>
+                        <a:rPr lang="en-IN" dirty="0">
+                          <a:solidFill>
+                            <a:schemeClr val="bg1"/>
+                          </a:solidFill>
+                          <a:effectLst/>
+                        </a:rPr>
+                        <a:t>Difference between means, x</a:t>
+                      </a:r>
+                      <a:r>
+                        <a:rPr lang="en-IN" baseline="-25000" dirty="0">
+                          <a:solidFill>
+                            <a:schemeClr val="bg1"/>
+                          </a:solidFill>
+                          <a:effectLst/>
+                        </a:rPr>
+                        <a:t>1</a:t>
+                      </a:r>
+                      <a:r>
+                        <a:rPr lang="en-IN" dirty="0">
+                          <a:solidFill>
+                            <a:schemeClr val="bg1"/>
+                          </a:solidFill>
+                          <a:effectLst/>
+                        </a:rPr>
+                        <a:t> - x</a:t>
+                      </a:r>
+                      <a:r>
+                        <a:rPr lang="en-IN" baseline="-25000" dirty="0">
+                          <a:solidFill>
+                            <a:schemeClr val="bg1"/>
+                          </a:solidFill>
+                          <a:effectLst/>
+                        </a:rPr>
+                        <a:t>2</a:t>
+                      </a:r>
+                      <a:r>
+                        <a:rPr lang="en-IN" dirty="0">
+                          <a:solidFill>
+                            <a:schemeClr val="bg1"/>
+                          </a:solidFill>
+                          <a:effectLst/>
+                        </a:rPr>
+                        <a:t> </a:t>
+                      </a:r>
+                    </a:p>
+                  </a:txBody>
+                  <a:tcPr anchor="ctr">
+                    <a:lnL w="12700" cap="flat" cmpd="sng" algn="ctr">
+                      <a:solidFill>
+                        <a:schemeClr val="tx1"/>
+                      </a:solidFill>
+                      <a:prstDash val="solid"/>
+                      <a:round/>
+                      <a:headEnd type="none" w="med" len="med"/>
+                      <a:tailEnd type="none" w="med" len="med"/>
+                    </a:lnL>
+                    <a:lnR w="12700" cap="flat" cmpd="sng" algn="ctr">
+                      <a:solidFill>
+                        <a:schemeClr val="tx1"/>
+                      </a:solidFill>
+                      <a:prstDash val="solid"/>
+                      <a:round/>
+                      <a:headEnd type="none" w="med" len="med"/>
+                      <a:tailEnd type="none" w="med" len="med"/>
+                    </a:lnR>
+                    <a:lnT w="12700" cap="flat" cmpd="sng" algn="ctr">
+                      <a:solidFill>
+                        <a:schemeClr val="tx1"/>
+                      </a:solidFill>
+                      <a:prstDash val="solid"/>
+                      <a:round/>
+                      <a:headEnd type="none" w="med" len="med"/>
+                      <a:tailEnd type="none" w="med" len="med"/>
+                    </a:lnT>
+                    <a:lnB w="12700" cap="flat" cmpd="sng" algn="ctr">
+                      <a:solidFill>
+                        <a:schemeClr val="tx1"/>
+                      </a:solidFill>
+                      <a:prstDash val="solid"/>
+                      <a:round/>
+                      <a:headEnd type="none" w="med" len="med"/>
+                      <a:tailEnd type="none" w="med" len="med"/>
+                    </a:lnB>
+                    <a:solidFill>
+                      <a:schemeClr val="bg1">
+                        <a:lumMod val="50000"/>
+                      </a:schemeClr>
+                    </a:solidFill>
+                  </a:tcPr>
+                </a:tc>
+                <a:tc>
+                  <a:txBody>
+                    <a:bodyPr/>
+                    <a:lstStyle/>
+                    <a:p>
+                      <a:pPr algn="ctr"/>
+                      <a:r>
+                        <a:rPr lang="pt-BR" dirty="0">
+                          <a:solidFill>
+                            <a:schemeClr val="bg1"/>
+                          </a:solidFill>
+                          <a:effectLst/>
+                        </a:rPr>
+                        <a:t>SE</a:t>
+                      </a:r>
+                      <a:r>
+                        <a:rPr lang="pt-BR" baseline="-25000" dirty="0">
+                          <a:solidFill>
+                            <a:schemeClr val="bg1"/>
+                          </a:solidFill>
+                          <a:effectLst/>
+                        </a:rPr>
+                        <a:t>x1-x2</a:t>
+                      </a:r>
+                      <a:r>
+                        <a:rPr lang="pt-BR" dirty="0">
+                          <a:solidFill>
+                            <a:schemeClr val="bg1"/>
+                          </a:solidFill>
+                          <a:effectLst/>
+                        </a:rPr>
+                        <a:t> = sqrt [ s</a:t>
+                      </a:r>
+                      <a:r>
+                        <a:rPr lang="pt-BR" baseline="30000" dirty="0">
+                          <a:solidFill>
+                            <a:schemeClr val="bg1"/>
+                          </a:solidFill>
+                          <a:effectLst/>
+                        </a:rPr>
+                        <a:t>2</a:t>
+                      </a:r>
+                      <a:r>
+                        <a:rPr lang="pt-BR" baseline="-25000" dirty="0">
+                          <a:solidFill>
+                            <a:schemeClr val="bg1"/>
+                          </a:solidFill>
+                          <a:effectLst/>
+                        </a:rPr>
+                        <a:t>1</a:t>
+                      </a:r>
+                      <a:r>
+                        <a:rPr lang="pt-BR" dirty="0">
+                          <a:solidFill>
+                            <a:schemeClr val="bg1"/>
+                          </a:solidFill>
+                          <a:effectLst/>
+                        </a:rPr>
+                        <a:t> / n</a:t>
+                      </a:r>
+                      <a:r>
+                        <a:rPr lang="pt-BR" baseline="-25000" dirty="0">
+                          <a:solidFill>
+                            <a:schemeClr val="bg1"/>
+                          </a:solidFill>
+                          <a:effectLst/>
+                        </a:rPr>
+                        <a:t>1</a:t>
+                      </a:r>
+                      <a:r>
+                        <a:rPr lang="pt-BR" dirty="0">
+                          <a:solidFill>
+                            <a:schemeClr val="bg1"/>
+                          </a:solidFill>
+                          <a:effectLst/>
+                        </a:rPr>
+                        <a:t> + s</a:t>
+                      </a:r>
+                      <a:r>
+                        <a:rPr lang="pt-BR" baseline="30000" dirty="0">
+                          <a:solidFill>
+                            <a:schemeClr val="bg1"/>
+                          </a:solidFill>
+                          <a:effectLst/>
+                        </a:rPr>
+                        <a:t>2</a:t>
+                      </a:r>
+                      <a:r>
+                        <a:rPr lang="pt-BR" baseline="-25000" dirty="0">
+                          <a:solidFill>
+                            <a:schemeClr val="bg1"/>
+                          </a:solidFill>
+                          <a:effectLst/>
+                        </a:rPr>
+                        <a:t>2</a:t>
+                      </a:r>
+                      <a:r>
+                        <a:rPr lang="pt-BR" dirty="0">
+                          <a:solidFill>
+                            <a:schemeClr val="bg1"/>
+                          </a:solidFill>
+                          <a:effectLst/>
+                        </a:rPr>
+                        <a:t> / n</a:t>
+                      </a:r>
+                      <a:r>
+                        <a:rPr lang="pt-BR" baseline="-25000" dirty="0">
+                          <a:solidFill>
+                            <a:schemeClr val="bg1"/>
+                          </a:solidFill>
+                          <a:effectLst/>
+                        </a:rPr>
+                        <a:t>2</a:t>
+                      </a:r>
+                      <a:r>
+                        <a:rPr lang="pt-BR" dirty="0">
+                          <a:solidFill>
+                            <a:schemeClr val="bg1"/>
+                          </a:solidFill>
+                          <a:effectLst/>
+                        </a:rPr>
+                        <a:t> ] </a:t>
+                      </a:r>
+                    </a:p>
+                  </a:txBody>
+                  <a:tcPr anchor="ctr">
+                    <a:lnL w="12700" cap="flat" cmpd="sng" algn="ctr">
+                      <a:solidFill>
+                        <a:schemeClr val="tx1"/>
+                      </a:solidFill>
+                      <a:prstDash val="solid"/>
+                      <a:round/>
+                      <a:headEnd type="none" w="med" len="med"/>
+                      <a:tailEnd type="none" w="med" len="med"/>
+                    </a:lnL>
+                    <a:lnR w="12700" cap="flat" cmpd="sng" algn="ctr">
+                      <a:solidFill>
+                        <a:schemeClr val="tx1"/>
+                      </a:solidFill>
+                      <a:prstDash val="solid"/>
+                      <a:round/>
+                      <a:headEnd type="none" w="med" len="med"/>
+                      <a:tailEnd type="none" w="med" len="med"/>
+                    </a:lnR>
+                    <a:lnT w="12700" cap="flat" cmpd="sng" algn="ctr">
+                      <a:solidFill>
+                        <a:schemeClr val="tx1"/>
+                      </a:solidFill>
+                      <a:prstDash val="solid"/>
+                      <a:round/>
+                      <a:headEnd type="none" w="med" len="med"/>
+                      <a:tailEnd type="none" w="med" len="med"/>
+                    </a:lnT>
+                    <a:lnB w="12700" cap="flat" cmpd="sng" algn="ctr">
+                      <a:solidFill>
+                        <a:schemeClr val="tx1"/>
+                      </a:solidFill>
+                      <a:prstDash val="solid"/>
+                      <a:round/>
+                      <a:headEnd type="none" w="med" len="med"/>
+                      <a:tailEnd type="none" w="med" len="med"/>
+                    </a:lnB>
+                    <a:solidFill>
+                      <a:schemeClr val="bg1">
+                        <a:lumMod val="50000"/>
+                      </a:schemeClr>
+                    </a:solidFill>
+                  </a:tcPr>
+                </a:tc>
+                <a:extLst>
+                  <a:ext uri="{0D108BD9-81ED-4DB2-BD59-A6C34878D82A}">
+                    <a16:rowId xmlns:a16="http://schemas.microsoft.com/office/drawing/2014/main" val="515113070"/>
+                  </a:ext>
+                </a:extLst>
+              </a:tr>
+            </a:tbl>
+          </a:graphicData>
+        </a:graphic>
+      </p:graphicFrame>
+    </p:spTree>
+    <p:extLst>
+      <p:ext uri="{BB962C8B-B14F-4D97-AF65-F5344CB8AC3E}">
+        <p14:creationId xmlns:p14="http://schemas.microsoft.com/office/powerpoint/2010/main" val="3221985678"/>
+      </p:ext>
+    </p:extLst>
+  </p:cSld>
+  <p:clrMapOvr>
+    <a:masterClrMapping/>
+  </p:clrMapOvr>
+  <p:timing>
+    <p:tnLst>
+      <p:par>
+        <p:cTn id="1" dur="indefinite" restart="never" nodeType="tmRoot"/>
+      </p:par>
+    </p:tnLst>
+  </p:timing>
+</p:sld>
+</file>
+
+<file path=ppt/slides/slide41.xml><?xml version="1.0" encoding="utf-8"?>
+<p:sld xmlns:a="http://schemas.openxmlformats.org/drawingml/2006/main" xmlns:r="http://schemas.openxmlformats.org/officeDocument/2006/relationships" xmlns:p="http://schemas.openxmlformats.org/presentationml/2006/main">
+  <p:cSld>
+    <p:spTree>
+      <p:nvGrpSpPr>
+        <p:cNvPr id="1" name=""/>
+        <p:cNvGrpSpPr/>
+        <p:nvPr/>
+      </p:nvGrpSpPr>
+      <p:grpSpPr>
+        <a:xfrm>
+          <a:off x="0" y="0"/>
+          <a:ext cx="0" cy="0"/>
+          <a:chOff x="0" y="0"/>
+          <a:chExt cx="0" cy="0"/>
+        </a:xfrm>
+      </p:grpSpPr>
+      <p:sp>
+        <p:nvSpPr>
+          <p:cNvPr id="5" name="Title 1"/>
+          <p:cNvSpPr>
+            <a:spLocks noGrp="1"/>
+          </p:cNvSpPr>
+          <p:nvPr>
+            <p:ph type="ctrTitle"/>
+          </p:nvPr>
+        </p:nvSpPr>
+        <p:spPr>
+          <a:xfrm>
+            <a:off x="802783" y="270455"/>
+            <a:ext cx="9796530" cy="711548"/>
+          </a:xfrm>
+        </p:spPr>
+        <p:txBody>
+          <a:bodyPr>
+            <a:normAutofit/>
+          </a:bodyPr>
+          <a:lstStyle/>
+          <a:p>
+            <a:pPr algn="l"/>
+            <a:r>
+              <a:rPr lang="en-US" sz="4000" dirty="0" smtClean="0"/>
+              <a:t>Estimation – Margin of Error</a:t>
+            </a:r>
+            <a:endParaRPr lang="en-IN" sz="4000" dirty="0"/>
+          </a:p>
+        </p:txBody>
+      </p:sp>
+      <p:cxnSp>
+        <p:nvCxnSpPr>
+          <p:cNvPr id="7" name="Straight Connector 6"/>
+          <p:cNvCxnSpPr/>
+          <p:nvPr/>
+        </p:nvCxnSpPr>
+        <p:spPr>
+          <a:xfrm>
+            <a:off x="914400" y="956255"/>
+            <a:ext cx="10045521" cy="0"/>
+          </a:xfrm>
+          <a:prstGeom prst="line">
+            <a:avLst/>
+          </a:prstGeom>
+          <a:ln>
+            <a:solidFill>
+              <a:schemeClr val="bg1">
+                <a:lumMod val="75000"/>
+              </a:schemeClr>
+            </a:solidFill>
+          </a:ln>
+        </p:spPr>
+        <p:style>
+          <a:lnRef idx="1">
+            <a:schemeClr val="dk1"/>
+          </a:lnRef>
+          <a:fillRef idx="0">
+            <a:schemeClr val="dk1"/>
+          </a:fillRef>
+          <a:effectRef idx="0">
+            <a:schemeClr val="dk1"/>
+          </a:effectRef>
+          <a:fontRef idx="minor">
+            <a:schemeClr val="tx1"/>
+          </a:fontRef>
+        </p:style>
+      </p:cxnSp>
+      <p:sp>
+        <p:nvSpPr>
+          <p:cNvPr id="2" name="TextBox 1"/>
+          <p:cNvSpPr txBox="1"/>
+          <p:nvPr/>
+        </p:nvSpPr>
+        <p:spPr>
+          <a:xfrm>
+            <a:off x="802783" y="1047241"/>
+            <a:ext cx="10247289" cy="4611519"/>
+          </a:xfrm>
+          <a:prstGeom prst="rect">
+            <a:avLst/>
+          </a:prstGeom>
+          <a:noFill/>
+        </p:spPr>
+        <p:txBody>
+          <a:bodyPr wrap="square" rtlCol="0">
+            <a:spAutoFit/>
+          </a:bodyPr>
+          <a:lstStyle/>
+          <a:p>
+            <a:pPr>
+              <a:spcAft>
+                <a:spcPts val="1000"/>
+              </a:spcAft>
+            </a:pPr>
+            <a:r>
+              <a:rPr lang="en-IN" dirty="0"/>
+              <a:t>In a confidence interval, the range of values above and below the sample statistic is called the margin of error</a:t>
+            </a:r>
+            <a:r>
+              <a:rPr lang="en-IN" dirty="0" smtClean="0"/>
+              <a:t>.</a:t>
+            </a:r>
+          </a:p>
+          <a:p>
+            <a:pPr>
+              <a:spcAft>
+                <a:spcPts val="1000"/>
+              </a:spcAft>
+            </a:pPr>
+            <a:r>
+              <a:rPr lang="en-IN" dirty="0"/>
+              <a:t>For example, suppose we wanted to know the percentage of adults that exercise daily. We could devise a sample design to ensure that our sample estimate will not differ from the true population value by more than, say, 5 percent (the margin of error) 90 percent of the time (the confidence level</a:t>
+            </a:r>
+            <a:r>
+              <a:rPr lang="en-IN" dirty="0" smtClean="0"/>
+              <a:t>).</a:t>
+            </a:r>
+          </a:p>
+          <a:p>
+            <a:pPr>
+              <a:spcAft>
+                <a:spcPts val="1000"/>
+              </a:spcAft>
+            </a:pPr>
+            <a:r>
+              <a:rPr lang="en-IN" dirty="0"/>
+              <a:t>The margin of error can be defined by either of the following </a:t>
+            </a:r>
+            <a:r>
+              <a:rPr lang="en-IN" dirty="0" smtClean="0"/>
+              <a:t>equations:</a:t>
+            </a:r>
+            <a:endParaRPr lang="en-IN" dirty="0"/>
+          </a:p>
+          <a:p>
+            <a:pPr algn="ctr"/>
+            <a:r>
+              <a:rPr lang="en-IN" dirty="0"/>
+              <a:t>Margin of error = Critical value x Standard deviation of the statistic </a:t>
+            </a:r>
+            <a:br>
+              <a:rPr lang="en-IN" dirty="0"/>
+            </a:br>
+            <a:r>
+              <a:rPr lang="en-IN" dirty="0"/>
+              <a:t>Margin of error = Critical value x Standard error of the statistic </a:t>
+            </a:r>
+          </a:p>
+          <a:p>
+            <a:pPr>
+              <a:spcAft>
+                <a:spcPts val="1000"/>
+              </a:spcAft>
+            </a:pPr>
+            <a:endParaRPr lang="en-US" dirty="0"/>
+          </a:p>
+          <a:p>
+            <a:pPr>
+              <a:spcAft>
+                <a:spcPts val="1000"/>
+              </a:spcAft>
+            </a:pPr>
+            <a:r>
+              <a:rPr lang="en-US" b="1" dirty="0" smtClean="0"/>
+              <a:t>How to find Critical value:</a:t>
+            </a:r>
+          </a:p>
+          <a:p>
+            <a:pPr marL="342900" indent="-342900">
+              <a:buAutoNum type="arabicPeriod"/>
+            </a:pPr>
+            <a:r>
+              <a:rPr lang="en-IN" dirty="0" smtClean="0"/>
+              <a:t>Compute </a:t>
+            </a:r>
+            <a:r>
+              <a:rPr lang="en-IN" dirty="0"/>
+              <a:t>alpha (α): α = 1 - (confidence level / 100</a:t>
+            </a:r>
+            <a:r>
+              <a:rPr lang="en-IN" dirty="0" smtClean="0"/>
+              <a:t>)</a:t>
+            </a:r>
+          </a:p>
+          <a:p>
+            <a:pPr marL="342900" indent="-342900">
+              <a:buAutoNum type="arabicPeriod"/>
+            </a:pPr>
+            <a:r>
+              <a:rPr lang="en-IN" dirty="0"/>
+              <a:t>Find the critical probability (p*): p* = 1 - </a:t>
+            </a:r>
+            <a:r>
+              <a:rPr lang="en-IN" dirty="0" smtClean="0"/>
+              <a:t>α/2</a:t>
+            </a:r>
+          </a:p>
+          <a:p>
+            <a:pPr marL="342900" indent="-342900">
+              <a:buAutoNum type="arabicPeriod"/>
+            </a:pPr>
+            <a:r>
+              <a:rPr lang="en-IN" dirty="0"/>
+              <a:t>To express the critical value as a z-score, find the z-score having a cumulative probability equal to the critical </a:t>
+            </a:r>
+            <a:r>
+              <a:rPr lang="en-IN" dirty="0" smtClean="0"/>
+              <a:t>probability.</a:t>
+            </a:r>
+            <a:endParaRPr lang="en-US" dirty="0" smtClean="0"/>
+          </a:p>
+        </p:txBody>
+      </p:sp>
+    </p:spTree>
+    <p:extLst>
+      <p:ext uri="{BB962C8B-B14F-4D97-AF65-F5344CB8AC3E}">
+        <p14:creationId xmlns:p14="http://schemas.microsoft.com/office/powerpoint/2010/main" val="1333108419"/>
+      </p:ext>
+    </p:extLst>
+  </p:cSld>
+  <p:clrMapOvr>
+    <a:masterClrMapping/>
+  </p:clrMapOvr>
+  <p:timing>
+    <p:tnLst>
+      <p:par>
+        <p:cTn id="1" dur="indefinite" restart="never" nodeType="tmRoot"/>
+      </p:par>
+    </p:tnLst>
+  </p:timing>
+</p:sld>
+</file>
+
+<file path=ppt/slides/slide42.xml><?xml version="1.0" encoding="utf-8"?>
+<p:sld xmlns:a="http://schemas.openxmlformats.org/drawingml/2006/main" xmlns:r="http://schemas.openxmlformats.org/officeDocument/2006/relationships" xmlns:p="http://schemas.openxmlformats.org/presentationml/2006/main">
+  <p:cSld>
+    <p:spTree>
+      <p:nvGrpSpPr>
+        <p:cNvPr id="1" name=""/>
+        <p:cNvGrpSpPr/>
+        <p:nvPr/>
+      </p:nvGrpSpPr>
+      <p:grpSpPr>
+        <a:xfrm>
+          <a:off x="0" y="0"/>
+          <a:ext cx="0" cy="0"/>
+          <a:chOff x="0" y="0"/>
+          <a:chExt cx="0" cy="0"/>
+        </a:xfrm>
+      </p:grpSpPr>
+      <p:sp>
+        <p:nvSpPr>
+          <p:cNvPr id="5" name="Title 1"/>
+          <p:cNvSpPr>
+            <a:spLocks noGrp="1"/>
+          </p:cNvSpPr>
+          <p:nvPr>
+            <p:ph type="ctrTitle"/>
+          </p:nvPr>
+        </p:nvSpPr>
+        <p:spPr>
+          <a:xfrm>
+            <a:off x="802783" y="270455"/>
+            <a:ext cx="9144000" cy="711548"/>
+          </a:xfrm>
+        </p:spPr>
+        <p:txBody>
+          <a:bodyPr>
+            <a:normAutofit/>
+          </a:bodyPr>
+          <a:lstStyle/>
+          <a:p>
+            <a:pPr algn="l"/>
+            <a:r>
+              <a:rPr lang="en-US" sz="4000" dirty="0" smtClean="0"/>
+              <a:t>Inferential Statistics - Topics</a:t>
+            </a:r>
+            <a:endParaRPr lang="en-IN" sz="4000" dirty="0"/>
+          </a:p>
+        </p:txBody>
+      </p:sp>
+      <p:cxnSp>
+        <p:nvCxnSpPr>
+          <p:cNvPr id="7" name="Straight Connector 6"/>
+          <p:cNvCxnSpPr/>
+          <p:nvPr/>
+        </p:nvCxnSpPr>
+        <p:spPr>
+          <a:xfrm>
+            <a:off x="914400" y="956255"/>
+            <a:ext cx="10045521" cy="0"/>
+          </a:xfrm>
+          <a:prstGeom prst="line">
+            <a:avLst/>
+          </a:prstGeom>
+          <a:ln>
+            <a:solidFill>
+              <a:schemeClr val="bg1">
+                <a:lumMod val="75000"/>
+              </a:schemeClr>
+            </a:solidFill>
+          </a:ln>
+        </p:spPr>
+        <p:style>
+          <a:lnRef idx="1">
+            <a:schemeClr val="dk1"/>
+          </a:lnRef>
+          <a:fillRef idx="0">
+            <a:schemeClr val="dk1"/>
+          </a:fillRef>
+          <a:effectRef idx="0">
+            <a:schemeClr val="dk1"/>
+          </a:effectRef>
+          <a:fontRef idx="minor">
+            <a:schemeClr val="tx1"/>
+          </a:fontRef>
+        </p:style>
+      </p:cxnSp>
+      <p:sp>
+        <p:nvSpPr>
+          <p:cNvPr id="2" name="TextBox 1"/>
+          <p:cNvSpPr txBox="1"/>
+          <p:nvPr/>
+        </p:nvSpPr>
+        <p:spPr>
+          <a:xfrm>
+            <a:off x="914400" y="1339403"/>
+            <a:ext cx="9672034" cy="3693319"/>
+          </a:xfrm>
+          <a:prstGeom prst="rect">
+            <a:avLst/>
+          </a:prstGeom>
+          <a:noFill/>
+        </p:spPr>
+        <p:txBody>
+          <a:bodyPr wrap="square" rtlCol="0">
+            <a:spAutoFit/>
+          </a:bodyPr>
+          <a:lstStyle/>
+          <a:p>
+            <a:r>
+              <a:rPr lang="en-US" dirty="0" smtClean="0"/>
+              <a:t>Population and sample</a:t>
+            </a:r>
+          </a:p>
+          <a:p>
+            <a:r>
+              <a:rPr lang="en-US" dirty="0"/>
+              <a:t>Sampling </a:t>
+            </a:r>
+            <a:r>
+              <a:rPr lang="en-US" dirty="0" smtClean="0"/>
+              <a:t>distributions</a:t>
+            </a:r>
+          </a:p>
+          <a:p>
+            <a:r>
+              <a:rPr lang="en-US" dirty="0" smtClean="0"/>
+              <a:t>Central Limit theorem</a:t>
+            </a:r>
+          </a:p>
+          <a:p>
+            <a:r>
+              <a:rPr lang="en-US" dirty="0" smtClean="0"/>
+              <a:t>Sampling </a:t>
+            </a:r>
+            <a:r>
+              <a:rPr lang="en-US" dirty="0" err="1" smtClean="0"/>
+              <a:t>dist</a:t>
+            </a:r>
+            <a:r>
+              <a:rPr lang="en-US" dirty="0" smtClean="0"/>
+              <a:t> of difference between means</a:t>
+            </a:r>
+          </a:p>
+          <a:p>
+            <a:endParaRPr lang="en-US" dirty="0"/>
+          </a:p>
+          <a:p>
+            <a:r>
+              <a:rPr lang="en-US" dirty="0" smtClean="0"/>
+              <a:t>T distribution</a:t>
+            </a:r>
+          </a:p>
+          <a:p>
+            <a:r>
+              <a:rPr lang="en-US" dirty="0" smtClean="0"/>
+              <a:t>Chi square </a:t>
+            </a:r>
+            <a:r>
+              <a:rPr lang="en-US" dirty="0" err="1" smtClean="0"/>
+              <a:t>dist</a:t>
+            </a:r>
+            <a:endParaRPr lang="en-US" dirty="0" smtClean="0"/>
+          </a:p>
+          <a:p>
+            <a:r>
+              <a:rPr lang="en-US" dirty="0" smtClean="0"/>
+              <a:t>When to use normal and when to use t-distribution</a:t>
+            </a:r>
+            <a:endParaRPr lang="en-US" dirty="0"/>
+          </a:p>
+          <a:p>
+            <a:endParaRPr lang="en-US" dirty="0"/>
+          </a:p>
+          <a:p>
+            <a:r>
+              <a:rPr lang="en-US" dirty="0" smtClean="0"/>
+              <a:t>Estimation</a:t>
+            </a:r>
+          </a:p>
+          <a:p>
+            <a:r>
+              <a:rPr lang="en-US" dirty="0" smtClean="0"/>
+              <a:t>Confidence Interval</a:t>
+            </a:r>
+          </a:p>
+          <a:p>
+            <a:r>
+              <a:rPr lang="en-US" dirty="0" smtClean="0"/>
+              <a:t>Hypothesis Testing</a:t>
+            </a:r>
+          </a:p>
+          <a:p>
+            <a:endParaRPr lang="en-US" dirty="0" smtClean="0"/>
+          </a:p>
+        </p:txBody>
+      </p:sp>
+    </p:spTree>
+    <p:extLst>
+      <p:ext uri="{BB962C8B-B14F-4D97-AF65-F5344CB8AC3E}">
+        <p14:creationId xmlns:p14="http://schemas.microsoft.com/office/powerpoint/2010/main" val="119503499"/>
       </p:ext>
     </p:extLst>
   </p:cSld>

</xml_diff>

<commit_message>
Add hypothesis testing basics
</commit_message>
<xml_diff>
--- a/Statistics/Lesson 7 Inferential Statistics.pptx
+++ b/Statistics/Lesson 7 Inferential Statistics.pptx
@@ -1,11 +1,11 @@
 
 <file path=ppt/presentation.xml><?xml version="1.0" encoding="utf-8"?>
-<p:presentation xmlns:a="http://schemas.openxmlformats.org/drawingml/2006/main" xmlns:r="http://schemas.openxmlformats.org/officeDocument/2006/relationships" xmlns:p="http://schemas.openxmlformats.org/presentationml/2006/main" saveSubsetFonts="1">
+<p:presentation xmlns:a="http://schemas.openxmlformats.org/drawingml/2006/main" xmlns:r="http://schemas.openxmlformats.org/officeDocument/2006/relationships" xmlns:p="http://schemas.openxmlformats.org/presentationml/2006/main" saveSubsetFonts="1" bookmarkIdSeed="2">
   <p:sldMasterIdLst>
     <p:sldMasterId id="2147483648" r:id="rId1"/>
   </p:sldMasterIdLst>
   <p:notesMasterIdLst>
-    <p:notesMasterId r:id="rId49"/>
+    <p:notesMasterId r:id="rId57"/>
   </p:notesMasterIdLst>
   <p:sldIdLst>
     <p:sldId id="256" r:id="rId2"/>
@@ -53,8 +53,16 @@
     <p:sldId id="303" r:id="rId44"/>
     <p:sldId id="304" r:id="rId45"/>
     <p:sldId id="305" r:id="rId46"/>
-    <p:sldId id="306" r:id="rId47"/>
-    <p:sldId id="259" r:id="rId48"/>
+    <p:sldId id="308" r:id="rId47"/>
+    <p:sldId id="309" r:id="rId48"/>
+    <p:sldId id="310" r:id="rId49"/>
+    <p:sldId id="311" r:id="rId50"/>
+    <p:sldId id="312" r:id="rId51"/>
+    <p:sldId id="313" r:id="rId52"/>
+    <p:sldId id="314" r:id="rId53"/>
+    <p:sldId id="306" r:id="rId54"/>
+    <p:sldId id="307" r:id="rId55"/>
+    <p:sldId id="259" r:id="rId56"/>
   </p:sldIdLst>
   <p:sldSz cx="12192000" cy="6858000"/>
   <p:notesSz cx="6858000" cy="9144000"/>
@@ -3867,22 +3875,22 @@
     </dgm:pt>
   </dgm:ptLst>
   <dgm:cxnLst>
-    <dgm:cxn modelId="{3A28B779-BE0D-4A5B-9FEC-C896EE6BF684}" type="presOf" srcId="{224D1A33-2177-4379-85AC-491635E3207C}" destId="{4A8DD10D-0F0D-4CEF-9191-93D6FD0BA05A}" srcOrd="1" destOrd="0" presId="urn:microsoft.com/office/officeart/2005/8/layout/orgChart1"/>
+    <dgm:cxn modelId="{0B56B656-62E3-4B4A-BAAE-96779CF7C4A1}" type="presOf" srcId="{751355D3-44E8-4E6E-9D51-DB0BDF6F8B27}" destId="{EB7451C5-833A-4B88-9D4E-F7A134315F8A}" srcOrd="0" destOrd="0" presId="urn:microsoft.com/office/officeart/2005/8/layout/orgChart1"/>
+    <dgm:cxn modelId="{BC82C397-B5AA-4B8F-BA42-EC3D30CB3B05}" type="presOf" srcId="{89736316-B279-44C9-85FE-52278F79A1EB}" destId="{60DDD26C-4888-4C76-97A8-968F8F1FC0A1}" srcOrd="1" destOrd="0" presId="urn:microsoft.com/office/officeart/2005/8/layout/orgChart1"/>
+    <dgm:cxn modelId="{A682E337-7ED3-408A-AF63-A4F30DEEB413}" type="presOf" srcId="{4E573EEB-07CF-4A90-9112-3B5DE060C8D7}" destId="{B4B8CC6F-811A-4FA0-881B-B85BDC864321}" srcOrd="0" destOrd="0" presId="urn:microsoft.com/office/officeart/2005/8/layout/orgChart1"/>
+    <dgm:cxn modelId="{6878BC21-1276-48A0-A509-C7863F375EAB}" type="presOf" srcId="{D7660463-EC2C-41E6-BF83-8C594D0E465F}" destId="{536E6E19-9C67-4494-9269-8E6361DB3871}" srcOrd="0" destOrd="0" presId="urn:microsoft.com/office/officeart/2005/8/layout/orgChart1"/>
     <dgm:cxn modelId="{7086E52E-8F90-417F-989C-043352A943DB}" type="presOf" srcId="{8345937E-F7BB-472A-829B-9CD742D491FF}" destId="{B54C1BAC-63AB-493C-B59F-F43ED765477E}" srcOrd="0" destOrd="0" presId="urn:microsoft.com/office/officeart/2005/8/layout/orgChart1"/>
     <dgm:cxn modelId="{7E975151-2B9B-42B2-9C86-E72571CF00F6}" srcId="{C72D03A6-BE49-4AF7-959C-EAAC95663EBE}" destId="{224D1A33-2177-4379-85AC-491635E3207C}" srcOrd="0" destOrd="0" parTransId="{604822C8-7B37-4A27-98FF-510B3CFC531F}" sibTransId="{34786473-5356-4A77-A38C-DC86208302A7}"/>
     <dgm:cxn modelId="{844C52CC-DFD7-468D-BBEE-B58A7655A750}" srcId="{224D1A33-2177-4379-85AC-491635E3207C}" destId="{D7660463-EC2C-41E6-BF83-8C594D0E465F}" srcOrd="2" destOrd="0" parTransId="{751355D3-44E8-4E6E-9D51-DB0BDF6F8B27}" sibTransId="{F32E22C9-B21F-42F8-9EDF-363E690C2023}"/>
+    <dgm:cxn modelId="{3A28B779-BE0D-4A5B-9FEC-C896EE6BF684}" type="presOf" srcId="{224D1A33-2177-4379-85AC-491635E3207C}" destId="{4A8DD10D-0F0D-4CEF-9191-93D6FD0BA05A}" srcOrd="1" destOrd="0" presId="urn:microsoft.com/office/officeart/2005/8/layout/orgChart1"/>
+    <dgm:cxn modelId="{5864F6BD-360C-4007-A379-49EA18B5EFD1}" type="presOf" srcId="{89736316-B279-44C9-85FE-52278F79A1EB}" destId="{9461FE30-1405-43DB-9B19-DD6BE2D5AD79}" srcOrd="0" destOrd="0" presId="urn:microsoft.com/office/officeart/2005/8/layout/orgChart1"/>
+    <dgm:cxn modelId="{88CF4F96-826C-4585-8024-C60E20EEED53}" srcId="{224D1A33-2177-4379-85AC-491635E3207C}" destId="{89736316-B279-44C9-85FE-52278F79A1EB}" srcOrd="1" destOrd="0" parTransId="{E4FA66D3-6011-421C-BADF-A565A07653FA}" sibTransId="{9BBBECA6-251A-42DB-9CDD-A03688876BE5}"/>
+    <dgm:cxn modelId="{6D0A05EC-7253-4641-8A8C-6E7783120D8B}" type="presOf" srcId="{8345937E-F7BB-472A-829B-9CD742D491FF}" destId="{E11279B2-1661-490D-9267-21ABF6FEFB3D}" srcOrd="1" destOrd="0" presId="urn:microsoft.com/office/officeart/2005/8/layout/orgChart1"/>
+    <dgm:cxn modelId="{4BF81254-935B-4EA0-A0D5-85CBE494E97E}" type="presOf" srcId="{C72D03A6-BE49-4AF7-959C-EAAC95663EBE}" destId="{497F0704-7651-4C13-8E3C-1E59F76CFEDB}" srcOrd="0" destOrd="0" presId="urn:microsoft.com/office/officeart/2005/8/layout/orgChart1"/>
+    <dgm:cxn modelId="{5CCBEAB1-A684-4765-AE22-ACB03D492253}" type="presOf" srcId="{E4FA66D3-6011-421C-BADF-A565A07653FA}" destId="{82F95887-249A-46AD-8C77-142180498462}" srcOrd="0" destOrd="0" presId="urn:microsoft.com/office/officeart/2005/8/layout/orgChart1"/>
     <dgm:cxn modelId="{058B0B17-96CE-4BD9-A678-9FAD20EE697F}" type="presOf" srcId="{224D1A33-2177-4379-85AC-491635E3207C}" destId="{0622FFFB-58CB-4530-AF6F-48A696D7B221}" srcOrd="0" destOrd="0" presId="urn:microsoft.com/office/officeart/2005/8/layout/orgChart1"/>
-    <dgm:cxn modelId="{4BF81254-935B-4EA0-A0D5-85CBE494E97E}" type="presOf" srcId="{C72D03A6-BE49-4AF7-959C-EAAC95663EBE}" destId="{497F0704-7651-4C13-8E3C-1E59F76CFEDB}" srcOrd="0" destOrd="0" presId="urn:microsoft.com/office/officeart/2005/8/layout/orgChart1"/>
-    <dgm:cxn modelId="{BC82C397-B5AA-4B8F-BA42-EC3D30CB3B05}" type="presOf" srcId="{89736316-B279-44C9-85FE-52278F79A1EB}" destId="{60DDD26C-4888-4C76-97A8-968F8F1FC0A1}" srcOrd="1" destOrd="0" presId="urn:microsoft.com/office/officeart/2005/8/layout/orgChart1"/>
-    <dgm:cxn modelId="{6878BC21-1276-48A0-A509-C7863F375EAB}" type="presOf" srcId="{D7660463-EC2C-41E6-BF83-8C594D0E465F}" destId="{536E6E19-9C67-4494-9269-8E6361DB3871}" srcOrd="0" destOrd="0" presId="urn:microsoft.com/office/officeart/2005/8/layout/orgChart1"/>
-    <dgm:cxn modelId="{6D0A05EC-7253-4641-8A8C-6E7783120D8B}" type="presOf" srcId="{8345937E-F7BB-472A-829B-9CD742D491FF}" destId="{E11279B2-1661-490D-9267-21ABF6FEFB3D}" srcOrd="1" destOrd="0" presId="urn:microsoft.com/office/officeart/2005/8/layout/orgChart1"/>
-    <dgm:cxn modelId="{88CF4F96-826C-4585-8024-C60E20EEED53}" srcId="{224D1A33-2177-4379-85AC-491635E3207C}" destId="{89736316-B279-44C9-85FE-52278F79A1EB}" srcOrd="1" destOrd="0" parTransId="{E4FA66D3-6011-421C-BADF-A565A07653FA}" sibTransId="{9BBBECA6-251A-42DB-9CDD-A03688876BE5}"/>
+    <dgm:cxn modelId="{4E2EE02E-E71F-4399-8191-263F6F14B292}" type="presOf" srcId="{D7660463-EC2C-41E6-BF83-8C594D0E465F}" destId="{AF908EF1-DE97-425E-819C-DD722E61778D}" srcOrd="1" destOrd="0" presId="urn:microsoft.com/office/officeart/2005/8/layout/orgChart1"/>
     <dgm:cxn modelId="{7CD625E5-BB0C-4B7A-9D7E-56AE577D5A01}" srcId="{224D1A33-2177-4379-85AC-491635E3207C}" destId="{8345937E-F7BB-472A-829B-9CD742D491FF}" srcOrd="0" destOrd="0" parTransId="{4E573EEB-07CF-4A90-9112-3B5DE060C8D7}" sibTransId="{E47F75B3-A9F8-4034-A4ED-82DA7951EF2A}"/>
-    <dgm:cxn modelId="{4E2EE02E-E71F-4399-8191-263F6F14B292}" type="presOf" srcId="{D7660463-EC2C-41E6-BF83-8C594D0E465F}" destId="{AF908EF1-DE97-425E-819C-DD722E61778D}" srcOrd="1" destOrd="0" presId="urn:microsoft.com/office/officeart/2005/8/layout/orgChart1"/>
-    <dgm:cxn modelId="{5CCBEAB1-A684-4765-AE22-ACB03D492253}" type="presOf" srcId="{E4FA66D3-6011-421C-BADF-A565A07653FA}" destId="{82F95887-249A-46AD-8C77-142180498462}" srcOrd="0" destOrd="0" presId="urn:microsoft.com/office/officeart/2005/8/layout/orgChart1"/>
-    <dgm:cxn modelId="{0B56B656-62E3-4B4A-BAAE-96779CF7C4A1}" type="presOf" srcId="{751355D3-44E8-4E6E-9D51-DB0BDF6F8B27}" destId="{EB7451C5-833A-4B88-9D4E-F7A134315F8A}" srcOrd="0" destOrd="0" presId="urn:microsoft.com/office/officeart/2005/8/layout/orgChart1"/>
-    <dgm:cxn modelId="{5864F6BD-360C-4007-A379-49EA18B5EFD1}" type="presOf" srcId="{89736316-B279-44C9-85FE-52278F79A1EB}" destId="{9461FE30-1405-43DB-9B19-DD6BE2D5AD79}" srcOrd="0" destOrd="0" presId="urn:microsoft.com/office/officeart/2005/8/layout/orgChart1"/>
-    <dgm:cxn modelId="{A682E337-7ED3-408A-AF63-A4F30DEEB413}" type="presOf" srcId="{4E573EEB-07CF-4A90-9112-3B5DE060C8D7}" destId="{B4B8CC6F-811A-4FA0-881B-B85BDC864321}" srcOrd="0" destOrd="0" presId="urn:microsoft.com/office/officeart/2005/8/layout/orgChart1"/>
     <dgm:cxn modelId="{786E089A-5FCC-467F-8A99-07732E42EA68}" type="presParOf" srcId="{497F0704-7651-4C13-8E3C-1E59F76CFEDB}" destId="{F7840FAC-D48D-403E-A257-B26B164AEFEF}" srcOrd="0" destOrd="0" presId="urn:microsoft.com/office/officeart/2005/8/layout/orgChart1"/>
     <dgm:cxn modelId="{48957916-0E0B-4EDF-B742-85C92009CC3C}" type="presParOf" srcId="{F7840FAC-D48D-403E-A257-B26B164AEFEF}" destId="{1744FB3D-1174-4867-B657-5AD675426810}" srcOrd="0" destOrd="0" presId="urn:microsoft.com/office/officeart/2005/8/layout/orgChart1"/>
     <dgm:cxn modelId="{520619CD-4C6D-4C79-A485-5DDE6A234A13}" type="presParOf" srcId="{1744FB3D-1174-4867-B657-5AD675426810}" destId="{0622FFFB-58CB-4530-AF6F-48A696D7B221}" srcOrd="0" destOrd="0" presId="urn:microsoft.com/office/officeart/2005/8/layout/orgChart1"/>
@@ -11890,7 +11898,7 @@
           <a:p>
             <a:fld id="{D2876548-E42F-41CB-898C-FACBC5501881}" type="datetimeFigureOut">
               <a:rPr lang="en-IN" smtClean="0"/>
-              <a:t>24-01-2019</a:t>
+              <a:t>25-01-2019</a:t>
             </a:fld>
             <a:endParaRPr lang="en-IN"/>
           </a:p>
@@ -12373,7 +12381,7 @@
           <a:p>
             <a:fld id="{72AA8E1B-3B7D-435E-B296-065D59D211A9}" type="datetimeFigureOut">
               <a:rPr lang="en-IN" smtClean="0"/>
-              <a:t>24-01-2019</a:t>
+              <a:t>25-01-2019</a:t>
             </a:fld>
             <a:endParaRPr lang="en-IN"/>
           </a:p>
@@ -12543,7 +12551,7 @@
           <a:p>
             <a:fld id="{72AA8E1B-3B7D-435E-B296-065D59D211A9}" type="datetimeFigureOut">
               <a:rPr lang="en-IN" smtClean="0"/>
-              <a:t>24-01-2019</a:t>
+              <a:t>25-01-2019</a:t>
             </a:fld>
             <a:endParaRPr lang="en-IN"/>
           </a:p>
@@ -12723,7 +12731,7 @@
           <a:p>
             <a:fld id="{72AA8E1B-3B7D-435E-B296-065D59D211A9}" type="datetimeFigureOut">
               <a:rPr lang="en-IN" smtClean="0"/>
-              <a:t>24-01-2019</a:t>
+              <a:t>25-01-2019</a:t>
             </a:fld>
             <a:endParaRPr lang="en-IN"/>
           </a:p>
@@ -12893,7 +12901,7 @@
           <a:p>
             <a:fld id="{72AA8E1B-3B7D-435E-B296-065D59D211A9}" type="datetimeFigureOut">
               <a:rPr lang="en-IN" smtClean="0"/>
-              <a:t>24-01-2019</a:t>
+              <a:t>25-01-2019</a:t>
             </a:fld>
             <a:endParaRPr lang="en-IN"/>
           </a:p>
@@ -13139,7 +13147,7 @@
           <a:p>
             <a:fld id="{72AA8E1B-3B7D-435E-B296-065D59D211A9}" type="datetimeFigureOut">
               <a:rPr lang="en-IN" smtClean="0"/>
-              <a:t>24-01-2019</a:t>
+              <a:t>25-01-2019</a:t>
             </a:fld>
             <a:endParaRPr lang="en-IN"/>
           </a:p>
@@ -13371,7 +13379,7 @@
           <a:p>
             <a:fld id="{72AA8E1B-3B7D-435E-B296-065D59D211A9}" type="datetimeFigureOut">
               <a:rPr lang="en-IN" smtClean="0"/>
-              <a:t>24-01-2019</a:t>
+              <a:t>25-01-2019</a:t>
             </a:fld>
             <a:endParaRPr lang="en-IN"/>
           </a:p>
@@ -13738,7 +13746,7 @@
           <a:p>
             <a:fld id="{72AA8E1B-3B7D-435E-B296-065D59D211A9}" type="datetimeFigureOut">
               <a:rPr lang="en-IN" smtClean="0"/>
-              <a:t>24-01-2019</a:t>
+              <a:t>25-01-2019</a:t>
             </a:fld>
             <a:endParaRPr lang="en-IN"/>
           </a:p>
@@ -13856,7 +13864,7 @@
           <a:p>
             <a:fld id="{72AA8E1B-3B7D-435E-B296-065D59D211A9}" type="datetimeFigureOut">
               <a:rPr lang="en-IN" smtClean="0"/>
-              <a:t>24-01-2019</a:t>
+              <a:t>25-01-2019</a:t>
             </a:fld>
             <a:endParaRPr lang="en-IN"/>
           </a:p>
@@ -13951,7 +13959,7 @@
           <a:p>
             <a:fld id="{72AA8E1B-3B7D-435E-B296-065D59D211A9}" type="datetimeFigureOut">
               <a:rPr lang="en-IN" smtClean="0"/>
-              <a:t>24-01-2019</a:t>
+              <a:t>25-01-2019</a:t>
             </a:fld>
             <a:endParaRPr lang="en-IN"/>
           </a:p>
@@ -14228,7 +14236,7 @@
           <a:p>
             <a:fld id="{72AA8E1B-3B7D-435E-B296-065D59D211A9}" type="datetimeFigureOut">
               <a:rPr lang="en-IN" smtClean="0"/>
-              <a:t>24-01-2019</a:t>
+              <a:t>25-01-2019</a:t>
             </a:fld>
             <a:endParaRPr lang="en-IN"/>
           </a:p>
@@ -14481,7 +14489,7 @@
           <a:p>
             <a:fld id="{72AA8E1B-3B7D-435E-B296-065D59D211A9}" type="datetimeFigureOut">
               <a:rPr lang="en-IN" smtClean="0"/>
-              <a:t>24-01-2019</a:t>
+              <a:t>25-01-2019</a:t>
             </a:fld>
             <a:endParaRPr lang="en-IN"/>
           </a:p>
@@ -14694,7 +14702,7 @@
           <a:p>
             <a:fld id="{72AA8E1B-3B7D-435E-B296-065D59D211A9}" type="datetimeFigureOut">
               <a:rPr lang="en-IN" smtClean="0"/>
-              <a:t>24-01-2019</a:t>
+              <a:t>25-01-2019</a:t>
             </a:fld>
             <a:endParaRPr lang="en-IN"/>
           </a:p>
@@ -22074,7 +22082,7 @@
 </file>
 
 <file path=ppt/slides/slide33.xml><?xml version="1.0" encoding="utf-8"?>
-<p:sld xmlns:a="http://schemas.openxmlformats.org/drawingml/2006/main" xmlns:r="http://schemas.openxmlformats.org/officeDocument/2006/relationships" xmlns:p="http://schemas.openxmlformats.org/presentationml/2006/main">
+<p:sld xmlns:a="http://schemas.openxmlformats.org/drawingml/2006/main" xmlns:r="http://schemas.openxmlformats.org/officeDocument/2006/relationships" xmlns:p="http://schemas.openxmlformats.org/presentationml/2006/main" show="0">
   <p:cSld>
     <p:spTree>
       <p:nvGrpSpPr>
@@ -22210,6 +22218,14 @@
   <p:clrMapOvr>
     <a:masterClrMapping/>
   </p:clrMapOvr>
+  <mc:AlternateContent xmlns:mc="http://schemas.openxmlformats.org/markup-compatibility/2006">
+    <mc:Choice xmlns:p14="http://schemas.microsoft.com/office/powerpoint/2010/main" Requires="p14">
+      <p:transition spd="slow" p14:dur="2000"/>
+    </mc:Choice>
+    <mc:Fallback>
+      <p:transition spd="slow"/>
+    </mc:Fallback>
+  </mc:AlternateContent>
   <p:timing>
     <p:tnLst>
       <p:par>
@@ -26370,11 +26386,7 @@
             </a:r>
             <a:r>
               <a:rPr lang="en-IN" dirty="0" smtClean="0"/>
-              <a:t>probability</a:t>
-            </a:r>
-            <a:r>
-              <a:rPr lang="en-IN" dirty="0" smtClean="0"/>
-              <a:t>.</a:t>
+              <a:t>probability.</a:t>
             </a:r>
           </a:p>
           <a:p>
@@ -26403,7 +26415,6 @@
               <a:rPr lang="en-US" dirty="0" smtClean="0"/>
               <a:t>Critical t-statistics is the t statistics having degrees of freedom equal to DOF and cumulative probability equal to critical probability.</a:t>
             </a:r>
-            <a:endParaRPr lang="en-US" dirty="0" smtClean="0"/>
           </a:p>
         </p:txBody>
       </p:sp>
@@ -26540,8 +26551,12 @@
               </a:spcAft>
             </a:pPr>
             <a:r>
+              <a:rPr lang="en-IN" b="1" dirty="0"/>
+              <a:t>Should you express the critical value as a t statistic or as a z-score?</a:t>
+            </a:r>
+            <a:r>
               <a:rPr lang="en-IN" dirty="0"/>
-              <a:t>Should you express the critical value as a t statistic or as a z-score? One way to answer this question focuses on the population standard </a:t>
+              <a:t> One way to answer this question focuses on the population standard </a:t>
             </a:r>
             <a:r>
               <a:rPr lang="en-IN" dirty="0" smtClean="0"/>
@@ -27177,7 +27192,7 @@
         <p:spPr>
           <a:xfrm>
             <a:off x="802783" y="1047241"/>
-            <a:ext cx="10247289" cy="369332"/>
+            <a:ext cx="10646535" cy="5611793"/>
           </a:xfrm>
           <a:prstGeom prst="rect">
             <a:avLst/>
@@ -27196,8 +27211,140 @@
               </a:spcAft>
             </a:pPr>
             <a:r>
-              <a:rPr lang="en-US" dirty="0" smtClean="0"/>
-              <a:t>s</a:t>
+              <a:rPr lang="en-IN" dirty="0"/>
+              <a:t>A statistical hypothesis is an assumption about a population parameter. This assumption may or may not be true. Hypothesis testing refers to the formal procedures used by statisticians to accept or reject statistical hypotheses.</a:t>
+            </a:r>
+          </a:p>
+          <a:p>
+            <a:r>
+              <a:rPr lang="en-IN" dirty="0"/>
+              <a:t>The best way to determine whether a statistical hypothesis is true would be to examine the entire population. Since that is often impractical, researchers typically examine a random sample from the population. If sample data are not consistent with the statistical hypothesis, the hypothesis is rejected</a:t>
+            </a:r>
+            <a:r>
+              <a:rPr lang="en-IN" dirty="0" smtClean="0"/>
+              <a:t>.</a:t>
+            </a:r>
+          </a:p>
+          <a:p>
+            <a:endParaRPr lang="en-US" dirty="0"/>
+          </a:p>
+          <a:p>
+            <a:r>
+              <a:rPr lang="en-IN" dirty="0"/>
+              <a:t>There are two types of statistical </a:t>
+            </a:r>
+            <a:r>
+              <a:rPr lang="en-IN" dirty="0" smtClean="0"/>
+              <a:t>hypotheses:</a:t>
+            </a:r>
+            <a:endParaRPr lang="en-IN" dirty="0"/>
+          </a:p>
+          <a:p>
+            <a:r>
+              <a:rPr lang="en-IN" b="1" dirty="0"/>
+              <a:t>Null hypothesis</a:t>
+            </a:r>
+            <a:r>
+              <a:rPr lang="en-IN" dirty="0"/>
+              <a:t>. The null hypothesis, denoted by </a:t>
+            </a:r>
+            <a:r>
+              <a:rPr lang="en-IN" dirty="0" err="1"/>
+              <a:t>H</a:t>
+            </a:r>
+            <a:r>
+              <a:rPr lang="en-IN" baseline="-25000" dirty="0" err="1"/>
+              <a:t>o</a:t>
+            </a:r>
+            <a:r>
+              <a:rPr lang="en-IN" dirty="0"/>
+              <a:t>, is usually the hypothesis that sample observations result purely from chance.</a:t>
+            </a:r>
+          </a:p>
+          <a:p>
+            <a:pPr>
+              <a:spcAft>
+                <a:spcPts val="1000"/>
+              </a:spcAft>
+            </a:pPr>
+            <a:r>
+              <a:rPr lang="en-IN" b="1" dirty="0"/>
+              <a:t>Alternative hypothesis</a:t>
+            </a:r>
+            <a:r>
+              <a:rPr lang="en-IN" dirty="0"/>
+              <a:t>. The alternative hypothesis, denoted by H</a:t>
+            </a:r>
+            <a:r>
+              <a:rPr lang="en-IN" baseline="-25000" dirty="0"/>
+              <a:t>1</a:t>
+            </a:r>
+            <a:r>
+              <a:rPr lang="en-IN" dirty="0"/>
+              <a:t> or H</a:t>
+            </a:r>
+            <a:r>
+              <a:rPr lang="en-IN" baseline="-25000" dirty="0"/>
+              <a:t>a</a:t>
+            </a:r>
+            <a:r>
+              <a:rPr lang="en-IN" dirty="0"/>
+              <a:t>, is the hypothesis that sample observations are influenced by some non-random cause. </a:t>
+            </a:r>
+          </a:p>
+          <a:p>
+            <a:r>
+              <a:rPr lang="en-US" b="1" dirty="0" smtClean="0"/>
+              <a:t>Example</a:t>
+            </a:r>
+          </a:p>
+          <a:p>
+            <a:r>
+              <a:rPr lang="en-IN" dirty="0" smtClean="0"/>
+              <a:t>Suppose </a:t>
+            </a:r>
+            <a:r>
+              <a:rPr lang="en-IN" dirty="0"/>
+              <a:t>we wanted to determine whether a coin was fair and balanced. A null hypothesis might be that half the flips would result in Heads and half, in Tails. The alternative hypothesis might be that the number of Heads and Tails would be very different. Symbolically, these hypotheses would be expressed as</a:t>
+            </a:r>
+          </a:p>
+          <a:p>
+            <a:r>
+              <a:rPr lang="en-IN" dirty="0" err="1"/>
+              <a:t>H</a:t>
+            </a:r>
+            <a:r>
+              <a:rPr lang="en-IN" baseline="-25000" dirty="0" err="1"/>
+              <a:t>o</a:t>
+            </a:r>
+            <a:r>
+              <a:rPr lang="en-IN" dirty="0"/>
+              <a:t>: P = 0.5 </a:t>
+            </a:r>
+            <a:br>
+              <a:rPr lang="en-IN" dirty="0"/>
+            </a:br>
+            <a:r>
+              <a:rPr lang="en-IN" dirty="0"/>
+              <a:t>H</a:t>
+            </a:r>
+            <a:r>
+              <a:rPr lang="en-IN" baseline="-25000" dirty="0"/>
+              <a:t>a</a:t>
+            </a:r>
+            <a:r>
+              <a:rPr lang="en-IN" dirty="0"/>
+              <a:t>: P ≠ 0.5 </a:t>
+            </a:r>
+          </a:p>
+          <a:p>
+            <a:r>
+              <a:rPr lang="en-IN" dirty="0"/>
+              <a:t>Suppose we flipped the coin 50 times, resulting in 40 Heads and 10 Tails. Given this result, we would be inclined to reject the null hypothesis</a:t>
+            </a:r>
+            <a:r>
+              <a:rPr lang="en-IN" dirty="0" smtClean="0"/>
+              <a:t>.</a:t>
             </a:r>
             <a:endParaRPr lang="en-IN" dirty="0"/>
           </a:p>
@@ -27317,7 +27464,7 @@
         <p:spPr>
           <a:xfrm>
             <a:off x="802783" y="1047241"/>
-            <a:ext cx="10247289" cy="369332"/>
+            <a:ext cx="10646535" cy="4929555"/>
           </a:xfrm>
           <a:prstGeom prst="rect">
             <a:avLst/>
@@ -27330,15 +27477,159 @@
           </a:bodyPr>
           <a:lstStyle/>
           <a:p>
+            <a:r>
+              <a:rPr lang="en-IN" dirty="0"/>
+              <a:t>Some researchers say that a hypothesis test can have one of two outcomes: you accept the null hypothesis or you reject the null hypothesis. </a:t>
+            </a:r>
+            <a:endParaRPr lang="en-IN" dirty="0" smtClean="0"/>
+          </a:p>
+          <a:p>
+            <a:r>
+              <a:rPr lang="en-IN" dirty="0" smtClean="0"/>
+              <a:t>Many </a:t>
+            </a:r>
+            <a:r>
+              <a:rPr lang="en-IN" dirty="0"/>
+              <a:t>statisticians, however, take issue with the notion of "accepting the null hypothesis." Instead, they say: you </a:t>
+            </a:r>
+            <a:r>
+              <a:rPr lang="en-IN" b="1" dirty="0"/>
+              <a:t>reject the null hypothesis</a:t>
+            </a:r>
+            <a:r>
+              <a:rPr lang="en-IN" dirty="0"/>
+              <a:t> or you </a:t>
+            </a:r>
+            <a:r>
+              <a:rPr lang="en-IN" b="1" dirty="0"/>
+              <a:t>fail to reject the null hypothesis</a:t>
+            </a:r>
+            <a:r>
+              <a:rPr lang="en-IN" dirty="0"/>
+              <a:t>. </a:t>
+            </a:r>
+            <a:endParaRPr lang="en-IN" dirty="0" smtClean="0"/>
+          </a:p>
+          <a:p>
             <a:pPr>
               <a:spcAft>
                 <a:spcPts val="1000"/>
               </a:spcAft>
             </a:pPr>
             <a:r>
-              <a:rPr lang="en-US" dirty="0" smtClean="0"/>
-              <a:t>s</a:t>
-            </a:r>
+              <a:rPr lang="en-IN" dirty="0" smtClean="0"/>
+              <a:t>Why </a:t>
+            </a:r>
+            <a:r>
+              <a:rPr lang="en-IN" dirty="0"/>
+              <a:t>the distinction between "acceptance" and "failure to reject?" </a:t>
+            </a:r>
+            <a:r>
+              <a:rPr lang="en-IN" dirty="0" smtClean="0"/>
+              <a:t>- Acceptance </a:t>
+            </a:r>
+            <a:r>
+              <a:rPr lang="en-IN" dirty="0"/>
+              <a:t>implies that the null hypothesis is true. Failure to reject implies that the data are not sufficiently persuasive for us to prefer the alternative hypothesis over the null hypothesis</a:t>
+            </a:r>
+            <a:r>
+              <a:rPr lang="en-IN" dirty="0" smtClean="0"/>
+              <a:t>.</a:t>
+            </a:r>
+          </a:p>
+          <a:p>
+            <a:r>
+              <a:rPr lang="en-IN" b="1" dirty="0"/>
+              <a:t>Decision </a:t>
+            </a:r>
+            <a:r>
+              <a:rPr lang="en-IN" b="1" dirty="0" smtClean="0"/>
+              <a:t>Errors :</a:t>
+            </a:r>
+            <a:r>
+              <a:rPr lang="en-IN" dirty="0" smtClean="0"/>
+              <a:t>Two </a:t>
+            </a:r>
+            <a:r>
+              <a:rPr lang="en-IN" dirty="0"/>
+              <a:t>types of errors can result from a hypothesis test.</a:t>
+            </a:r>
+          </a:p>
+          <a:p>
+            <a:r>
+              <a:rPr lang="en-IN" b="1" dirty="0"/>
+              <a:t>Type I error</a:t>
+            </a:r>
+            <a:r>
+              <a:rPr lang="en-IN" dirty="0"/>
+              <a:t>. A Type I error occurs when the researcher rejects a null hypothesis when it is true. The probability of committing a Type I error is called the </a:t>
+            </a:r>
+            <a:r>
+              <a:rPr lang="en-IN" b="1" dirty="0"/>
+              <a:t>significance level</a:t>
+            </a:r>
+            <a:r>
+              <a:rPr lang="en-IN" dirty="0"/>
+              <a:t>. This probability is also called </a:t>
+            </a:r>
+            <a:r>
+              <a:rPr lang="en-IN" b="1" dirty="0"/>
+              <a:t>alpha</a:t>
+            </a:r>
+            <a:r>
+              <a:rPr lang="en-IN" dirty="0"/>
+              <a:t>, and is often denoted by α.</a:t>
+            </a:r>
+          </a:p>
+          <a:p>
+            <a:r>
+              <a:rPr lang="en-IN" b="1" dirty="0"/>
+              <a:t>Type II error</a:t>
+            </a:r>
+            <a:r>
+              <a:rPr lang="en-IN" dirty="0"/>
+              <a:t>. A Type II error occurs when the researcher fails to reject a null hypothesis that is false. The probability of committing a Type II error is called </a:t>
+            </a:r>
+            <a:r>
+              <a:rPr lang="en-IN" b="1" dirty="0"/>
+              <a:t>Beta</a:t>
+            </a:r>
+            <a:r>
+              <a:rPr lang="en-IN" dirty="0"/>
+              <a:t>, and is often denoted by β. The probability of </a:t>
+            </a:r>
+            <a:r>
+              <a:rPr lang="en-IN" i="1" dirty="0"/>
+              <a:t>not</a:t>
+            </a:r>
+            <a:r>
+              <a:rPr lang="en-IN" dirty="0"/>
+              <a:t> committing a Type II error is called the </a:t>
+            </a:r>
+            <a:r>
+              <a:rPr lang="en-IN" b="1" dirty="0"/>
+              <a:t>Power</a:t>
+            </a:r>
+            <a:r>
+              <a:rPr lang="en-IN" dirty="0"/>
+              <a:t> of the test.</a:t>
+            </a:r>
+          </a:p>
+          <a:p>
+            <a:endParaRPr lang="en-IN" dirty="0"/>
+          </a:p>
+          <a:p>
+            <a:r>
+              <a:rPr lang="en-US" dirty="0"/>
+              <a:t> </a:t>
+            </a:r>
+          </a:p>
+          <a:p>
+            <a:pPr>
+              <a:spcAft>
+                <a:spcPts val="1000"/>
+              </a:spcAft>
+            </a:pPr>
             <a:endParaRPr lang="en-IN" dirty="0"/>
           </a:p>
         </p:txBody>
@@ -27346,7 +27637,7 @@
     </p:spTree>
     <p:extLst>
       <p:ext uri="{BB962C8B-B14F-4D97-AF65-F5344CB8AC3E}">
-        <p14:creationId xmlns:p14="http://schemas.microsoft.com/office/powerpoint/2010/main" val="2340456989"/>
+        <p14:creationId xmlns:p14="http://schemas.microsoft.com/office/powerpoint/2010/main" val="3089270928"/>
       </p:ext>
     </p:extLst>
   </p:cSld>
@@ -27393,7 +27684,7 @@
         <p:spPr>
           <a:xfrm>
             <a:off x="802783" y="270455"/>
-            <a:ext cx="9144000" cy="711548"/>
+            <a:ext cx="9796530" cy="711548"/>
           </a:xfrm>
         </p:spPr>
         <p:txBody>
@@ -27405,7 +27696,7 @@
             <a:pPr algn="l"/>
             <a:r>
               <a:rPr lang="en-US" sz="4000" dirty="0" smtClean="0"/>
-              <a:t>Inferential Statistics - Topics</a:t>
+              <a:t>Hypothesis Testing</a:t>
             </a:r>
             <a:endParaRPr lang="en-IN" sz="4000" dirty="0"/>
           </a:p>
@@ -27456,8 +27747,8 @@
         </p:nvSpPr>
         <p:spPr>
           <a:xfrm>
-            <a:off x="914400" y="1339403"/>
-            <a:ext cx="9672034" cy="3693319"/>
+            <a:off x="802783" y="1047241"/>
+            <a:ext cx="10646535" cy="2990562"/>
           </a:xfrm>
           <a:prstGeom prst="rect">
             <a:avLst/>
@@ -27471,89 +27762,85 @@
           <a:lstStyle/>
           <a:p>
             <a:r>
-              <a:rPr lang="en-US" dirty="0" smtClean="0"/>
-              <a:t>Population and sample</a:t>
-            </a:r>
-          </a:p>
-          <a:p>
-            <a:r>
-              <a:rPr lang="en-US" dirty="0"/>
-              <a:t>Sampling </a:t>
-            </a:r>
-            <a:r>
-              <a:rPr lang="en-US" dirty="0" smtClean="0"/>
-              <a:t>distributions</a:t>
-            </a:r>
-          </a:p>
-          <a:p>
-            <a:r>
-              <a:rPr lang="en-US" dirty="0" smtClean="0"/>
-              <a:t>Central Limit theorem</a:t>
-            </a:r>
-          </a:p>
-          <a:p>
-            <a:r>
-              <a:rPr lang="en-US" dirty="0" smtClean="0"/>
-              <a:t>Sampling </a:t>
-            </a:r>
-            <a:r>
-              <a:rPr lang="en-US" dirty="0" err="1" smtClean="0"/>
-              <a:t>dist</a:t>
-            </a:r>
-            <a:r>
-              <a:rPr lang="en-US" dirty="0" smtClean="0"/>
-              <a:t> of difference between means</a:t>
-            </a:r>
-          </a:p>
-          <a:p>
-            <a:endParaRPr lang="en-US" dirty="0"/>
-          </a:p>
-          <a:p>
-            <a:r>
-              <a:rPr lang="en-US" dirty="0" smtClean="0"/>
-              <a:t>T distribution</a:t>
-            </a:r>
-          </a:p>
-          <a:p>
-            <a:r>
-              <a:rPr lang="en-US" dirty="0" smtClean="0"/>
-              <a:t>Chi square </a:t>
-            </a:r>
-            <a:r>
-              <a:rPr lang="en-US" dirty="0" err="1" smtClean="0"/>
-              <a:t>dist</a:t>
-            </a:r>
-            <a:endParaRPr lang="en-US" dirty="0" smtClean="0"/>
-          </a:p>
-          <a:p>
-            <a:r>
-              <a:rPr lang="en-US" dirty="0" smtClean="0"/>
-              <a:t>When to use normal and when to use t-distribution</a:t>
-            </a:r>
-            <a:endParaRPr lang="en-US" dirty="0"/>
-          </a:p>
-          <a:p>
-            <a:endParaRPr lang="en-US" dirty="0"/>
-          </a:p>
-          <a:p>
-            <a:r>
-              <a:rPr lang="en-US" dirty="0" smtClean="0"/>
-              <a:t>Estimation</a:t>
-            </a:r>
-          </a:p>
-          <a:p>
-            <a:r>
-              <a:rPr lang="en-US" dirty="0" smtClean="0"/>
-              <a:t>Confidence Interval</a:t>
-            </a:r>
-          </a:p>
-          <a:p>
-            <a:r>
-              <a:rPr lang="en-US" dirty="0" smtClean="0"/>
-              <a:t>Hypothesis Testing</a:t>
-            </a:r>
-          </a:p>
-          <a:p>
+              <a:rPr lang="en-IN" b="1" dirty="0" smtClean="0"/>
+              <a:t>P-value</a:t>
+            </a:r>
+            <a:r>
+              <a:rPr lang="en-IN" dirty="0" smtClean="0"/>
+              <a:t>: </a:t>
+            </a:r>
+            <a:r>
+              <a:rPr lang="en-IN" dirty="0"/>
+              <a:t>The strength of evidence in support of a null hypothesis is measured by the </a:t>
+            </a:r>
+            <a:r>
+              <a:rPr lang="en-IN" b="1" dirty="0"/>
+              <a:t>P-value</a:t>
+            </a:r>
+            <a:r>
+              <a:rPr lang="en-IN" dirty="0"/>
+              <a:t>. Suppose the test statistic is equal to </a:t>
+            </a:r>
+            <a:r>
+              <a:rPr lang="en-IN" i="1" dirty="0"/>
+              <a:t>S</a:t>
+            </a:r>
+            <a:r>
+              <a:rPr lang="en-IN" dirty="0"/>
+              <a:t>. The P-value is the probability of observing a test statistic as extreme as </a:t>
+            </a:r>
+            <a:r>
+              <a:rPr lang="en-IN" i="1" dirty="0"/>
+              <a:t>S</a:t>
+            </a:r>
+            <a:r>
+              <a:rPr lang="en-IN" dirty="0"/>
+              <a:t>, assuming the null </a:t>
+            </a:r>
+            <a:r>
+              <a:rPr lang="en-IN" dirty="0" smtClean="0"/>
+              <a:t>hypothesis </a:t>
+            </a:r>
+            <a:r>
+              <a:rPr lang="en-IN" dirty="0"/>
+              <a:t>is true. If the P-value is less than the significance level, we reject the null hypothesis.</a:t>
+            </a:r>
+          </a:p>
+          <a:p>
+            <a:endParaRPr lang="en-IN" dirty="0"/>
+          </a:p>
+          <a:p>
+            <a:r>
+              <a:rPr lang="en-IN" b="1" dirty="0"/>
+              <a:t>Region of acceptance</a:t>
+            </a:r>
+            <a:r>
+              <a:rPr lang="en-IN" dirty="0"/>
+              <a:t>. The </a:t>
+            </a:r>
+            <a:r>
+              <a:rPr lang="en-IN" b="1" dirty="0"/>
+              <a:t>region of acceptance</a:t>
+            </a:r>
+            <a:r>
+              <a:rPr lang="en-IN" dirty="0"/>
+              <a:t> is a range of values. If the test statistic falls within the region of acceptance, the null hypothesis is not rejected. The region of acceptance is defined so that the chance of making a Type I error is equal to the significance level. The set of values outside the region of acceptance is called the </a:t>
+            </a:r>
+            <a:r>
+              <a:rPr lang="en-IN" b="1" dirty="0"/>
+              <a:t>region of rejection</a:t>
+            </a:r>
+            <a:r>
+              <a:rPr lang="en-IN" dirty="0"/>
+              <a:t>. If the test statistic falls within the region of rejection, the null hypothesis is rejected. In such cases, we say that the hypothesis has been rejected at the α level of significance.</a:t>
+            </a:r>
+          </a:p>
+          <a:p>
+            <a:pPr>
+              <a:spcAft>
+                <a:spcPts val="1000"/>
+              </a:spcAft>
+            </a:pPr>
             <a:endParaRPr lang="en-US" dirty="0" smtClean="0"/>
           </a:p>
         </p:txBody>
@@ -27561,7 +27848,411 @@
     </p:spTree>
     <p:extLst>
       <p:ext uri="{BB962C8B-B14F-4D97-AF65-F5344CB8AC3E}">
-        <p14:creationId xmlns:p14="http://schemas.microsoft.com/office/powerpoint/2010/main" val="119503499"/>
+        <p14:creationId xmlns:p14="http://schemas.microsoft.com/office/powerpoint/2010/main" val="1037737894"/>
+      </p:ext>
+    </p:extLst>
+  </p:cSld>
+  <p:clrMapOvr>
+    <a:masterClrMapping/>
+  </p:clrMapOvr>
+  <p:timing>
+    <p:tnLst>
+      <p:par>
+        <p:cTn id="1" dur="indefinite" restart="never" nodeType="tmRoot"/>
+      </p:par>
+    </p:tnLst>
+  </p:timing>
+</p:sld>
+</file>
+
+<file path=ppt/slides/slide48.xml><?xml version="1.0" encoding="utf-8"?>
+<p:sld xmlns:a="http://schemas.openxmlformats.org/drawingml/2006/main" xmlns:r="http://schemas.openxmlformats.org/officeDocument/2006/relationships" xmlns:p="http://schemas.openxmlformats.org/presentationml/2006/main">
+  <p:cSld>
+    <p:spTree>
+      <p:nvGrpSpPr>
+        <p:cNvPr id="1" name=""/>
+        <p:cNvGrpSpPr/>
+        <p:nvPr/>
+      </p:nvGrpSpPr>
+      <p:grpSpPr>
+        <a:xfrm>
+          <a:off x="0" y="0"/>
+          <a:ext cx="0" cy="0"/>
+          <a:chOff x="0" y="0"/>
+          <a:chExt cx="0" cy="0"/>
+        </a:xfrm>
+      </p:grpSpPr>
+      <p:sp>
+        <p:nvSpPr>
+          <p:cNvPr id="5" name="Title 1"/>
+          <p:cNvSpPr>
+            <a:spLocks noGrp="1"/>
+          </p:cNvSpPr>
+          <p:nvPr>
+            <p:ph type="ctrTitle"/>
+          </p:nvPr>
+        </p:nvSpPr>
+        <p:spPr>
+          <a:xfrm>
+            <a:off x="802783" y="270455"/>
+            <a:ext cx="9796530" cy="711548"/>
+          </a:xfrm>
+        </p:spPr>
+        <p:txBody>
+          <a:bodyPr>
+            <a:normAutofit/>
+          </a:bodyPr>
+          <a:lstStyle/>
+          <a:p>
+            <a:pPr algn="l"/>
+            <a:r>
+              <a:rPr lang="en-US" sz="4000" dirty="0" smtClean="0"/>
+              <a:t>Hypothesis Testing</a:t>
+            </a:r>
+            <a:endParaRPr lang="en-IN" sz="4000" dirty="0"/>
+          </a:p>
+        </p:txBody>
+      </p:sp>
+      <p:cxnSp>
+        <p:nvCxnSpPr>
+          <p:cNvPr id="7" name="Straight Connector 6"/>
+          <p:cNvCxnSpPr/>
+          <p:nvPr/>
+        </p:nvCxnSpPr>
+        <p:spPr>
+          <a:xfrm>
+            <a:off x="914400" y="956255"/>
+            <a:ext cx="10045521" cy="0"/>
+          </a:xfrm>
+          <a:prstGeom prst="line">
+            <a:avLst/>
+          </a:prstGeom>
+          <a:ln>
+            <a:solidFill>
+              <a:schemeClr val="bg1">
+                <a:lumMod val="75000"/>
+              </a:schemeClr>
+            </a:solidFill>
+          </a:ln>
+        </p:spPr>
+        <p:style>
+          <a:lnRef idx="1">
+            <a:schemeClr val="dk1"/>
+          </a:lnRef>
+          <a:fillRef idx="0">
+            <a:schemeClr val="dk1"/>
+          </a:fillRef>
+          <a:effectRef idx="0">
+            <a:schemeClr val="dk1"/>
+          </a:effectRef>
+          <a:fontRef idx="minor">
+            <a:schemeClr val="tx1"/>
+          </a:fontRef>
+        </p:style>
+      </p:cxnSp>
+      <p:sp>
+        <p:nvSpPr>
+          <p:cNvPr id="2" name="TextBox 1"/>
+          <p:cNvSpPr txBox="1"/>
+          <p:nvPr/>
+        </p:nvSpPr>
+        <p:spPr>
+          <a:xfrm>
+            <a:off x="802783" y="1047241"/>
+            <a:ext cx="10646535" cy="3821559"/>
+          </a:xfrm>
+          <a:prstGeom prst="rect">
+            <a:avLst/>
+          </a:prstGeom>
+          <a:noFill/>
+        </p:spPr>
+        <p:txBody>
+          <a:bodyPr wrap="square" rtlCol="0">
+            <a:spAutoFit/>
+          </a:bodyPr>
+          <a:lstStyle/>
+          <a:p>
+            <a:pPr>
+              <a:spcAft>
+                <a:spcPts val="1000"/>
+              </a:spcAft>
+            </a:pPr>
+            <a:r>
+              <a:rPr lang="en-US" b="1" dirty="0"/>
+              <a:t>One tailed and two tailed hypothesis testing</a:t>
+            </a:r>
+            <a:r>
+              <a:rPr lang="en-US" b="1" dirty="0" smtClean="0"/>
+              <a:t>:</a:t>
+            </a:r>
+            <a:endParaRPr lang="en-IN" dirty="0" smtClean="0"/>
+          </a:p>
+          <a:p>
+            <a:r>
+              <a:rPr lang="en-IN" dirty="0" smtClean="0"/>
+              <a:t>A </a:t>
+            </a:r>
+            <a:r>
+              <a:rPr lang="en-IN" dirty="0"/>
+              <a:t>test of a statistical hypothesis, where the region of rejection is on only one side of the sampling distribution, is called a </a:t>
+            </a:r>
+            <a:r>
+              <a:rPr lang="en-IN" b="1" dirty="0"/>
+              <a:t>one-tailed test</a:t>
+            </a:r>
+            <a:r>
+              <a:rPr lang="en-IN" dirty="0"/>
+              <a:t>. </a:t>
+            </a:r>
+            <a:endParaRPr lang="en-IN" dirty="0" smtClean="0"/>
+          </a:p>
+          <a:p>
+            <a:r>
+              <a:rPr lang="en-IN" dirty="0" smtClean="0"/>
+              <a:t>For </a:t>
+            </a:r>
+            <a:r>
+              <a:rPr lang="en-IN" dirty="0"/>
+              <a:t>example, suppose the null hypothesis states that the mean is less than or equal to 10. The alternative hypothesis would be that the mean is greater than 10. The region of rejection would consist of a range of numbers located on the right side of sampling distribution; that is, a set of numbers greater than 10. </a:t>
+            </a:r>
+            <a:endParaRPr lang="en-IN" dirty="0" smtClean="0"/>
+          </a:p>
+          <a:p>
+            <a:endParaRPr lang="en-IN" dirty="0"/>
+          </a:p>
+          <a:p>
+            <a:r>
+              <a:rPr lang="en-IN" dirty="0"/>
+              <a:t>A test of a statistical hypothesis, where the region of rejection is on both sides of the sampling distribution, is called a </a:t>
+            </a:r>
+            <a:r>
+              <a:rPr lang="en-IN" b="1" dirty="0"/>
+              <a:t>two-tailed test</a:t>
+            </a:r>
+            <a:r>
+              <a:rPr lang="en-IN" dirty="0"/>
+              <a:t>. </a:t>
+            </a:r>
+            <a:endParaRPr lang="en-IN" dirty="0" smtClean="0"/>
+          </a:p>
+          <a:p>
+            <a:r>
+              <a:rPr lang="en-IN" dirty="0" smtClean="0"/>
+              <a:t>For </a:t>
+            </a:r>
+            <a:r>
+              <a:rPr lang="en-IN" dirty="0"/>
+              <a:t>example, suppose the null hypothesis states that the mean is equal to 10. The alternative hypothesis would be that the mean is less than 10 or greater than 10. The region of rejection would consist of a range of numbers located on both sides of sampling distribution; that is, the region of rejection would consist partly of numbers that were less than 10 and partly of numbers that were greater than 10. </a:t>
+            </a:r>
+            <a:endParaRPr lang="en-US" dirty="0"/>
+          </a:p>
+        </p:txBody>
+      </p:sp>
+    </p:spTree>
+    <p:extLst>
+      <p:ext uri="{BB962C8B-B14F-4D97-AF65-F5344CB8AC3E}">
+        <p14:creationId xmlns:p14="http://schemas.microsoft.com/office/powerpoint/2010/main" val="2444072745"/>
+      </p:ext>
+    </p:extLst>
+  </p:cSld>
+  <p:clrMapOvr>
+    <a:masterClrMapping/>
+  </p:clrMapOvr>
+  <p:timing>
+    <p:tnLst>
+      <p:par>
+        <p:cTn id="1" dur="indefinite" restart="never" nodeType="tmRoot"/>
+      </p:par>
+    </p:tnLst>
+  </p:timing>
+</p:sld>
+</file>
+
+<file path=ppt/slides/slide49.xml><?xml version="1.0" encoding="utf-8"?>
+<p:sld xmlns:a="http://schemas.openxmlformats.org/drawingml/2006/main" xmlns:r="http://schemas.openxmlformats.org/officeDocument/2006/relationships" xmlns:p="http://schemas.openxmlformats.org/presentationml/2006/main">
+  <p:cSld>
+    <p:spTree>
+      <p:nvGrpSpPr>
+        <p:cNvPr id="1" name=""/>
+        <p:cNvGrpSpPr/>
+        <p:nvPr/>
+      </p:nvGrpSpPr>
+      <p:grpSpPr>
+        <a:xfrm>
+          <a:off x="0" y="0"/>
+          <a:ext cx="0" cy="0"/>
+          <a:chOff x="0" y="0"/>
+          <a:chExt cx="0" cy="0"/>
+        </a:xfrm>
+      </p:grpSpPr>
+      <p:sp>
+        <p:nvSpPr>
+          <p:cNvPr id="5" name="Title 1"/>
+          <p:cNvSpPr>
+            <a:spLocks noGrp="1"/>
+          </p:cNvSpPr>
+          <p:nvPr>
+            <p:ph type="ctrTitle"/>
+          </p:nvPr>
+        </p:nvSpPr>
+        <p:spPr>
+          <a:xfrm>
+            <a:off x="802783" y="270455"/>
+            <a:ext cx="9796530" cy="711548"/>
+          </a:xfrm>
+        </p:spPr>
+        <p:txBody>
+          <a:bodyPr>
+            <a:normAutofit/>
+          </a:bodyPr>
+          <a:lstStyle/>
+          <a:p>
+            <a:pPr algn="l"/>
+            <a:r>
+              <a:rPr lang="en-US" sz="4000" dirty="0" smtClean="0"/>
+              <a:t>Hypothesis Testing</a:t>
+            </a:r>
+            <a:endParaRPr lang="en-IN" sz="4000" dirty="0"/>
+          </a:p>
+        </p:txBody>
+      </p:sp>
+      <p:cxnSp>
+        <p:nvCxnSpPr>
+          <p:cNvPr id="7" name="Straight Connector 6"/>
+          <p:cNvCxnSpPr/>
+          <p:nvPr/>
+        </p:nvCxnSpPr>
+        <p:spPr>
+          <a:xfrm>
+            <a:off x="914400" y="956255"/>
+            <a:ext cx="10045521" cy="0"/>
+          </a:xfrm>
+          <a:prstGeom prst="line">
+            <a:avLst/>
+          </a:prstGeom>
+          <a:ln>
+            <a:solidFill>
+              <a:schemeClr val="bg1">
+                <a:lumMod val="75000"/>
+              </a:schemeClr>
+            </a:solidFill>
+          </a:ln>
+        </p:spPr>
+        <p:style>
+          <a:lnRef idx="1">
+            <a:schemeClr val="dk1"/>
+          </a:lnRef>
+          <a:fillRef idx="0">
+            <a:schemeClr val="dk1"/>
+          </a:fillRef>
+          <a:effectRef idx="0">
+            <a:schemeClr val="dk1"/>
+          </a:effectRef>
+          <a:fontRef idx="minor">
+            <a:schemeClr val="tx1"/>
+          </a:fontRef>
+        </p:style>
+      </p:cxnSp>
+      <p:sp>
+        <p:nvSpPr>
+          <p:cNvPr id="2" name="TextBox 1"/>
+          <p:cNvSpPr txBox="1"/>
+          <p:nvPr/>
+        </p:nvSpPr>
+        <p:spPr>
+          <a:xfrm>
+            <a:off x="802783" y="1047241"/>
+            <a:ext cx="10646535" cy="3949799"/>
+          </a:xfrm>
+          <a:prstGeom prst="rect">
+            <a:avLst/>
+          </a:prstGeom>
+          <a:noFill/>
+        </p:spPr>
+        <p:txBody>
+          <a:bodyPr wrap="square" rtlCol="0">
+            <a:spAutoFit/>
+          </a:bodyPr>
+          <a:lstStyle/>
+          <a:p>
+            <a:pPr>
+              <a:spcAft>
+                <a:spcPts val="1000"/>
+              </a:spcAft>
+            </a:pPr>
+            <a:r>
+              <a:rPr lang="en-US" b="1" dirty="0" smtClean="0"/>
+              <a:t>Example 1:</a:t>
+            </a:r>
+          </a:p>
+          <a:p>
+            <a:pPr>
+              <a:spcAft>
+                <a:spcPts val="1000"/>
+              </a:spcAft>
+            </a:pPr>
+            <a:r>
+              <a:rPr lang="en-IN" dirty="0"/>
+              <a:t>A neurologist is testing the effect of a drug on response time by injecting 100 rats with a unit dose of the drug, subjecting each to neurological stimulus and recording its response time. The neurologist knows that the mean response time for rats not injected with the drug is 1.2 seconds. The mean of the 100 injected rats response times is 1.05 seconds with the sample standard deviation of 0.5 seconds. Do you think that the drug has an affect on response time? </a:t>
+            </a:r>
+            <a:endParaRPr lang="en-US" dirty="0"/>
+          </a:p>
+          <a:p>
+            <a:r>
+              <a:rPr lang="en-US" dirty="0" smtClean="0"/>
+              <a:t>We write 2 hypothesizes first:</a:t>
+            </a:r>
+            <a:endParaRPr lang="en-US" dirty="0"/>
+          </a:p>
+          <a:p>
+            <a:r>
+              <a:rPr lang="en-US" dirty="0" smtClean="0"/>
+              <a:t>H</a:t>
+            </a:r>
+            <a:r>
+              <a:rPr lang="en-US" sz="1050" dirty="0" smtClean="0"/>
+              <a:t>0</a:t>
+            </a:r>
+            <a:r>
+              <a:rPr lang="en-US" dirty="0" smtClean="0"/>
+              <a:t> – The drug has no effect, i.e., the mean would be 1.2 s even with the drug</a:t>
+            </a:r>
+          </a:p>
+          <a:p>
+            <a:r>
+              <a:rPr lang="en-US" dirty="0" smtClean="0"/>
+              <a:t>H</a:t>
+            </a:r>
+            <a:r>
+              <a:rPr lang="en-US" sz="1200" dirty="0" smtClean="0"/>
+              <a:t>a</a:t>
+            </a:r>
+            <a:r>
+              <a:rPr lang="en-US" dirty="0" smtClean="0"/>
+              <a:t> – Drug has an effect – The mean does not equals 1.2 s when drug is given.</a:t>
+            </a:r>
+          </a:p>
+          <a:p>
+            <a:endParaRPr lang="en-US" dirty="0"/>
+          </a:p>
+          <a:p>
+            <a:r>
+              <a:rPr lang="en-US" dirty="0" smtClean="0"/>
+              <a:t>Should we accept alternate hypothesis or data is not convincing enough?</a:t>
+            </a:r>
+          </a:p>
+          <a:p>
+            <a:r>
+              <a:rPr lang="en-US" dirty="0" smtClean="0"/>
+              <a:t>Assuming null hypothesis is true, we find the probability of this scenario. If that probability is really small, that means null hypothesis isn’t true, because we have that value.</a:t>
+            </a:r>
+          </a:p>
+        </p:txBody>
+      </p:sp>
+    </p:spTree>
+    <p:extLst>
+      <p:ext uri="{BB962C8B-B14F-4D97-AF65-F5344CB8AC3E}">
+        <p14:creationId xmlns:p14="http://schemas.microsoft.com/office/powerpoint/2010/main" val="122446599"/>
       </p:ext>
     </p:extLst>
   </p:cSld>
@@ -28031,6 +28722,1201 @@
     <p:extLst>
       <p:ext uri="{BB962C8B-B14F-4D97-AF65-F5344CB8AC3E}">
         <p14:creationId xmlns:p14="http://schemas.microsoft.com/office/powerpoint/2010/main" val="2601882874"/>
+      </p:ext>
+    </p:extLst>
+  </p:cSld>
+  <p:clrMapOvr>
+    <a:masterClrMapping/>
+  </p:clrMapOvr>
+  <p:timing>
+    <p:tnLst>
+      <p:par>
+        <p:cTn id="1" dur="indefinite" restart="never" nodeType="tmRoot"/>
+      </p:par>
+    </p:tnLst>
+  </p:timing>
+</p:sld>
+</file>
+
+<file path=ppt/slides/slide50.xml><?xml version="1.0" encoding="utf-8"?>
+<p:sld xmlns:a="http://schemas.openxmlformats.org/drawingml/2006/main" xmlns:r="http://schemas.openxmlformats.org/officeDocument/2006/relationships" xmlns:p="http://schemas.openxmlformats.org/presentationml/2006/main">
+  <p:cSld>
+    <p:spTree>
+      <p:nvGrpSpPr>
+        <p:cNvPr id="1" name=""/>
+        <p:cNvGrpSpPr/>
+        <p:nvPr/>
+      </p:nvGrpSpPr>
+      <p:grpSpPr>
+        <a:xfrm>
+          <a:off x="0" y="0"/>
+          <a:ext cx="0" cy="0"/>
+          <a:chOff x="0" y="0"/>
+          <a:chExt cx="0" cy="0"/>
+        </a:xfrm>
+      </p:grpSpPr>
+      <p:pic>
+        <p:nvPicPr>
+          <p:cNvPr id="3" name="Picture 2"/>
+          <p:cNvPicPr>
+            <a:picLocks noChangeAspect="1"/>
+          </p:cNvPicPr>
+          <p:nvPr/>
+        </p:nvPicPr>
+        <p:blipFill>
+          <a:blip r:embed="rId2"/>
+          <a:stretch>
+            <a:fillRect/>
+          </a:stretch>
+        </p:blipFill>
+        <p:spPr>
+          <a:xfrm>
+            <a:off x="914400" y="3430297"/>
+            <a:ext cx="4438650" cy="1990725"/>
+          </a:xfrm>
+          <a:prstGeom prst="rect">
+            <a:avLst/>
+          </a:prstGeom>
+        </p:spPr>
+      </p:pic>
+      <p:sp>
+        <p:nvSpPr>
+          <p:cNvPr id="5" name="Title 1"/>
+          <p:cNvSpPr>
+            <a:spLocks noGrp="1"/>
+          </p:cNvSpPr>
+          <p:nvPr>
+            <p:ph type="ctrTitle"/>
+          </p:nvPr>
+        </p:nvSpPr>
+        <p:spPr>
+          <a:xfrm>
+            <a:off x="802783" y="270455"/>
+            <a:ext cx="9796530" cy="711548"/>
+          </a:xfrm>
+        </p:spPr>
+        <p:txBody>
+          <a:bodyPr>
+            <a:normAutofit/>
+          </a:bodyPr>
+          <a:lstStyle/>
+          <a:p>
+            <a:pPr algn="l"/>
+            <a:r>
+              <a:rPr lang="en-US" sz="4000" dirty="0" smtClean="0"/>
+              <a:t>Hypothesis Testing</a:t>
+            </a:r>
+            <a:endParaRPr lang="en-IN" sz="4000" dirty="0"/>
+          </a:p>
+        </p:txBody>
+      </p:sp>
+      <p:cxnSp>
+        <p:nvCxnSpPr>
+          <p:cNvPr id="7" name="Straight Connector 6"/>
+          <p:cNvCxnSpPr/>
+          <p:nvPr/>
+        </p:nvCxnSpPr>
+        <p:spPr>
+          <a:xfrm>
+            <a:off x="914400" y="956255"/>
+            <a:ext cx="10045521" cy="0"/>
+          </a:xfrm>
+          <a:prstGeom prst="line">
+            <a:avLst/>
+          </a:prstGeom>
+          <a:ln>
+            <a:solidFill>
+              <a:schemeClr val="bg1">
+                <a:lumMod val="75000"/>
+              </a:schemeClr>
+            </a:solidFill>
+          </a:ln>
+        </p:spPr>
+        <p:style>
+          <a:lnRef idx="1">
+            <a:schemeClr val="dk1"/>
+          </a:lnRef>
+          <a:fillRef idx="0">
+            <a:schemeClr val="dk1"/>
+          </a:fillRef>
+          <a:effectRef idx="0">
+            <a:schemeClr val="dk1"/>
+          </a:effectRef>
+          <a:fontRef idx="minor">
+            <a:schemeClr val="tx1"/>
+          </a:fontRef>
+        </p:style>
+      </p:cxnSp>
+      <p:sp>
+        <p:nvSpPr>
+          <p:cNvPr id="2" name="TextBox 1"/>
+          <p:cNvSpPr txBox="1"/>
+          <p:nvPr/>
+        </p:nvSpPr>
+        <p:spPr>
+          <a:xfrm>
+            <a:off x="802783" y="1047241"/>
+            <a:ext cx="10646535" cy="2903359"/>
+          </a:xfrm>
+          <a:prstGeom prst="rect">
+            <a:avLst/>
+          </a:prstGeom>
+          <a:noFill/>
+        </p:spPr>
+        <p:txBody>
+          <a:bodyPr wrap="square" rtlCol="0">
+            <a:spAutoFit/>
+          </a:bodyPr>
+          <a:lstStyle/>
+          <a:p>
+            <a:pPr>
+              <a:spcAft>
+                <a:spcPts val="1000"/>
+              </a:spcAft>
+            </a:pPr>
+            <a:r>
+              <a:rPr lang="en-US" b="1" dirty="0" smtClean="0"/>
+              <a:t>Example 1:</a:t>
+            </a:r>
+          </a:p>
+          <a:p>
+            <a:pPr>
+              <a:spcAft>
+                <a:spcPts val="1000"/>
+              </a:spcAft>
+            </a:pPr>
+            <a:r>
+              <a:rPr lang="en-IN" dirty="0"/>
+              <a:t>A neurologist is testing the effect of a drug on response time by injecting 100 rats with a unit dose of the drug, subjecting each to neurological stimulus and recording its response time. The neurologist knows that the mean response time for rats not injected with the drug is 1.2 seconds. The mean of the 100 injected rats response times is 1.05 seconds with the sample standard deviation of 0.5 seconds. Do you think that the drug has an affect on response time? </a:t>
+            </a:r>
+            <a:endParaRPr lang="en-US" dirty="0"/>
+          </a:p>
+          <a:p>
+            <a:r>
+              <a:rPr lang="en-US" b="1" dirty="0" smtClean="0"/>
+              <a:t>Sampling </a:t>
+            </a:r>
+            <a:r>
+              <a:rPr lang="en-US" b="1" dirty="0" err="1" smtClean="0"/>
+              <a:t>Dist</a:t>
+            </a:r>
+            <a:r>
+              <a:rPr lang="en-US" b="1" dirty="0" smtClean="0"/>
+              <a:t>: </a:t>
+            </a:r>
+            <a:r>
+              <a:rPr lang="el-GR" sz="2000" dirty="0" smtClean="0"/>
+              <a:t>μ</a:t>
+            </a:r>
+            <a:r>
+              <a:rPr lang="en-US" sz="1200" dirty="0" smtClean="0"/>
+              <a:t>x</a:t>
+            </a:r>
+            <a:r>
+              <a:rPr lang="en-US" dirty="0" smtClean="0"/>
+              <a:t> = </a:t>
+            </a:r>
+            <a:r>
+              <a:rPr lang="el-GR" sz="2000" dirty="0" smtClean="0"/>
+              <a:t>μ</a:t>
+            </a:r>
+            <a:r>
+              <a:rPr lang="en-US" dirty="0" smtClean="0"/>
+              <a:t> = 1.2s , </a:t>
+            </a:r>
+            <a:r>
+              <a:rPr lang="en-US" dirty="0" err="1" smtClean="0"/>
+              <a:t>s.d.</a:t>
+            </a:r>
+            <a:r>
+              <a:rPr lang="en-US" dirty="0" smtClean="0"/>
+              <a:t> of sampling </a:t>
+            </a:r>
+            <a:r>
+              <a:rPr lang="en-US" dirty="0" err="1" smtClean="0"/>
+              <a:t>dist</a:t>
+            </a:r>
+            <a:r>
+              <a:rPr lang="en-US" dirty="0" smtClean="0"/>
+              <a:t> = (</a:t>
+            </a:r>
+            <a:r>
+              <a:rPr lang="en-US" dirty="0" smtClean="0">
+                <a:solidFill>
+                  <a:srgbClr val="FF0000"/>
+                </a:solidFill>
+              </a:rPr>
+              <a:t>population std. dev</a:t>
+            </a:r>
+            <a:r>
+              <a:rPr lang="en-US" dirty="0" smtClean="0"/>
+              <a:t>.) / </a:t>
+            </a:r>
+            <a:r>
+              <a:rPr lang="en-US" dirty="0" err="1" smtClean="0"/>
+              <a:t>sqrt</a:t>
+            </a:r>
+            <a:r>
+              <a:rPr lang="en-US" dirty="0" smtClean="0"/>
+              <a:t>(100)</a:t>
+            </a:r>
+          </a:p>
+          <a:p>
+            <a:r>
+              <a:rPr lang="en-US" sz="2000" dirty="0"/>
+              <a:t>  </a:t>
+            </a:r>
+            <a:r>
+              <a:rPr lang="en-US" sz="2000" dirty="0" smtClean="0"/>
+              <a:t>= (</a:t>
+            </a:r>
+            <a:r>
+              <a:rPr lang="en-US" dirty="0" smtClean="0"/>
+              <a:t>sample </a:t>
+            </a:r>
+            <a:r>
+              <a:rPr lang="en-US" dirty="0" err="1" smtClean="0"/>
+              <a:t>std</a:t>
+            </a:r>
+            <a:r>
+              <a:rPr lang="en-US" dirty="0" smtClean="0"/>
+              <a:t> dev) / </a:t>
+            </a:r>
+            <a:r>
+              <a:rPr lang="en-US" dirty="0" err="1" smtClean="0"/>
+              <a:t>sqrt</a:t>
+            </a:r>
+            <a:r>
+              <a:rPr lang="en-US" dirty="0" smtClean="0"/>
+              <a:t>(100) (good approximator since sample size is big) = 0.05 </a:t>
+            </a:r>
+            <a:endParaRPr lang="el-GR" dirty="0" smtClean="0"/>
+          </a:p>
+          <a:p>
+            <a:endParaRPr lang="en-US" b="1" dirty="0" smtClean="0"/>
+          </a:p>
+        </p:txBody>
+      </p:sp>
+      <p:pic>
+        <p:nvPicPr>
+          <p:cNvPr id="4" name="Picture 3"/>
+          <p:cNvPicPr>
+            <a:picLocks noChangeAspect="1"/>
+          </p:cNvPicPr>
+          <p:nvPr/>
+        </p:nvPicPr>
+        <p:blipFill>
+          <a:blip r:embed="rId3"/>
+          <a:stretch>
+            <a:fillRect/>
+          </a:stretch>
+        </p:blipFill>
+        <p:spPr>
+          <a:xfrm>
+            <a:off x="2578390" y="5230522"/>
+            <a:ext cx="904875" cy="190500"/>
+          </a:xfrm>
+          <a:prstGeom prst="rect">
+            <a:avLst/>
+          </a:prstGeom>
+        </p:spPr>
+      </p:pic>
+      <p:sp>
+        <p:nvSpPr>
+          <p:cNvPr id="6" name="TextBox 5"/>
+          <p:cNvSpPr txBox="1"/>
+          <p:nvPr/>
+        </p:nvSpPr>
+        <p:spPr>
+          <a:xfrm>
+            <a:off x="5701048" y="3693022"/>
+            <a:ext cx="5924282" cy="1477328"/>
+          </a:xfrm>
+          <a:prstGeom prst="rect">
+            <a:avLst/>
+          </a:prstGeom>
+          <a:noFill/>
+        </p:spPr>
+        <p:txBody>
+          <a:bodyPr wrap="square" rtlCol="0">
+            <a:spAutoFit/>
+          </a:bodyPr>
+          <a:lstStyle/>
+          <a:p>
+            <a:r>
+              <a:rPr lang="en-US" dirty="0" smtClean="0"/>
+              <a:t>Now we have to find how many </a:t>
+            </a:r>
+            <a:r>
+              <a:rPr lang="en-US" dirty="0" err="1" smtClean="0"/>
+              <a:t>std</a:t>
+            </a:r>
+            <a:r>
+              <a:rPr lang="en-US" dirty="0" smtClean="0"/>
+              <a:t> dev away is 1.05 from the mean (z score). Or what is the probability of getting 1.05.</a:t>
+            </a:r>
+          </a:p>
+          <a:p>
+            <a:endParaRPr lang="en-US" dirty="0" smtClean="0"/>
+          </a:p>
+          <a:p>
+            <a:r>
+              <a:rPr lang="en-US" dirty="0" smtClean="0"/>
+              <a:t>Z score – 1.2 – 1.05 / 0.05 - ~3.</a:t>
+            </a:r>
+          </a:p>
+          <a:p>
+            <a:r>
+              <a:rPr lang="en-US" dirty="0" smtClean="0"/>
+              <a:t>So we are around 3 standard deviations away.</a:t>
+            </a:r>
+            <a:endParaRPr lang="en-IN" dirty="0"/>
+          </a:p>
+        </p:txBody>
+      </p:sp>
+    </p:spTree>
+    <p:extLst>
+      <p:ext uri="{BB962C8B-B14F-4D97-AF65-F5344CB8AC3E}">
+        <p14:creationId xmlns:p14="http://schemas.microsoft.com/office/powerpoint/2010/main" val="2578659535"/>
+      </p:ext>
+    </p:extLst>
+  </p:cSld>
+  <p:clrMapOvr>
+    <a:masterClrMapping/>
+  </p:clrMapOvr>
+  <p:timing>
+    <p:tnLst>
+      <p:par>
+        <p:cTn id="1" dur="indefinite" restart="never" nodeType="tmRoot"/>
+      </p:par>
+    </p:tnLst>
+  </p:timing>
+</p:sld>
+</file>
+
+<file path=ppt/slides/slide51.xml><?xml version="1.0" encoding="utf-8"?>
+<p:sld xmlns:a="http://schemas.openxmlformats.org/drawingml/2006/main" xmlns:r="http://schemas.openxmlformats.org/officeDocument/2006/relationships" xmlns:p="http://schemas.openxmlformats.org/presentationml/2006/main">
+  <p:cSld>
+    <p:spTree>
+      <p:nvGrpSpPr>
+        <p:cNvPr id="1" name=""/>
+        <p:cNvGrpSpPr/>
+        <p:nvPr/>
+      </p:nvGrpSpPr>
+      <p:grpSpPr>
+        <a:xfrm>
+          <a:off x="0" y="0"/>
+          <a:ext cx="0" cy="0"/>
+          <a:chOff x="0" y="0"/>
+          <a:chExt cx="0" cy="0"/>
+        </a:xfrm>
+      </p:grpSpPr>
+      <p:sp>
+        <p:nvSpPr>
+          <p:cNvPr id="5" name="Title 1"/>
+          <p:cNvSpPr>
+            <a:spLocks noGrp="1"/>
+          </p:cNvSpPr>
+          <p:nvPr>
+            <p:ph type="ctrTitle"/>
+          </p:nvPr>
+        </p:nvSpPr>
+        <p:spPr>
+          <a:xfrm>
+            <a:off x="802783" y="270455"/>
+            <a:ext cx="9796530" cy="711548"/>
+          </a:xfrm>
+        </p:spPr>
+        <p:txBody>
+          <a:bodyPr>
+            <a:normAutofit/>
+          </a:bodyPr>
+          <a:lstStyle/>
+          <a:p>
+            <a:pPr algn="l"/>
+            <a:r>
+              <a:rPr lang="en-US" sz="4000" dirty="0" smtClean="0"/>
+              <a:t>Hypothesis Testing</a:t>
+            </a:r>
+            <a:endParaRPr lang="en-IN" sz="4000" dirty="0"/>
+          </a:p>
+        </p:txBody>
+      </p:sp>
+      <p:cxnSp>
+        <p:nvCxnSpPr>
+          <p:cNvPr id="7" name="Straight Connector 6"/>
+          <p:cNvCxnSpPr/>
+          <p:nvPr/>
+        </p:nvCxnSpPr>
+        <p:spPr>
+          <a:xfrm>
+            <a:off x="914400" y="956255"/>
+            <a:ext cx="10045521" cy="0"/>
+          </a:xfrm>
+          <a:prstGeom prst="line">
+            <a:avLst/>
+          </a:prstGeom>
+          <a:ln>
+            <a:solidFill>
+              <a:schemeClr val="bg1">
+                <a:lumMod val="75000"/>
+              </a:schemeClr>
+            </a:solidFill>
+          </a:ln>
+        </p:spPr>
+        <p:style>
+          <a:lnRef idx="1">
+            <a:schemeClr val="dk1"/>
+          </a:lnRef>
+          <a:fillRef idx="0">
+            <a:schemeClr val="dk1"/>
+          </a:fillRef>
+          <a:effectRef idx="0">
+            <a:schemeClr val="dk1"/>
+          </a:effectRef>
+          <a:fontRef idx="minor">
+            <a:schemeClr val="tx1"/>
+          </a:fontRef>
+        </p:style>
+      </p:cxnSp>
+      <p:sp>
+        <p:nvSpPr>
+          <p:cNvPr id="2" name="TextBox 1"/>
+          <p:cNvSpPr txBox="1"/>
+          <p:nvPr/>
+        </p:nvSpPr>
+        <p:spPr>
+          <a:xfrm>
+            <a:off x="802783" y="1047241"/>
+            <a:ext cx="10646535" cy="774571"/>
+          </a:xfrm>
+          <a:prstGeom prst="rect">
+            <a:avLst/>
+          </a:prstGeom>
+          <a:noFill/>
+        </p:spPr>
+        <p:txBody>
+          <a:bodyPr wrap="square" rtlCol="0">
+            <a:spAutoFit/>
+          </a:bodyPr>
+          <a:lstStyle/>
+          <a:p>
+            <a:pPr>
+              <a:spcAft>
+                <a:spcPts val="1000"/>
+              </a:spcAft>
+            </a:pPr>
+            <a:r>
+              <a:rPr lang="en-US" b="1" dirty="0" smtClean="0"/>
+              <a:t>Example 1:</a:t>
+            </a:r>
+          </a:p>
+          <a:p>
+            <a:endParaRPr lang="en-US" b="1" dirty="0" smtClean="0"/>
+          </a:p>
+        </p:txBody>
+      </p:sp>
+      <p:pic>
+        <p:nvPicPr>
+          <p:cNvPr id="9" name="Picture 8"/>
+          <p:cNvPicPr>
+            <a:picLocks noChangeAspect="1"/>
+          </p:cNvPicPr>
+          <p:nvPr/>
+        </p:nvPicPr>
+        <p:blipFill>
+          <a:blip r:embed="rId2"/>
+          <a:stretch>
+            <a:fillRect/>
+          </a:stretch>
+        </p:blipFill>
+        <p:spPr>
+          <a:xfrm>
+            <a:off x="351955" y="1339134"/>
+            <a:ext cx="4791075" cy="2247900"/>
+          </a:xfrm>
+          <a:prstGeom prst="rect">
+            <a:avLst/>
+          </a:prstGeom>
+        </p:spPr>
+      </p:pic>
+      <p:sp>
+        <p:nvSpPr>
+          <p:cNvPr id="10" name="TextBox 9"/>
+          <p:cNvSpPr txBox="1"/>
+          <p:nvPr/>
+        </p:nvSpPr>
+        <p:spPr>
+          <a:xfrm>
+            <a:off x="5422006" y="1519707"/>
+            <a:ext cx="5872766" cy="3693319"/>
+          </a:xfrm>
+          <a:prstGeom prst="rect">
+            <a:avLst/>
+          </a:prstGeom>
+          <a:noFill/>
+        </p:spPr>
+        <p:txBody>
+          <a:bodyPr wrap="square" rtlCol="0">
+            <a:spAutoFit/>
+          </a:bodyPr>
+          <a:lstStyle/>
+          <a:p>
+            <a:r>
+              <a:rPr lang="en-US" dirty="0" smtClean="0"/>
+              <a:t>So probability of getting a value in the shaded area is ~0.3%</a:t>
+            </a:r>
+            <a:r>
+              <a:rPr lang="en-IN" dirty="0" smtClean="0"/>
+              <a:t>.</a:t>
+            </a:r>
+          </a:p>
+          <a:p>
+            <a:r>
+              <a:rPr lang="en-US" dirty="0" smtClean="0"/>
+              <a:t>Or 0.003</a:t>
+            </a:r>
+          </a:p>
+          <a:p>
+            <a:r>
+              <a:rPr lang="en-US" dirty="0" smtClean="0"/>
+              <a:t>Since the probability is very less, we can reject the null hypothesis and go with the alternate hypothesis.</a:t>
+            </a:r>
+          </a:p>
+          <a:p>
+            <a:endParaRPr lang="en-US" dirty="0"/>
+          </a:p>
+          <a:p>
+            <a:r>
+              <a:rPr lang="en-US" dirty="0" smtClean="0"/>
+              <a:t>Probability of getting a result more extreme than the sample, given the null hypothesis, is called p-value.</a:t>
+            </a:r>
+          </a:p>
+          <a:p>
+            <a:endParaRPr lang="en-US" dirty="0"/>
+          </a:p>
+          <a:p>
+            <a:r>
+              <a:rPr lang="en-US" dirty="0" smtClean="0"/>
+              <a:t>And we reject the null hypothesis if the p value is less than a certain limit.</a:t>
+            </a:r>
+          </a:p>
+          <a:p>
+            <a:r>
+              <a:rPr lang="en-US" dirty="0" smtClean="0"/>
+              <a:t>Conventionally that limit is 0.05.</a:t>
+            </a:r>
+          </a:p>
+          <a:p>
+            <a:r>
+              <a:rPr lang="en-US" dirty="0" smtClean="0"/>
+              <a:t>The p value we got is 0.003. So we can reject the null hypothesis.</a:t>
+            </a:r>
+          </a:p>
+        </p:txBody>
+      </p:sp>
+      <p:sp>
+        <p:nvSpPr>
+          <p:cNvPr id="11" name="TextBox 10"/>
+          <p:cNvSpPr txBox="1"/>
+          <p:nvPr/>
+        </p:nvSpPr>
+        <p:spPr>
+          <a:xfrm>
+            <a:off x="540913" y="5563673"/>
+            <a:ext cx="10766738" cy="646331"/>
+          </a:xfrm>
+          <a:prstGeom prst="rect">
+            <a:avLst/>
+          </a:prstGeom>
+          <a:noFill/>
+        </p:spPr>
+        <p:txBody>
+          <a:bodyPr wrap="square" rtlCol="0">
+            <a:spAutoFit/>
+          </a:bodyPr>
+          <a:lstStyle/>
+          <a:p>
+            <a:r>
+              <a:rPr lang="en-US" dirty="0" smtClean="0"/>
+              <a:t>So there is a very small probability that we could have got that value in sample (1.05 s) if null hypothesis was true.</a:t>
+            </a:r>
+          </a:p>
+          <a:p>
+            <a:r>
+              <a:rPr lang="en-US" dirty="0" smtClean="0"/>
+              <a:t>So we reject it.</a:t>
+            </a:r>
+            <a:endParaRPr lang="en-IN" dirty="0"/>
+          </a:p>
+        </p:txBody>
+      </p:sp>
+    </p:spTree>
+    <p:extLst>
+      <p:ext uri="{BB962C8B-B14F-4D97-AF65-F5344CB8AC3E}">
+        <p14:creationId xmlns:p14="http://schemas.microsoft.com/office/powerpoint/2010/main" val="3038711326"/>
+      </p:ext>
+    </p:extLst>
+  </p:cSld>
+  <p:clrMapOvr>
+    <a:masterClrMapping/>
+  </p:clrMapOvr>
+  <p:timing>
+    <p:tnLst>
+      <p:par>
+        <p:cTn id="1" dur="indefinite" restart="never" nodeType="tmRoot"/>
+      </p:par>
+    </p:tnLst>
+  </p:timing>
+</p:sld>
+</file>
+
+<file path=ppt/slides/slide52.xml><?xml version="1.0" encoding="utf-8"?>
+<p:sld xmlns:a="http://schemas.openxmlformats.org/drawingml/2006/main" xmlns:r="http://schemas.openxmlformats.org/officeDocument/2006/relationships" xmlns:p="http://schemas.openxmlformats.org/presentationml/2006/main">
+  <p:cSld>
+    <p:spTree>
+      <p:nvGrpSpPr>
+        <p:cNvPr id="1" name=""/>
+        <p:cNvGrpSpPr/>
+        <p:nvPr/>
+      </p:nvGrpSpPr>
+      <p:grpSpPr>
+        <a:xfrm>
+          <a:off x="0" y="0"/>
+          <a:ext cx="0" cy="0"/>
+          <a:chOff x="0" y="0"/>
+          <a:chExt cx="0" cy="0"/>
+        </a:xfrm>
+      </p:grpSpPr>
+      <p:sp>
+        <p:nvSpPr>
+          <p:cNvPr id="5" name="Title 1"/>
+          <p:cNvSpPr>
+            <a:spLocks noGrp="1"/>
+          </p:cNvSpPr>
+          <p:nvPr>
+            <p:ph type="ctrTitle"/>
+          </p:nvPr>
+        </p:nvSpPr>
+        <p:spPr>
+          <a:xfrm>
+            <a:off x="802783" y="270455"/>
+            <a:ext cx="9796530" cy="711548"/>
+          </a:xfrm>
+        </p:spPr>
+        <p:txBody>
+          <a:bodyPr>
+            <a:normAutofit/>
+          </a:bodyPr>
+          <a:lstStyle/>
+          <a:p>
+            <a:pPr algn="l"/>
+            <a:r>
+              <a:rPr lang="en-US" sz="4000" dirty="0" smtClean="0"/>
+              <a:t>Hypothesis Testing</a:t>
+            </a:r>
+            <a:endParaRPr lang="en-IN" sz="4000" dirty="0"/>
+          </a:p>
+        </p:txBody>
+      </p:sp>
+      <p:cxnSp>
+        <p:nvCxnSpPr>
+          <p:cNvPr id="7" name="Straight Connector 6"/>
+          <p:cNvCxnSpPr/>
+          <p:nvPr/>
+        </p:nvCxnSpPr>
+        <p:spPr>
+          <a:xfrm>
+            <a:off x="914400" y="956255"/>
+            <a:ext cx="10045521" cy="0"/>
+          </a:xfrm>
+          <a:prstGeom prst="line">
+            <a:avLst/>
+          </a:prstGeom>
+          <a:ln>
+            <a:solidFill>
+              <a:schemeClr val="bg1">
+                <a:lumMod val="75000"/>
+              </a:schemeClr>
+            </a:solidFill>
+          </a:ln>
+        </p:spPr>
+        <p:style>
+          <a:lnRef idx="1">
+            <a:schemeClr val="dk1"/>
+          </a:lnRef>
+          <a:fillRef idx="0">
+            <a:schemeClr val="dk1"/>
+          </a:fillRef>
+          <a:effectRef idx="0">
+            <a:schemeClr val="dk1"/>
+          </a:effectRef>
+          <a:fontRef idx="minor">
+            <a:schemeClr val="tx1"/>
+          </a:fontRef>
+        </p:style>
+      </p:cxnSp>
+      <p:sp>
+        <p:nvSpPr>
+          <p:cNvPr id="2" name="TextBox 1"/>
+          <p:cNvSpPr txBox="1"/>
+          <p:nvPr/>
+        </p:nvSpPr>
+        <p:spPr>
+          <a:xfrm>
+            <a:off x="802783" y="1047241"/>
+            <a:ext cx="10646535" cy="3129062"/>
+          </a:xfrm>
+          <a:prstGeom prst="rect">
+            <a:avLst/>
+          </a:prstGeom>
+          <a:noFill/>
+        </p:spPr>
+        <p:txBody>
+          <a:bodyPr wrap="square" rtlCol="0">
+            <a:spAutoFit/>
+          </a:bodyPr>
+          <a:lstStyle/>
+          <a:p>
+            <a:pPr>
+              <a:spcAft>
+                <a:spcPts val="1000"/>
+              </a:spcAft>
+            </a:pPr>
+            <a:r>
+              <a:rPr lang="en-US" b="1" dirty="0" smtClean="0"/>
+              <a:t>Example 2:</a:t>
+            </a:r>
+          </a:p>
+          <a:p>
+            <a:pPr>
+              <a:spcAft>
+                <a:spcPts val="1000"/>
+              </a:spcAft>
+            </a:pPr>
+            <a:r>
+              <a:rPr lang="en-IN" dirty="0"/>
+              <a:t>The mean emission of all engines of a new design needs to be below 20 parts per million if the design is to meet new emission requirements. 10 engines are manufactured for testing purposes, and the emission level of each is determined. The emission data </a:t>
+            </a:r>
+            <a:r>
+              <a:rPr lang="en-IN" dirty="0" smtClean="0"/>
+              <a:t>is:</a:t>
+            </a:r>
+          </a:p>
+          <a:p>
+            <a:pPr>
+              <a:spcAft>
+                <a:spcPts val="1000"/>
+              </a:spcAft>
+            </a:pPr>
+            <a:r>
+              <a:rPr lang="en-US" dirty="0" smtClean="0"/>
+              <a:t>15.6  16.2  22.5  20.5  16.4  19.4  16.6  17.9  12.7  13.9		(mean – 17.17 and </a:t>
+            </a:r>
+            <a:r>
+              <a:rPr lang="en-US" dirty="0" err="1" smtClean="0"/>
+              <a:t>stdev</a:t>
+            </a:r>
+            <a:r>
+              <a:rPr lang="en-US" dirty="0" smtClean="0"/>
+              <a:t> – 2.98)</a:t>
+            </a:r>
+          </a:p>
+          <a:p>
+            <a:pPr>
+              <a:spcAft>
+                <a:spcPts val="1000"/>
+              </a:spcAft>
+            </a:pPr>
+            <a:r>
+              <a:rPr lang="en-US" dirty="0" smtClean="0"/>
+              <a:t>Does the data supply sufficient evidence to conclude that this type of engine meets the new standard? Assuming we are willing to risk a Type I error with probability 0.01</a:t>
+            </a:r>
+          </a:p>
+          <a:p>
+            <a:endParaRPr lang="en-US" dirty="0"/>
+          </a:p>
+          <a:p>
+            <a:pPr>
+              <a:spcAft>
+                <a:spcPts val="1000"/>
+              </a:spcAft>
+            </a:pPr>
+            <a:r>
+              <a:rPr lang="en-US" dirty="0" smtClean="0"/>
+              <a:t>H</a:t>
+            </a:r>
+            <a:r>
+              <a:rPr lang="en-US" sz="1200" dirty="0" smtClean="0"/>
+              <a:t>0</a:t>
+            </a:r>
+            <a:r>
+              <a:rPr lang="en-US" dirty="0" smtClean="0"/>
+              <a:t> – </a:t>
+            </a:r>
+            <a:r>
+              <a:rPr lang="el-GR" dirty="0"/>
+              <a:t>μ</a:t>
+            </a:r>
+            <a:r>
+              <a:rPr lang="en-US" dirty="0" smtClean="0"/>
+              <a:t> – 10 ppm</a:t>
+            </a:r>
+            <a:endParaRPr lang="en-US" dirty="0"/>
+          </a:p>
+        </p:txBody>
+      </p:sp>
+    </p:spTree>
+    <p:extLst>
+      <p:ext uri="{BB962C8B-B14F-4D97-AF65-F5344CB8AC3E}">
+        <p14:creationId xmlns:p14="http://schemas.microsoft.com/office/powerpoint/2010/main" val="4060610187"/>
+      </p:ext>
+    </p:extLst>
+  </p:cSld>
+  <p:clrMapOvr>
+    <a:masterClrMapping/>
+  </p:clrMapOvr>
+  <p:timing>
+    <p:tnLst>
+      <p:par>
+        <p:cTn id="1" dur="indefinite" restart="never" nodeType="tmRoot"/>
+      </p:par>
+    </p:tnLst>
+  </p:timing>
+</p:sld>
+</file>
+
+<file path=ppt/slides/slide53.xml><?xml version="1.0" encoding="utf-8"?>
+<p:sld xmlns:a="http://schemas.openxmlformats.org/drawingml/2006/main" xmlns:r="http://schemas.openxmlformats.org/officeDocument/2006/relationships" xmlns:p="http://schemas.openxmlformats.org/presentationml/2006/main">
+  <p:cSld>
+    <p:spTree>
+      <p:nvGrpSpPr>
+        <p:cNvPr id="1" name=""/>
+        <p:cNvGrpSpPr/>
+        <p:nvPr/>
+      </p:nvGrpSpPr>
+      <p:grpSpPr>
+        <a:xfrm>
+          <a:off x="0" y="0"/>
+          <a:ext cx="0" cy="0"/>
+          <a:chOff x="0" y="0"/>
+          <a:chExt cx="0" cy="0"/>
+        </a:xfrm>
+      </p:grpSpPr>
+      <p:sp>
+        <p:nvSpPr>
+          <p:cNvPr id="2" name="TextBox 1"/>
+          <p:cNvSpPr txBox="1"/>
+          <p:nvPr/>
+        </p:nvSpPr>
+        <p:spPr>
+          <a:xfrm>
+            <a:off x="210354" y="0"/>
+            <a:ext cx="11290480" cy="1323439"/>
+          </a:xfrm>
+          <a:prstGeom prst="rect">
+            <a:avLst/>
+          </a:prstGeom>
+          <a:noFill/>
+        </p:spPr>
+        <p:txBody>
+          <a:bodyPr wrap="square" rtlCol="0">
+            <a:spAutoFit/>
+          </a:bodyPr>
+          <a:lstStyle/>
+          <a:p>
+            <a:r>
+              <a:rPr lang="en-US" sz="1000" dirty="0" smtClean="0"/>
+              <a:t>Hypothesis testing</a:t>
+            </a:r>
+            <a:endParaRPr lang="en-IN" sz="1000" dirty="0"/>
+          </a:p>
+          <a:p>
+            <a:endParaRPr lang="en-US" sz="1000" dirty="0"/>
+          </a:p>
+          <a:p>
+            <a:endParaRPr lang="en-US" sz="1000" dirty="0" smtClean="0"/>
+          </a:p>
+          <a:p>
+            <a:endParaRPr lang="en-US" sz="1000" dirty="0" smtClean="0"/>
+          </a:p>
+          <a:p>
+            <a:r>
+              <a:rPr lang="en-IN" sz="1000" dirty="0" smtClean="0"/>
+              <a:t>The </a:t>
+            </a:r>
+            <a:r>
+              <a:rPr lang="en-IN" sz="1000" dirty="0"/>
+              <a:t>analysis plan includes decision rules for rejecting the null hypothesis. In practice, statisticians describe these decision rules in two ways - with reference to a P-value or with reference to a region of acceptance</a:t>
+            </a:r>
+          </a:p>
+          <a:p>
+            <a:endParaRPr lang="en-IN" sz="1000" dirty="0" smtClean="0"/>
+          </a:p>
+          <a:p>
+            <a:endParaRPr lang="en-US" sz="1000" dirty="0" smtClean="0"/>
+          </a:p>
+          <a:p>
+            <a:endParaRPr lang="en-US" sz="1000" dirty="0" smtClean="0"/>
+          </a:p>
+        </p:txBody>
+      </p:sp>
+    </p:spTree>
+    <p:extLst>
+      <p:ext uri="{BB962C8B-B14F-4D97-AF65-F5344CB8AC3E}">
+        <p14:creationId xmlns:p14="http://schemas.microsoft.com/office/powerpoint/2010/main" val="2340456989"/>
+      </p:ext>
+    </p:extLst>
+  </p:cSld>
+  <p:clrMapOvr>
+    <a:masterClrMapping/>
+  </p:clrMapOvr>
+  <p:timing>
+    <p:tnLst>
+      <p:par>
+        <p:cTn id="1" dur="indefinite" restart="never" nodeType="tmRoot"/>
+      </p:par>
+    </p:tnLst>
+  </p:timing>
+</p:sld>
+</file>
+
+<file path=ppt/slides/slide54.xml><?xml version="1.0" encoding="utf-8"?>
+<p:sld xmlns:a="http://schemas.openxmlformats.org/drawingml/2006/main" xmlns:r="http://schemas.openxmlformats.org/officeDocument/2006/relationships" xmlns:p="http://schemas.openxmlformats.org/presentationml/2006/main">
+  <p:cSld>
+    <p:spTree>
+      <p:nvGrpSpPr>
+        <p:cNvPr id="1" name=""/>
+        <p:cNvGrpSpPr/>
+        <p:nvPr/>
+      </p:nvGrpSpPr>
+      <p:grpSpPr>
+        <a:xfrm>
+          <a:off x="0" y="0"/>
+          <a:ext cx="0" cy="0"/>
+          <a:chOff x="0" y="0"/>
+          <a:chExt cx="0" cy="0"/>
+        </a:xfrm>
+      </p:grpSpPr>
+    </p:spTree>
+    <p:extLst>
+      <p:ext uri="{BB962C8B-B14F-4D97-AF65-F5344CB8AC3E}">
+        <p14:creationId xmlns:p14="http://schemas.microsoft.com/office/powerpoint/2010/main" val="2792573365"/>
+      </p:ext>
+    </p:extLst>
+  </p:cSld>
+  <p:clrMapOvr>
+    <a:masterClrMapping/>
+  </p:clrMapOvr>
+  <p:timing>
+    <p:tnLst>
+      <p:par>
+        <p:cTn id="1" dur="indefinite" restart="never" nodeType="tmRoot"/>
+      </p:par>
+    </p:tnLst>
+  </p:timing>
+</p:sld>
+</file>
+
+<file path=ppt/slides/slide55.xml><?xml version="1.0" encoding="utf-8"?>
+<p:sld xmlns:a="http://schemas.openxmlformats.org/drawingml/2006/main" xmlns:r="http://schemas.openxmlformats.org/officeDocument/2006/relationships" xmlns:p="http://schemas.openxmlformats.org/presentationml/2006/main">
+  <p:cSld>
+    <p:spTree>
+      <p:nvGrpSpPr>
+        <p:cNvPr id="1" name=""/>
+        <p:cNvGrpSpPr/>
+        <p:nvPr/>
+      </p:nvGrpSpPr>
+      <p:grpSpPr>
+        <a:xfrm>
+          <a:off x="0" y="0"/>
+          <a:ext cx="0" cy="0"/>
+          <a:chOff x="0" y="0"/>
+          <a:chExt cx="0" cy="0"/>
+        </a:xfrm>
+      </p:grpSpPr>
+      <p:sp>
+        <p:nvSpPr>
+          <p:cNvPr id="5" name="Title 1"/>
+          <p:cNvSpPr>
+            <a:spLocks noGrp="1"/>
+          </p:cNvSpPr>
+          <p:nvPr>
+            <p:ph type="ctrTitle"/>
+          </p:nvPr>
+        </p:nvSpPr>
+        <p:spPr>
+          <a:xfrm>
+            <a:off x="802783" y="270455"/>
+            <a:ext cx="9144000" cy="711548"/>
+          </a:xfrm>
+        </p:spPr>
+        <p:txBody>
+          <a:bodyPr>
+            <a:normAutofit/>
+          </a:bodyPr>
+          <a:lstStyle/>
+          <a:p>
+            <a:pPr algn="l"/>
+            <a:r>
+              <a:rPr lang="en-US" sz="4000" dirty="0" smtClean="0"/>
+              <a:t>Inferential Statistics - Topics</a:t>
+            </a:r>
+            <a:endParaRPr lang="en-IN" sz="4000" dirty="0"/>
+          </a:p>
+        </p:txBody>
+      </p:sp>
+      <p:cxnSp>
+        <p:nvCxnSpPr>
+          <p:cNvPr id="7" name="Straight Connector 6"/>
+          <p:cNvCxnSpPr/>
+          <p:nvPr/>
+        </p:nvCxnSpPr>
+        <p:spPr>
+          <a:xfrm>
+            <a:off x="914400" y="956255"/>
+            <a:ext cx="10045521" cy="0"/>
+          </a:xfrm>
+          <a:prstGeom prst="line">
+            <a:avLst/>
+          </a:prstGeom>
+          <a:ln>
+            <a:solidFill>
+              <a:schemeClr val="bg1">
+                <a:lumMod val="75000"/>
+              </a:schemeClr>
+            </a:solidFill>
+          </a:ln>
+        </p:spPr>
+        <p:style>
+          <a:lnRef idx="1">
+            <a:schemeClr val="dk1"/>
+          </a:lnRef>
+          <a:fillRef idx="0">
+            <a:schemeClr val="dk1"/>
+          </a:fillRef>
+          <a:effectRef idx="0">
+            <a:schemeClr val="dk1"/>
+          </a:effectRef>
+          <a:fontRef idx="minor">
+            <a:schemeClr val="tx1"/>
+          </a:fontRef>
+        </p:style>
+      </p:cxnSp>
+      <p:sp>
+        <p:nvSpPr>
+          <p:cNvPr id="2" name="TextBox 1"/>
+          <p:cNvSpPr txBox="1"/>
+          <p:nvPr/>
+        </p:nvSpPr>
+        <p:spPr>
+          <a:xfrm>
+            <a:off x="914400" y="1339403"/>
+            <a:ext cx="9672034" cy="3693319"/>
+          </a:xfrm>
+          <a:prstGeom prst="rect">
+            <a:avLst/>
+          </a:prstGeom>
+          <a:noFill/>
+        </p:spPr>
+        <p:txBody>
+          <a:bodyPr wrap="square" rtlCol="0">
+            <a:spAutoFit/>
+          </a:bodyPr>
+          <a:lstStyle/>
+          <a:p>
+            <a:r>
+              <a:rPr lang="en-US" dirty="0" smtClean="0"/>
+              <a:t>Population and sample</a:t>
+            </a:r>
+          </a:p>
+          <a:p>
+            <a:r>
+              <a:rPr lang="en-US" dirty="0"/>
+              <a:t>Sampling </a:t>
+            </a:r>
+            <a:r>
+              <a:rPr lang="en-US" dirty="0" smtClean="0"/>
+              <a:t>distributions</a:t>
+            </a:r>
+          </a:p>
+          <a:p>
+            <a:r>
+              <a:rPr lang="en-US" dirty="0" smtClean="0"/>
+              <a:t>Central Limit theorem</a:t>
+            </a:r>
+          </a:p>
+          <a:p>
+            <a:r>
+              <a:rPr lang="en-US" dirty="0" smtClean="0"/>
+              <a:t>Sampling </a:t>
+            </a:r>
+            <a:r>
+              <a:rPr lang="en-US" dirty="0" err="1" smtClean="0"/>
+              <a:t>dist</a:t>
+            </a:r>
+            <a:r>
+              <a:rPr lang="en-US" dirty="0" smtClean="0"/>
+              <a:t> of difference between means</a:t>
+            </a:r>
+          </a:p>
+          <a:p>
+            <a:endParaRPr lang="en-US" dirty="0"/>
+          </a:p>
+          <a:p>
+            <a:r>
+              <a:rPr lang="en-US" dirty="0" smtClean="0"/>
+              <a:t>T distribution</a:t>
+            </a:r>
+          </a:p>
+          <a:p>
+            <a:r>
+              <a:rPr lang="en-US" dirty="0" smtClean="0"/>
+              <a:t>Chi square </a:t>
+            </a:r>
+            <a:r>
+              <a:rPr lang="en-US" dirty="0" err="1" smtClean="0"/>
+              <a:t>dist</a:t>
+            </a:r>
+            <a:endParaRPr lang="en-US" dirty="0" smtClean="0"/>
+          </a:p>
+          <a:p>
+            <a:r>
+              <a:rPr lang="en-US" dirty="0" smtClean="0"/>
+              <a:t>When to use normal and when to use t-distribution</a:t>
+            </a:r>
+            <a:endParaRPr lang="en-US" dirty="0"/>
+          </a:p>
+          <a:p>
+            <a:endParaRPr lang="en-US" dirty="0"/>
+          </a:p>
+          <a:p>
+            <a:r>
+              <a:rPr lang="en-US" dirty="0" smtClean="0"/>
+              <a:t>Estimation</a:t>
+            </a:r>
+          </a:p>
+          <a:p>
+            <a:r>
+              <a:rPr lang="en-US" dirty="0" smtClean="0"/>
+              <a:t>Confidence Interval</a:t>
+            </a:r>
+          </a:p>
+          <a:p>
+            <a:r>
+              <a:rPr lang="en-US" dirty="0" smtClean="0"/>
+              <a:t>Hypothesis Testing</a:t>
+            </a:r>
+          </a:p>
+          <a:p>
+            <a:endParaRPr lang="en-US" dirty="0" smtClean="0"/>
+          </a:p>
+        </p:txBody>
+      </p:sp>
+    </p:spTree>
+    <p:extLst>
+      <p:ext uri="{BB962C8B-B14F-4D97-AF65-F5344CB8AC3E}">
+        <p14:creationId xmlns:p14="http://schemas.microsoft.com/office/powerpoint/2010/main" val="119503499"/>
       </p:ext>
     </p:extLst>
   </p:cSld>

</xml_diff>

<commit_message>
Updates for inferential statistics
</commit_message>
<xml_diff>
--- a/Statistics/Lesson 7 Inferential Statistics.pptx
+++ b/Statistics/Lesson 7 Inferential Statistics.pptx
@@ -5,7 +5,7 @@
     <p:sldMasterId id="2147483648" r:id="rId1"/>
   </p:sldMasterIdLst>
   <p:notesMasterIdLst>
-    <p:notesMasterId r:id="rId57"/>
+    <p:notesMasterId r:id="rId66"/>
   </p:notesMasterIdLst>
   <p:sldIdLst>
     <p:sldId id="256" r:id="rId2"/>
@@ -57,12 +57,21 @@
     <p:sldId id="312" r:id="rId48"/>
     <p:sldId id="313" r:id="rId49"/>
     <p:sldId id="314" r:id="rId50"/>
-    <p:sldId id="306" r:id="rId51"/>
-    <p:sldId id="307" r:id="rId52"/>
-    <p:sldId id="259" r:id="rId53"/>
-    <p:sldId id="291" r:id="rId54"/>
-    <p:sldId id="292" r:id="rId55"/>
-    <p:sldId id="293" r:id="rId56"/>
+    <p:sldId id="315" r:id="rId51"/>
+    <p:sldId id="321" r:id="rId52"/>
+    <p:sldId id="316" r:id="rId53"/>
+    <p:sldId id="317" r:id="rId54"/>
+    <p:sldId id="322" r:id="rId55"/>
+    <p:sldId id="318" r:id="rId56"/>
+    <p:sldId id="319" r:id="rId57"/>
+    <p:sldId id="320" r:id="rId58"/>
+    <p:sldId id="323" r:id="rId59"/>
+    <p:sldId id="307" r:id="rId60"/>
+    <p:sldId id="324" r:id="rId61"/>
+    <p:sldId id="325" r:id="rId62"/>
+    <p:sldId id="291" r:id="rId63"/>
+    <p:sldId id="292" r:id="rId64"/>
+    <p:sldId id="293" r:id="rId65"/>
   </p:sldIdLst>
   <p:sldSz cx="12192000" cy="6858000"/>
   <p:notesSz cx="6858000" cy="9144000"/>
@@ -25892,7 +25901,7 @@
         </p:nvSpPr>
         <p:spPr>
           <a:xfrm>
-            <a:off x="802783" y="1047241"/>
+            <a:off x="802783" y="1060120"/>
             <a:ext cx="10247289" cy="5355312"/>
           </a:xfrm>
           <a:prstGeom prst="rect">
@@ -25913,8 +25922,12 @@
           </a:p>
           <a:p>
             <a:r>
-              <a:rPr lang="en-IN" dirty="0"/>
-              <a:t>Nine hundred (900) high school freshmen were randomly selected for a national survey. Among survey participants, the mean grade-point average (GPA) was 2.7, and the standard deviation was 0.4. What is the margin of error, assuming a 95% confidence level</a:t>
+              <a:rPr lang="en-IN" dirty="0" smtClean="0"/>
+              <a:t>900 </a:t>
+            </a:r>
+            <a:r>
+              <a:rPr lang="en-IN" dirty="0"/>
+              <a:t>high school freshmen were randomly selected for a national survey. Among survey participants, the mean grade-point average (GPA) was 2.7, and the standard deviation was 0.4. What is the margin of error, assuming a 95% confidence level</a:t>
             </a:r>
             <a:r>
               <a:rPr lang="en-IN" dirty="0" smtClean="0"/>
@@ -28118,7 +28131,7 @@
         <p:spPr>
           <a:xfrm>
             <a:off x="802783" y="1047241"/>
-            <a:ext cx="10646535" cy="3129062"/>
+            <a:ext cx="10646535" cy="5806718"/>
           </a:xfrm>
           <a:prstGeom prst="rect">
             <a:avLst/>
@@ -28205,7 +28218,31 @@
             </a:r>
             <a:r>
               <a:rPr lang="en-US" dirty="0" smtClean="0"/>
-              <a:t> – </a:t>
+              <a:t> : </a:t>
+            </a:r>
+            <a:r>
+              <a:rPr lang="el-GR" dirty="0" smtClean="0"/>
+              <a:t>μ</a:t>
+            </a:r>
+            <a:r>
+              <a:rPr lang="en-US" dirty="0" smtClean="0"/>
+              <a:t> </a:t>
+            </a:r>
+            <a:r>
+              <a:rPr lang="en-US" dirty="0"/>
+              <a:t>=</a:t>
+            </a:r>
+            <a:r>
+              <a:rPr lang="en-US" dirty="0" smtClean="0"/>
+              <a:t> 20 ppm and H</a:t>
+            </a:r>
+            <a:r>
+              <a:rPr lang="en-US" sz="1100" dirty="0" smtClean="0"/>
+              <a:t>1</a:t>
+            </a:r>
+            <a:r>
+              <a:rPr lang="en-US" dirty="0" smtClean="0"/>
+              <a:t> : </a:t>
             </a:r>
             <a:r>
               <a:rPr lang="el-GR" dirty="0"/>
@@ -28213,7 +28250,113 @@
             </a:r>
             <a:r>
               <a:rPr lang="en-US" dirty="0" smtClean="0"/>
-              <a:t> – 10 ppm</a:t>
+              <a:t> &lt; 20 ppm			(Reject H</a:t>
+            </a:r>
+            <a:r>
+              <a:rPr lang="en-US" sz="1100" dirty="0" smtClean="0"/>
+              <a:t>0</a:t>
+            </a:r>
+            <a:r>
+              <a:rPr lang="en-US" dirty="0" smtClean="0"/>
+              <a:t> if p(mean = 17.17 | H</a:t>
+            </a:r>
+            <a:r>
+              <a:rPr lang="en-US" sz="1100" dirty="0" smtClean="0"/>
+              <a:t>0</a:t>
+            </a:r>
+            <a:r>
+              <a:rPr lang="en-US" dirty="0" smtClean="0"/>
+              <a:t> is true) &lt; 1%</a:t>
+            </a:r>
+          </a:p>
+          <a:p>
+            <a:pPr>
+              <a:spcAft>
+                <a:spcPts val="1000"/>
+              </a:spcAft>
+            </a:pPr>
+            <a:r>
+              <a:rPr lang="en-US" dirty="0" smtClean="0"/>
+              <a:t>T = (17.17 – 20) / (sample </a:t>
+            </a:r>
+            <a:r>
+              <a:rPr lang="en-US" dirty="0" err="1" smtClean="0"/>
+              <a:t>std</a:t>
+            </a:r>
+            <a:r>
+              <a:rPr lang="en-US" dirty="0" smtClean="0"/>
+              <a:t> dev (2.98) / </a:t>
+            </a:r>
+            <a:r>
+              <a:rPr lang="en-US" dirty="0" err="1" smtClean="0"/>
+              <a:t>sqrt</a:t>
+            </a:r>
+            <a:r>
+              <a:rPr lang="en-US" dirty="0" smtClean="0"/>
+              <a:t>(10)) = -3.003  ~ -3.00</a:t>
+            </a:r>
+          </a:p>
+          <a:p>
+            <a:pPr>
+              <a:spcAft>
+                <a:spcPts val="1000"/>
+              </a:spcAft>
+            </a:pPr>
+            <a:r>
+              <a:rPr lang="en-US" dirty="0" smtClean="0"/>
+              <a:t>Now we need to figure out the probability of getting this t statistics in a t statistics with </a:t>
+            </a:r>
+            <a:r>
+              <a:rPr lang="en-US" dirty="0" err="1" smtClean="0"/>
+              <a:t>dof</a:t>
+            </a:r>
+            <a:r>
+              <a:rPr lang="en-US" dirty="0" smtClean="0"/>
+              <a:t> = 9.</a:t>
+            </a:r>
+          </a:p>
+          <a:p>
+            <a:pPr>
+              <a:spcAft>
+                <a:spcPts val="1000"/>
+              </a:spcAft>
+            </a:pPr>
+            <a:r>
+              <a:rPr lang="en-US" dirty="0" smtClean="0"/>
+              <a:t>(we care about 1 sided t dist.)</a:t>
+            </a:r>
+          </a:p>
+          <a:p>
+            <a:pPr>
+              <a:spcAft>
+                <a:spcPts val="1000"/>
+              </a:spcAft>
+            </a:pPr>
+            <a:r>
+              <a:rPr lang="en-US" dirty="0" smtClean="0"/>
+              <a:t>Or we can find out the t value at which the probability of getting any value &lt;= to that value is 1%.</a:t>
+            </a:r>
+          </a:p>
+          <a:p>
+            <a:pPr>
+              <a:spcAft>
+                <a:spcPts val="1000"/>
+              </a:spcAft>
+            </a:pPr>
+            <a:r>
+              <a:rPr lang="en-US" dirty="0" smtClean="0"/>
+              <a:t>That is out threshold value. If the value we calculated is less than the threshold value, then we have less than 1 % chance of getting mean 17.17 if null hypothesis is true.</a:t>
+            </a:r>
+          </a:p>
+          <a:p>
+            <a:pPr>
+              <a:spcAft>
+                <a:spcPts val="1000"/>
+              </a:spcAft>
+            </a:pPr>
+            <a:r>
+              <a:rPr lang="en-US" dirty="0" smtClean="0"/>
+              <a:t>So we reject the null hypothesis.</a:t>
             </a:r>
             <a:endParaRPr lang="en-US" dirty="0"/>
           </a:p>
@@ -28727,138 +28870,6 @@
       </p:grpSpPr>
       <p:sp>
         <p:nvSpPr>
-          <p:cNvPr id="2" name="TextBox 1"/>
-          <p:cNvSpPr txBox="1"/>
-          <p:nvPr/>
-        </p:nvSpPr>
-        <p:spPr>
-          <a:xfrm>
-            <a:off x="210354" y="0"/>
-            <a:ext cx="11290480" cy="1323439"/>
-          </a:xfrm>
-          <a:prstGeom prst="rect">
-            <a:avLst/>
-          </a:prstGeom>
-          <a:noFill/>
-        </p:spPr>
-        <p:txBody>
-          <a:bodyPr wrap="square" rtlCol="0">
-            <a:spAutoFit/>
-          </a:bodyPr>
-          <a:lstStyle/>
-          <a:p>
-            <a:r>
-              <a:rPr lang="en-US" sz="1000" dirty="0" smtClean="0"/>
-              <a:t>Hypothesis testing</a:t>
-            </a:r>
-            <a:endParaRPr lang="en-IN" sz="1000" dirty="0"/>
-          </a:p>
-          <a:p>
-            <a:endParaRPr lang="en-US" sz="1000" dirty="0"/>
-          </a:p>
-          <a:p>
-            <a:endParaRPr lang="en-US" sz="1000" dirty="0" smtClean="0"/>
-          </a:p>
-          <a:p>
-            <a:endParaRPr lang="en-US" sz="1000" dirty="0" smtClean="0"/>
-          </a:p>
-          <a:p>
-            <a:r>
-              <a:rPr lang="en-IN" sz="1000" dirty="0" smtClean="0"/>
-              <a:t>The </a:t>
-            </a:r>
-            <a:r>
-              <a:rPr lang="en-IN" sz="1000" dirty="0"/>
-              <a:t>analysis plan includes decision rules for rejecting the null hypothesis. In practice, statisticians describe these decision rules in two ways - with reference to a P-value or with reference to a region of acceptance</a:t>
-            </a:r>
-          </a:p>
-          <a:p>
-            <a:endParaRPr lang="en-IN" sz="1000" dirty="0" smtClean="0"/>
-          </a:p>
-          <a:p>
-            <a:endParaRPr lang="en-US" sz="1000" dirty="0" smtClean="0"/>
-          </a:p>
-          <a:p>
-            <a:endParaRPr lang="en-US" sz="1000" dirty="0" smtClean="0"/>
-          </a:p>
-        </p:txBody>
-      </p:sp>
-    </p:spTree>
-    <p:extLst>
-      <p:ext uri="{BB962C8B-B14F-4D97-AF65-F5344CB8AC3E}">
-        <p14:creationId xmlns:p14="http://schemas.microsoft.com/office/powerpoint/2010/main" val="2340456989"/>
-      </p:ext>
-    </p:extLst>
-  </p:cSld>
-  <p:clrMapOvr>
-    <a:masterClrMapping/>
-  </p:clrMapOvr>
-  <p:timing>
-    <p:tnLst>
-      <p:par>
-        <p:cTn id="1" dur="indefinite" restart="never" nodeType="tmRoot"/>
-      </p:par>
-    </p:tnLst>
-  </p:timing>
-</p:sld>
-</file>
-
-<file path=ppt/slides/slide51.xml><?xml version="1.0" encoding="utf-8"?>
-<p:sld xmlns:a="http://schemas.openxmlformats.org/drawingml/2006/main" xmlns:r="http://schemas.openxmlformats.org/officeDocument/2006/relationships" xmlns:p="http://schemas.openxmlformats.org/presentationml/2006/main">
-  <p:cSld>
-    <p:spTree>
-      <p:nvGrpSpPr>
-        <p:cNvPr id="1" name=""/>
-        <p:cNvGrpSpPr/>
-        <p:nvPr/>
-      </p:nvGrpSpPr>
-      <p:grpSpPr>
-        <a:xfrm>
-          <a:off x="0" y="0"/>
-          <a:ext cx="0" cy="0"/>
-          <a:chOff x="0" y="0"/>
-          <a:chExt cx="0" cy="0"/>
-        </a:xfrm>
-      </p:grpSpPr>
-    </p:spTree>
-    <p:extLst>
-      <p:ext uri="{BB962C8B-B14F-4D97-AF65-F5344CB8AC3E}">
-        <p14:creationId xmlns:p14="http://schemas.microsoft.com/office/powerpoint/2010/main" val="2792573365"/>
-      </p:ext>
-    </p:extLst>
-  </p:cSld>
-  <p:clrMapOvr>
-    <a:masterClrMapping/>
-  </p:clrMapOvr>
-  <p:timing>
-    <p:tnLst>
-      <p:par>
-        <p:cTn id="1" dur="indefinite" restart="never" nodeType="tmRoot"/>
-      </p:par>
-    </p:tnLst>
-  </p:timing>
-</p:sld>
-</file>
-
-<file path=ppt/slides/slide52.xml><?xml version="1.0" encoding="utf-8"?>
-<p:sld xmlns:a="http://schemas.openxmlformats.org/drawingml/2006/main" xmlns:r="http://schemas.openxmlformats.org/officeDocument/2006/relationships" xmlns:p="http://schemas.openxmlformats.org/presentationml/2006/main">
-  <p:cSld>
-    <p:spTree>
-      <p:nvGrpSpPr>
-        <p:cNvPr id="1" name=""/>
-        <p:cNvGrpSpPr/>
-        <p:nvPr/>
-      </p:nvGrpSpPr>
-      <p:grpSpPr>
-        <a:xfrm>
-          <a:off x="0" y="0"/>
-          <a:ext cx="0" cy="0"/>
-          <a:chOff x="0" y="0"/>
-          <a:chExt cx="0" cy="0"/>
-        </a:xfrm>
-      </p:grpSpPr>
-      <p:sp>
-        <p:nvSpPr>
           <p:cNvPr id="5" name="Title 1"/>
           <p:cNvSpPr>
             <a:spLocks noGrp="1"/>
@@ -28870,7 +28881,7 @@
         <p:spPr>
           <a:xfrm>
             <a:off x="802783" y="270455"/>
-            <a:ext cx="9144000" cy="711548"/>
+            <a:ext cx="9796530" cy="711548"/>
           </a:xfrm>
         </p:spPr>
         <p:txBody>
@@ -28882,7 +28893,7 @@
             <a:pPr algn="l"/>
             <a:r>
               <a:rPr lang="en-US" sz="4000" dirty="0" smtClean="0"/>
-              <a:t>Inferential Statistics - Topics</a:t>
+              <a:t>Hypothesis Testing</a:t>
             </a:r>
             <a:endParaRPr lang="en-IN" sz="4000" dirty="0"/>
           </a:p>
@@ -28933,8 +28944,8 @@
         </p:nvSpPr>
         <p:spPr>
           <a:xfrm>
-            <a:off x="914400" y="1339403"/>
-            <a:ext cx="9672034" cy="3693319"/>
+            <a:off x="802783" y="1047241"/>
+            <a:ext cx="10646535" cy="4334520"/>
           </a:xfrm>
           <a:prstGeom prst="rect">
             <a:avLst/>
@@ -28947,98 +28958,727 @@
           </a:bodyPr>
           <a:lstStyle/>
           <a:p>
+            <a:pPr>
+              <a:spcAft>
+                <a:spcPts val="1000"/>
+              </a:spcAft>
+            </a:pPr>
+            <a:r>
+              <a:rPr lang="en-US" b="1" dirty="0" smtClean="0"/>
+              <a:t>Hypothesis Test for a Proportion:</a:t>
+            </a:r>
+          </a:p>
+          <a:p>
+            <a:pPr marL="285750" indent="-285750">
+              <a:buFontTx/>
+              <a:buChar char="-"/>
+            </a:pPr>
+            <a:r>
+              <a:rPr lang="en-IN" dirty="0" smtClean="0"/>
+              <a:t>Compute the standard deviation (σ) of the sampling distribution: σ = </a:t>
+            </a:r>
+            <a:r>
+              <a:rPr lang="en-IN" dirty="0" err="1" smtClean="0"/>
+              <a:t>sqrt</a:t>
+            </a:r>
+            <a:r>
+              <a:rPr lang="en-IN" dirty="0" smtClean="0"/>
+              <a:t>[ P * ( 1 - P ) / n ] </a:t>
+            </a:r>
+          </a:p>
+          <a:p>
+            <a:r>
+              <a:rPr lang="en-IN" dirty="0" smtClean="0"/>
+              <a:t>where </a:t>
+            </a:r>
+            <a:r>
+              <a:rPr lang="en-IN" dirty="0"/>
+              <a:t>P is the hypothesized value of population proportion in the null hypothesis, and n is the sample </a:t>
+            </a:r>
+            <a:r>
+              <a:rPr lang="en-IN" dirty="0" smtClean="0"/>
+              <a:t>size</a:t>
+            </a:r>
+          </a:p>
+          <a:p>
+            <a:pPr marL="285750" indent="-285750">
+              <a:buFontTx/>
+              <a:buChar char="-"/>
+            </a:pPr>
+            <a:r>
+              <a:rPr lang="en-IN" dirty="0" smtClean="0"/>
+              <a:t>Test statistics: z </a:t>
+            </a:r>
+            <a:r>
+              <a:rPr lang="en-IN" dirty="0"/>
+              <a:t>= (p - P) / </a:t>
+            </a:r>
+            <a:r>
+              <a:rPr lang="el-GR" dirty="0"/>
+              <a:t>σ </a:t>
+            </a:r>
             <a:r>
               <a:rPr lang="en-US" dirty="0" smtClean="0"/>
-              <a:t>Population and sample</a:t>
-            </a:r>
-          </a:p>
-          <a:p>
-            <a:r>
-              <a:rPr lang="en-US" dirty="0"/>
-              <a:t>Sampling </a:t>
-            </a:r>
+              <a:t> </a:t>
+            </a:r>
+          </a:p>
+          <a:p>
+            <a:pPr>
+              <a:spcAft>
+                <a:spcPts val="1000"/>
+              </a:spcAft>
+            </a:pPr>
+            <a:r>
+              <a:rPr lang="en-IN" dirty="0" smtClean="0"/>
+              <a:t>where </a:t>
+            </a:r>
+            <a:r>
+              <a:rPr lang="en-IN" dirty="0"/>
+              <a:t>P is the hypothesized value of population proportion in the null hypothesis, p is the sample proportion, and σ is the standard deviation of the sampling distribution</a:t>
+            </a:r>
+            <a:r>
+              <a:rPr lang="en-IN" dirty="0" smtClean="0"/>
+              <a:t>.</a:t>
+            </a:r>
+          </a:p>
+          <a:p>
+            <a:pPr>
+              <a:spcAft>
+                <a:spcPts val="1000"/>
+              </a:spcAft>
+            </a:pPr>
+            <a:endParaRPr lang="en-US" dirty="0"/>
+          </a:p>
+          <a:p>
+            <a:pPr>
+              <a:spcAft>
+                <a:spcPts val="1000"/>
+              </a:spcAft>
+            </a:pPr>
+            <a:r>
+              <a:rPr lang="en-US" b="1" dirty="0" smtClean="0"/>
+              <a:t>Example 1:</a:t>
+            </a:r>
+          </a:p>
+          <a:p>
+            <a:pPr>
+              <a:spcAft>
+                <a:spcPts val="1000"/>
+              </a:spcAft>
+            </a:pPr>
+            <a:r>
+              <a:rPr lang="en-IN" dirty="0"/>
+              <a:t>The CEO of a large electric utility claims that 80 percent of his 1,000,000 customers are very satisfied with the service they receive. To test this claim, the local newspaper surveyed 100 customers, using simple random sampling. Among the sampled customers, 73 percent say they are very </a:t>
+            </a:r>
+            <a:r>
+              <a:rPr lang="en-IN" dirty="0" err="1"/>
+              <a:t>satisified</a:t>
+            </a:r>
+            <a:r>
+              <a:rPr lang="en-IN" dirty="0"/>
+              <a:t>. Based on these findings, can we reject the CEO's hypothesis that 80% of the customers are very satisfied? Use a 0.05 level of significance</a:t>
+            </a:r>
+            <a:r>
+              <a:rPr lang="en-IN" dirty="0" smtClean="0"/>
+              <a:t>.</a:t>
+            </a:r>
+          </a:p>
+          <a:p>
+            <a:pPr>
+              <a:spcAft>
+                <a:spcPts val="1000"/>
+              </a:spcAft>
+            </a:pPr>
             <a:r>
               <a:rPr lang="en-US" dirty="0" smtClean="0"/>
-              <a:t>distributions</a:t>
-            </a:r>
-          </a:p>
-          <a:p>
-            <a:r>
-              <a:rPr lang="en-US" dirty="0" smtClean="0"/>
-              <a:t>Central Limit theorem</a:t>
-            </a:r>
-          </a:p>
-          <a:p>
-            <a:r>
-              <a:rPr lang="en-US" dirty="0" smtClean="0"/>
-              <a:t>Sampling </a:t>
-            </a:r>
-            <a:r>
-              <a:rPr lang="en-US" dirty="0" err="1" smtClean="0"/>
-              <a:t>dist</a:t>
-            </a:r>
-            <a:r>
-              <a:rPr lang="en-US" dirty="0" smtClean="0"/>
-              <a:t> of difference between means</a:t>
-            </a:r>
-          </a:p>
-          <a:p>
-            <a:endParaRPr lang="en-US" dirty="0"/>
-          </a:p>
-          <a:p>
-            <a:r>
-              <a:rPr lang="en-US" dirty="0" smtClean="0"/>
-              <a:t>T distribution</a:t>
-            </a:r>
-          </a:p>
-          <a:p>
-            <a:r>
-              <a:rPr lang="en-US" dirty="0" smtClean="0"/>
-              <a:t>Chi square </a:t>
-            </a:r>
-            <a:r>
-              <a:rPr lang="en-US" dirty="0" err="1" smtClean="0"/>
-              <a:t>dist</a:t>
-            </a:r>
-            <a:endParaRPr lang="en-US" dirty="0" smtClean="0"/>
-          </a:p>
-          <a:p>
-            <a:r>
-              <a:rPr lang="en-US" dirty="0" smtClean="0"/>
-              <a:t>When to use normal and when to use t-distribution</a:t>
-            </a:r>
-            <a:endParaRPr lang="en-US" dirty="0"/>
-          </a:p>
-          <a:p>
-            <a:endParaRPr lang="en-US" dirty="0"/>
-          </a:p>
-          <a:p>
-            <a:r>
-              <a:rPr lang="en-US" dirty="0" smtClean="0"/>
-              <a:t>Estimation</a:t>
-            </a:r>
-          </a:p>
-          <a:p>
-            <a:r>
-              <a:rPr lang="en-US" dirty="0" smtClean="0"/>
-              <a:t>Confidence Interval</a:t>
-            </a:r>
-          </a:p>
-          <a:p>
-            <a:r>
-              <a:rPr lang="en-US" dirty="0" smtClean="0"/>
-              <a:t>Hypothesis Testing</a:t>
-            </a:r>
-          </a:p>
-          <a:p>
-            <a:endParaRPr lang="en-US" dirty="0" smtClean="0"/>
+              <a:t>(Example of Two tailed test)</a:t>
+            </a:r>
           </a:p>
         </p:txBody>
       </p:sp>
     </p:spTree>
     <p:extLst>
       <p:ext uri="{BB962C8B-B14F-4D97-AF65-F5344CB8AC3E}">
-        <p14:creationId xmlns:p14="http://schemas.microsoft.com/office/powerpoint/2010/main" val="119503499"/>
+        <p14:creationId xmlns:p14="http://schemas.microsoft.com/office/powerpoint/2010/main" val="1683405372"/>
+      </p:ext>
+    </p:extLst>
+  </p:cSld>
+  <p:clrMapOvr>
+    <a:masterClrMapping/>
+  </p:clrMapOvr>
+  <p:timing>
+    <p:tnLst>
+      <p:par>
+        <p:cTn id="1" dur="indefinite" restart="never" nodeType="tmRoot"/>
+      </p:par>
+    </p:tnLst>
+  </p:timing>
+</p:sld>
+</file>
+
+<file path=ppt/slides/slide51.xml><?xml version="1.0" encoding="utf-8"?>
+<p:sld xmlns:a="http://schemas.openxmlformats.org/drawingml/2006/main" xmlns:r="http://schemas.openxmlformats.org/officeDocument/2006/relationships" xmlns:p="http://schemas.openxmlformats.org/presentationml/2006/main">
+  <p:cSld>
+    <p:spTree>
+      <p:nvGrpSpPr>
+        <p:cNvPr id="1" name=""/>
+        <p:cNvGrpSpPr/>
+        <p:nvPr/>
+      </p:nvGrpSpPr>
+      <p:grpSpPr>
+        <a:xfrm>
+          <a:off x="0" y="0"/>
+          <a:ext cx="0" cy="0"/>
+          <a:chOff x="0" y="0"/>
+          <a:chExt cx="0" cy="0"/>
+        </a:xfrm>
+      </p:grpSpPr>
+      <p:sp>
+        <p:nvSpPr>
+          <p:cNvPr id="5" name="Title 1"/>
+          <p:cNvSpPr>
+            <a:spLocks noGrp="1"/>
+          </p:cNvSpPr>
+          <p:nvPr>
+            <p:ph type="ctrTitle"/>
+          </p:nvPr>
+        </p:nvSpPr>
+        <p:spPr>
+          <a:xfrm>
+            <a:off x="802783" y="270455"/>
+            <a:ext cx="9796530" cy="711548"/>
+          </a:xfrm>
+        </p:spPr>
+        <p:txBody>
+          <a:bodyPr>
+            <a:normAutofit/>
+          </a:bodyPr>
+          <a:lstStyle/>
+          <a:p>
+            <a:pPr algn="l"/>
+            <a:r>
+              <a:rPr lang="en-US" sz="4000" dirty="0" smtClean="0"/>
+              <a:t>Hypothesis Testing</a:t>
+            </a:r>
+            <a:endParaRPr lang="en-IN" sz="4000" dirty="0"/>
+          </a:p>
+        </p:txBody>
+      </p:sp>
+      <p:cxnSp>
+        <p:nvCxnSpPr>
+          <p:cNvPr id="7" name="Straight Connector 6"/>
+          <p:cNvCxnSpPr/>
+          <p:nvPr/>
+        </p:nvCxnSpPr>
+        <p:spPr>
+          <a:xfrm>
+            <a:off x="914400" y="956255"/>
+            <a:ext cx="10045521" cy="0"/>
+          </a:xfrm>
+          <a:prstGeom prst="line">
+            <a:avLst/>
+          </a:prstGeom>
+          <a:ln>
+            <a:solidFill>
+              <a:schemeClr val="bg1">
+                <a:lumMod val="75000"/>
+              </a:schemeClr>
+            </a:solidFill>
+          </a:ln>
+        </p:spPr>
+        <p:style>
+          <a:lnRef idx="1">
+            <a:schemeClr val="dk1"/>
+          </a:lnRef>
+          <a:fillRef idx="0">
+            <a:schemeClr val="dk1"/>
+          </a:fillRef>
+          <a:effectRef idx="0">
+            <a:schemeClr val="dk1"/>
+          </a:effectRef>
+          <a:fontRef idx="minor">
+            <a:schemeClr val="tx1"/>
+          </a:fontRef>
+        </p:style>
+      </p:cxnSp>
+      <p:sp>
+        <p:nvSpPr>
+          <p:cNvPr id="2" name="TextBox 1"/>
+          <p:cNvSpPr txBox="1"/>
+          <p:nvPr/>
+        </p:nvSpPr>
+        <p:spPr>
+          <a:xfrm>
+            <a:off x="802783" y="1047241"/>
+            <a:ext cx="10646535" cy="5827236"/>
+          </a:xfrm>
+          <a:prstGeom prst="rect">
+            <a:avLst/>
+          </a:prstGeom>
+          <a:noFill/>
+        </p:spPr>
+        <p:txBody>
+          <a:bodyPr wrap="square" rtlCol="0">
+            <a:spAutoFit/>
+          </a:bodyPr>
+          <a:lstStyle/>
+          <a:p>
+            <a:pPr>
+              <a:spcAft>
+                <a:spcPts val="1000"/>
+              </a:spcAft>
+            </a:pPr>
+            <a:r>
+              <a:rPr lang="en-US" b="1" dirty="0" smtClean="0"/>
+              <a:t>Hypothesis Test for a Proportion:</a:t>
+            </a:r>
+          </a:p>
+          <a:p>
+            <a:pPr>
+              <a:spcAft>
+                <a:spcPts val="1000"/>
+              </a:spcAft>
+            </a:pPr>
+            <a:r>
+              <a:rPr lang="en-US" b="1" dirty="0" smtClean="0"/>
+              <a:t>Example 1:</a:t>
+            </a:r>
+          </a:p>
+          <a:p>
+            <a:pPr algn="ctr">
+              <a:spcAft>
+                <a:spcPts val="1000"/>
+              </a:spcAft>
+            </a:pPr>
+            <a:r>
+              <a:rPr lang="en-IN" dirty="0" smtClean="0"/>
+              <a:t>Null hypothesis: P = 0.80</a:t>
+            </a:r>
+          </a:p>
+          <a:p>
+            <a:pPr algn="ctr">
+              <a:spcAft>
+                <a:spcPts val="1000"/>
+              </a:spcAft>
+            </a:pPr>
+            <a:r>
+              <a:rPr lang="en-IN" dirty="0" smtClean="0"/>
+              <a:t>Alternative hypothesis: P ≠ 0.80</a:t>
+            </a:r>
+          </a:p>
+          <a:p>
+            <a:r>
+              <a:rPr lang="en-US" dirty="0" smtClean="0"/>
+              <a:t>Calculating standard error:</a:t>
+            </a:r>
+          </a:p>
+          <a:p>
+            <a:pPr algn="ctr"/>
+            <a:r>
+              <a:rPr lang="el-GR" dirty="0" smtClean="0"/>
+              <a:t>σ = sqrt[ P * ( 1 - P ) / n ] </a:t>
+            </a:r>
+          </a:p>
+          <a:p>
+            <a:pPr algn="ctr"/>
+            <a:r>
+              <a:rPr lang="el-GR" dirty="0" smtClean="0"/>
+              <a:t>σ = sqrt [(0.8 * 0.2) / 100]</a:t>
+            </a:r>
+          </a:p>
+          <a:p>
+            <a:pPr algn="ctr"/>
+            <a:r>
+              <a:rPr lang="el-GR" dirty="0" smtClean="0"/>
+              <a:t>σ = sqrt(0.0016) = 0.04</a:t>
+            </a:r>
+          </a:p>
+          <a:p>
+            <a:endParaRPr lang="en-US" dirty="0" smtClean="0"/>
+          </a:p>
+          <a:p>
+            <a:r>
+              <a:rPr lang="en-US" dirty="0" smtClean="0"/>
+              <a:t>Calculating z-statistic</a:t>
+            </a:r>
+            <a:endParaRPr lang="en-US" dirty="0"/>
+          </a:p>
+          <a:p>
+            <a:pPr algn="ctr"/>
+            <a:r>
+              <a:rPr lang="el-GR" dirty="0" smtClean="0"/>
+              <a:t>z = (p - P) / σ = (.73 - .80)/0.04 = -1.75</a:t>
+            </a:r>
+          </a:p>
+          <a:p>
+            <a:pPr>
+              <a:spcAft>
+                <a:spcPts val="1000"/>
+              </a:spcAft>
+            </a:pPr>
+            <a:endParaRPr lang="en-US" dirty="0" smtClean="0"/>
+          </a:p>
+          <a:p>
+            <a:r>
+              <a:rPr lang="en-US" dirty="0" smtClean="0"/>
+              <a:t>For this z score, we find the probability: 0.04. Since two tailed, so total p value would be 0.04+0.04. = 0.08.</a:t>
+            </a:r>
+          </a:p>
+          <a:p>
+            <a:pPr>
+              <a:spcAft>
+                <a:spcPts val="1000"/>
+              </a:spcAft>
+            </a:pPr>
+            <a:r>
+              <a:rPr lang="en-IN" dirty="0" smtClean="0"/>
+              <a:t>Since the P-value (0.08) is greater than the significance level (0.05), we cannot reject the null hypothesis.</a:t>
+            </a:r>
+          </a:p>
+          <a:p>
+            <a:pPr>
+              <a:spcAft>
+                <a:spcPts val="1000"/>
+              </a:spcAft>
+            </a:pPr>
+            <a:endParaRPr lang="en-IN" b="1" i="1" dirty="0" smtClean="0"/>
+          </a:p>
+          <a:p>
+            <a:pPr>
+              <a:spcAft>
+                <a:spcPts val="1000"/>
+              </a:spcAft>
+            </a:pPr>
+            <a:r>
+              <a:rPr lang="en-IN" b="1" i="1" dirty="0" smtClean="0"/>
+              <a:t>Note</a:t>
+            </a:r>
+            <a:r>
+              <a:rPr lang="en-IN" i="1" dirty="0" smtClean="0"/>
+              <a:t>: The approach is appropriate because the sampling method was simple random sampling, the sample included at least 10 successes and 10 failures, and the population size was at least 10 times the sample size.</a:t>
+            </a:r>
+            <a:endParaRPr lang="en-US" i="1" dirty="0" smtClean="0"/>
+          </a:p>
+        </p:txBody>
+      </p:sp>
+    </p:spTree>
+    <p:extLst>
+      <p:ext uri="{BB962C8B-B14F-4D97-AF65-F5344CB8AC3E}">
+        <p14:creationId xmlns:p14="http://schemas.microsoft.com/office/powerpoint/2010/main" val="850445660"/>
+      </p:ext>
+    </p:extLst>
+  </p:cSld>
+  <p:clrMapOvr>
+    <a:masterClrMapping/>
+  </p:clrMapOvr>
+  <p:timing>
+    <p:tnLst>
+      <p:par>
+        <p:cTn id="1" dur="indefinite" restart="never" nodeType="tmRoot"/>
+      </p:par>
+    </p:tnLst>
+  </p:timing>
+</p:sld>
+</file>
+
+<file path=ppt/slides/slide52.xml><?xml version="1.0" encoding="utf-8"?>
+<p:sld xmlns:a="http://schemas.openxmlformats.org/drawingml/2006/main" xmlns:r="http://schemas.openxmlformats.org/officeDocument/2006/relationships" xmlns:p="http://schemas.openxmlformats.org/presentationml/2006/main">
+  <p:cSld>
+    <p:spTree>
+      <p:nvGrpSpPr>
+        <p:cNvPr id="1" name=""/>
+        <p:cNvGrpSpPr/>
+        <p:nvPr/>
+      </p:nvGrpSpPr>
+      <p:grpSpPr>
+        <a:xfrm>
+          <a:off x="0" y="0"/>
+          <a:ext cx="0" cy="0"/>
+          <a:chOff x="0" y="0"/>
+          <a:chExt cx="0" cy="0"/>
+        </a:xfrm>
+      </p:grpSpPr>
+      <p:sp>
+        <p:nvSpPr>
+          <p:cNvPr id="5" name="Title 1"/>
+          <p:cNvSpPr>
+            <a:spLocks noGrp="1"/>
+          </p:cNvSpPr>
+          <p:nvPr>
+            <p:ph type="ctrTitle"/>
+          </p:nvPr>
+        </p:nvSpPr>
+        <p:spPr>
+          <a:xfrm>
+            <a:off x="802783" y="270455"/>
+            <a:ext cx="9796530" cy="711548"/>
+          </a:xfrm>
+        </p:spPr>
+        <p:txBody>
+          <a:bodyPr>
+            <a:normAutofit/>
+          </a:bodyPr>
+          <a:lstStyle/>
+          <a:p>
+            <a:pPr algn="l"/>
+            <a:r>
+              <a:rPr lang="en-US" sz="4000" dirty="0" smtClean="0"/>
+              <a:t>Hypothesis Testing</a:t>
+            </a:r>
+            <a:endParaRPr lang="en-IN" sz="4000" dirty="0"/>
+          </a:p>
+        </p:txBody>
+      </p:sp>
+      <p:cxnSp>
+        <p:nvCxnSpPr>
+          <p:cNvPr id="7" name="Straight Connector 6"/>
+          <p:cNvCxnSpPr/>
+          <p:nvPr/>
+        </p:nvCxnSpPr>
+        <p:spPr>
+          <a:xfrm>
+            <a:off x="914400" y="956255"/>
+            <a:ext cx="10045521" cy="0"/>
+          </a:xfrm>
+          <a:prstGeom prst="line">
+            <a:avLst/>
+          </a:prstGeom>
+          <a:ln>
+            <a:solidFill>
+              <a:schemeClr val="bg1">
+                <a:lumMod val="75000"/>
+              </a:schemeClr>
+            </a:solidFill>
+          </a:ln>
+        </p:spPr>
+        <p:style>
+          <a:lnRef idx="1">
+            <a:schemeClr val="dk1"/>
+          </a:lnRef>
+          <a:fillRef idx="0">
+            <a:schemeClr val="dk1"/>
+          </a:fillRef>
+          <a:effectRef idx="0">
+            <a:schemeClr val="dk1"/>
+          </a:effectRef>
+          <a:fontRef idx="minor">
+            <a:schemeClr val="tx1"/>
+          </a:fontRef>
+        </p:style>
+      </p:cxnSp>
+      <p:sp>
+        <p:nvSpPr>
+          <p:cNvPr id="2" name="TextBox 1"/>
+          <p:cNvSpPr txBox="1"/>
+          <p:nvPr/>
+        </p:nvSpPr>
+        <p:spPr>
+          <a:xfrm>
+            <a:off x="802783" y="1047241"/>
+            <a:ext cx="10646535" cy="5570756"/>
+          </a:xfrm>
+          <a:prstGeom prst="rect">
+            <a:avLst/>
+          </a:prstGeom>
+          <a:noFill/>
+        </p:spPr>
+        <p:txBody>
+          <a:bodyPr wrap="square" rtlCol="0">
+            <a:spAutoFit/>
+          </a:bodyPr>
+          <a:lstStyle/>
+          <a:p>
+            <a:pPr>
+              <a:spcAft>
+                <a:spcPts val="1000"/>
+              </a:spcAft>
+            </a:pPr>
+            <a:r>
+              <a:rPr lang="en-US" b="1" dirty="0" smtClean="0"/>
+              <a:t>Hypothesis Test for a Proportion:</a:t>
+            </a:r>
+          </a:p>
+          <a:p>
+            <a:pPr>
+              <a:spcAft>
+                <a:spcPts val="1000"/>
+              </a:spcAft>
+            </a:pPr>
+            <a:r>
+              <a:rPr lang="en-US" b="1" dirty="0" smtClean="0"/>
+              <a:t>Example 2:</a:t>
+            </a:r>
+          </a:p>
+          <a:p>
+            <a:pPr>
+              <a:spcAft>
+                <a:spcPts val="1000"/>
+              </a:spcAft>
+            </a:pPr>
+            <a:r>
+              <a:rPr lang="en-IN" dirty="0" smtClean="0"/>
+              <a:t>Suppose </a:t>
+            </a:r>
+            <a:r>
+              <a:rPr lang="en-IN" dirty="0"/>
+              <a:t>the previous example is stated a little bit differently. Suppose the CEO claims that </a:t>
+            </a:r>
+            <a:r>
+              <a:rPr lang="en-IN" i="1" dirty="0"/>
+              <a:t>at least</a:t>
+            </a:r>
+            <a:r>
+              <a:rPr lang="en-IN" dirty="0"/>
+              <a:t> 80 percent of the company's 1,000,000 customers are very satisfied. Again, 100 customers are surveyed using simple random sampling. The result: 73 percent are very satisfied. Based on these results, should we accept or reject the CEO's hypothesis? Assume a significance level of 0.05. </a:t>
+            </a:r>
+            <a:r>
+              <a:rPr lang="en-IN" dirty="0" smtClean="0"/>
+              <a:t> (One tailed test)</a:t>
+            </a:r>
+          </a:p>
+          <a:p>
+            <a:pPr algn="ctr"/>
+            <a:r>
+              <a:rPr lang="en-IN" dirty="0"/>
+              <a:t>Null hypothesis: P &gt;= 0.80</a:t>
+            </a:r>
+          </a:p>
+          <a:p>
+            <a:pPr algn="ctr">
+              <a:spcAft>
+                <a:spcPts val="1000"/>
+              </a:spcAft>
+            </a:pPr>
+            <a:r>
+              <a:rPr lang="en-IN" dirty="0"/>
+              <a:t>Alternative hypothesis: P &lt; </a:t>
+            </a:r>
+            <a:r>
+              <a:rPr lang="en-IN" dirty="0" smtClean="0"/>
+              <a:t>0.80</a:t>
+            </a:r>
+            <a:endParaRPr lang="en-US" dirty="0"/>
+          </a:p>
+          <a:p>
+            <a:r>
+              <a:rPr lang="en-IN" dirty="0" smtClean="0"/>
+              <a:t>Now we calculate </a:t>
+            </a:r>
+            <a:r>
+              <a:rPr lang="en-IN" dirty="0"/>
+              <a:t>the standard deviation (</a:t>
+            </a:r>
+            <a:r>
+              <a:rPr lang="el-GR" dirty="0"/>
+              <a:t>σ) </a:t>
+            </a:r>
+            <a:r>
+              <a:rPr lang="en-IN" dirty="0"/>
+              <a:t>and compute the z-score test statistic (z). </a:t>
+            </a:r>
+            <a:endParaRPr lang="en-IN" dirty="0" smtClean="0"/>
+          </a:p>
+          <a:p>
+            <a:pPr algn="ctr"/>
+            <a:r>
+              <a:rPr lang="el-GR" dirty="0" smtClean="0"/>
+              <a:t>σ </a:t>
+            </a:r>
+            <a:r>
+              <a:rPr lang="el-GR" dirty="0"/>
+              <a:t>= </a:t>
+            </a:r>
+            <a:r>
+              <a:rPr lang="en-IN" dirty="0" err="1"/>
+              <a:t>sqrt</a:t>
+            </a:r>
+            <a:r>
+              <a:rPr lang="en-IN" dirty="0"/>
+              <a:t>[ P * ( 1 - P ) / n ] = </a:t>
+            </a:r>
+            <a:r>
+              <a:rPr lang="en-IN" dirty="0" err="1"/>
+              <a:t>sqrt</a:t>
+            </a:r>
+            <a:r>
+              <a:rPr lang="en-IN" dirty="0"/>
+              <a:t> [(0.8 * 0.2) / 100] </a:t>
+            </a:r>
+          </a:p>
+          <a:p>
+            <a:pPr algn="ctr"/>
+            <a:r>
+              <a:rPr lang="el-GR" dirty="0"/>
+              <a:t>σ = </a:t>
+            </a:r>
+            <a:r>
+              <a:rPr lang="en-IN" dirty="0" err="1"/>
+              <a:t>sqrt</a:t>
+            </a:r>
+            <a:r>
+              <a:rPr lang="en-IN" dirty="0"/>
+              <a:t>(0.0016) = 0.04</a:t>
+            </a:r>
+          </a:p>
+          <a:p>
+            <a:pPr algn="ctr"/>
+            <a:r>
+              <a:rPr lang="en-IN" dirty="0"/>
+              <a:t>z = (p - P) / </a:t>
+            </a:r>
+            <a:r>
+              <a:rPr lang="el-GR" dirty="0"/>
+              <a:t>σ = (.73 - .80)/0.04 = -1.75</a:t>
+            </a:r>
+          </a:p>
+          <a:p>
+            <a:pPr>
+              <a:spcAft>
+                <a:spcPts val="1000"/>
+              </a:spcAft>
+            </a:pPr>
+            <a:r>
+              <a:rPr lang="en-IN" dirty="0"/>
+              <a:t>where P is the hypothesized value of population proportion in the null hypothesis, p is the sample proportion, and n is the sample size</a:t>
+            </a:r>
+            <a:r>
+              <a:rPr lang="en-IN" dirty="0" smtClean="0"/>
+              <a:t>.</a:t>
+            </a:r>
+          </a:p>
+          <a:p>
+            <a:pPr>
+              <a:spcAft>
+                <a:spcPts val="1000"/>
+              </a:spcAft>
+            </a:pPr>
+            <a:r>
+              <a:rPr lang="en-IN" dirty="0"/>
+              <a:t>Since we have a one-tailed test, the P-value is the probability that the z-score is less than -1.75. We use the Normal Distribution Calculator to find P(z &lt; -1.75) = 0.04. Thus, the P-value = 0.04</a:t>
+            </a:r>
+            <a:r>
+              <a:rPr lang="en-IN" dirty="0" smtClean="0"/>
+              <a:t>.</a:t>
+            </a:r>
+          </a:p>
+          <a:p>
+            <a:pPr>
+              <a:spcAft>
+                <a:spcPts val="1000"/>
+              </a:spcAft>
+            </a:pPr>
+            <a:r>
+              <a:rPr lang="en-IN" dirty="0"/>
+              <a:t>Since the P-value (0.04) is less than the significance level (0.05), we cannot accept the null hypothesis.</a:t>
+            </a:r>
+            <a:endParaRPr lang="en-US" dirty="0" smtClean="0"/>
+          </a:p>
+        </p:txBody>
+      </p:sp>
+    </p:spTree>
+    <p:extLst>
+      <p:ext uri="{BB962C8B-B14F-4D97-AF65-F5344CB8AC3E}">
+        <p14:creationId xmlns:p14="http://schemas.microsoft.com/office/powerpoint/2010/main" val="1876260844"/>
       </p:ext>
     </p:extLst>
   </p:cSld>
@@ -29056,6 +29696,2429 @@
 </file>
 
 <file path=ppt/slides/slide53.xml><?xml version="1.0" encoding="utf-8"?>
+<p:sld xmlns:a="http://schemas.openxmlformats.org/drawingml/2006/main" xmlns:r="http://schemas.openxmlformats.org/officeDocument/2006/relationships" xmlns:p="http://schemas.openxmlformats.org/presentationml/2006/main">
+  <p:cSld>
+    <p:spTree>
+      <p:nvGrpSpPr>
+        <p:cNvPr id="1" name=""/>
+        <p:cNvGrpSpPr/>
+        <p:nvPr/>
+      </p:nvGrpSpPr>
+      <p:grpSpPr>
+        <a:xfrm>
+          <a:off x="0" y="0"/>
+          <a:ext cx="0" cy="0"/>
+          <a:chOff x="0" y="0"/>
+          <a:chExt cx="0" cy="0"/>
+        </a:xfrm>
+      </p:grpSpPr>
+      <p:sp>
+        <p:nvSpPr>
+          <p:cNvPr id="5" name="Title 1"/>
+          <p:cNvSpPr>
+            <a:spLocks noGrp="1"/>
+          </p:cNvSpPr>
+          <p:nvPr>
+            <p:ph type="ctrTitle"/>
+          </p:nvPr>
+        </p:nvSpPr>
+        <p:spPr>
+          <a:xfrm>
+            <a:off x="802783" y="270455"/>
+            <a:ext cx="9796530" cy="711548"/>
+          </a:xfrm>
+        </p:spPr>
+        <p:txBody>
+          <a:bodyPr>
+            <a:normAutofit/>
+          </a:bodyPr>
+          <a:lstStyle/>
+          <a:p>
+            <a:pPr algn="l"/>
+            <a:r>
+              <a:rPr lang="en-US" sz="4000" dirty="0" smtClean="0"/>
+              <a:t>Hypothesis Testing</a:t>
+            </a:r>
+            <a:endParaRPr lang="en-IN" sz="4000" dirty="0"/>
+          </a:p>
+        </p:txBody>
+      </p:sp>
+      <p:cxnSp>
+        <p:nvCxnSpPr>
+          <p:cNvPr id="7" name="Straight Connector 6"/>
+          <p:cNvCxnSpPr/>
+          <p:nvPr/>
+        </p:nvCxnSpPr>
+        <p:spPr>
+          <a:xfrm>
+            <a:off x="914400" y="956255"/>
+            <a:ext cx="10045521" cy="0"/>
+          </a:xfrm>
+          <a:prstGeom prst="line">
+            <a:avLst/>
+          </a:prstGeom>
+          <a:ln>
+            <a:solidFill>
+              <a:schemeClr val="bg1">
+                <a:lumMod val="75000"/>
+              </a:schemeClr>
+            </a:solidFill>
+          </a:ln>
+        </p:spPr>
+        <p:style>
+          <a:lnRef idx="1">
+            <a:schemeClr val="dk1"/>
+          </a:lnRef>
+          <a:fillRef idx="0">
+            <a:schemeClr val="dk1"/>
+          </a:fillRef>
+          <a:effectRef idx="0">
+            <a:schemeClr val="dk1"/>
+          </a:effectRef>
+          <a:fontRef idx="minor">
+            <a:schemeClr val="tx1"/>
+          </a:fontRef>
+        </p:style>
+      </p:cxnSp>
+      <p:sp>
+        <p:nvSpPr>
+          <p:cNvPr id="2" name="TextBox 1"/>
+          <p:cNvSpPr txBox="1"/>
+          <p:nvPr/>
+        </p:nvSpPr>
+        <p:spPr>
+          <a:xfrm>
+            <a:off x="802783" y="1047241"/>
+            <a:ext cx="10646535" cy="5570756"/>
+          </a:xfrm>
+          <a:prstGeom prst="rect">
+            <a:avLst/>
+          </a:prstGeom>
+          <a:noFill/>
+        </p:spPr>
+        <p:txBody>
+          <a:bodyPr wrap="square" rtlCol="0">
+            <a:spAutoFit/>
+          </a:bodyPr>
+          <a:lstStyle/>
+          <a:p>
+            <a:pPr>
+              <a:spcAft>
+                <a:spcPts val="1000"/>
+              </a:spcAft>
+            </a:pPr>
+            <a:r>
+              <a:rPr lang="en-US" b="1" dirty="0" smtClean="0"/>
+              <a:t>Hypothesis Test for a Mean:</a:t>
+            </a:r>
+          </a:p>
+          <a:p>
+            <a:pPr>
+              <a:spcAft>
+                <a:spcPts val="1000"/>
+              </a:spcAft>
+            </a:pPr>
+            <a:r>
+              <a:rPr lang="en-US" b="1" dirty="0" smtClean="0"/>
+              <a:t>General Procedure:</a:t>
+            </a:r>
+          </a:p>
+          <a:p>
+            <a:pPr marL="285750" indent="-285750">
+              <a:buFontTx/>
+              <a:buChar char="-"/>
+            </a:pPr>
+            <a:r>
+              <a:rPr lang="en-IN" dirty="0" smtClean="0"/>
+              <a:t>Compute </a:t>
+            </a:r>
+            <a:r>
+              <a:rPr lang="en-IN" dirty="0"/>
+              <a:t>the standard error (SE) of the sampling </a:t>
+            </a:r>
+            <a:r>
+              <a:rPr lang="en-IN" dirty="0" smtClean="0"/>
+              <a:t>distribution: SE </a:t>
+            </a:r>
+            <a:r>
+              <a:rPr lang="en-IN" dirty="0"/>
+              <a:t>= s * </a:t>
+            </a:r>
+            <a:r>
+              <a:rPr lang="en-IN" dirty="0" err="1"/>
+              <a:t>sqrt</a:t>
+            </a:r>
+            <a:r>
+              <a:rPr lang="en-IN" dirty="0"/>
+              <a:t>{ ( 1/n ) * [ ( N - n ) / ( N - 1 ) ] } </a:t>
+            </a:r>
+          </a:p>
+          <a:p>
+            <a:pPr>
+              <a:spcAft>
+                <a:spcPts val="1000"/>
+              </a:spcAft>
+            </a:pPr>
+            <a:r>
+              <a:rPr lang="en-IN" dirty="0"/>
+              <a:t>where </a:t>
+            </a:r>
+            <a:r>
+              <a:rPr lang="en-IN" i="1" dirty="0"/>
+              <a:t>s</a:t>
+            </a:r>
+            <a:r>
+              <a:rPr lang="en-IN" dirty="0"/>
+              <a:t> is the standard deviation of the sample, N is the population size, and </a:t>
+            </a:r>
+            <a:r>
+              <a:rPr lang="en-IN" i="1" dirty="0"/>
+              <a:t>n</a:t>
+            </a:r>
+            <a:r>
+              <a:rPr lang="en-IN" dirty="0"/>
+              <a:t> is the sample size. </a:t>
+            </a:r>
+            <a:endParaRPr lang="en-IN" i="1" dirty="0" smtClean="0"/>
+          </a:p>
+          <a:p>
+            <a:pPr>
+              <a:spcAft>
+                <a:spcPts val="1000"/>
+              </a:spcAft>
+            </a:pPr>
+            <a:r>
+              <a:rPr lang="en-IN" i="1" dirty="0" smtClean="0"/>
+              <a:t>When </a:t>
+            </a:r>
+            <a:r>
+              <a:rPr lang="en-IN" i="1" dirty="0"/>
+              <a:t>the population size is much larger (at least 20 times larger) than the sample size, the standard error can be approximated by: SE = s / </a:t>
+            </a:r>
+            <a:r>
+              <a:rPr lang="en-IN" i="1" dirty="0" err="1"/>
+              <a:t>sqrt</a:t>
+            </a:r>
+            <a:r>
+              <a:rPr lang="en-IN" i="1" dirty="0"/>
+              <a:t>( n ) </a:t>
+            </a:r>
+            <a:endParaRPr lang="en-IN" dirty="0" smtClean="0"/>
+          </a:p>
+          <a:p>
+            <a:pPr marL="285750" indent="-285750">
+              <a:spcAft>
+                <a:spcPts val="1000"/>
+              </a:spcAft>
+              <a:buFontTx/>
+              <a:buChar char="-"/>
+            </a:pPr>
+            <a:r>
+              <a:rPr lang="en-IN" dirty="0" smtClean="0"/>
+              <a:t>The </a:t>
+            </a:r>
+            <a:r>
+              <a:rPr lang="en-IN" dirty="0"/>
+              <a:t>degrees of freedom (DF) is equal to the sample size (n) minus one. Thus, DF = n - 1</a:t>
+            </a:r>
+            <a:r>
+              <a:rPr lang="en-IN" dirty="0" smtClean="0"/>
+              <a:t>.</a:t>
+            </a:r>
+          </a:p>
+          <a:p>
+            <a:pPr marL="285750" indent="-285750">
+              <a:buFontTx/>
+              <a:buChar char="-"/>
+            </a:pPr>
+            <a:r>
+              <a:rPr lang="en-IN" dirty="0" smtClean="0"/>
+              <a:t>The </a:t>
+            </a:r>
+            <a:r>
+              <a:rPr lang="en-IN" dirty="0"/>
+              <a:t>test statistic is a t statistic (t) defined by the following equation. t = (x - μ) / SE </a:t>
+            </a:r>
+          </a:p>
+          <a:p>
+            <a:pPr>
+              <a:spcAft>
+                <a:spcPts val="1000"/>
+              </a:spcAft>
+            </a:pPr>
+            <a:r>
+              <a:rPr lang="en-IN" dirty="0"/>
+              <a:t>where x is the sample mean, μ is the hypothesized population mean in the null hypothesis, and SE is the standard error</a:t>
+            </a:r>
+            <a:r>
+              <a:rPr lang="en-IN" dirty="0" smtClean="0"/>
+              <a:t>.</a:t>
+            </a:r>
+          </a:p>
+          <a:p>
+            <a:r>
+              <a:rPr lang="en-US" b="1" dirty="0"/>
+              <a:t>Example 1:</a:t>
+            </a:r>
+          </a:p>
+          <a:p>
+            <a:r>
+              <a:rPr lang="en-IN" dirty="0"/>
+              <a:t>An inventor has developed a new, energy-efficient lawn mower engine. He claims that the engine will run continuously for 5 hours (300 minutes) on a single gallon of regular gasoline. From his stock of 2000 engines, the inventor selects a simple random sample of 50 engines for testing. The engines run for an average of 295 minutes, with a standard deviation of 20 minutes. Test the null hypothesis that the mean run time is 300 minutes against the alternative hypothesis that the mean run time is not 300 minutes. Use a 0.05 level of significance. (Assume that run times for the population of engines are normally distributed.) </a:t>
+            </a:r>
+          </a:p>
+        </p:txBody>
+      </p:sp>
+    </p:spTree>
+    <p:extLst>
+      <p:ext uri="{BB962C8B-B14F-4D97-AF65-F5344CB8AC3E}">
+        <p14:creationId xmlns:p14="http://schemas.microsoft.com/office/powerpoint/2010/main" val="2972649139"/>
+      </p:ext>
+    </p:extLst>
+  </p:cSld>
+  <p:clrMapOvr>
+    <a:masterClrMapping/>
+  </p:clrMapOvr>
+  <p:timing>
+    <p:tnLst>
+      <p:par>
+        <p:cTn id="1" dur="indefinite" restart="never" nodeType="tmRoot"/>
+      </p:par>
+    </p:tnLst>
+  </p:timing>
+</p:sld>
+</file>
+
+<file path=ppt/slides/slide54.xml><?xml version="1.0" encoding="utf-8"?>
+<p:sld xmlns:a="http://schemas.openxmlformats.org/drawingml/2006/main" xmlns:r="http://schemas.openxmlformats.org/officeDocument/2006/relationships" xmlns:p="http://schemas.openxmlformats.org/presentationml/2006/main">
+  <p:cSld>
+    <p:spTree>
+      <p:nvGrpSpPr>
+        <p:cNvPr id="1" name=""/>
+        <p:cNvGrpSpPr/>
+        <p:nvPr/>
+      </p:nvGrpSpPr>
+      <p:grpSpPr>
+        <a:xfrm>
+          <a:off x="0" y="0"/>
+          <a:ext cx="0" cy="0"/>
+          <a:chOff x="0" y="0"/>
+          <a:chExt cx="0" cy="0"/>
+        </a:xfrm>
+      </p:grpSpPr>
+      <p:sp>
+        <p:nvSpPr>
+          <p:cNvPr id="5" name="Title 1"/>
+          <p:cNvSpPr>
+            <a:spLocks noGrp="1"/>
+          </p:cNvSpPr>
+          <p:nvPr>
+            <p:ph type="ctrTitle"/>
+          </p:nvPr>
+        </p:nvSpPr>
+        <p:spPr>
+          <a:xfrm>
+            <a:off x="802783" y="270455"/>
+            <a:ext cx="9796530" cy="711548"/>
+          </a:xfrm>
+        </p:spPr>
+        <p:txBody>
+          <a:bodyPr>
+            <a:normAutofit/>
+          </a:bodyPr>
+          <a:lstStyle/>
+          <a:p>
+            <a:pPr algn="l"/>
+            <a:r>
+              <a:rPr lang="en-US" sz="4000" dirty="0" smtClean="0"/>
+              <a:t>Hypothesis Testing</a:t>
+            </a:r>
+            <a:endParaRPr lang="en-IN" sz="4000" dirty="0"/>
+          </a:p>
+        </p:txBody>
+      </p:sp>
+      <p:cxnSp>
+        <p:nvCxnSpPr>
+          <p:cNvPr id="7" name="Straight Connector 6"/>
+          <p:cNvCxnSpPr/>
+          <p:nvPr/>
+        </p:nvCxnSpPr>
+        <p:spPr>
+          <a:xfrm>
+            <a:off x="914400" y="956255"/>
+            <a:ext cx="10045521" cy="0"/>
+          </a:xfrm>
+          <a:prstGeom prst="line">
+            <a:avLst/>
+          </a:prstGeom>
+          <a:ln>
+            <a:solidFill>
+              <a:schemeClr val="bg1">
+                <a:lumMod val="75000"/>
+              </a:schemeClr>
+            </a:solidFill>
+          </a:ln>
+        </p:spPr>
+        <p:style>
+          <a:lnRef idx="1">
+            <a:schemeClr val="dk1"/>
+          </a:lnRef>
+          <a:fillRef idx="0">
+            <a:schemeClr val="dk1"/>
+          </a:fillRef>
+          <a:effectRef idx="0">
+            <a:schemeClr val="dk1"/>
+          </a:effectRef>
+          <a:fontRef idx="minor">
+            <a:schemeClr val="tx1"/>
+          </a:fontRef>
+        </p:style>
+      </p:cxnSp>
+      <p:sp>
+        <p:nvSpPr>
+          <p:cNvPr id="2" name="TextBox 1"/>
+          <p:cNvSpPr txBox="1"/>
+          <p:nvPr/>
+        </p:nvSpPr>
+        <p:spPr>
+          <a:xfrm>
+            <a:off x="802783" y="1047241"/>
+            <a:ext cx="10646535" cy="5483552"/>
+          </a:xfrm>
+          <a:prstGeom prst="rect">
+            <a:avLst/>
+          </a:prstGeom>
+          <a:noFill/>
+        </p:spPr>
+        <p:txBody>
+          <a:bodyPr wrap="square" rtlCol="0">
+            <a:spAutoFit/>
+          </a:bodyPr>
+          <a:lstStyle/>
+          <a:p>
+            <a:pPr>
+              <a:spcAft>
+                <a:spcPts val="1000"/>
+              </a:spcAft>
+            </a:pPr>
+            <a:r>
+              <a:rPr lang="en-US" b="1" dirty="0" smtClean="0"/>
+              <a:t>Hypothesis Test for a Mean:</a:t>
+            </a:r>
+            <a:endParaRPr lang="en-US" dirty="0" smtClean="0"/>
+          </a:p>
+          <a:p>
+            <a:r>
+              <a:rPr lang="en-US" b="1" dirty="0" smtClean="0"/>
+              <a:t>Example 1:</a:t>
+            </a:r>
+          </a:p>
+          <a:p>
+            <a:endParaRPr lang="en-US" dirty="0" smtClean="0"/>
+          </a:p>
+          <a:p>
+            <a:pPr algn="ctr"/>
+            <a:r>
+              <a:rPr lang="en-IN" dirty="0"/>
+              <a:t>Null hypothesis: </a:t>
+            </a:r>
+            <a:r>
+              <a:rPr lang="el-GR" dirty="0"/>
+              <a:t>μ = 300</a:t>
+            </a:r>
+          </a:p>
+          <a:p>
+            <a:pPr algn="ctr"/>
+            <a:r>
+              <a:rPr lang="en-IN" dirty="0"/>
+              <a:t>Alternative hypothesis: </a:t>
+            </a:r>
+            <a:r>
+              <a:rPr lang="el-GR" dirty="0"/>
+              <a:t>μ ≠ 300</a:t>
+            </a:r>
+          </a:p>
+          <a:p>
+            <a:endParaRPr lang="pt-BR" dirty="0" smtClean="0"/>
+          </a:p>
+          <a:p>
+            <a:r>
+              <a:rPr lang="pt-BR" dirty="0" smtClean="0"/>
+              <a:t>Calculating Standard error and t-statistic:</a:t>
+            </a:r>
+          </a:p>
+          <a:p>
+            <a:pPr algn="ctr"/>
+            <a:r>
+              <a:rPr lang="pt-BR" dirty="0" smtClean="0"/>
+              <a:t>SE </a:t>
+            </a:r>
+            <a:r>
+              <a:rPr lang="pt-BR" dirty="0"/>
+              <a:t>= s / sqrt(n) = 20 / sqrt(50) = 20/7.07 = 2.83</a:t>
+            </a:r>
+          </a:p>
+          <a:p>
+            <a:pPr algn="ctr"/>
+            <a:r>
+              <a:rPr lang="pt-BR" dirty="0"/>
+              <a:t>DF = n - 1 = 50 - 1 = 49</a:t>
+            </a:r>
+          </a:p>
+          <a:p>
+            <a:pPr algn="ctr"/>
+            <a:r>
+              <a:rPr lang="pt-BR" dirty="0"/>
+              <a:t>t = (x - μ) / SE = (295 - 300)/2.83 = -1.77</a:t>
+            </a:r>
+          </a:p>
+          <a:p>
+            <a:endParaRPr lang="en-IN" dirty="0" smtClean="0"/>
+          </a:p>
+          <a:p>
+            <a:r>
+              <a:rPr lang="en-IN" dirty="0" smtClean="0"/>
+              <a:t>where </a:t>
+            </a:r>
+            <a:r>
+              <a:rPr lang="en-IN" dirty="0"/>
+              <a:t>s is the standard deviation of the sample, x is the sample mean, μ is the hypothesized population mean, and n is the sample size</a:t>
+            </a:r>
+            <a:r>
+              <a:rPr lang="en-IN" dirty="0" smtClean="0"/>
+              <a:t>.</a:t>
+            </a:r>
+          </a:p>
+          <a:p>
+            <a:r>
+              <a:rPr lang="en-IN" dirty="0"/>
+              <a:t>Since we have a two-tailed test, the P-value is the probability that the t statistic having 49 degrees of freedom is less than -1.77 or greater than 1.77.</a:t>
+            </a:r>
+          </a:p>
+          <a:p>
+            <a:r>
+              <a:rPr lang="en-IN" dirty="0"/>
+              <a:t>We use the t Distribution Calculator to find P(t &lt; -1.77) = 0.04, and P(t &gt; 1.77) = 0.04. Thus, the P-value = 0.04 + 0.04 = 0.08</a:t>
+            </a:r>
+            <a:r>
+              <a:rPr lang="en-IN" dirty="0" smtClean="0"/>
+              <a:t>.</a:t>
+            </a:r>
+          </a:p>
+          <a:p>
+            <a:endParaRPr lang="en-US" dirty="0"/>
+          </a:p>
+          <a:p>
+            <a:r>
+              <a:rPr lang="en-IN" dirty="0"/>
+              <a:t>Since the P-value (0.08) is greater than the significance level (0.05), we cannot reject the null </a:t>
+            </a:r>
+            <a:r>
+              <a:rPr lang="en-IN" dirty="0" smtClean="0"/>
+              <a:t>hypothesis.</a:t>
+            </a:r>
+            <a:endParaRPr lang="en-US" dirty="0" smtClean="0"/>
+          </a:p>
+        </p:txBody>
+      </p:sp>
+    </p:spTree>
+    <p:extLst>
+      <p:ext uri="{BB962C8B-B14F-4D97-AF65-F5344CB8AC3E}">
+        <p14:creationId xmlns:p14="http://schemas.microsoft.com/office/powerpoint/2010/main" val="121440525"/>
+      </p:ext>
+    </p:extLst>
+  </p:cSld>
+  <p:clrMapOvr>
+    <a:masterClrMapping/>
+  </p:clrMapOvr>
+  <p:timing>
+    <p:tnLst>
+      <p:par>
+        <p:cTn id="1" dur="indefinite" restart="never" nodeType="tmRoot"/>
+      </p:par>
+    </p:tnLst>
+  </p:timing>
+</p:sld>
+</file>
+
+<file path=ppt/slides/slide55.xml><?xml version="1.0" encoding="utf-8"?>
+<p:sld xmlns:a="http://schemas.openxmlformats.org/drawingml/2006/main" xmlns:r="http://schemas.openxmlformats.org/officeDocument/2006/relationships" xmlns:p="http://schemas.openxmlformats.org/presentationml/2006/main">
+  <p:cSld>
+    <p:spTree>
+      <p:nvGrpSpPr>
+        <p:cNvPr id="1" name=""/>
+        <p:cNvGrpSpPr/>
+        <p:nvPr/>
+      </p:nvGrpSpPr>
+      <p:grpSpPr>
+        <a:xfrm>
+          <a:off x="0" y="0"/>
+          <a:ext cx="0" cy="0"/>
+          <a:chOff x="0" y="0"/>
+          <a:chExt cx="0" cy="0"/>
+        </a:xfrm>
+      </p:grpSpPr>
+      <p:sp>
+        <p:nvSpPr>
+          <p:cNvPr id="5" name="Title 1"/>
+          <p:cNvSpPr>
+            <a:spLocks noGrp="1"/>
+          </p:cNvSpPr>
+          <p:nvPr>
+            <p:ph type="ctrTitle"/>
+          </p:nvPr>
+        </p:nvSpPr>
+        <p:spPr>
+          <a:xfrm>
+            <a:off x="802783" y="270455"/>
+            <a:ext cx="9796530" cy="711548"/>
+          </a:xfrm>
+        </p:spPr>
+        <p:txBody>
+          <a:bodyPr>
+            <a:normAutofit/>
+          </a:bodyPr>
+          <a:lstStyle/>
+          <a:p>
+            <a:pPr algn="l"/>
+            <a:r>
+              <a:rPr lang="en-US" sz="4000" dirty="0" smtClean="0"/>
+              <a:t>Hypothesis Testing</a:t>
+            </a:r>
+            <a:endParaRPr lang="en-IN" sz="4000" dirty="0"/>
+          </a:p>
+        </p:txBody>
+      </p:sp>
+      <p:cxnSp>
+        <p:nvCxnSpPr>
+          <p:cNvPr id="7" name="Straight Connector 6"/>
+          <p:cNvCxnSpPr/>
+          <p:nvPr/>
+        </p:nvCxnSpPr>
+        <p:spPr>
+          <a:xfrm>
+            <a:off x="914400" y="956255"/>
+            <a:ext cx="10045521" cy="0"/>
+          </a:xfrm>
+          <a:prstGeom prst="line">
+            <a:avLst/>
+          </a:prstGeom>
+          <a:ln>
+            <a:solidFill>
+              <a:schemeClr val="bg1">
+                <a:lumMod val="75000"/>
+              </a:schemeClr>
+            </a:solidFill>
+          </a:ln>
+        </p:spPr>
+        <p:style>
+          <a:lnRef idx="1">
+            <a:schemeClr val="dk1"/>
+          </a:lnRef>
+          <a:fillRef idx="0">
+            <a:schemeClr val="dk1"/>
+          </a:fillRef>
+          <a:effectRef idx="0">
+            <a:schemeClr val="dk1"/>
+          </a:effectRef>
+          <a:fontRef idx="minor">
+            <a:schemeClr val="tx1"/>
+          </a:fontRef>
+        </p:style>
+      </p:cxnSp>
+      <p:sp>
+        <p:nvSpPr>
+          <p:cNvPr id="2" name="TextBox 1"/>
+          <p:cNvSpPr txBox="1"/>
+          <p:nvPr/>
+        </p:nvSpPr>
+        <p:spPr>
+          <a:xfrm>
+            <a:off x="802783" y="1047241"/>
+            <a:ext cx="10646535" cy="5627181"/>
+          </a:xfrm>
+          <a:prstGeom prst="rect">
+            <a:avLst/>
+          </a:prstGeom>
+          <a:noFill/>
+        </p:spPr>
+        <p:txBody>
+          <a:bodyPr wrap="square" rtlCol="0">
+            <a:spAutoFit/>
+          </a:bodyPr>
+          <a:lstStyle/>
+          <a:p>
+            <a:pPr>
+              <a:spcAft>
+                <a:spcPts val="1000"/>
+              </a:spcAft>
+            </a:pPr>
+            <a:r>
+              <a:rPr lang="en-US" b="1" dirty="0" smtClean="0"/>
+              <a:t>Hypothesis Test for a Mean:</a:t>
+            </a:r>
+            <a:endParaRPr lang="en-US" dirty="0" smtClean="0"/>
+          </a:p>
+          <a:p>
+            <a:r>
+              <a:rPr lang="en-US" b="1" dirty="0" smtClean="0"/>
+              <a:t>Example 2:</a:t>
+            </a:r>
+          </a:p>
+          <a:p>
+            <a:pPr>
+              <a:spcAft>
+                <a:spcPts val="1000"/>
+              </a:spcAft>
+            </a:pPr>
+            <a:r>
+              <a:rPr lang="en-IN" sz="1700" dirty="0"/>
+              <a:t>Bon Air Elementary School has 1000 students. The principal of the school thinks that the average IQ of students at Bon Air is at least 110. To prove her point, she administers an IQ test to 20 randomly selected students. Among the sampled students, the average IQ is 108 with a standard deviation of 10. Based on these results, should the principal accept or reject her original hypothesis? Assume a significance level of 0.01. (Assume that test scores in the population of engines are normally distributed.) </a:t>
+            </a:r>
+            <a:endParaRPr lang="en-US" sz="1700" dirty="0"/>
+          </a:p>
+          <a:p>
+            <a:pPr algn="ctr"/>
+            <a:r>
+              <a:rPr lang="en-IN" sz="1700" dirty="0"/>
+              <a:t>Null hypothesis: </a:t>
+            </a:r>
+            <a:r>
+              <a:rPr lang="el-GR" sz="1700" dirty="0"/>
+              <a:t>μ &gt;= 110</a:t>
+            </a:r>
+          </a:p>
+          <a:p>
+            <a:pPr algn="ctr"/>
+            <a:r>
+              <a:rPr lang="en-IN" sz="1700" dirty="0"/>
+              <a:t>Alternative hypothesis: </a:t>
+            </a:r>
+            <a:r>
+              <a:rPr lang="el-GR" sz="1700" dirty="0"/>
+              <a:t>μ &lt; 110</a:t>
+            </a:r>
+          </a:p>
+          <a:p>
+            <a:r>
+              <a:rPr lang="en-IN" sz="1700" dirty="0"/>
+              <a:t>Note that these hypotheses constitute a one-tailed test. The null hypothesis will be rejected if the sample mean is too small</a:t>
+            </a:r>
+            <a:r>
+              <a:rPr lang="en-IN" sz="1700" dirty="0" smtClean="0"/>
+              <a:t>.</a:t>
+            </a:r>
+          </a:p>
+          <a:p>
+            <a:pPr algn="ctr"/>
+            <a:r>
+              <a:rPr lang="pt-BR" sz="1700" dirty="0"/>
+              <a:t>SE = s / sqrt(n) = 10 / sqrt(20) = 10/4.472 = 2.236</a:t>
+            </a:r>
+          </a:p>
+          <a:p>
+            <a:pPr algn="ctr"/>
+            <a:r>
+              <a:rPr lang="pt-BR" sz="1700" dirty="0"/>
+              <a:t>DF = n - 1 = 20 - 1 = 19</a:t>
+            </a:r>
+          </a:p>
+          <a:p>
+            <a:pPr algn="ctr"/>
+            <a:r>
+              <a:rPr lang="pt-BR" sz="1700" dirty="0"/>
+              <a:t>t = (x - μ) / SE = (108 - 110)/2.236 = -</a:t>
+            </a:r>
+            <a:r>
+              <a:rPr lang="pt-BR" sz="1700" dirty="0" smtClean="0"/>
+              <a:t>0.894</a:t>
+            </a:r>
+            <a:endParaRPr lang="en-US" sz="1700" dirty="0" smtClean="0"/>
+          </a:p>
+          <a:p>
+            <a:r>
+              <a:rPr lang="en-IN" sz="1700" dirty="0"/>
+              <a:t>where s is the standard deviation of the sample, x is the sample mean, μ is the hypothesized population mean, and n is the sample size</a:t>
+            </a:r>
+            <a:r>
+              <a:rPr lang="en-IN" sz="1700" dirty="0" smtClean="0"/>
+              <a:t>.</a:t>
+            </a:r>
+            <a:endParaRPr lang="en-US" sz="1700" dirty="0" smtClean="0"/>
+          </a:p>
+          <a:p>
+            <a:r>
+              <a:rPr lang="en-IN" sz="1700" dirty="0"/>
+              <a:t>The observed sample mean produced a t statistic test statistic of -0.894. We use the t Distribution Calculator to find P(t &lt; -0.894) = 0.19. This means we would expect to find a sample mean of 108 or smaller in 19 percent of our samples, if the true population IQ were 110. Thus the P-value in this analysis is 0.19</a:t>
+            </a:r>
+            <a:r>
+              <a:rPr lang="en-IN" sz="1700" dirty="0" smtClean="0"/>
+              <a:t>.</a:t>
+            </a:r>
+            <a:endParaRPr lang="en-US" sz="1700" dirty="0"/>
+          </a:p>
+          <a:p>
+            <a:r>
+              <a:rPr lang="en-IN" sz="1700" dirty="0"/>
+              <a:t>Since the P-value (0.19) is greater than the significance level (0.01), we cannot reject the null hypothesis</a:t>
+            </a:r>
+            <a:r>
+              <a:rPr lang="en-IN" dirty="0"/>
+              <a:t>.</a:t>
+            </a:r>
+            <a:endParaRPr lang="en-US" dirty="0" smtClean="0"/>
+          </a:p>
+        </p:txBody>
+      </p:sp>
+    </p:spTree>
+    <p:extLst>
+      <p:ext uri="{BB962C8B-B14F-4D97-AF65-F5344CB8AC3E}">
+        <p14:creationId xmlns:p14="http://schemas.microsoft.com/office/powerpoint/2010/main" val="2502831363"/>
+      </p:ext>
+    </p:extLst>
+  </p:cSld>
+  <p:clrMapOvr>
+    <a:masterClrMapping/>
+  </p:clrMapOvr>
+  <p:timing>
+    <p:tnLst>
+      <p:par>
+        <p:cTn id="1" dur="indefinite" restart="never" nodeType="tmRoot"/>
+      </p:par>
+    </p:tnLst>
+  </p:timing>
+</p:sld>
+</file>
+
+<file path=ppt/slides/slide56.xml><?xml version="1.0" encoding="utf-8"?>
+<p:sld xmlns:a="http://schemas.openxmlformats.org/drawingml/2006/main" xmlns:r="http://schemas.openxmlformats.org/officeDocument/2006/relationships" xmlns:p="http://schemas.openxmlformats.org/presentationml/2006/main">
+  <p:cSld>
+    <p:spTree>
+      <p:nvGrpSpPr>
+        <p:cNvPr id="1" name=""/>
+        <p:cNvGrpSpPr/>
+        <p:nvPr/>
+      </p:nvGrpSpPr>
+      <p:grpSpPr>
+        <a:xfrm>
+          <a:off x="0" y="0"/>
+          <a:ext cx="0" cy="0"/>
+          <a:chOff x="0" y="0"/>
+          <a:chExt cx="0" cy="0"/>
+        </a:xfrm>
+      </p:grpSpPr>
+      <p:sp>
+        <p:nvSpPr>
+          <p:cNvPr id="5" name="Title 1"/>
+          <p:cNvSpPr>
+            <a:spLocks noGrp="1"/>
+          </p:cNvSpPr>
+          <p:nvPr>
+            <p:ph type="ctrTitle"/>
+          </p:nvPr>
+        </p:nvSpPr>
+        <p:spPr>
+          <a:xfrm>
+            <a:off x="802783" y="270455"/>
+            <a:ext cx="9796530" cy="711548"/>
+          </a:xfrm>
+        </p:spPr>
+        <p:txBody>
+          <a:bodyPr>
+            <a:normAutofit/>
+          </a:bodyPr>
+          <a:lstStyle/>
+          <a:p>
+            <a:pPr algn="l"/>
+            <a:r>
+              <a:rPr lang="en-US" sz="4000" dirty="0" smtClean="0"/>
+              <a:t>Hypothesis Testing</a:t>
+            </a:r>
+            <a:endParaRPr lang="en-IN" sz="4000" dirty="0"/>
+          </a:p>
+        </p:txBody>
+      </p:sp>
+      <p:cxnSp>
+        <p:nvCxnSpPr>
+          <p:cNvPr id="7" name="Straight Connector 6"/>
+          <p:cNvCxnSpPr/>
+          <p:nvPr/>
+        </p:nvCxnSpPr>
+        <p:spPr>
+          <a:xfrm>
+            <a:off x="914400" y="956255"/>
+            <a:ext cx="10045521" cy="0"/>
+          </a:xfrm>
+          <a:prstGeom prst="line">
+            <a:avLst/>
+          </a:prstGeom>
+          <a:ln>
+            <a:solidFill>
+              <a:schemeClr val="bg1">
+                <a:lumMod val="75000"/>
+              </a:schemeClr>
+            </a:solidFill>
+          </a:ln>
+        </p:spPr>
+        <p:style>
+          <a:lnRef idx="1">
+            <a:schemeClr val="dk1"/>
+          </a:lnRef>
+          <a:fillRef idx="0">
+            <a:schemeClr val="dk1"/>
+          </a:fillRef>
+          <a:effectRef idx="0">
+            <a:schemeClr val="dk1"/>
+          </a:effectRef>
+          <a:fontRef idx="minor">
+            <a:schemeClr val="tx1"/>
+          </a:fontRef>
+        </p:style>
+      </p:cxnSp>
+      <p:sp>
+        <p:nvSpPr>
+          <p:cNvPr id="2" name="TextBox 1"/>
+          <p:cNvSpPr txBox="1"/>
+          <p:nvPr/>
+        </p:nvSpPr>
+        <p:spPr>
+          <a:xfrm>
+            <a:off x="802783" y="1047241"/>
+            <a:ext cx="10646535" cy="4867999"/>
+          </a:xfrm>
+          <a:prstGeom prst="rect">
+            <a:avLst/>
+          </a:prstGeom>
+          <a:noFill/>
+        </p:spPr>
+        <p:txBody>
+          <a:bodyPr wrap="square" rtlCol="0">
+            <a:spAutoFit/>
+          </a:bodyPr>
+          <a:lstStyle/>
+          <a:p>
+            <a:pPr>
+              <a:spcAft>
+                <a:spcPts val="1000"/>
+              </a:spcAft>
+            </a:pPr>
+            <a:r>
+              <a:rPr lang="en-US" b="1" dirty="0" smtClean="0"/>
+              <a:t>Hypothesis Test difference between Means:</a:t>
+            </a:r>
+          </a:p>
+          <a:p>
+            <a:pPr>
+              <a:spcAft>
+                <a:spcPts val="1000"/>
+              </a:spcAft>
+            </a:pPr>
+            <a:r>
+              <a:rPr lang="en-IN" dirty="0"/>
+              <a:t>The test procedure, called the </a:t>
+            </a:r>
+            <a:r>
+              <a:rPr lang="en-IN" b="1" dirty="0"/>
+              <a:t>two-sample t-test</a:t>
+            </a:r>
+            <a:r>
+              <a:rPr lang="en-IN" dirty="0"/>
+              <a:t>, </a:t>
+            </a:r>
+            <a:endParaRPr lang="en-IN" dirty="0" smtClean="0"/>
+          </a:p>
+          <a:p>
+            <a:r>
+              <a:rPr lang="en-IN" dirty="0"/>
+              <a:t>When the null hypothesis states that there is no difference between the two population means (i.e., d = 0), the null and alternative hypothesis are often stated in the following form.</a:t>
+            </a:r>
+          </a:p>
+          <a:p>
+            <a:pPr algn="ctr"/>
+            <a:r>
+              <a:rPr lang="en-IN" dirty="0" err="1"/>
+              <a:t>H</a:t>
+            </a:r>
+            <a:r>
+              <a:rPr lang="en-IN" baseline="-25000" dirty="0" err="1"/>
+              <a:t>o</a:t>
+            </a:r>
+            <a:r>
+              <a:rPr lang="en-IN" dirty="0"/>
+              <a:t>: μ</a:t>
+            </a:r>
+            <a:r>
+              <a:rPr lang="en-IN" baseline="-25000" dirty="0"/>
+              <a:t>1</a:t>
+            </a:r>
+            <a:r>
+              <a:rPr lang="en-IN" dirty="0"/>
+              <a:t> = μ</a:t>
+            </a:r>
+            <a:r>
+              <a:rPr lang="en-IN" baseline="-25000" dirty="0"/>
+              <a:t>2</a:t>
+            </a:r>
+            <a:endParaRPr lang="en-IN" dirty="0"/>
+          </a:p>
+          <a:p>
+            <a:pPr algn="ctr">
+              <a:spcAft>
+                <a:spcPts val="1000"/>
+              </a:spcAft>
+            </a:pPr>
+            <a:r>
+              <a:rPr lang="en-IN" dirty="0"/>
+              <a:t>H</a:t>
+            </a:r>
+            <a:r>
+              <a:rPr lang="en-IN" baseline="-25000" dirty="0"/>
+              <a:t>a</a:t>
+            </a:r>
+            <a:r>
+              <a:rPr lang="en-IN" dirty="0"/>
+              <a:t>: μ</a:t>
+            </a:r>
+            <a:r>
+              <a:rPr lang="en-IN" baseline="-25000" dirty="0"/>
+              <a:t>1</a:t>
+            </a:r>
+            <a:r>
+              <a:rPr lang="en-IN" dirty="0"/>
+              <a:t> ≠ μ</a:t>
+            </a:r>
+            <a:r>
+              <a:rPr lang="en-IN" baseline="-25000" dirty="0"/>
+              <a:t>2</a:t>
+            </a:r>
+            <a:r>
+              <a:rPr lang="en-IN" dirty="0"/>
+              <a:t> </a:t>
+            </a:r>
+          </a:p>
+          <a:p>
+            <a:pPr>
+              <a:spcAft>
+                <a:spcPts val="1000"/>
+              </a:spcAft>
+            </a:pPr>
+            <a:r>
+              <a:rPr lang="en-IN" dirty="0" smtClean="0"/>
+              <a:t>Standard Error SE </a:t>
+            </a:r>
+            <a:r>
+              <a:rPr lang="en-IN" dirty="0"/>
+              <a:t>= </a:t>
+            </a:r>
+            <a:r>
+              <a:rPr lang="en-IN" dirty="0" err="1"/>
+              <a:t>sqrt</a:t>
+            </a:r>
+            <a:r>
+              <a:rPr lang="en-IN" dirty="0"/>
+              <a:t>[ (s</a:t>
+            </a:r>
+            <a:r>
+              <a:rPr lang="en-IN" baseline="-25000" dirty="0"/>
+              <a:t>1</a:t>
+            </a:r>
+            <a:r>
+              <a:rPr lang="en-IN" baseline="30000" dirty="0"/>
+              <a:t>2</a:t>
+            </a:r>
+            <a:r>
+              <a:rPr lang="en-IN" dirty="0"/>
+              <a:t>/n</a:t>
+            </a:r>
+            <a:r>
+              <a:rPr lang="en-IN" baseline="-25000" dirty="0"/>
+              <a:t>1</a:t>
+            </a:r>
+            <a:r>
+              <a:rPr lang="en-IN" dirty="0"/>
+              <a:t>) + (s</a:t>
+            </a:r>
+            <a:r>
+              <a:rPr lang="en-IN" baseline="-25000" dirty="0"/>
+              <a:t>2</a:t>
+            </a:r>
+            <a:r>
+              <a:rPr lang="en-IN" baseline="30000" dirty="0"/>
+              <a:t>2</a:t>
+            </a:r>
+            <a:r>
+              <a:rPr lang="en-IN" dirty="0"/>
+              <a:t>/n</a:t>
+            </a:r>
+            <a:r>
+              <a:rPr lang="en-IN" baseline="-25000" dirty="0"/>
+              <a:t>2</a:t>
+            </a:r>
+            <a:r>
+              <a:rPr lang="en-IN" dirty="0"/>
+              <a:t>) ] </a:t>
+            </a:r>
+            <a:endParaRPr lang="en-IN" dirty="0" smtClean="0"/>
+          </a:p>
+          <a:p>
+            <a:pPr>
+              <a:spcAft>
+                <a:spcPts val="1000"/>
+              </a:spcAft>
+            </a:pPr>
+            <a:r>
+              <a:rPr lang="pt-BR" dirty="0"/>
+              <a:t>DF = (s</a:t>
+            </a:r>
+            <a:r>
+              <a:rPr lang="pt-BR" baseline="-25000" dirty="0"/>
+              <a:t>1</a:t>
+            </a:r>
+            <a:r>
+              <a:rPr lang="pt-BR" baseline="30000" dirty="0"/>
+              <a:t>2</a:t>
+            </a:r>
+            <a:r>
+              <a:rPr lang="pt-BR" dirty="0"/>
+              <a:t>/n</a:t>
+            </a:r>
+            <a:r>
+              <a:rPr lang="pt-BR" baseline="-25000" dirty="0"/>
+              <a:t>1</a:t>
+            </a:r>
+            <a:r>
+              <a:rPr lang="pt-BR" dirty="0"/>
+              <a:t> + s</a:t>
+            </a:r>
+            <a:r>
+              <a:rPr lang="pt-BR" baseline="-25000" dirty="0"/>
+              <a:t>2</a:t>
+            </a:r>
+            <a:r>
+              <a:rPr lang="pt-BR" baseline="30000" dirty="0"/>
+              <a:t>2</a:t>
+            </a:r>
+            <a:r>
+              <a:rPr lang="pt-BR" dirty="0"/>
+              <a:t>/n</a:t>
+            </a:r>
+            <a:r>
+              <a:rPr lang="pt-BR" baseline="-25000" dirty="0"/>
+              <a:t>2</a:t>
+            </a:r>
+            <a:r>
+              <a:rPr lang="pt-BR" dirty="0"/>
+              <a:t>)</a:t>
+            </a:r>
+            <a:r>
+              <a:rPr lang="pt-BR" baseline="30000" dirty="0"/>
+              <a:t>2</a:t>
+            </a:r>
+            <a:r>
+              <a:rPr lang="pt-BR" dirty="0"/>
+              <a:t> / { [ (s</a:t>
+            </a:r>
+            <a:r>
+              <a:rPr lang="pt-BR" baseline="-25000" dirty="0"/>
+              <a:t>1</a:t>
+            </a:r>
+            <a:r>
+              <a:rPr lang="pt-BR" baseline="30000" dirty="0"/>
+              <a:t>2</a:t>
+            </a:r>
+            <a:r>
+              <a:rPr lang="pt-BR" dirty="0"/>
+              <a:t> / n</a:t>
+            </a:r>
+            <a:r>
+              <a:rPr lang="pt-BR" baseline="-25000" dirty="0"/>
+              <a:t>1</a:t>
+            </a:r>
+            <a:r>
+              <a:rPr lang="pt-BR" dirty="0"/>
+              <a:t>)</a:t>
+            </a:r>
+            <a:r>
+              <a:rPr lang="pt-BR" baseline="30000" dirty="0"/>
+              <a:t>2</a:t>
+            </a:r>
+            <a:r>
+              <a:rPr lang="pt-BR" dirty="0"/>
+              <a:t> / (n</a:t>
+            </a:r>
+            <a:r>
+              <a:rPr lang="pt-BR" baseline="-25000" dirty="0"/>
+              <a:t>1</a:t>
+            </a:r>
+            <a:r>
+              <a:rPr lang="pt-BR" dirty="0"/>
+              <a:t> - 1) ] + [ (s</a:t>
+            </a:r>
+            <a:r>
+              <a:rPr lang="pt-BR" baseline="-25000" dirty="0"/>
+              <a:t>2</a:t>
+            </a:r>
+            <a:r>
+              <a:rPr lang="pt-BR" baseline="30000" dirty="0"/>
+              <a:t>2</a:t>
+            </a:r>
+            <a:r>
+              <a:rPr lang="pt-BR" dirty="0"/>
+              <a:t> / n</a:t>
+            </a:r>
+            <a:r>
+              <a:rPr lang="pt-BR" baseline="-25000" dirty="0"/>
+              <a:t>2</a:t>
+            </a:r>
+            <a:r>
+              <a:rPr lang="pt-BR" dirty="0"/>
+              <a:t>)</a:t>
+            </a:r>
+            <a:r>
+              <a:rPr lang="pt-BR" baseline="30000" dirty="0"/>
+              <a:t>2</a:t>
+            </a:r>
+            <a:r>
+              <a:rPr lang="pt-BR" dirty="0"/>
+              <a:t> / (n</a:t>
+            </a:r>
+            <a:r>
+              <a:rPr lang="pt-BR" baseline="-25000" dirty="0"/>
+              <a:t>2</a:t>
+            </a:r>
+            <a:r>
+              <a:rPr lang="pt-BR" dirty="0"/>
+              <a:t> - 1) ] } </a:t>
+            </a:r>
+            <a:endParaRPr lang="pt-BR" dirty="0" smtClean="0"/>
+          </a:p>
+          <a:p>
+            <a:pPr>
+              <a:spcAft>
+                <a:spcPts val="1000"/>
+              </a:spcAft>
+            </a:pPr>
+            <a:r>
+              <a:rPr lang="en-IN" dirty="0"/>
+              <a:t>If DF does not compute to an integer, round it off to the nearest whole number. Some texts suggest that the degrees of freedom can be approximated by the smaller of n</a:t>
+            </a:r>
+            <a:r>
+              <a:rPr lang="en-IN" baseline="-25000" dirty="0"/>
+              <a:t>1</a:t>
+            </a:r>
+            <a:r>
+              <a:rPr lang="en-IN" dirty="0"/>
+              <a:t> - 1 and n</a:t>
+            </a:r>
+            <a:r>
+              <a:rPr lang="en-IN" baseline="-25000" dirty="0"/>
+              <a:t>2</a:t>
+            </a:r>
+            <a:r>
+              <a:rPr lang="en-IN" dirty="0"/>
+              <a:t> - 1; but the above formula gives better results</a:t>
+            </a:r>
+            <a:r>
+              <a:rPr lang="en-IN" dirty="0" smtClean="0"/>
+              <a:t>.</a:t>
+            </a:r>
+          </a:p>
+          <a:p>
+            <a:pPr>
+              <a:spcAft>
+                <a:spcPts val="1000"/>
+              </a:spcAft>
+            </a:pPr>
+            <a:r>
+              <a:rPr lang="en-IN" dirty="0"/>
+              <a:t>The test statistic is a t statistic (t) defined by the following </a:t>
+            </a:r>
+            <a:r>
+              <a:rPr lang="en-IN" dirty="0" smtClean="0"/>
+              <a:t>equation </a:t>
+            </a:r>
+            <a:r>
+              <a:rPr lang="fr-FR" dirty="0" smtClean="0"/>
+              <a:t>t </a:t>
+            </a:r>
+            <a:r>
+              <a:rPr lang="fr-FR" dirty="0"/>
+              <a:t>= [ (x</a:t>
+            </a:r>
+            <a:r>
+              <a:rPr lang="fr-FR" baseline="-25000" dirty="0"/>
+              <a:t>1</a:t>
+            </a:r>
+            <a:r>
+              <a:rPr lang="fr-FR" dirty="0"/>
+              <a:t> - x</a:t>
+            </a:r>
+            <a:r>
+              <a:rPr lang="fr-FR" baseline="-25000" dirty="0"/>
+              <a:t>2</a:t>
+            </a:r>
+            <a:r>
+              <a:rPr lang="fr-FR" dirty="0"/>
+              <a:t>) - d ] / </a:t>
+            </a:r>
+            <a:r>
+              <a:rPr lang="fr-FR" dirty="0" smtClean="0"/>
+              <a:t>SE</a:t>
+            </a:r>
+          </a:p>
+          <a:p>
+            <a:pPr>
+              <a:spcAft>
+                <a:spcPts val="1000"/>
+              </a:spcAft>
+            </a:pPr>
+            <a:r>
+              <a:rPr lang="en-IN" dirty="0"/>
+              <a:t>where x</a:t>
+            </a:r>
+            <a:r>
+              <a:rPr lang="en-IN" baseline="-25000" dirty="0"/>
+              <a:t>1</a:t>
+            </a:r>
+            <a:r>
+              <a:rPr lang="en-IN" dirty="0"/>
+              <a:t> is the mean of sample 1, x</a:t>
+            </a:r>
+            <a:r>
+              <a:rPr lang="en-IN" baseline="-25000" dirty="0"/>
+              <a:t>2</a:t>
+            </a:r>
+            <a:r>
+              <a:rPr lang="en-IN" dirty="0"/>
+              <a:t> is the mean of sample 2, d is the hypothesized difference between population means, and SE is the standard error</a:t>
+            </a:r>
+            <a:r>
+              <a:rPr lang="en-IN" dirty="0" smtClean="0"/>
+              <a:t>.</a:t>
+            </a:r>
+          </a:p>
+        </p:txBody>
+      </p:sp>
+    </p:spTree>
+    <p:extLst>
+      <p:ext uri="{BB962C8B-B14F-4D97-AF65-F5344CB8AC3E}">
+        <p14:creationId xmlns:p14="http://schemas.microsoft.com/office/powerpoint/2010/main" val="380982905"/>
+      </p:ext>
+    </p:extLst>
+  </p:cSld>
+  <p:clrMapOvr>
+    <a:masterClrMapping/>
+  </p:clrMapOvr>
+  <p:timing>
+    <p:tnLst>
+      <p:par>
+        <p:cTn id="1" dur="indefinite" restart="never" nodeType="tmRoot"/>
+      </p:par>
+    </p:tnLst>
+  </p:timing>
+</p:sld>
+</file>
+
+<file path=ppt/slides/slide57.xml><?xml version="1.0" encoding="utf-8"?>
+<p:sld xmlns:a="http://schemas.openxmlformats.org/drawingml/2006/main" xmlns:r="http://schemas.openxmlformats.org/officeDocument/2006/relationships" xmlns:p="http://schemas.openxmlformats.org/presentationml/2006/main">
+  <p:cSld>
+    <p:spTree>
+      <p:nvGrpSpPr>
+        <p:cNvPr id="1" name=""/>
+        <p:cNvGrpSpPr/>
+        <p:nvPr/>
+      </p:nvGrpSpPr>
+      <p:grpSpPr>
+        <a:xfrm>
+          <a:off x="0" y="0"/>
+          <a:ext cx="0" cy="0"/>
+          <a:chOff x="0" y="0"/>
+          <a:chExt cx="0" cy="0"/>
+        </a:xfrm>
+      </p:grpSpPr>
+      <p:sp>
+        <p:nvSpPr>
+          <p:cNvPr id="5" name="Title 1"/>
+          <p:cNvSpPr>
+            <a:spLocks noGrp="1"/>
+          </p:cNvSpPr>
+          <p:nvPr>
+            <p:ph type="ctrTitle"/>
+          </p:nvPr>
+        </p:nvSpPr>
+        <p:spPr>
+          <a:xfrm>
+            <a:off x="802783" y="270455"/>
+            <a:ext cx="9796530" cy="711548"/>
+          </a:xfrm>
+        </p:spPr>
+        <p:txBody>
+          <a:bodyPr>
+            <a:normAutofit/>
+          </a:bodyPr>
+          <a:lstStyle/>
+          <a:p>
+            <a:pPr algn="l"/>
+            <a:r>
+              <a:rPr lang="en-US" sz="4000" dirty="0" smtClean="0"/>
+              <a:t>Hypothesis Testing</a:t>
+            </a:r>
+            <a:endParaRPr lang="en-IN" sz="4000" dirty="0"/>
+          </a:p>
+        </p:txBody>
+      </p:sp>
+      <p:cxnSp>
+        <p:nvCxnSpPr>
+          <p:cNvPr id="7" name="Straight Connector 6"/>
+          <p:cNvCxnSpPr/>
+          <p:nvPr/>
+        </p:nvCxnSpPr>
+        <p:spPr>
+          <a:xfrm>
+            <a:off x="914400" y="956255"/>
+            <a:ext cx="10045521" cy="0"/>
+          </a:xfrm>
+          <a:prstGeom prst="line">
+            <a:avLst/>
+          </a:prstGeom>
+          <a:ln>
+            <a:solidFill>
+              <a:schemeClr val="bg1">
+                <a:lumMod val="75000"/>
+              </a:schemeClr>
+            </a:solidFill>
+          </a:ln>
+        </p:spPr>
+        <p:style>
+          <a:lnRef idx="1">
+            <a:schemeClr val="dk1"/>
+          </a:lnRef>
+          <a:fillRef idx="0">
+            <a:schemeClr val="dk1"/>
+          </a:fillRef>
+          <a:effectRef idx="0">
+            <a:schemeClr val="dk1"/>
+          </a:effectRef>
+          <a:fontRef idx="minor">
+            <a:schemeClr val="tx1"/>
+          </a:fontRef>
+        </p:style>
+      </p:cxnSp>
+      <p:sp>
+        <p:nvSpPr>
+          <p:cNvPr id="2" name="TextBox 1"/>
+          <p:cNvSpPr txBox="1"/>
+          <p:nvPr/>
+        </p:nvSpPr>
+        <p:spPr>
+          <a:xfrm>
+            <a:off x="802783" y="1047241"/>
+            <a:ext cx="10646535" cy="5591274"/>
+          </a:xfrm>
+          <a:prstGeom prst="rect">
+            <a:avLst/>
+          </a:prstGeom>
+          <a:noFill/>
+        </p:spPr>
+        <p:txBody>
+          <a:bodyPr wrap="square" rtlCol="0">
+            <a:spAutoFit/>
+          </a:bodyPr>
+          <a:lstStyle/>
+          <a:p>
+            <a:pPr>
+              <a:spcAft>
+                <a:spcPts val="1000"/>
+              </a:spcAft>
+            </a:pPr>
+            <a:r>
+              <a:rPr lang="en-US" b="1" dirty="0" smtClean="0"/>
+              <a:t>Hypothesis Test difference between Means:</a:t>
+            </a:r>
+          </a:p>
+          <a:p>
+            <a:r>
+              <a:rPr lang="en-US" b="1" dirty="0" smtClean="0"/>
+              <a:t>Example 1:</a:t>
+            </a:r>
+          </a:p>
+          <a:p>
+            <a:r>
+              <a:rPr lang="en-IN" dirty="0"/>
+              <a:t>Within a school district, students were randomly assigned to one of two Math teachers - Mrs. Smith and Mrs. Jones. After the assignment, Mrs. Smith had 30 students, and Mrs. Jones had 25 students.</a:t>
+            </a:r>
+          </a:p>
+          <a:p>
+            <a:r>
+              <a:rPr lang="en-IN" dirty="0"/>
+              <a:t>At the end of the year, each class took the same standardized test. Mrs. Smith's students had an average test score of 78, with a standard deviation of 10; and Mrs. Jones' students had an average test score of 85, with a standard deviation of 15.</a:t>
+            </a:r>
+          </a:p>
+          <a:p>
+            <a:pPr>
+              <a:spcAft>
+                <a:spcPts val="1000"/>
+              </a:spcAft>
+            </a:pPr>
+            <a:r>
+              <a:rPr lang="en-IN" dirty="0"/>
+              <a:t>Test the hypothesis that Mrs. Smith and Mrs. Jones are equally effective teachers. Use a 0.10 level of significance. (Assume that student performance is approximately normal.) </a:t>
+            </a:r>
+          </a:p>
+          <a:p>
+            <a:pPr algn="ctr"/>
+            <a:endParaRPr lang="en-IN" dirty="0" smtClean="0"/>
+          </a:p>
+          <a:p>
+            <a:pPr algn="ctr"/>
+            <a:r>
+              <a:rPr lang="en-IN" dirty="0" smtClean="0"/>
+              <a:t>Null </a:t>
+            </a:r>
+            <a:r>
+              <a:rPr lang="en-IN" dirty="0"/>
+              <a:t>hypothesis: </a:t>
+            </a:r>
+            <a:r>
+              <a:rPr lang="el-GR" dirty="0"/>
+              <a:t>μ</a:t>
+            </a:r>
+            <a:r>
+              <a:rPr lang="el-GR" baseline="-25000" dirty="0"/>
+              <a:t>1</a:t>
+            </a:r>
+            <a:r>
+              <a:rPr lang="el-GR" dirty="0"/>
+              <a:t> - μ</a:t>
+            </a:r>
+            <a:r>
+              <a:rPr lang="el-GR" baseline="-25000" dirty="0"/>
+              <a:t>2</a:t>
+            </a:r>
+            <a:r>
+              <a:rPr lang="el-GR" dirty="0"/>
+              <a:t> = 0</a:t>
+            </a:r>
+          </a:p>
+          <a:p>
+            <a:pPr algn="ctr"/>
+            <a:r>
+              <a:rPr lang="en-IN" dirty="0"/>
+              <a:t>Alternative hypothesis: </a:t>
+            </a:r>
+            <a:r>
+              <a:rPr lang="el-GR" dirty="0"/>
+              <a:t>μ</a:t>
+            </a:r>
+            <a:r>
+              <a:rPr lang="el-GR" baseline="-25000" dirty="0"/>
+              <a:t>1</a:t>
+            </a:r>
+            <a:r>
+              <a:rPr lang="el-GR" dirty="0"/>
+              <a:t> - μ</a:t>
+            </a:r>
+            <a:r>
+              <a:rPr lang="el-GR" baseline="-25000" dirty="0"/>
+              <a:t>2</a:t>
+            </a:r>
+            <a:r>
+              <a:rPr lang="el-GR" dirty="0"/>
+              <a:t> ≠ 0</a:t>
+            </a:r>
+          </a:p>
+          <a:p>
+            <a:pPr>
+              <a:spcAft>
+                <a:spcPts val="1000"/>
+              </a:spcAft>
+            </a:pPr>
+            <a:endParaRPr lang="en-IN" dirty="0" smtClean="0"/>
+          </a:p>
+          <a:p>
+            <a:pPr>
+              <a:spcAft>
+                <a:spcPts val="1000"/>
+              </a:spcAft>
+            </a:pPr>
+            <a:r>
+              <a:rPr lang="en-IN" dirty="0" smtClean="0"/>
+              <a:t>Note </a:t>
+            </a:r>
+            <a:r>
+              <a:rPr lang="en-IN" dirty="0"/>
+              <a:t>that these hypotheses constitute a two-tailed test. The null hypothesis will be rejected if the difference between sample means is too big or if it is too </a:t>
+            </a:r>
+            <a:r>
+              <a:rPr lang="en-IN" dirty="0" smtClean="0"/>
+              <a:t>small</a:t>
+            </a:r>
+          </a:p>
+          <a:p>
+            <a:pPr algn="ctr"/>
+            <a:r>
+              <a:rPr lang="pt-BR" dirty="0"/>
+              <a:t>SE = sqrt[(s</a:t>
+            </a:r>
+            <a:r>
+              <a:rPr lang="pt-BR" baseline="-25000" dirty="0"/>
+              <a:t>1</a:t>
+            </a:r>
+            <a:r>
+              <a:rPr lang="pt-BR" baseline="30000" dirty="0"/>
+              <a:t>2</a:t>
+            </a:r>
+            <a:r>
+              <a:rPr lang="pt-BR" dirty="0"/>
+              <a:t>/n</a:t>
+            </a:r>
+            <a:r>
+              <a:rPr lang="pt-BR" baseline="-25000" dirty="0"/>
+              <a:t>1</a:t>
+            </a:r>
+            <a:r>
+              <a:rPr lang="pt-BR" dirty="0"/>
+              <a:t>) + (s</a:t>
+            </a:r>
+            <a:r>
+              <a:rPr lang="pt-BR" baseline="-25000" dirty="0"/>
+              <a:t>2</a:t>
+            </a:r>
+            <a:r>
+              <a:rPr lang="pt-BR" baseline="30000" dirty="0"/>
+              <a:t>2</a:t>
+            </a:r>
+            <a:r>
+              <a:rPr lang="pt-BR" dirty="0"/>
+              <a:t>/n</a:t>
+            </a:r>
+            <a:r>
+              <a:rPr lang="pt-BR" baseline="-25000" dirty="0"/>
+              <a:t>2</a:t>
+            </a:r>
+            <a:r>
+              <a:rPr lang="pt-BR" dirty="0"/>
+              <a:t>)]</a:t>
+            </a:r>
+          </a:p>
+          <a:p>
+            <a:pPr algn="ctr"/>
+            <a:r>
+              <a:rPr lang="pt-BR" dirty="0"/>
+              <a:t>SE = sqrt[(10</a:t>
+            </a:r>
+            <a:r>
+              <a:rPr lang="pt-BR" baseline="30000" dirty="0"/>
+              <a:t>2</a:t>
+            </a:r>
+            <a:r>
+              <a:rPr lang="pt-BR" dirty="0"/>
+              <a:t>/30) + (15</a:t>
+            </a:r>
+            <a:r>
+              <a:rPr lang="pt-BR" baseline="30000" dirty="0"/>
+              <a:t>2</a:t>
+            </a:r>
+            <a:r>
+              <a:rPr lang="pt-BR" dirty="0"/>
+              <a:t>/25] = sqrt(3.33 + 9)</a:t>
+            </a:r>
+          </a:p>
+          <a:p>
+            <a:pPr algn="ctr"/>
+            <a:r>
+              <a:rPr lang="pt-BR" dirty="0"/>
+              <a:t>SE = sqrt(12.33) = </a:t>
+            </a:r>
+            <a:r>
+              <a:rPr lang="pt-BR" dirty="0" smtClean="0"/>
+              <a:t>3.51</a:t>
+            </a:r>
+            <a:endParaRPr lang="pt-BR" dirty="0"/>
+          </a:p>
+        </p:txBody>
+      </p:sp>
+    </p:spTree>
+    <p:extLst>
+      <p:ext uri="{BB962C8B-B14F-4D97-AF65-F5344CB8AC3E}">
+        <p14:creationId xmlns:p14="http://schemas.microsoft.com/office/powerpoint/2010/main" val="837604096"/>
+      </p:ext>
+    </p:extLst>
+  </p:cSld>
+  <p:clrMapOvr>
+    <a:masterClrMapping/>
+  </p:clrMapOvr>
+  <p:timing>
+    <p:tnLst>
+      <p:par>
+        <p:cTn id="1" dur="indefinite" restart="never" nodeType="tmRoot"/>
+      </p:par>
+    </p:tnLst>
+  </p:timing>
+</p:sld>
+</file>
+
+<file path=ppt/slides/slide58.xml><?xml version="1.0" encoding="utf-8"?>
+<p:sld xmlns:a="http://schemas.openxmlformats.org/drawingml/2006/main" xmlns:r="http://schemas.openxmlformats.org/officeDocument/2006/relationships" xmlns:p="http://schemas.openxmlformats.org/presentationml/2006/main">
+  <p:cSld>
+    <p:spTree>
+      <p:nvGrpSpPr>
+        <p:cNvPr id="1" name=""/>
+        <p:cNvGrpSpPr/>
+        <p:nvPr/>
+      </p:nvGrpSpPr>
+      <p:grpSpPr>
+        <a:xfrm>
+          <a:off x="0" y="0"/>
+          <a:ext cx="0" cy="0"/>
+          <a:chOff x="0" y="0"/>
+          <a:chExt cx="0" cy="0"/>
+        </a:xfrm>
+      </p:grpSpPr>
+      <p:sp>
+        <p:nvSpPr>
+          <p:cNvPr id="5" name="Title 1"/>
+          <p:cNvSpPr>
+            <a:spLocks noGrp="1"/>
+          </p:cNvSpPr>
+          <p:nvPr>
+            <p:ph type="ctrTitle"/>
+          </p:nvPr>
+        </p:nvSpPr>
+        <p:spPr>
+          <a:xfrm>
+            <a:off x="802783" y="270455"/>
+            <a:ext cx="9796530" cy="711548"/>
+          </a:xfrm>
+        </p:spPr>
+        <p:txBody>
+          <a:bodyPr>
+            <a:normAutofit/>
+          </a:bodyPr>
+          <a:lstStyle/>
+          <a:p>
+            <a:pPr algn="l"/>
+            <a:r>
+              <a:rPr lang="en-US" sz="4000" dirty="0" smtClean="0"/>
+              <a:t>Hypothesis Testing</a:t>
+            </a:r>
+            <a:endParaRPr lang="en-IN" sz="4000" dirty="0"/>
+          </a:p>
+        </p:txBody>
+      </p:sp>
+      <p:cxnSp>
+        <p:nvCxnSpPr>
+          <p:cNvPr id="7" name="Straight Connector 6"/>
+          <p:cNvCxnSpPr/>
+          <p:nvPr/>
+        </p:nvCxnSpPr>
+        <p:spPr>
+          <a:xfrm>
+            <a:off x="914400" y="956255"/>
+            <a:ext cx="10045521" cy="0"/>
+          </a:xfrm>
+          <a:prstGeom prst="line">
+            <a:avLst/>
+          </a:prstGeom>
+          <a:ln>
+            <a:solidFill>
+              <a:schemeClr val="bg1">
+                <a:lumMod val="75000"/>
+              </a:schemeClr>
+            </a:solidFill>
+          </a:ln>
+        </p:spPr>
+        <p:style>
+          <a:lnRef idx="1">
+            <a:schemeClr val="dk1"/>
+          </a:lnRef>
+          <a:fillRef idx="0">
+            <a:schemeClr val="dk1"/>
+          </a:fillRef>
+          <a:effectRef idx="0">
+            <a:schemeClr val="dk1"/>
+          </a:effectRef>
+          <a:fontRef idx="minor">
+            <a:schemeClr val="tx1"/>
+          </a:fontRef>
+        </p:style>
+      </p:cxnSp>
+      <p:sp>
+        <p:nvSpPr>
+          <p:cNvPr id="2" name="TextBox 1"/>
+          <p:cNvSpPr txBox="1"/>
+          <p:nvPr/>
+        </p:nvSpPr>
+        <p:spPr>
+          <a:xfrm>
+            <a:off x="802783" y="1047241"/>
+            <a:ext cx="10646535" cy="5483552"/>
+          </a:xfrm>
+          <a:prstGeom prst="rect">
+            <a:avLst/>
+          </a:prstGeom>
+          <a:noFill/>
+        </p:spPr>
+        <p:txBody>
+          <a:bodyPr wrap="square" rtlCol="0">
+            <a:spAutoFit/>
+          </a:bodyPr>
+          <a:lstStyle/>
+          <a:p>
+            <a:pPr>
+              <a:spcAft>
+                <a:spcPts val="1000"/>
+              </a:spcAft>
+            </a:pPr>
+            <a:r>
+              <a:rPr lang="en-US" b="1" dirty="0" smtClean="0"/>
+              <a:t>Hypothesis Test difference between Means:</a:t>
+            </a:r>
+          </a:p>
+          <a:p>
+            <a:r>
+              <a:rPr lang="en-US" b="1" dirty="0" smtClean="0"/>
+              <a:t>Example 1:</a:t>
+            </a:r>
+          </a:p>
+          <a:p>
+            <a:endParaRPr lang="en-US" dirty="0" smtClean="0"/>
+          </a:p>
+          <a:p>
+            <a:r>
+              <a:rPr lang="en-US" dirty="0" smtClean="0"/>
+              <a:t>Calculation of DOF and t-statistic:</a:t>
+            </a:r>
+          </a:p>
+          <a:p>
+            <a:r>
+              <a:rPr lang="pt-BR" dirty="0"/>
+              <a:t>DF = (s</a:t>
+            </a:r>
+            <a:r>
+              <a:rPr lang="pt-BR" baseline="-25000" dirty="0"/>
+              <a:t>1</a:t>
+            </a:r>
+            <a:r>
+              <a:rPr lang="pt-BR" baseline="30000" dirty="0"/>
+              <a:t>2</a:t>
+            </a:r>
+            <a:r>
+              <a:rPr lang="pt-BR" dirty="0"/>
+              <a:t>/n</a:t>
+            </a:r>
+            <a:r>
+              <a:rPr lang="pt-BR" baseline="-25000" dirty="0"/>
+              <a:t>1</a:t>
+            </a:r>
+            <a:r>
+              <a:rPr lang="pt-BR" dirty="0"/>
+              <a:t> + s</a:t>
+            </a:r>
+            <a:r>
+              <a:rPr lang="pt-BR" baseline="-25000" dirty="0"/>
+              <a:t>2</a:t>
+            </a:r>
+            <a:r>
+              <a:rPr lang="pt-BR" baseline="30000" dirty="0"/>
+              <a:t>2</a:t>
+            </a:r>
+            <a:r>
+              <a:rPr lang="pt-BR" dirty="0"/>
+              <a:t>/n</a:t>
+            </a:r>
+            <a:r>
+              <a:rPr lang="pt-BR" baseline="-25000" dirty="0"/>
+              <a:t>2</a:t>
+            </a:r>
+            <a:r>
+              <a:rPr lang="pt-BR" dirty="0"/>
+              <a:t>)</a:t>
+            </a:r>
+            <a:r>
+              <a:rPr lang="pt-BR" baseline="30000" dirty="0"/>
+              <a:t>2</a:t>
+            </a:r>
+            <a:r>
+              <a:rPr lang="pt-BR" dirty="0"/>
+              <a:t> / { [ (s</a:t>
+            </a:r>
+            <a:r>
+              <a:rPr lang="pt-BR" baseline="-25000" dirty="0"/>
+              <a:t>1</a:t>
+            </a:r>
+            <a:r>
+              <a:rPr lang="pt-BR" baseline="30000" dirty="0"/>
+              <a:t>2</a:t>
+            </a:r>
+            <a:r>
+              <a:rPr lang="pt-BR" dirty="0"/>
+              <a:t> / n</a:t>
+            </a:r>
+            <a:r>
+              <a:rPr lang="pt-BR" baseline="-25000" dirty="0"/>
+              <a:t>1</a:t>
+            </a:r>
+            <a:r>
+              <a:rPr lang="pt-BR" dirty="0"/>
+              <a:t>)</a:t>
+            </a:r>
+            <a:r>
+              <a:rPr lang="pt-BR" baseline="30000" dirty="0"/>
+              <a:t>2</a:t>
+            </a:r>
+            <a:r>
+              <a:rPr lang="pt-BR" dirty="0"/>
+              <a:t> / (n</a:t>
+            </a:r>
+            <a:r>
+              <a:rPr lang="pt-BR" baseline="-25000" dirty="0"/>
+              <a:t>1</a:t>
+            </a:r>
+            <a:r>
+              <a:rPr lang="pt-BR" dirty="0"/>
+              <a:t> - 1) ] + [ (s</a:t>
+            </a:r>
+            <a:r>
+              <a:rPr lang="pt-BR" baseline="-25000" dirty="0"/>
+              <a:t>2</a:t>
+            </a:r>
+            <a:r>
+              <a:rPr lang="pt-BR" baseline="30000" dirty="0"/>
+              <a:t>2</a:t>
+            </a:r>
+            <a:r>
+              <a:rPr lang="pt-BR" dirty="0"/>
+              <a:t> / n</a:t>
+            </a:r>
+            <a:r>
+              <a:rPr lang="pt-BR" baseline="-25000" dirty="0"/>
+              <a:t>2</a:t>
+            </a:r>
+            <a:r>
+              <a:rPr lang="pt-BR" dirty="0"/>
+              <a:t>)</a:t>
+            </a:r>
+            <a:r>
+              <a:rPr lang="pt-BR" baseline="30000" dirty="0"/>
+              <a:t>2</a:t>
+            </a:r>
+            <a:r>
+              <a:rPr lang="pt-BR" dirty="0"/>
+              <a:t> / (n</a:t>
+            </a:r>
+            <a:r>
+              <a:rPr lang="pt-BR" baseline="-25000" dirty="0"/>
+              <a:t>2</a:t>
+            </a:r>
+            <a:r>
+              <a:rPr lang="pt-BR" dirty="0"/>
+              <a:t> - 1) ] }</a:t>
+            </a:r>
+          </a:p>
+          <a:p>
+            <a:r>
+              <a:rPr lang="pt-BR" dirty="0"/>
+              <a:t>DF = (10</a:t>
+            </a:r>
+            <a:r>
+              <a:rPr lang="pt-BR" baseline="30000" dirty="0"/>
+              <a:t>2</a:t>
+            </a:r>
+            <a:r>
+              <a:rPr lang="pt-BR" dirty="0"/>
+              <a:t>/30 + 15</a:t>
+            </a:r>
+            <a:r>
+              <a:rPr lang="pt-BR" baseline="30000" dirty="0"/>
+              <a:t>2</a:t>
+            </a:r>
+            <a:r>
+              <a:rPr lang="pt-BR" dirty="0"/>
+              <a:t>/25)</a:t>
+            </a:r>
+            <a:r>
+              <a:rPr lang="pt-BR" baseline="30000" dirty="0"/>
+              <a:t>2</a:t>
+            </a:r>
+            <a:r>
+              <a:rPr lang="pt-BR" dirty="0"/>
+              <a:t> / { [ (10</a:t>
+            </a:r>
+            <a:r>
+              <a:rPr lang="pt-BR" baseline="30000" dirty="0"/>
+              <a:t>2</a:t>
+            </a:r>
+            <a:r>
+              <a:rPr lang="pt-BR" dirty="0"/>
+              <a:t> / 30)</a:t>
+            </a:r>
+            <a:r>
+              <a:rPr lang="pt-BR" baseline="30000" dirty="0"/>
+              <a:t>2</a:t>
+            </a:r>
+            <a:r>
+              <a:rPr lang="pt-BR" dirty="0"/>
+              <a:t> / (29) ] + [ (15</a:t>
+            </a:r>
+            <a:r>
+              <a:rPr lang="pt-BR" baseline="30000" dirty="0"/>
+              <a:t>2</a:t>
+            </a:r>
+            <a:r>
+              <a:rPr lang="pt-BR" dirty="0"/>
+              <a:t> / 25)</a:t>
+            </a:r>
+            <a:r>
+              <a:rPr lang="pt-BR" baseline="30000" dirty="0"/>
+              <a:t>2</a:t>
+            </a:r>
+            <a:r>
+              <a:rPr lang="pt-BR" dirty="0"/>
+              <a:t> / (24) ] }</a:t>
+            </a:r>
+          </a:p>
+          <a:p>
+            <a:r>
+              <a:rPr lang="pt-BR" dirty="0"/>
+              <a:t>DF = (3.33 + 9)</a:t>
+            </a:r>
+            <a:r>
+              <a:rPr lang="pt-BR" baseline="30000" dirty="0"/>
+              <a:t>2</a:t>
+            </a:r>
+            <a:r>
+              <a:rPr lang="pt-BR" dirty="0"/>
+              <a:t> / { [ (3.33)</a:t>
+            </a:r>
+            <a:r>
+              <a:rPr lang="pt-BR" baseline="30000" dirty="0"/>
+              <a:t>2</a:t>
+            </a:r>
+            <a:r>
+              <a:rPr lang="pt-BR" dirty="0"/>
+              <a:t> / (29) ] + [ (9)</a:t>
+            </a:r>
+            <a:r>
+              <a:rPr lang="pt-BR" baseline="30000" dirty="0"/>
+              <a:t>2</a:t>
+            </a:r>
+            <a:r>
+              <a:rPr lang="pt-BR" dirty="0"/>
+              <a:t> / (24) ] } = 152.03 / (0.382 + 3.375) = 152.03/3.757 = 40.47</a:t>
+            </a:r>
+          </a:p>
+          <a:p>
+            <a:endParaRPr lang="pt-BR" dirty="0" smtClean="0"/>
+          </a:p>
+          <a:p>
+            <a:r>
+              <a:rPr lang="pt-BR" dirty="0" smtClean="0"/>
+              <a:t>t </a:t>
+            </a:r>
+            <a:r>
+              <a:rPr lang="pt-BR" dirty="0"/>
+              <a:t>= [ (x</a:t>
+            </a:r>
+            <a:r>
+              <a:rPr lang="pt-BR" baseline="-25000" dirty="0"/>
+              <a:t>1</a:t>
+            </a:r>
+            <a:r>
+              <a:rPr lang="pt-BR" dirty="0"/>
+              <a:t> - x</a:t>
+            </a:r>
+            <a:r>
+              <a:rPr lang="pt-BR" baseline="-25000" dirty="0"/>
+              <a:t>2</a:t>
+            </a:r>
+            <a:r>
+              <a:rPr lang="pt-BR" dirty="0"/>
+              <a:t>) - d ] / SE = [ (78 - 85) - 0 ] / 3.51 = -7/3.51 = -1.99</a:t>
+            </a:r>
+          </a:p>
+          <a:p>
+            <a:endParaRPr lang="en-US" dirty="0" smtClean="0"/>
+          </a:p>
+          <a:p>
+            <a:r>
+              <a:rPr lang="en-IN" dirty="0"/>
+              <a:t>where s1 is the standard deviation of sample 1, s2 is the standard deviation of sample 2, n1 is the size of sample 1, n2 is the size of sample 2, x1 is the mean of sample 1, x2 is the mean of sample 2, d is the hypothesized difference between the population means, and SE is the standard error</a:t>
+            </a:r>
+            <a:r>
+              <a:rPr lang="en-IN" dirty="0" smtClean="0"/>
+              <a:t>.</a:t>
+            </a:r>
+          </a:p>
+          <a:p>
+            <a:r>
+              <a:rPr lang="en-IN" dirty="0"/>
+              <a:t>Since we have a two-tailed test, the P-value is the probability that a t statistic having 40 degrees of freedom is more extreme than -1.99; that is, less than -1.99 or greater than 1.99.</a:t>
+            </a:r>
+          </a:p>
+          <a:p>
+            <a:endParaRPr lang="en-IN" dirty="0"/>
+          </a:p>
+          <a:p>
+            <a:r>
+              <a:rPr lang="en-IN" dirty="0"/>
+              <a:t>We use the t Distribution Calculator to find P(t &lt; -1.99) = 0.027, and P(t &gt; 1.99) = 0.027. Thus, the P-value = 0.027 + 0.027 = 0.054</a:t>
+            </a:r>
+            <a:r>
+              <a:rPr lang="en-IN" dirty="0" smtClean="0"/>
+              <a:t>.</a:t>
+            </a:r>
+          </a:p>
+          <a:p>
+            <a:r>
+              <a:rPr lang="en-IN" dirty="0"/>
+              <a:t>Since the P-value (0.054) is less than the significance level (0.10), we cannot accept the null hypothesis.</a:t>
+            </a:r>
+            <a:endParaRPr lang="en-IN" dirty="0" smtClean="0"/>
+          </a:p>
+        </p:txBody>
+      </p:sp>
+    </p:spTree>
+    <p:extLst>
+      <p:ext uri="{BB962C8B-B14F-4D97-AF65-F5344CB8AC3E}">
+        <p14:creationId xmlns:p14="http://schemas.microsoft.com/office/powerpoint/2010/main" val="3117239644"/>
+      </p:ext>
+    </p:extLst>
+  </p:cSld>
+  <p:clrMapOvr>
+    <a:masterClrMapping/>
+  </p:clrMapOvr>
+  <p:timing>
+    <p:tnLst>
+      <p:par>
+        <p:cTn id="1" dur="indefinite" restart="never" nodeType="tmRoot"/>
+      </p:par>
+    </p:tnLst>
+  </p:timing>
+</p:sld>
+</file>
+
+<file path=ppt/slides/slide59.xml><?xml version="1.0" encoding="utf-8"?>
+<p:sld xmlns:a="http://schemas.openxmlformats.org/drawingml/2006/main" xmlns:r="http://schemas.openxmlformats.org/officeDocument/2006/relationships" xmlns:p="http://schemas.openxmlformats.org/presentationml/2006/main">
+  <p:cSld>
+    <p:spTree>
+      <p:nvGrpSpPr>
+        <p:cNvPr id="1" name=""/>
+        <p:cNvGrpSpPr/>
+        <p:nvPr/>
+      </p:nvGrpSpPr>
+      <p:grpSpPr>
+        <a:xfrm>
+          <a:off x="0" y="0"/>
+          <a:ext cx="0" cy="0"/>
+          <a:chOff x="0" y="0"/>
+          <a:chExt cx="0" cy="0"/>
+        </a:xfrm>
+      </p:grpSpPr>
+    </p:spTree>
+    <p:extLst>
+      <p:ext uri="{BB962C8B-B14F-4D97-AF65-F5344CB8AC3E}">
+        <p14:creationId xmlns:p14="http://schemas.microsoft.com/office/powerpoint/2010/main" val="2792573365"/>
+      </p:ext>
+    </p:extLst>
+  </p:cSld>
+  <p:clrMapOvr>
+    <a:masterClrMapping/>
+  </p:clrMapOvr>
+  <p:timing>
+    <p:tnLst>
+      <p:par>
+        <p:cTn id="1" dur="indefinite" restart="never" nodeType="tmRoot"/>
+      </p:par>
+    </p:tnLst>
+  </p:timing>
+</p:sld>
+</file>
+
+<file path=ppt/slides/slide6.xml><?xml version="1.0" encoding="utf-8"?>
+<p:sld xmlns:a="http://schemas.openxmlformats.org/drawingml/2006/main" xmlns:r="http://schemas.openxmlformats.org/officeDocument/2006/relationships" xmlns:p="http://schemas.openxmlformats.org/presentationml/2006/main">
+  <p:cSld>
+    <p:spTree>
+      <p:nvGrpSpPr>
+        <p:cNvPr id="1" name=""/>
+        <p:cNvGrpSpPr/>
+        <p:nvPr/>
+      </p:nvGrpSpPr>
+      <p:grpSpPr>
+        <a:xfrm>
+          <a:off x="0" y="0"/>
+          <a:ext cx="0" cy="0"/>
+          <a:chOff x="0" y="0"/>
+          <a:chExt cx="0" cy="0"/>
+        </a:xfrm>
+      </p:grpSpPr>
+      <p:sp>
+        <p:nvSpPr>
+          <p:cNvPr id="5" name="Title 1"/>
+          <p:cNvSpPr>
+            <a:spLocks noGrp="1"/>
+          </p:cNvSpPr>
+          <p:nvPr>
+            <p:ph type="ctrTitle"/>
+          </p:nvPr>
+        </p:nvSpPr>
+        <p:spPr>
+          <a:xfrm>
+            <a:off x="802783" y="270455"/>
+            <a:ext cx="9144000" cy="711548"/>
+          </a:xfrm>
+        </p:spPr>
+        <p:txBody>
+          <a:bodyPr>
+            <a:normAutofit/>
+          </a:bodyPr>
+          <a:lstStyle/>
+          <a:p>
+            <a:pPr algn="l"/>
+            <a:r>
+              <a:rPr lang="en-US" sz="4000" dirty="0"/>
+              <a:t>Population </a:t>
+            </a:r>
+            <a:r>
+              <a:rPr lang="en-US" sz="4000" dirty="0" smtClean="0"/>
+              <a:t>and Sample</a:t>
+            </a:r>
+            <a:endParaRPr lang="en-IN" sz="4000" dirty="0"/>
+          </a:p>
+        </p:txBody>
+      </p:sp>
+      <p:cxnSp>
+        <p:nvCxnSpPr>
+          <p:cNvPr id="7" name="Straight Connector 6"/>
+          <p:cNvCxnSpPr/>
+          <p:nvPr/>
+        </p:nvCxnSpPr>
+        <p:spPr>
+          <a:xfrm>
+            <a:off x="914400" y="956255"/>
+            <a:ext cx="10045521" cy="0"/>
+          </a:xfrm>
+          <a:prstGeom prst="line">
+            <a:avLst/>
+          </a:prstGeom>
+          <a:ln>
+            <a:solidFill>
+              <a:schemeClr val="bg1">
+                <a:lumMod val="75000"/>
+              </a:schemeClr>
+            </a:solidFill>
+          </a:ln>
+        </p:spPr>
+        <p:style>
+          <a:lnRef idx="1">
+            <a:schemeClr val="dk1"/>
+          </a:lnRef>
+          <a:fillRef idx="0">
+            <a:schemeClr val="dk1"/>
+          </a:fillRef>
+          <a:effectRef idx="0">
+            <a:schemeClr val="dk1"/>
+          </a:effectRef>
+          <a:fontRef idx="minor">
+            <a:schemeClr val="tx1"/>
+          </a:fontRef>
+        </p:style>
+      </p:cxnSp>
+      <p:sp>
+        <p:nvSpPr>
+          <p:cNvPr id="2" name="TextBox 1"/>
+          <p:cNvSpPr txBox="1"/>
+          <p:nvPr/>
+        </p:nvSpPr>
+        <p:spPr>
+          <a:xfrm>
+            <a:off x="802784" y="1047241"/>
+            <a:ext cx="10311683" cy="461665"/>
+          </a:xfrm>
+          <a:prstGeom prst="rect">
+            <a:avLst/>
+          </a:prstGeom>
+          <a:noFill/>
+        </p:spPr>
+        <p:txBody>
+          <a:bodyPr wrap="square" rtlCol="0">
+            <a:spAutoFit/>
+          </a:bodyPr>
+          <a:lstStyle/>
+          <a:p>
+            <a:r>
+              <a:rPr lang="en-US" sz="2400" b="1" dirty="0" smtClean="0"/>
+              <a:t>Difference between biased and unbiased estimate of Sample Variance</a:t>
+            </a:r>
+            <a:endParaRPr lang="en-IN" sz="2400" b="1" dirty="0"/>
+          </a:p>
+        </p:txBody>
+      </p:sp>
+      <p:sp>
+        <p:nvSpPr>
+          <p:cNvPr id="6" name="TextBox 5"/>
+          <p:cNvSpPr txBox="1"/>
+          <p:nvPr/>
+        </p:nvSpPr>
+        <p:spPr>
+          <a:xfrm>
+            <a:off x="802783" y="1667803"/>
+            <a:ext cx="10311684" cy="646331"/>
+          </a:xfrm>
+          <a:prstGeom prst="rect">
+            <a:avLst/>
+          </a:prstGeom>
+          <a:noFill/>
+        </p:spPr>
+        <p:txBody>
+          <a:bodyPr wrap="square" rtlCol="0">
+            <a:spAutoFit/>
+          </a:bodyPr>
+          <a:lstStyle/>
+          <a:p>
+            <a:r>
+              <a:rPr lang="en-US" dirty="0" smtClean="0"/>
+              <a:t>Using (n-1) instead of (n) in Sample Standard Deviation and Sample Variance is called </a:t>
+            </a:r>
+            <a:r>
+              <a:rPr lang="en-US" b="1" dirty="0" smtClean="0"/>
+              <a:t>Bessel’s Correction</a:t>
+            </a:r>
+            <a:r>
+              <a:rPr lang="en-US" dirty="0" smtClean="0"/>
+              <a:t>. This corrects the bias in the estimation of the population variance from sample variance.</a:t>
+            </a:r>
+            <a:endParaRPr lang="en-IN" dirty="0"/>
+          </a:p>
+        </p:txBody>
+      </p:sp>
+      <p:sp>
+        <p:nvSpPr>
+          <p:cNvPr id="8" name="TextBox 7"/>
+          <p:cNvSpPr txBox="1"/>
+          <p:nvPr/>
+        </p:nvSpPr>
+        <p:spPr>
+          <a:xfrm>
+            <a:off x="802783" y="2676768"/>
+            <a:ext cx="4005330" cy="646331"/>
+          </a:xfrm>
+          <a:prstGeom prst="rect">
+            <a:avLst/>
+          </a:prstGeom>
+          <a:noFill/>
+        </p:spPr>
+        <p:txBody>
+          <a:bodyPr wrap="square" rtlCol="0">
+            <a:spAutoFit/>
+          </a:bodyPr>
+          <a:lstStyle/>
+          <a:p>
+            <a:r>
+              <a:rPr lang="en-US" dirty="0" smtClean="0"/>
+              <a:t>Explanation:</a:t>
+            </a:r>
+          </a:p>
+          <a:p>
+            <a:endParaRPr lang="en-IN" dirty="0"/>
+          </a:p>
+        </p:txBody>
+      </p:sp>
+    </p:spTree>
+    <p:extLst>
+      <p:ext uri="{BB962C8B-B14F-4D97-AF65-F5344CB8AC3E}">
+        <p14:creationId xmlns:p14="http://schemas.microsoft.com/office/powerpoint/2010/main" val="3935298623"/>
+      </p:ext>
+    </p:extLst>
+  </p:cSld>
+  <p:clrMapOvr>
+    <a:masterClrMapping/>
+  </p:clrMapOvr>
+  <p:timing>
+    <p:tnLst>
+      <p:par>
+        <p:cTn id="1" dur="indefinite" restart="never" nodeType="tmRoot"/>
+      </p:par>
+    </p:tnLst>
+  </p:timing>
+</p:sld>
+</file>
+
+<file path=ppt/slides/slide60.xml><?xml version="1.0" encoding="utf-8"?>
+<p:sld xmlns:a="http://schemas.openxmlformats.org/drawingml/2006/main" xmlns:r="http://schemas.openxmlformats.org/officeDocument/2006/relationships" xmlns:p="http://schemas.openxmlformats.org/presentationml/2006/main">
+  <p:cSld>
+    <p:spTree>
+      <p:nvGrpSpPr>
+        <p:cNvPr id="1" name=""/>
+        <p:cNvGrpSpPr/>
+        <p:nvPr/>
+      </p:nvGrpSpPr>
+      <p:grpSpPr>
+        <a:xfrm>
+          <a:off x="0" y="0"/>
+          <a:ext cx="0" cy="0"/>
+          <a:chOff x="0" y="0"/>
+          <a:chExt cx="0" cy="0"/>
+        </a:xfrm>
+      </p:grpSpPr>
+    </p:spTree>
+    <p:extLst>
+      <p:ext uri="{BB962C8B-B14F-4D97-AF65-F5344CB8AC3E}">
+        <p14:creationId xmlns:p14="http://schemas.microsoft.com/office/powerpoint/2010/main" val="1511193028"/>
+      </p:ext>
+    </p:extLst>
+  </p:cSld>
+  <p:clrMapOvr>
+    <a:masterClrMapping/>
+  </p:clrMapOvr>
+  <p:timing>
+    <p:tnLst>
+      <p:par>
+        <p:cTn id="1" dur="indefinite" restart="never" nodeType="tmRoot"/>
+      </p:par>
+    </p:tnLst>
+  </p:timing>
+</p:sld>
+</file>
+
+<file path=ppt/slides/slide61.xml><?xml version="1.0" encoding="utf-8"?>
+<p:sld xmlns:a="http://schemas.openxmlformats.org/drawingml/2006/main" xmlns:r="http://schemas.openxmlformats.org/officeDocument/2006/relationships" xmlns:p="http://schemas.openxmlformats.org/presentationml/2006/main">
+  <p:cSld>
+    <p:spTree>
+      <p:nvGrpSpPr>
+        <p:cNvPr id="1" name=""/>
+        <p:cNvGrpSpPr/>
+        <p:nvPr/>
+      </p:nvGrpSpPr>
+      <p:grpSpPr>
+        <a:xfrm>
+          <a:off x="0" y="0"/>
+          <a:ext cx="0" cy="0"/>
+          <a:chOff x="0" y="0"/>
+          <a:chExt cx="0" cy="0"/>
+        </a:xfrm>
+      </p:grpSpPr>
+    </p:spTree>
+    <p:extLst>
+      <p:ext uri="{BB962C8B-B14F-4D97-AF65-F5344CB8AC3E}">
+        <p14:creationId xmlns:p14="http://schemas.microsoft.com/office/powerpoint/2010/main" val="3919302428"/>
+      </p:ext>
+    </p:extLst>
+  </p:cSld>
+  <p:clrMapOvr>
+    <a:masterClrMapping/>
+  </p:clrMapOvr>
+  <p:timing>
+    <p:tnLst>
+      <p:par>
+        <p:cTn id="1" dur="indefinite" restart="never" nodeType="tmRoot"/>
+      </p:par>
+    </p:tnLst>
+  </p:timing>
+</p:sld>
+</file>
+
+<file path=ppt/slides/slide62.xml><?xml version="1.0" encoding="utf-8"?>
 <p:sld xmlns:a="http://schemas.openxmlformats.org/drawingml/2006/main" xmlns:r="http://schemas.openxmlformats.org/officeDocument/2006/relationships" xmlns:p="http://schemas.openxmlformats.org/presentationml/2006/main">
   <p:cSld>
     <p:spTree>
@@ -29399,7 +32462,7 @@
 </p:sld>
 </file>
 
-<file path=ppt/slides/slide54.xml><?xml version="1.0" encoding="utf-8"?>
+<file path=ppt/slides/slide63.xml><?xml version="1.0" encoding="utf-8"?>
 <p:sld xmlns:a="http://schemas.openxmlformats.org/drawingml/2006/main" xmlns:r="http://schemas.openxmlformats.org/officeDocument/2006/relationships" xmlns:p="http://schemas.openxmlformats.org/presentationml/2006/main">
   <p:cSld>
     <p:spTree>
@@ -29792,7 +32855,7 @@
 </p:sld>
 </file>
 
-<file path=ppt/slides/slide55.xml><?xml version="1.0" encoding="utf-8"?>
+<file path=ppt/slides/slide64.xml><?xml version="1.0" encoding="utf-8"?>
 <p:sld xmlns:a="http://schemas.openxmlformats.org/drawingml/2006/main" xmlns:r="http://schemas.openxmlformats.org/officeDocument/2006/relationships" xmlns:p="http://schemas.openxmlformats.org/presentationml/2006/main" show="0">
   <p:cSld>
     <p:spTree>
@@ -29937,215 +33000,6 @@
       <p:transition spd="slow"/>
     </mc:Fallback>
   </mc:AlternateContent>
-  <p:timing>
-    <p:tnLst>
-      <p:par>
-        <p:cTn id="1" dur="indefinite" restart="never" nodeType="tmRoot"/>
-      </p:par>
-    </p:tnLst>
-  </p:timing>
-</p:sld>
-</file>
-
-<file path=ppt/slides/slide6.xml><?xml version="1.0" encoding="utf-8"?>
-<p:sld xmlns:a="http://schemas.openxmlformats.org/drawingml/2006/main" xmlns:r="http://schemas.openxmlformats.org/officeDocument/2006/relationships" xmlns:p="http://schemas.openxmlformats.org/presentationml/2006/main">
-  <p:cSld>
-    <p:spTree>
-      <p:nvGrpSpPr>
-        <p:cNvPr id="1" name=""/>
-        <p:cNvGrpSpPr/>
-        <p:nvPr/>
-      </p:nvGrpSpPr>
-      <p:grpSpPr>
-        <a:xfrm>
-          <a:off x="0" y="0"/>
-          <a:ext cx="0" cy="0"/>
-          <a:chOff x="0" y="0"/>
-          <a:chExt cx="0" cy="0"/>
-        </a:xfrm>
-      </p:grpSpPr>
-      <p:sp>
-        <p:nvSpPr>
-          <p:cNvPr id="5" name="Title 1"/>
-          <p:cNvSpPr>
-            <a:spLocks noGrp="1"/>
-          </p:cNvSpPr>
-          <p:nvPr>
-            <p:ph type="ctrTitle"/>
-          </p:nvPr>
-        </p:nvSpPr>
-        <p:spPr>
-          <a:xfrm>
-            <a:off x="802783" y="270455"/>
-            <a:ext cx="9144000" cy="711548"/>
-          </a:xfrm>
-        </p:spPr>
-        <p:txBody>
-          <a:bodyPr>
-            <a:normAutofit/>
-          </a:bodyPr>
-          <a:lstStyle/>
-          <a:p>
-            <a:pPr algn="l"/>
-            <a:r>
-              <a:rPr lang="en-US" sz="4000" dirty="0"/>
-              <a:t>Population </a:t>
-            </a:r>
-            <a:r>
-              <a:rPr lang="en-US" sz="4000" dirty="0" smtClean="0"/>
-              <a:t>and Sample</a:t>
-            </a:r>
-            <a:endParaRPr lang="en-IN" sz="4000" dirty="0"/>
-          </a:p>
-        </p:txBody>
-      </p:sp>
-      <p:cxnSp>
-        <p:nvCxnSpPr>
-          <p:cNvPr id="7" name="Straight Connector 6"/>
-          <p:cNvCxnSpPr/>
-          <p:nvPr/>
-        </p:nvCxnSpPr>
-        <p:spPr>
-          <a:xfrm>
-            <a:off x="914400" y="956255"/>
-            <a:ext cx="10045521" cy="0"/>
-          </a:xfrm>
-          <a:prstGeom prst="line">
-            <a:avLst/>
-          </a:prstGeom>
-          <a:ln>
-            <a:solidFill>
-              <a:schemeClr val="bg1">
-                <a:lumMod val="75000"/>
-              </a:schemeClr>
-            </a:solidFill>
-          </a:ln>
-        </p:spPr>
-        <p:style>
-          <a:lnRef idx="1">
-            <a:schemeClr val="dk1"/>
-          </a:lnRef>
-          <a:fillRef idx="0">
-            <a:schemeClr val="dk1"/>
-          </a:fillRef>
-          <a:effectRef idx="0">
-            <a:schemeClr val="dk1"/>
-          </a:effectRef>
-          <a:fontRef idx="minor">
-            <a:schemeClr val="tx1"/>
-          </a:fontRef>
-        </p:style>
-      </p:cxnSp>
-      <p:sp>
-        <p:nvSpPr>
-          <p:cNvPr id="2" name="TextBox 1"/>
-          <p:cNvSpPr txBox="1"/>
-          <p:nvPr/>
-        </p:nvSpPr>
-        <p:spPr>
-          <a:xfrm>
-            <a:off x="802784" y="1047241"/>
-            <a:ext cx="10311683" cy="461665"/>
-          </a:xfrm>
-          <a:prstGeom prst="rect">
-            <a:avLst/>
-          </a:prstGeom>
-          <a:noFill/>
-        </p:spPr>
-        <p:txBody>
-          <a:bodyPr wrap="square" rtlCol="0">
-            <a:spAutoFit/>
-          </a:bodyPr>
-          <a:lstStyle/>
-          <a:p>
-            <a:r>
-              <a:rPr lang="en-US" sz="2400" b="1" dirty="0" smtClean="0"/>
-              <a:t>Difference between biased and unbiased estimate of Sample Variance</a:t>
-            </a:r>
-            <a:endParaRPr lang="en-IN" sz="2400" b="1" dirty="0"/>
-          </a:p>
-        </p:txBody>
-      </p:sp>
-      <p:sp>
-        <p:nvSpPr>
-          <p:cNvPr id="6" name="TextBox 5"/>
-          <p:cNvSpPr txBox="1"/>
-          <p:nvPr/>
-        </p:nvSpPr>
-        <p:spPr>
-          <a:xfrm>
-            <a:off x="802783" y="1667803"/>
-            <a:ext cx="10311684" cy="646331"/>
-          </a:xfrm>
-          <a:prstGeom prst="rect">
-            <a:avLst/>
-          </a:prstGeom>
-          <a:noFill/>
-        </p:spPr>
-        <p:txBody>
-          <a:bodyPr wrap="square" rtlCol="0">
-            <a:spAutoFit/>
-          </a:bodyPr>
-          <a:lstStyle/>
-          <a:p>
-            <a:r>
-              <a:rPr lang="en-US" dirty="0" smtClean="0"/>
-              <a:t>Using (n-1) instead of (n) in Sample Standard Deviation and Sample Variance is called </a:t>
-            </a:r>
-            <a:r>
-              <a:rPr lang="en-US" b="1" dirty="0" smtClean="0"/>
-              <a:t>Bessel’s Correction</a:t>
-            </a:r>
-            <a:r>
-              <a:rPr lang="en-US" dirty="0" smtClean="0"/>
-              <a:t>. This corrects the bias in the estimation of the population variance from sample variance.</a:t>
-            </a:r>
-            <a:endParaRPr lang="en-IN" dirty="0"/>
-          </a:p>
-        </p:txBody>
-      </p:sp>
-      <p:sp>
-        <p:nvSpPr>
-          <p:cNvPr id="8" name="TextBox 7"/>
-          <p:cNvSpPr txBox="1"/>
-          <p:nvPr/>
-        </p:nvSpPr>
-        <p:spPr>
-          <a:xfrm>
-            <a:off x="802783" y="2676768"/>
-            <a:ext cx="4005330" cy="646331"/>
-          </a:xfrm>
-          <a:prstGeom prst="rect">
-            <a:avLst/>
-          </a:prstGeom>
-          <a:noFill/>
-        </p:spPr>
-        <p:txBody>
-          <a:bodyPr wrap="square" rtlCol="0">
-            <a:spAutoFit/>
-          </a:bodyPr>
-          <a:lstStyle/>
-          <a:p>
-            <a:r>
-              <a:rPr lang="en-US" dirty="0" smtClean="0"/>
-              <a:t>Explanation:</a:t>
-            </a:r>
-          </a:p>
-          <a:p>
-            <a:endParaRPr lang="en-IN" dirty="0"/>
-          </a:p>
-        </p:txBody>
-      </p:sp>
-    </p:spTree>
-    <p:extLst>
-      <p:ext uri="{BB962C8B-B14F-4D97-AF65-F5344CB8AC3E}">
-        <p14:creationId xmlns:p14="http://schemas.microsoft.com/office/powerpoint/2010/main" val="3935298623"/>
-      </p:ext>
-    </p:extLst>
-  </p:cSld>
-  <p:clrMapOvr>
-    <a:masterClrMapping/>
-  </p:clrMapOvr>
   <p:timing>
     <p:tnLst>
       <p:par>

</xml_diff>